<commit_message>
fixed typos, added info about GitHub
</commit_message>
<xml_diff>
--- a/versionhallinta.pptx
+++ b/versionhallinta.pptx
@@ -179,7 +179,7 @@
 <file path=ppt/revisionInfo.xml><?xml version="1.0" encoding="utf-8"?>
 <p1510:revInfo xmlns:a="http://schemas.openxmlformats.org/drawingml/2006/main" xmlns:r="http://schemas.openxmlformats.org/officeDocument/2006/relationships" xmlns:p1510="http://schemas.microsoft.com/office/powerpoint/2015/10/main">
   <p1510:revLst>
-    <p1510:client id="{442BC05D-2D09-4631-8A27-83814B4C3FF3}" v="32" dt="2018-12-06T16:26:24.056"/>
+    <p1510:client id="{5D8233FE-1C15-4CED-B334-6EBC4EAA9096}" v="2" dt="2019-01-18T06:15:21.395"/>
   </p1510:revLst>
 </p1510:revInfo>
 </file>
@@ -399,21 +399,6 @@
           </ac:spMkLst>
         </pc:spChg>
       </pc:sldChg>
-      <pc:sldChg chg="modSp add del">
-        <pc:chgData name="Mikko Pääkkönen" userId="738bf089a40c7f08" providerId="LiveId" clId="{442BC05D-2D09-4631-8A27-83814B4C3FF3}" dt="2018-12-06T16:24:23.605" v="1374" actId="2696"/>
-        <pc:sldMkLst>
-          <pc:docMk/>
-          <pc:sldMk cId="2701250902" sldId="290"/>
-        </pc:sldMkLst>
-        <pc:spChg chg="mod">
-          <ac:chgData name="Mikko Pääkkönen" userId="738bf089a40c7f08" providerId="LiveId" clId="{442BC05D-2D09-4631-8A27-83814B4C3FF3}" dt="2018-12-06T16:22:16.491" v="1300" actId="20577"/>
-          <ac:spMkLst>
-            <pc:docMk/>
-            <pc:sldMk cId="2701250902" sldId="290"/>
-            <ac:spMk id="2" creationId="{094DB930-2672-49D9-A543-781948FEFDBB}"/>
-          </ac:spMkLst>
-        </pc:spChg>
-      </pc:sldChg>
       <pc:sldChg chg="addSp delSp modSp add ord">
         <pc:chgData name="Mikko Pääkkönen" userId="738bf089a40c7f08" providerId="LiveId" clId="{442BC05D-2D09-4631-8A27-83814B4C3FF3}" dt="2018-12-06T16:24:16.117" v="1373" actId="20577"/>
         <pc:sldMkLst>
@@ -457,88 +442,22 @@
   </pc:docChgLst>
   <pc:docChgLst>
     <pc:chgData name="Mikko Pääkkönen" userId="738bf089a40c7f08" providerId="LiveId" clId="{7371DB93-0DF9-4B60-9C3A-91FFF4D00BD4}"/>
-    <pc:docChg chg="undo custSel addSld delSld modSld sldOrd">
-      <pc:chgData name="Mikko Pääkkönen" userId="738bf089a40c7f08" providerId="LiveId" clId="{7371DB93-0DF9-4B60-9C3A-91FFF4D00BD4}" dt="2018-09-26T05:57:01.480" v="3699" actId="20577"/>
+  </pc:docChgLst>
+  <pc:docChgLst>
+    <pc:chgData name="Mikko Pääkkönen" userId="738bf089a40c7f08" providerId="LiveId" clId="{5D8233FE-1C15-4CED-B334-6EBC4EAA9096}"/>
+    <pc:docChg chg="modSld">
+      <pc:chgData name="Mikko Pääkkönen" userId="738bf089a40c7f08" providerId="LiveId" clId="{5D8233FE-1C15-4CED-B334-6EBC4EAA9096}" dt="2019-01-18T06:15:22.801" v="241" actId="20577"/>
       <pc:docMkLst>
         <pc:docMk/>
       </pc:docMkLst>
       <pc:sldChg chg="modSp">
-        <pc:chgData name="Mikko Pääkkönen" userId="738bf089a40c7f08" providerId="LiveId" clId="{7371DB93-0DF9-4B60-9C3A-91FFF4D00BD4}" dt="2018-09-11T13:52:00.990" v="479" actId="20577"/>
-        <pc:sldMkLst>
-          <pc:docMk/>
-          <pc:sldMk cId="0" sldId="257"/>
-        </pc:sldMkLst>
-        <pc:spChg chg="mod">
-          <ac:chgData name="Mikko Pääkkönen" userId="738bf089a40c7f08" providerId="LiveId" clId="{7371DB93-0DF9-4B60-9C3A-91FFF4D00BD4}" dt="2018-09-11T13:52:00.990" v="479" actId="20577"/>
-          <ac:spMkLst>
-            <pc:docMk/>
-            <pc:sldMk cId="0" sldId="257"/>
-            <ac:spMk id="4" creationId="{00000000-0000-0000-0000-000000000000}"/>
-          </ac:spMkLst>
-        </pc:spChg>
-        <pc:spChg chg="mod">
-          <ac:chgData name="Mikko Pääkkönen" userId="738bf089a40c7f08" providerId="LiveId" clId="{7371DB93-0DF9-4B60-9C3A-91FFF4D00BD4}" dt="2018-09-11T13:39:11.750" v="24" actId="20577"/>
-          <ac:spMkLst>
-            <pc:docMk/>
-            <pc:sldMk cId="0" sldId="257"/>
-            <ac:spMk id="20482" creationId="{00000000-0000-0000-0000-000000000000}"/>
-          </ac:spMkLst>
-        </pc:spChg>
-      </pc:sldChg>
-      <pc:sldChg chg="modSp">
-        <pc:chgData name="Mikko Pääkkönen" userId="738bf089a40c7f08" providerId="LiveId" clId="{7371DB93-0DF9-4B60-9C3A-91FFF4D00BD4}" dt="2018-09-11T14:18:51.311" v="1666" actId="404"/>
-        <pc:sldMkLst>
-          <pc:docMk/>
-          <pc:sldMk cId="0" sldId="259"/>
-        </pc:sldMkLst>
-        <pc:spChg chg="mod">
-          <ac:chgData name="Mikko Pääkkönen" userId="738bf089a40c7f08" providerId="LiveId" clId="{7371DB93-0DF9-4B60-9C3A-91FFF4D00BD4}" dt="2018-09-11T13:48:05.077" v="200" actId="20577"/>
-          <ac:spMkLst>
-            <pc:docMk/>
-            <pc:sldMk cId="0" sldId="259"/>
-            <ac:spMk id="5" creationId="{00000000-0000-0000-0000-000000000000}"/>
-          </ac:spMkLst>
-        </pc:spChg>
-        <pc:spChg chg="mod">
-          <ac:chgData name="Mikko Pääkkönen" userId="738bf089a40c7f08" providerId="LiveId" clId="{7371DB93-0DF9-4B60-9C3A-91FFF4D00BD4}" dt="2018-09-11T14:18:51.311" v="1666" actId="404"/>
-          <ac:spMkLst>
-            <pc:docMk/>
-            <pc:sldMk cId="0" sldId="259"/>
-            <ac:spMk id="6" creationId="{00000000-0000-0000-0000-000000000000}"/>
-          </ac:spMkLst>
-        </pc:spChg>
-      </pc:sldChg>
-      <pc:sldChg chg="modSp">
-        <pc:chgData name="Mikko Pääkkönen" userId="738bf089a40c7f08" providerId="LiveId" clId="{7371DB93-0DF9-4B60-9C3A-91FFF4D00BD4}" dt="2018-09-11T14:21:05.350" v="1679" actId="20577"/>
-        <pc:sldMkLst>
-          <pc:docMk/>
-          <pc:sldMk cId="1145613939" sldId="271"/>
-        </pc:sldMkLst>
-        <pc:spChg chg="mod">
-          <ac:chgData name="Mikko Pääkkönen" userId="738bf089a40c7f08" providerId="LiveId" clId="{7371DB93-0DF9-4B60-9C3A-91FFF4D00BD4}" dt="2018-09-11T14:21:05.350" v="1679" actId="20577"/>
-          <ac:spMkLst>
-            <pc:docMk/>
-            <pc:sldMk cId="1145613939" sldId="271"/>
-            <ac:spMk id="2" creationId="{00000000-0000-0000-0000-000000000000}"/>
-          </ac:spMkLst>
-        </pc:spChg>
-      </pc:sldChg>
-      <pc:sldChg chg="modSp add modNotesTx">
-        <pc:chgData name="Mikko Pääkkönen" userId="738bf089a40c7f08" providerId="LiveId" clId="{7371DB93-0DF9-4B60-9C3A-91FFF4D00BD4}" dt="2018-09-11T14:23:33.030" v="1829" actId="20577"/>
+        <pc:chgData name="Mikko Pääkkönen" userId="738bf089a40c7f08" providerId="LiveId" clId="{5D8233FE-1C15-4CED-B334-6EBC4EAA9096}" dt="2019-01-18T06:08:47.382" v="3" actId="20577"/>
         <pc:sldMkLst>
           <pc:docMk/>
           <pc:sldMk cId="3378279309" sldId="274"/>
         </pc:sldMkLst>
         <pc:spChg chg="mod">
-          <ac:chgData name="Mikko Pääkkönen" userId="738bf089a40c7f08" providerId="LiveId" clId="{7371DB93-0DF9-4B60-9C3A-91FFF4D00BD4}" dt="2018-09-11T14:23:33.030" v="1829" actId="20577"/>
-          <ac:spMkLst>
-            <pc:docMk/>
-            <pc:sldMk cId="3378279309" sldId="274"/>
-            <ac:spMk id="3" creationId="{00000000-0000-0000-0000-000000000000}"/>
-          </ac:spMkLst>
-        </pc:spChg>
-        <pc:spChg chg="mod">
-          <ac:chgData name="Mikko Pääkkönen" userId="738bf089a40c7f08" providerId="LiveId" clId="{7371DB93-0DF9-4B60-9C3A-91FFF4D00BD4}" dt="2018-09-11T13:56:41.971" v="647" actId="5793"/>
+          <ac:chgData name="Mikko Pääkkönen" userId="738bf089a40c7f08" providerId="LiveId" clId="{5D8233FE-1C15-4CED-B334-6EBC4EAA9096}" dt="2019-01-18T06:08:47.382" v="3" actId="20577"/>
           <ac:spMkLst>
             <pc:docMk/>
             <pc:sldMk cId="3378279309" sldId="274"/>
@@ -546,84 +465,14 @@
           </ac:spMkLst>
         </pc:spChg>
       </pc:sldChg>
-      <pc:sldChg chg="modSp add ord">
-        <pc:chgData name="Mikko Pääkkönen" userId="738bf089a40c7f08" providerId="LiveId" clId="{7371DB93-0DF9-4B60-9C3A-91FFF4D00BD4}" dt="2018-09-11T13:47:07.861" v="161"/>
-        <pc:sldMkLst>
-          <pc:docMk/>
-          <pc:sldMk cId="102781314" sldId="275"/>
-        </pc:sldMkLst>
-        <pc:spChg chg="mod">
-          <ac:chgData name="Mikko Pääkkönen" userId="738bf089a40c7f08" providerId="LiveId" clId="{7371DB93-0DF9-4B60-9C3A-91FFF4D00BD4}" dt="2018-09-11T13:45:54.362" v="150" actId="20577"/>
-          <ac:spMkLst>
-            <pc:docMk/>
-            <pc:sldMk cId="102781314" sldId="275"/>
-            <ac:spMk id="2" creationId="{D7ED3B97-F8D3-4697-8656-419A62126E0E}"/>
-          </ac:spMkLst>
-        </pc:spChg>
-        <pc:spChg chg="mod">
-          <ac:chgData name="Mikko Pääkkönen" userId="738bf089a40c7f08" providerId="LiveId" clId="{7371DB93-0DF9-4B60-9C3A-91FFF4D00BD4}" dt="2018-09-11T13:46:23.599" v="156"/>
-          <ac:spMkLst>
-            <pc:docMk/>
-            <pc:sldMk cId="102781314" sldId="275"/>
-            <ac:spMk id="3" creationId="{C6B65E48-DD32-4483-A03D-6E69AC8E7536}"/>
-          </ac:spMkLst>
-        </pc:spChg>
-        <pc:spChg chg="mod">
-          <ac:chgData name="Mikko Pääkkönen" userId="738bf089a40c7f08" providerId="LiveId" clId="{7371DB93-0DF9-4B60-9C3A-91FFF4D00BD4}" dt="2018-09-11T13:46:36.333" v="160" actId="20577"/>
-          <ac:spMkLst>
-            <pc:docMk/>
-            <pc:sldMk cId="102781314" sldId="275"/>
-            <ac:spMk id="4" creationId="{E2FBBCD5-1234-4BA5-B816-9359CB36DD98}"/>
-          </ac:spMkLst>
-        </pc:spChg>
-      </pc:sldChg>
-      <pc:sldChg chg="modSp add">
-        <pc:chgData name="Mikko Pääkkönen" userId="738bf089a40c7f08" providerId="LiveId" clId="{7371DB93-0DF9-4B60-9C3A-91FFF4D00BD4}" dt="2018-09-11T14:05:51.806" v="913" actId="20577"/>
-        <pc:sldMkLst>
-          <pc:docMk/>
-          <pc:sldMk cId="346251895" sldId="276"/>
-        </pc:sldMkLst>
-        <pc:spChg chg="mod">
-          <ac:chgData name="Mikko Pääkkönen" userId="738bf089a40c7f08" providerId="LiveId" clId="{7371DB93-0DF9-4B60-9C3A-91FFF4D00BD4}" dt="2018-09-11T14:05:20.799" v="906" actId="6549"/>
-          <ac:spMkLst>
-            <pc:docMk/>
-            <pc:sldMk cId="346251895" sldId="276"/>
-            <ac:spMk id="3" creationId="{00000000-0000-0000-0000-000000000000}"/>
-          </ac:spMkLst>
-        </pc:spChg>
-        <pc:spChg chg="mod">
-          <ac:chgData name="Mikko Pääkkönen" userId="738bf089a40c7f08" providerId="LiveId" clId="{7371DB93-0DF9-4B60-9C3A-91FFF4D00BD4}" dt="2018-09-11T14:05:51.806" v="913" actId="20577"/>
-          <ac:spMkLst>
-            <pc:docMk/>
-            <pc:sldMk cId="346251895" sldId="276"/>
-            <ac:spMk id="5" creationId="{00000000-0000-0000-0000-000000000000}"/>
-          </ac:spMkLst>
-        </pc:spChg>
-        <pc:spChg chg="mod">
-          <ac:chgData name="Mikko Pääkkönen" userId="738bf089a40c7f08" providerId="LiveId" clId="{7371DB93-0DF9-4B60-9C3A-91FFF4D00BD4}" dt="2018-09-11T14:05:17.989" v="905" actId="6549"/>
-          <ac:spMkLst>
-            <pc:docMk/>
-            <pc:sldMk cId="346251895" sldId="276"/>
-            <ac:spMk id="6" creationId="{00000000-0000-0000-0000-000000000000}"/>
-          </ac:spMkLst>
-        </pc:spChg>
-      </pc:sldChg>
-      <pc:sldChg chg="modSp add">
-        <pc:chgData name="Mikko Pääkkönen" userId="738bf089a40c7f08" providerId="LiveId" clId="{7371DB93-0DF9-4B60-9C3A-91FFF4D00BD4}" dt="2018-09-11T14:07:45.652" v="1191" actId="20577"/>
+      <pc:sldChg chg="modSp">
+        <pc:chgData name="Mikko Pääkkönen" userId="738bf089a40c7f08" providerId="LiveId" clId="{5D8233FE-1C15-4CED-B334-6EBC4EAA9096}" dt="2019-01-18T06:15:22.801" v="241" actId="20577"/>
         <pc:sldMkLst>
           <pc:docMk/>
           <pc:sldMk cId="4007713199" sldId="277"/>
         </pc:sldMkLst>
         <pc:spChg chg="mod">
-          <ac:chgData name="Mikko Pääkkönen" userId="738bf089a40c7f08" providerId="LiveId" clId="{7371DB93-0DF9-4B60-9C3A-91FFF4D00BD4}" dt="2018-09-11T14:05:56.663" v="917" actId="20577"/>
-          <ac:spMkLst>
-            <pc:docMk/>
-            <pc:sldMk cId="4007713199" sldId="277"/>
-            <ac:spMk id="5" creationId="{00000000-0000-0000-0000-000000000000}"/>
-          </ac:spMkLst>
-        </pc:spChg>
-        <pc:spChg chg="mod">
-          <ac:chgData name="Mikko Pääkkönen" userId="738bf089a40c7f08" providerId="LiveId" clId="{7371DB93-0DF9-4B60-9C3A-91FFF4D00BD4}" dt="2018-09-11T14:07:45.652" v="1191" actId="20577"/>
+          <ac:chgData name="Mikko Pääkkönen" userId="738bf089a40c7f08" providerId="LiveId" clId="{5D8233FE-1C15-4CED-B334-6EBC4EAA9096}" dt="2019-01-18T06:15:22.801" v="241" actId="20577"/>
           <ac:spMkLst>
             <pc:docMk/>
             <pc:sldMk cId="4007713199" sldId="277"/>
@@ -631,332 +480,20 @@
           </ac:spMkLst>
         </pc:spChg>
       </pc:sldChg>
-      <pc:sldChg chg="addSp modSp add">
-        <pc:chgData name="Mikko Pääkkönen" userId="738bf089a40c7f08" providerId="LiveId" clId="{7371DB93-0DF9-4B60-9C3A-91FFF4D00BD4}" dt="2018-09-26T05:45:45.462" v="3187" actId="1076"/>
+      <pc:sldChg chg="modSp">
+        <pc:chgData name="Mikko Pääkkönen" userId="738bf089a40c7f08" providerId="LiveId" clId="{5D8233FE-1C15-4CED-B334-6EBC4EAA9096}" dt="2019-01-18T06:12:51.836" v="152" actId="20577"/>
         <pc:sldMkLst>
           <pc:docMk/>
-          <pc:sldMk cId="1761254096" sldId="278"/>
+          <pc:sldMk cId="2670121243" sldId="289"/>
         </pc:sldMkLst>
         <pc:spChg chg="mod">
-          <ac:chgData name="Mikko Pääkkönen" userId="738bf089a40c7f08" providerId="LiveId" clId="{7371DB93-0DF9-4B60-9C3A-91FFF4D00BD4}" dt="2018-09-11T14:10:36.394" v="1272" actId="20577"/>
+          <ac:chgData name="Mikko Pääkkönen" userId="738bf089a40c7f08" providerId="LiveId" clId="{5D8233FE-1C15-4CED-B334-6EBC4EAA9096}" dt="2019-01-18T06:12:51.836" v="152" actId="20577"/>
           <ac:spMkLst>
             <pc:docMk/>
-            <pc:sldMk cId="1761254096" sldId="278"/>
-            <ac:spMk id="2" creationId="{094DB930-2672-49D9-A543-781948FEFDBB}"/>
-          </ac:spMkLst>
-        </pc:spChg>
-        <pc:spChg chg="mod">
-          <ac:chgData name="Mikko Pääkkönen" userId="738bf089a40c7f08" providerId="LiveId" clId="{7371DB93-0DF9-4B60-9C3A-91FFF4D00BD4}" dt="2018-09-11T14:12:35.491" v="1389" actId="5793"/>
-          <ac:spMkLst>
-            <pc:docMk/>
-            <pc:sldMk cId="1761254096" sldId="278"/>
+            <pc:sldMk cId="2670121243" sldId="289"/>
             <ac:spMk id="3" creationId="{80F09F31-0F4A-402B-9DEA-4943ABCD730A}"/>
           </ac:spMkLst>
         </pc:spChg>
-        <pc:picChg chg="add mod">
-          <ac:chgData name="Mikko Pääkkönen" userId="738bf089a40c7f08" providerId="LiveId" clId="{7371DB93-0DF9-4B60-9C3A-91FFF4D00BD4}" dt="2018-09-26T05:45:45.462" v="3187" actId="1076"/>
-          <ac:picMkLst>
-            <pc:docMk/>
-            <pc:sldMk cId="1761254096" sldId="278"/>
-            <ac:picMk id="3074" creationId="{89099A95-FDAB-4E01-AF9F-E6B8CC7CCBA7}"/>
-          </ac:picMkLst>
-        </pc:picChg>
-      </pc:sldChg>
-      <pc:sldChg chg="addSp modSp add">
-        <pc:chgData name="Mikko Pääkkönen" userId="738bf089a40c7f08" providerId="LiveId" clId="{7371DB93-0DF9-4B60-9C3A-91FFF4D00BD4}" dt="2018-09-26T05:45:59.331" v="3188"/>
-        <pc:sldMkLst>
-          <pc:docMk/>
-          <pc:sldMk cId="3796990650" sldId="279"/>
-        </pc:sldMkLst>
-        <pc:spChg chg="mod">
-          <ac:chgData name="Mikko Pääkkönen" userId="738bf089a40c7f08" providerId="LiveId" clId="{7371DB93-0DF9-4B60-9C3A-91FFF4D00BD4}" dt="2018-09-11T14:13:51.263" v="1431" actId="20577"/>
-          <ac:spMkLst>
-            <pc:docMk/>
-            <pc:sldMk cId="3796990650" sldId="279"/>
-            <ac:spMk id="2" creationId="{094DB930-2672-49D9-A543-781948FEFDBB}"/>
-          </ac:spMkLst>
-        </pc:spChg>
-        <pc:spChg chg="mod">
-          <ac:chgData name="Mikko Pääkkönen" userId="738bf089a40c7f08" providerId="LiveId" clId="{7371DB93-0DF9-4B60-9C3A-91FFF4D00BD4}" dt="2018-09-11T14:15:26.552" v="1560" actId="15"/>
-          <ac:spMkLst>
-            <pc:docMk/>
-            <pc:sldMk cId="3796990650" sldId="279"/>
-            <ac:spMk id="3" creationId="{80F09F31-0F4A-402B-9DEA-4943ABCD730A}"/>
-          </ac:spMkLst>
-        </pc:spChg>
-        <pc:picChg chg="add">
-          <ac:chgData name="Mikko Pääkkönen" userId="738bf089a40c7f08" providerId="LiveId" clId="{7371DB93-0DF9-4B60-9C3A-91FFF4D00BD4}" dt="2018-09-26T05:45:59.331" v="3188"/>
-          <ac:picMkLst>
-            <pc:docMk/>
-            <pc:sldMk cId="3796990650" sldId="279"/>
-            <ac:picMk id="5" creationId="{AB0B8663-C4FC-4020-BFAA-C476B0BBDB05}"/>
-          </ac:picMkLst>
-        </pc:picChg>
-      </pc:sldChg>
-      <pc:sldChg chg="modSp add ord">
-        <pc:chgData name="Mikko Pääkkönen" userId="738bf089a40c7f08" providerId="LiveId" clId="{7371DB93-0DF9-4B60-9C3A-91FFF4D00BD4}" dt="2018-09-26T05:40:50.441" v="3168" actId="114"/>
-        <pc:sldMkLst>
-          <pc:docMk/>
-          <pc:sldMk cId="4228207482" sldId="280"/>
-        </pc:sldMkLst>
-        <pc:spChg chg="mod">
-          <ac:chgData name="Mikko Pääkkönen" userId="738bf089a40c7f08" providerId="LiveId" clId="{7371DB93-0DF9-4B60-9C3A-91FFF4D00BD4}" dt="2018-09-11T14:21:50.127" v="1735" actId="20577"/>
-          <ac:spMkLst>
-            <pc:docMk/>
-            <pc:sldMk cId="4228207482" sldId="280"/>
-            <ac:spMk id="2" creationId="{094DB930-2672-49D9-A543-781948FEFDBB}"/>
-          </ac:spMkLst>
-        </pc:spChg>
-        <pc:spChg chg="mod">
-          <ac:chgData name="Mikko Pääkkönen" userId="738bf089a40c7f08" providerId="LiveId" clId="{7371DB93-0DF9-4B60-9C3A-91FFF4D00BD4}" dt="2018-09-26T05:40:50.441" v="3168" actId="114"/>
-          <ac:spMkLst>
-            <pc:docMk/>
-            <pc:sldMk cId="4228207482" sldId="280"/>
-            <ac:spMk id="3" creationId="{80F09F31-0F4A-402B-9DEA-4943ABCD730A}"/>
-          </ac:spMkLst>
-        </pc:spChg>
-      </pc:sldChg>
-      <pc:sldChg chg="addSp delSp modSp add">
-        <pc:chgData name="Mikko Pääkkönen" userId="738bf089a40c7f08" providerId="LiveId" clId="{7371DB93-0DF9-4B60-9C3A-91FFF4D00BD4}" dt="2018-09-26T05:41:27.358" v="3176" actId="14100"/>
-        <pc:sldMkLst>
-          <pc:docMk/>
-          <pc:sldMk cId="2255474097" sldId="281"/>
-        </pc:sldMkLst>
-        <pc:spChg chg="del">
-          <ac:chgData name="Mikko Pääkkönen" userId="738bf089a40c7f08" providerId="LiveId" clId="{7371DB93-0DF9-4B60-9C3A-91FFF4D00BD4}" dt="2018-09-25T13:47:22.806" v="2060"/>
-          <ac:spMkLst>
-            <pc:docMk/>
-            <pc:sldMk cId="2255474097" sldId="281"/>
-            <ac:spMk id="2" creationId="{23EA5891-2A3E-4198-925B-6FA5E3350116}"/>
-          </ac:spMkLst>
-        </pc:spChg>
-        <pc:spChg chg="del">
-          <ac:chgData name="Mikko Pääkkönen" userId="738bf089a40c7f08" providerId="LiveId" clId="{7371DB93-0DF9-4B60-9C3A-91FFF4D00BD4}" dt="2018-09-25T13:47:22.806" v="2060"/>
-          <ac:spMkLst>
-            <pc:docMk/>
-            <pc:sldMk cId="2255474097" sldId="281"/>
-            <ac:spMk id="3" creationId="{1FD9E308-77C4-4008-9B94-14C0DA3A5A44}"/>
-          </ac:spMkLst>
-        </pc:spChg>
-        <pc:spChg chg="mod">
-          <ac:chgData name="Mikko Pääkkönen" userId="738bf089a40c7f08" providerId="LiveId" clId="{7371DB93-0DF9-4B60-9C3A-91FFF4D00BD4}" dt="2018-09-26T05:41:27.358" v="3176" actId="14100"/>
-          <ac:spMkLst>
-            <pc:docMk/>
-            <pc:sldMk cId="2255474097" sldId="281"/>
-            <ac:spMk id="4" creationId="{CD757016-FBB2-409C-84E4-A85215112A01}"/>
-          </ac:spMkLst>
-        </pc:spChg>
-        <pc:spChg chg="add del mod">
-          <ac:chgData name="Mikko Pääkkönen" userId="738bf089a40c7f08" providerId="LiveId" clId="{7371DB93-0DF9-4B60-9C3A-91FFF4D00BD4}" dt="2018-09-25T13:47:53.601" v="2061"/>
-          <ac:spMkLst>
-            <pc:docMk/>
-            <pc:sldMk cId="2255474097" sldId="281"/>
-            <ac:spMk id="5" creationId="{A88F3C1E-79B5-47B9-9FF6-2290E52E738E}"/>
-          </ac:spMkLst>
-        </pc:spChg>
-        <pc:spChg chg="add del mod">
-          <ac:chgData name="Mikko Pääkkönen" userId="738bf089a40c7f08" providerId="LiveId" clId="{7371DB93-0DF9-4B60-9C3A-91FFF4D00BD4}" dt="2018-09-25T13:48:54.291" v="2066"/>
-          <ac:spMkLst>
-            <pc:docMk/>
-            <pc:sldMk cId="2255474097" sldId="281"/>
-            <ac:spMk id="8" creationId="{E132AD37-EC53-462E-9447-1AD3CD405704}"/>
-          </ac:spMkLst>
-        </pc:spChg>
-        <pc:picChg chg="add del mod">
-          <ac:chgData name="Mikko Pääkkönen" userId="738bf089a40c7f08" providerId="LiveId" clId="{7371DB93-0DF9-4B60-9C3A-91FFF4D00BD4}" dt="2018-09-25T13:48:34.593" v="2065" actId="478"/>
-          <ac:picMkLst>
-            <pc:docMk/>
-            <pc:sldMk cId="2255474097" sldId="281"/>
-            <ac:picMk id="6" creationId="{A877A6A8-7B80-4ED4-AEF3-769694FF9574}"/>
-          </ac:picMkLst>
-        </pc:picChg>
-        <pc:picChg chg="add mod">
-          <ac:chgData name="Mikko Pääkkönen" userId="738bf089a40c7f08" providerId="LiveId" clId="{7371DB93-0DF9-4B60-9C3A-91FFF4D00BD4}" dt="2018-09-25T13:49:03.070" v="2069" actId="1076"/>
-          <ac:picMkLst>
-            <pc:docMk/>
-            <pc:sldMk cId="2255474097" sldId="281"/>
-            <ac:picMk id="9" creationId="{061772FC-DBF1-46CA-9279-6212D65CD664}"/>
-          </ac:picMkLst>
-        </pc:picChg>
-      </pc:sldChg>
-      <pc:sldChg chg="addSp modSp add">
-        <pc:chgData name="Mikko Pääkkönen" userId="738bf089a40c7f08" providerId="LiveId" clId="{7371DB93-0DF9-4B60-9C3A-91FFF4D00BD4}" dt="2018-09-26T05:46:01.769" v="3189"/>
-        <pc:sldMkLst>
-          <pc:docMk/>
-          <pc:sldMk cId="1885639018" sldId="282"/>
-        </pc:sldMkLst>
-        <pc:spChg chg="mod">
-          <ac:chgData name="Mikko Pääkkönen" userId="738bf089a40c7f08" providerId="LiveId" clId="{7371DB93-0DF9-4B60-9C3A-91FFF4D00BD4}" dt="2018-09-26T05:22:36.752" v="2856" actId="20577"/>
-          <ac:spMkLst>
-            <pc:docMk/>
-            <pc:sldMk cId="1885639018" sldId="282"/>
-            <ac:spMk id="2" creationId="{094DB930-2672-49D9-A543-781948FEFDBB}"/>
-          </ac:spMkLst>
-        </pc:spChg>
-        <pc:spChg chg="mod">
-          <ac:chgData name="Mikko Pääkkönen" userId="738bf089a40c7f08" providerId="LiveId" clId="{7371DB93-0DF9-4B60-9C3A-91FFF4D00BD4}" dt="2018-09-26T05:10:00.009" v="2610" actId="20577"/>
-          <ac:spMkLst>
-            <pc:docMk/>
-            <pc:sldMk cId="1885639018" sldId="282"/>
-            <ac:spMk id="3" creationId="{80F09F31-0F4A-402B-9DEA-4943ABCD730A}"/>
-          </ac:spMkLst>
-        </pc:spChg>
-        <pc:spChg chg="mod">
-          <ac:chgData name="Mikko Pääkkönen" userId="738bf089a40c7f08" providerId="LiveId" clId="{7371DB93-0DF9-4B60-9C3A-91FFF4D00BD4}" dt="2018-09-26T05:08:17.007" v="2559" actId="20577"/>
-          <ac:spMkLst>
-            <pc:docMk/>
-            <pc:sldMk cId="1885639018" sldId="282"/>
-            <ac:spMk id="4" creationId="{4AB9EB3A-A16B-4531-8975-06E80423883E}"/>
-          </ac:spMkLst>
-        </pc:spChg>
-        <pc:picChg chg="add">
-          <ac:chgData name="Mikko Pääkkönen" userId="738bf089a40c7f08" providerId="LiveId" clId="{7371DB93-0DF9-4B60-9C3A-91FFF4D00BD4}" dt="2018-09-26T05:46:01.769" v="3189"/>
-          <ac:picMkLst>
-            <pc:docMk/>
-            <pc:sldMk cId="1885639018" sldId="282"/>
-            <ac:picMk id="5" creationId="{72640193-F4E3-4E22-91C0-CFC6EA110C5B}"/>
-          </ac:picMkLst>
-        </pc:picChg>
-      </pc:sldChg>
-      <pc:sldChg chg="addSp delSp modSp add">
-        <pc:chgData name="Mikko Pääkkönen" userId="738bf089a40c7f08" providerId="LiveId" clId="{7371DB93-0DF9-4B60-9C3A-91FFF4D00BD4}" dt="2018-09-26T05:46:07.441" v="3191"/>
-        <pc:sldMkLst>
-          <pc:docMk/>
-          <pc:sldMk cId="4218320821" sldId="283"/>
-        </pc:sldMkLst>
-        <pc:spChg chg="mod">
-          <ac:chgData name="Mikko Pääkkönen" userId="738bf089a40c7f08" providerId="LiveId" clId="{7371DB93-0DF9-4B60-9C3A-91FFF4D00BD4}" dt="2018-09-26T05:11:01.230" v="2622" actId="20577"/>
-          <ac:spMkLst>
-            <pc:docMk/>
-            <pc:sldMk cId="4218320821" sldId="283"/>
-            <ac:spMk id="2" creationId="{094DB930-2672-49D9-A543-781948FEFDBB}"/>
-          </ac:spMkLst>
-        </pc:spChg>
-        <pc:spChg chg="del mod">
-          <ac:chgData name="Mikko Pääkkönen" userId="738bf089a40c7f08" providerId="LiveId" clId="{7371DB93-0DF9-4B60-9C3A-91FFF4D00BD4}" dt="2018-09-26T05:10:55.180" v="2613"/>
-          <ac:spMkLst>
-            <pc:docMk/>
-            <pc:sldMk cId="4218320821" sldId="283"/>
-            <ac:spMk id="3" creationId="{80F09F31-0F4A-402B-9DEA-4943ABCD730A}"/>
-          </ac:spMkLst>
-        </pc:spChg>
-        <pc:spChg chg="mod">
-          <ac:chgData name="Mikko Pääkkönen" userId="738bf089a40c7f08" providerId="LiveId" clId="{7371DB93-0DF9-4B60-9C3A-91FFF4D00BD4}" dt="2018-09-26T05:11:31.936" v="2653" actId="20577"/>
-          <ac:spMkLst>
-            <pc:docMk/>
-            <pc:sldMk cId="4218320821" sldId="283"/>
-            <ac:spMk id="4" creationId="{4AB9EB3A-A16B-4531-8975-06E80423883E}"/>
-          </ac:spMkLst>
-        </pc:spChg>
-        <pc:picChg chg="add">
-          <ac:chgData name="Mikko Pääkkönen" userId="738bf089a40c7f08" providerId="LiveId" clId="{7371DB93-0DF9-4B60-9C3A-91FFF4D00BD4}" dt="2018-09-26T05:46:07.441" v="3191"/>
-          <ac:picMkLst>
-            <pc:docMk/>
-            <pc:sldMk cId="4218320821" sldId="283"/>
-            <ac:picMk id="6" creationId="{3AB9C826-94D1-47A2-9EB7-634C9567DF35}"/>
-          </ac:picMkLst>
-        </pc:picChg>
-        <pc:picChg chg="add">
-          <ac:chgData name="Mikko Pääkkönen" userId="738bf089a40c7f08" providerId="LiveId" clId="{7371DB93-0DF9-4B60-9C3A-91FFF4D00BD4}" dt="2018-09-26T05:10:55.180" v="2613"/>
-          <ac:picMkLst>
-            <pc:docMk/>
-            <pc:sldMk cId="4218320821" sldId="283"/>
-            <ac:picMk id="2050" creationId="{9F1DDE8C-2885-4563-8C53-3D54F68EFF80}"/>
-          </ac:picMkLst>
-        </pc:picChg>
-      </pc:sldChg>
-      <pc:sldChg chg="modSp add ord">
-        <pc:chgData name="Mikko Pääkkönen" userId="738bf089a40c7f08" providerId="LiveId" clId="{7371DB93-0DF9-4B60-9C3A-91FFF4D00BD4}" dt="2018-09-26T05:41:40.017" v="3183" actId="20577"/>
-        <pc:sldMkLst>
-          <pc:docMk/>
-          <pc:sldMk cId="468159001" sldId="284"/>
-        </pc:sldMkLst>
-        <pc:spChg chg="mod">
-          <ac:chgData name="Mikko Pääkkönen" userId="738bf089a40c7f08" providerId="LiveId" clId="{7371DB93-0DF9-4B60-9C3A-91FFF4D00BD4}" dt="2018-09-26T05:41:40.017" v="3183" actId="20577"/>
-          <ac:spMkLst>
-            <pc:docMk/>
-            <pc:sldMk cId="468159001" sldId="284"/>
-            <ac:spMk id="2" creationId="{094DB930-2672-49D9-A543-781948FEFDBB}"/>
-          </ac:spMkLst>
-        </pc:spChg>
-        <pc:spChg chg="mod">
-          <ac:chgData name="Mikko Pääkkönen" userId="738bf089a40c7f08" providerId="LiveId" clId="{7371DB93-0DF9-4B60-9C3A-91FFF4D00BD4}" dt="2018-09-26T05:20:08.848" v="2852" actId="404"/>
-          <ac:spMkLst>
-            <pc:docMk/>
-            <pc:sldMk cId="468159001" sldId="284"/>
-            <ac:spMk id="3" creationId="{80F09F31-0F4A-402B-9DEA-4943ABCD730A}"/>
-          </ac:spMkLst>
-        </pc:spChg>
-      </pc:sldChg>
-      <pc:sldChg chg="addSp modSp add">
-        <pc:chgData name="Mikko Pääkkönen" userId="738bf089a40c7f08" providerId="LiveId" clId="{7371DB93-0DF9-4B60-9C3A-91FFF4D00BD4}" dt="2018-09-26T05:46:04.695" v="3190"/>
-        <pc:sldMkLst>
-          <pc:docMk/>
-          <pc:sldMk cId="1129442990" sldId="285"/>
-        </pc:sldMkLst>
-        <pc:spChg chg="mod">
-          <ac:chgData name="Mikko Pääkkönen" userId="738bf089a40c7f08" providerId="LiveId" clId="{7371DB93-0DF9-4B60-9C3A-91FFF4D00BD4}" dt="2018-09-26T05:22:45.189" v="2859" actId="20577"/>
-          <ac:spMkLst>
-            <pc:docMk/>
-            <pc:sldMk cId="1129442990" sldId="285"/>
-            <ac:spMk id="2" creationId="{094DB930-2672-49D9-A543-781948FEFDBB}"/>
-          </ac:spMkLst>
-        </pc:spChg>
-        <pc:spChg chg="mod">
-          <ac:chgData name="Mikko Pääkkönen" userId="738bf089a40c7f08" providerId="LiveId" clId="{7371DB93-0DF9-4B60-9C3A-91FFF4D00BD4}" dt="2018-09-26T05:39:55.387" v="3165" actId="404"/>
-          <ac:spMkLst>
-            <pc:docMk/>
-            <pc:sldMk cId="1129442990" sldId="285"/>
-            <ac:spMk id="3" creationId="{80F09F31-0F4A-402B-9DEA-4943ABCD730A}"/>
-          </ac:spMkLst>
-        </pc:spChg>
-        <pc:spChg chg="mod">
-          <ac:chgData name="Mikko Pääkkönen" userId="738bf089a40c7f08" providerId="LiveId" clId="{7371DB93-0DF9-4B60-9C3A-91FFF4D00BD4}" dt="2018-09-26T05:29:32.273" v="3127" actId="6549"/>
-          <ac:spMkLst>
-            <pc:docMk/>
-            <pc:sldMk cId="1129442990" sldId="285"/>
-            <ac:spMk id="4" creationId="{4AB9EB3A-A16B-4531-8975-06E80423883E}"/>
-          </ac:spMkLst>
-        </pc:spChg>
-        <pc:picChg chg="add">
-          <ac:chgData name="Mikko Pääkkönen" userId="738bf089a40c7f08" providerId="LiveId" clId="{7371DB93-0DF9-4B60-9C3A-91FFF4D00BD4}" dt="2018-09-26T05:46:04.695" v="3190"/>
-          <ac:picMkLst>
-            <pc:docMk/>
-            <pc:sldMk cId="1129442990" sldId="285"/>
-            <ac:picMk id="5" creationId="{04C78133-18E0-463B-8C83-4606FC2527B7}"/>
-          </ac:picMkLst>
-        </pc:picChg>
-      </pc:sldChg>
-      <pc:sldChg chg="addSp delSp modSp add">
-        <pc:chgData name="Mikko Pääkkönen" userId="738bf089a40c7f08" providerId="LiveId" clId="{7371DB93-0DF9-4B60-9C3A-91FFF4D00BD4}" dt="2018-09-26T05:57:01.480" v="3699" actId="20577"/>
-        <pc:sldMkLst>
-          <pc:docMk/>
-          <pc:sldMk cId="3660611479" sldId="286"/>
-        </pc:sldMkLst>
-        <pc:spChg chg="mod">
-          <ac:chgData name="Mikko Pääkkönen" userId="738bf089a40c7f08" providerId="LiveId" clId="{7371DB93-0DF9-4B60-9C3A-91FFF4D00BD4}" dt="2018-09-26T05:51:29.737" v="3257" actId="20577"/>
-          <ac:spMkLst>
-            <pc:docMk/>
-            <pc:sldMk cId="3660611479" sldId="286"/>
-            <ac:spMk id="2" creationId="{094DB930-2672-49D9-A543-781948FEFDBB}"/>
-          </ac:spMkLst>
-        </pc:spChg>
-        <pc:spChg chg="mod">
-          <ac:chgData name="Mikko Pääkkönen" userId="738bf089a40c7f08" providerId="LiveId" clId="{7371DB93-0DF9-4B60-9C3A-91FFF4D00BD4}" dt="2018-09-26T05:57:01.480" v="3699" actId="20577"/>
-          <ac:spMkLst>
-            <pc:docMk/>
-            <pc:sldMk cId="3660611479" sldId="286"/>
-            <ac:spMk id="3" creationId="{80F09F31-0F4A-402B-9DEA-4943ABCD730A}"/>
-          </ac:spMkLst>
-        </pc:spChg>
-        <pc:picChg chg="add del">
-          <ac:chgData name="Mikko Pääkkönen" userId="738bf089a40c7f08" providerId="LiveId" clId="{7371DB93-0DF9-4B60-9C3A-91FFF4D00BD4}" dt="2018-09-26T05:51:56.120" v="3315" actId="478"/>
-          <ac:picMkLst>
-            <pc:docMk/>
-            <pc:sldMk cId="3660611479" sldId="286"/>
-            <ac:picMk id="5" creationId="{91E0E302-7602-496E-A25E-A9FC4A2DBD4C}"/>
-          </ac:picMkLst>
-        </pc:picChg>
       </pc:sldChg>
     </pc:docChg>
   </pc:docChgLst>
@@ -1072,7 +609,7 @@
               <a:pPr>
                 <a:defRPr/>
               </a:pPr>
-              <a:t>6.12.2018</a:t>
+              <a:t>18.1.2019</a:t>
             </a:fld>
             <a:endParaRPr lang="fi-FI"/>
           </a:p>
@@ -8169,7 +7706,7 @@
             </a:r>
             <a:r>
               <a:rPr lang="fi-FI" dirty="0" err="1"/>
-              <a:t>VCS:hen</a:t>
+              <a:t>VCS:iin</a:t>
             </a:r>
             <a:r>
               <a:rPr lang="fi-FI" dirty="0"/>
@@ -8738,7 +8275,7 @@
             </a:pPr>
             <a:r>
               <a:rPr lang="fi-FI" dirty="0"/>
-              <a:t>CVS-järjestelmiä on lukuisia erilaisia…</a:t>
+              <a:t>VCS-järjestelmiä on lukuisia erilaisia…</a:t>
             </a:r>
           </a:p>
           <a:p>
@@ -9117,12 +8654,6 @@
             </a:r>
           </a:p>
           <a:p>
-            <a:pPr marL="457200" lvl="1" indent="0">
-              <a:buNone/>
-            </a:pPr>
-            <a:endParaRPr lang="fi-FI" dirty="0"/>
-          </a:p>
-          <a:p>
             <a:r>
               <a:rPr lang="fi-FI" sz="2400" dirty="0"/>
               <a:t>Joskus ilmaiset palvelut vaativat avointa projektia (open-</a:t>
@@ -9157,7 +8688,53 @@
             </a:r>
           </a:p>
           <a:p>
-            <a:endParaRPr lang="fi-FI" sz="2400" dirty="0"/>
+            <a:pPr lvl="1"/>
+            <a:r>
+              <a:rPr lang="fi-FI" sz="1800" i="1" dirty="0"/>
+              <a:t>GitHub julkaisi alkuvuodesta 2019 rajattomat ilmaiset privaatit </a:t>
+            </a:r>
+            <a:r>
+              <a:rPr lang="fi-FI" sz="1800" i="1" dirty="0" err="1"/>
+              <a:t>repot</a:t>
+            </a:r>
+            <a:r>
+              <a:rPr lang="fi-FI" sz="1800" i="1" dirty="0"/>
+              <a:t>, joissa on mahdollista olla 3 tekijää (</a:t>
+            </a:r>
+            <a:r>
+              <a:rPr lang="fi-FI" sz="1800" i="1" dirty="0" err="1"/>
+              <a:t>collaborators</a:t>
+            </a:r>
+            <a:r>
+              <a:rPr lang="fi-FI" sz="1800" i="1" dirty="0"/>
+              <a:t>)</a:t>
+            </a:r>
+          </a:p>
+          <a:p>
+            <a:pPr lvl="1"/>
+            <a:r>
+              <a:rPr lang="fi-FI" sz="1800" i="1" dirty="0" err="1"/>
+              <a:t>Opisjelijat</a:t>
+            </a:r>
+            <a:r>
+              <a:rPr lang="fi-FI" sz="1800" i="1" dirty="0"/>
+              <a:t> saavat lisäksi </a:t>
+            </a:r>
+            <a:r>
+              <a:rPr lang="fi-FI" sz="1800" i="1" dirty="0" err="1"/>
+              <a:t>GitHub:n</a:t>
+            </a:r>
+            <a:r>
+              <a:rPr lang="fi-FI" sz="1800" i="1" dirty="0"/>
+              <a:t> laajemmat ominaisuudet käyttöön ilmaiseksi ks. </a:t>
+            </a:r>
+            <a:r>
+              <a:rPr lang="fi-FI" sz="1800" i="1" dirty="0">
+                <a:hlinkClick r:id="rId3"/>
+              </a:rPr>
+              <a:t>https://education.github.com/pack</a:t>
+            </a:r>
+            <a:endParaRPr lang="fi-FI" sz="1800" i="1" dirty="0"/>
           </a:p>
           <a:p>
             <a:r>
@@ -10576,27 +10153,6 @@
 </file>
 
 <file path=customXml/item1.xml><?xml version="1.0" encoding="utf-8"?>
-<p:properties xmlns:p="http://schemas.microsoft.com/office/2006/metadata/properties" xmlns:xsi="http://www.w3.org/2001/XMLSchema-instance">
-  <documentManagement>
-    <_dlc_DocId xmlns="bcbf1d70-0686-4af9-897b-e669bf036024">SAVONIA-1148-15</_dlc_DocId>
-    <_dlc_DocIdUrl xmlns="bcbf1d70-0686-4af9-897b-e669bf036024">
-      <Url>https://santra.savonia.fi/tukipalvelut/viestinta/visuaalinen-ilme/_layouts/DocIdRedir.aspx?ID=SAVONIA-1148-15</Url>
-      <Description>SAVONIA-1148-15</Description>
-    </_dlc_DocIdUrl>
-  </documentManagement>
-</p:properties>
-</file>
-
-<file path=customXml/item2.xml><?xml version="1.0" encoding="utf-8"?>
-<?mso-contentType ?>
-<FormTemplates xmlns="http://schemas.microsoft.com/sharepoint/v3/contenttype/forms">
-  <Display>DocumentLibraryForm</Display>
-  <Edit>DocumentLibraryForm</Edit>
-  <New>DocumentLibraryForm</New>
-</FormTemplates>
-</file>
-
-<file path=customXml/item3.xml><?xml version="1.0" encoding="utf-8"?>
 <?mso-contentType ?>
 <spe:Receivers xmlns:spe="http://schemas.microsoft.com/sharepoint/events">
   <Receiver>
@@ -10640,6 +10196,27 @@
     <Filter/>
   </Receiver>
 </spe:Receivers>
+</file>
+
+<file path=customXml/item2.xml><?xml version="1.0" encoding="utf-8"?>
+<?mso-contentType ?>
+<FormTemplates xmlns="http://schemas.microsoft.com/sharepoint/v3/contenttype/forms">
+  <Display>DocumentLibraryForm</Display>
+  <Edit>DocumentLibraryForm</Edit>
+  <New>DocumentLibraryForm</New>
+</FormTemplates>
+</file>
+
+<file path=customXml/item3.xml><?xml version="1.0" encoding="utf-8"?>
+<p:properties xmlns:p="http://schemas.microsoft.com/office/2006/metadata/properties" xmlns:xsi="http://www.w3.org/2001/XMLSchema-instance">
+  <documentManagement>
+    <_dlc_DocId xmlns="bcbf1d70-0686-4af9-897b-e669bf036024">SAVONIA-1148-15</_dlc_DocId>
+    <_dlc_DocIdUrl xmlns="bcbf1d70-0686-4af9-897b-e669bf036024">
+      <Url>https://santra.savonia.fi/tukipalvelut/viestinta/visuaalinen-ilme/_layouts/DocIdRedir.aspx?ID=SAVONIA-1148-15</Url>
+      <Description>SAVONIA-1148-15</Description>
+    </_dlc_DocIdUrl>
+  </documentManagement>
+</p:properties>
 </file>
 
 <file path=customXml/item4.xml><?xml version="1.0" encoding="utf-8"?>
@@ -10788,10 +10365,9 @@
 </file>
 
 <file path=customXml/itemProps1.xml><?xml version="1.0" encoding="utf-8"?>
-<ds:datastoreItem xmlns:ds="http://schemas.openxmlformats.org/officeDocument/2006/customXml" ds:itemID="{F82A60BA-D9BF-4B65-8C62-90B75FB47D2A}">
+<ds:datastoreItem xmlns:ds="http://schemas.openxmlformats.org/officeDocument/2006/customXml" ds:itemID="{D104143F-77D4-42B1-8837-22F1A6D250D0}">
   <ds:schemaRefs>
-    <ds:schemaRef ds:uri="http://schemas.microsoft.com/office/2006/metadata/properties"/>
-    <ds:schemaRef ds:uri="bcbf1d70-0686-4af9-897b-e669bf036024"/>
+    <ds:schemaRef ds:uri="http://schemas.microsoft.com/sharepoint/events"/>
   </ds:schemaRefs>
 </ds:datastoreItem>
 </file>
@@ -10805,9 +10381,10 @@
 </file>
 
 <file path=customXml/itemProps3.xml><?xml version="1.0" encoding="utf-8"?>
-<ds:datastoreItem xmlns:ds="http://schemas.openxmlformats.org/officeDocument/2006/customXml" ds:itemID="{D104143F-77D4-42B1-8837-22F1A6D250D0}">
+<ds:datastoreItem xmlns:ds="http://schemas.openxmlformats.org/officeDocument/2006/customXml" ds:itemID="{F82A60BA-D9BF-4B65-8C62-90B75FB47D2A}">
   <ds:schemaRefs>
-    <ds:schemaRef ds:uri="http://schemas.microsoft.com/sharepoint/events"/>
+    <ds:schemaRef ds:uri="http://schemas.microsoft.com/office/2006/metadata/properties"/>
+    <ds:schemaRef ds:uri="bcbf1d70-0686-4af9-897b-e669bf036024"/>
   </ds:schemaRefs>
 </ds:datastoreItem>
 </file>

</xml_diff>

<commit_message>
Päivitetty materiaaleja. Lisätty esimerkki git:n käytöön.
</commit_message>
<xml_diff>
--- a/versionhallinta.pptx
+++ b/versionhallinta.pptx
@@ -5,7 +5,7 @@
     <p:sldMasterId id="2147483785" r:id="rId5"/>
   </p:sldMasterIdLst>
   <p:notesMasterIdLst>
-    <p:notesMasterId r:id="rId27"/>
+    <p:notesMasterId r:id="rId34"/>
   </p:notesMasterIdLst>
   <p:sldIdLst>
     <p:sldId id="257" r:id="rId6"/>
@@ -17,18 +17,25 @@
     <p:sldId id="278" r:id="rId12"/>
     <p:sldId id="279" r:id="rId13"/>
     <p:sldId id="282" r:id="rId14"/>
-    <p:sldId id="285" r:id="rId15"/>
-    <p:sldId id="288" r:id="rId16"/>
-    <p:sldId id="287" r:id="rId17"/>
-    <p:sldId id="283" r:id="rId18"/>
-    <p:sldId id="271" r:id="rId19"/>
-    <p:sldId id="280" r:id="rId20"/>
-    <p:sldId id="286" r:id="rId21"/>
-    <p:sldId id="281" r:id="rId22"/>
-    <p:sldId id="284" r:id="rId23"/>
-    <p:sldId id="289" r:id="rId24"/>
-    <p:sldId id="291" r:id="rId25"/>
-    <p:sldId id="260" r:id="rId26"/>
+    <p:sldId id="292" r:id="rId15"/>
+    <p:sldId id="285" r:id="rId16"/>
+    <p:sldId id="288" r:id="rId17"/>
+    <p:sldId id="287" r:id="rId18"/>
+    <p:sldId id="283" r:id="rId19"/>
+    <p:sldId id="271" r:id="rId20"/>
+    <p:sldId id="280" r:id="rId21"/>
+    <p:sldId id="286" r:id="rId22"/>
+    <p:sldId id="281" r:id="rId23"/>
+    <p:sldId id="284" r:id="rId24"/>
+    <p:sldId id="289" r:id="rId25"/>
+    <p:sldId id="291" r:id="rId26"/>
+    <p:sldId id="293" r:id="rId27"/>
+    <p:sldId id="294" r:id="rId28"/>
+    <p:sldId id="295" r:id="rId29"/>
+    <p:sldId id="296" r:id="rId30"/>
+    <p:sldId id="297" r:id="rId31"/>
+    <p:sldId id="298" r:id="rId32"/>
+    <p:sldId id="260" r:id="rId33"/>
   </p:sldIdLst>
   <p:sldSz cx="9144000" cy="6858000" type="screen4x3"/>
   <p:notesSz cx="6858000" cy="9144000"/>
@@ -186,6 +193,60 @@
 
 <file path=ppt/changesInfos/changesInfo1.xml><?xml version="1.0" encoding="utf-8"?>
 <pc:chgInfo xmlns:a="http://schemas.openxmlformats.org/drawingml/2006/main" xmlns:r="http://schemas.openxmlformats.org/officeDocument/2006/relationships" xmlns:ac="http://schemas.microsoft.com/office/drawing/2013/main/command" xmlns:pc="http://schemas.microsoft.com/office/powerpoint/2013/main/command">
+  <pc:docChgLst>
+    <pc:chgData name="Mikko Pääkkönen" userId="738bf089a40c7f08" providerId="LiveId" clId="{5D8233FE-1C15-4CED-B334-6EBC4EAA9096}"/>
+    <pc:docChg chg="modSld">
+      <pc:chgData name="Mikko Pääkkönen" userId="738bf089a40c7f08" providerId="LiveId" clId="{5D8233FE-1C15-4CED-B334-6EBC4EAA9096}" dt="2019-01-18T06:15:22.801" v="241" actId="20577"/>
+      <pc:docMkLst>
+        <pc:docMk/>
+      </pc:docMkLst>
+      <pc:sldChg chg="modSp">
+        <pc:chgData name="Mikko Pääkkönen" userId="738bf089a40c7f08" providerId="LiveId" clId="{5D8233FE-1C15-4CED-B334-6EBC4EAA9096}" dt="2019-01-18T06:08:47.382" v="3" actId="20577"/>
+        <pc:sldMkLst>
+          <pc:docMk/>
+          <pc:sldMk cId="3378279309" sldId="274"/>
+        </pc:sldMkLst>
+        <pc:spChg chg="mod">
+          <ac:chgData name="Mikko Pääkkönen" userId="738bf089a40c7f08" providerId="LiveId" clId="{5D8233FE-1C15-4CED-B334-6EBC4EAA9096}" dt="2019-01-18T06:08:47.382" v="3" actId="20577"/>
+          <ac:spMkLst>
+            <pc:docMk/>
+            <pc:sldMk cId="3378279309" sldId="274"/>
+            <ac:spMk id="6" creationId="{00000000-0000-0000-0000-000000000000}"/>
+          </ac:spMkLst>
+        </pc:spChg>
+      </pc:sldChg>
+      <pc:sldChg chg="modSp">
+        <pc:chgData name="Mikko Pääkkönen" userId="738bf089a40c7f08" providerId="LiveId" clId="{5D8233FE-1C15-4CED-B334-6EBC4EAA9096}" dt="2019-01-18T06:15:22.801" v="241" actId="20577"/>
+        <pc:sldMkLst>
+          <pc:docMk/>
+          <pc:sldMk cId="4007713199" sldId="277"/>
+        </pc:sldMkLst>
+        <pc:spChg chg="mod">
+          <ac:chgData name="Mikko Pääkkönen" userId="738bf089a40c7f08" providerId="LiveId" clId="{5D8233FE-1C15-4CED-B334-6EBC4EAA9096}" dt="2019-01-18T06:15:22.801" v="241" actId="20577"/>
+          <ac:spMkLst>
+            <pc:docMk/>
+            <pc:sldMk cId="4007713199" sldId="277"/>
+            <ac:spMk id="6" creationId="{00000000-0000-0000-0000-000000000000}"/>
+          </ac:spMkLst>
+        </pc:spChg>
+      </pc:sldChg>
+      <pc:sldChg chg="modSp">
+        <pc:chgData name="Mikko Pääkkönen" userId="738bf089a40c7f08" providerId="LiveId" clId="{5D8233FE-1C15-4CED-B334-6EBC4EAA9096}" dt="2019-01-18T06:12:51.836" v="152" actId="20577"/>
+        <pc:sldMkLst>
+          <pc:docMk/>
+          <pc:sldMk cId="2670121243" sldId="289"/>
+        </pc:sldMkLst>
+        <pc:spChg chg="mod">
+          <ac:chgData name="Mikko Pääkkönen" userId="738bf089a40c7f08" providerId="LiveId" clId="{5D8233FE-1C15-4CED-B334-6EBC4EAA9096}" dt="2019-01-18T06:12:51.836" v="152" actId="20577"/>
+          <ac:spMkLst>
+            <pc:docMk/>
+            <pc:sldMk cId="2670121243" sldId="289"/>
+            <ac:spMk id="3" creationId="{80F09F31-0F4A-402B-9DEA-4943ABCD730A}"/>
+          </ac:spMkLst>
+        </pc:spChg>
+      </pc:sldChg>
+    </pc:docChg>
+  </pc:docChgLst>
   <pc:docChgLst>
     <pc:chgData name="Mikko Pääkkönen" userId="738bf089a40c7f08" providerId="LiveId" clId="{442BC05D-2D09-4631-8A27-83814B4C3FF3}"/>
     <pc:docChg chg="undo custSel addSld delSld modSld sldOrd">
@@ -443,60 +504,6 @@
   <pc:docChgLst>
     <pc:chgData name="Mikko Pääkkönen" userId="738bf089a40c7f08" providerId="LiveId" clId="{7371DB93-0DF9-4B60-9C3A-91FFF4D00BD4}"/>
   </pc:docChgLst>
-  <pc:docChgLst>
-    <pc:chgData name="Mikko Pääkkönen" userId="738bf089a40c7f08" providerId="LiveId" clId="{5D8233FE-1C15-4CED-B334-6EBC4EAA9096}"/>
-    <pc:docChg chg="modSld">
-      <pc:chgData name="Mikko Pääkkönen" userId="738bf089a40c7f08" providerId="LiveId" clId="{5D8233FE-1C15-4CED-B334-6EBC4EAA9096}" dt="2019-01-18T06:15:22.801" v="241" actId="20577"/>
-      <pc:docMkLst>
-        <pc:docMk/>
-      </pc:docMkLst>
-      <pc:sldChg chg="modSp">
-        <pc:chgData name="Mikko Pääkkönen" userId="738bf089a40c7f08" providerId="LiveId" clId="{5D8233FE-1C15-4CED-B334-6EBC4EAA9096}" dt="2019-01-18T06:08:47.382" v="3" actId="20577"/>
-        <pc:sldMkLst>
-          <pc:docMk/>
-          <pc:sldMk cId="3378279309" sldId="274"/>
-        </pc:sldMkLst>
-        <pc:spChg chg="mod">
-          <ac:chgData name="Mikko Pääkkönen" userId="738bf089a40c7f08" providerId="LiveId" clId="{5D8233FE-1C15-4CED-B334-6EBC4EAA9096}" dt="2019-01-18T06:08:47.382" v="3" actId="20577"/>
-          <ac:spMkLst>
-            <pc:docMk/>
-            <pc:sldMk cId="3378279309" sldId="274"/>
-            <ac:spMk id="6" creationId="{00000000-0000-0000-0000-000000000000}"/>
-          </ac:spMkLst>
-        </pc:spChg>
-      </pc:sldChg>
-      <pc:sldChg chg="modSp">
-        <pc:chgData name="Mikko Pääkkönen" userId="738bf089a40c7f08" providerId="LiveId" clId="{5D8233FE-1C15-4CED-B334-6EBC4EAA9096}" dt="2019-01-18T06:15:22.801" v="241" actId="20577"/>
-        <pc:sldMkLst>
-          <pc:docMk/>
-          <pc:sldMk cId="4007713199" sldId="277"/>
-        </pc:sldMkLst>
-        <pc:spChg chg="mod">
-          <ac:chgData name="Mikko Pääkkönen" userId="738bf089a40c7f08" providerId="LiveId" clId="{5D8233FE-1C15-4CED-B334-6EBC4EAA9096}" dt="2019-01-18T06:15:22.801" v="241" actId="20577"/>
-          <ac:spMkLst>
-            <pc:docMk/>
-            <pc:sldMk cId="4007713199" sldId="277"/>
-            <ac:spMk id="6" creationId="{00000000-0000-0000-0000-000000000000}"/>
-          </ac:spMkLst>
-        </pc:spChg>
-      </pc:sldChg>
-      <pc:sldChg chg="modSp">
-        <pc:chgData name="Mikko Pääkkönen" userId="738bf089a40c7f08" providerId="LiveId" clId="{5D8233FE-1C15-4CED-B334-6EBC4EAA9096}" dt="2019-01-18T06:12:51.836" v="152" actId="20577"/>
-        <pc:sldMkLst>
-          <pc:docMk/>
-          <pc:sldMk cId="2670121243" sldId="289"/>
-        </pc:sldMkLst>
-        <pc:spChg chg="mod">
-          <ac:chgData name="Mikko Pääkkönen" userId="738bf089a40c7f08" providerId="LiveId" clId="{5D8233FE-1C15-4CED-B334-6EBC4EAA9096}" dt="2019-01-18T06:12:51.836" v="152" actId="20577"/>
-          <ac:spMkLst>
-            <pc:docMk/>
-            <pc:sldMk cId="2670121243" sldId="289"/>
-            <ac:spMk id="3" creationId="{80F09F31-0F4A-402B-9DEA-4943ABCD730A}"/>
-          </ac:spMkLst>
-        </pc:spChg>
-      </pc:sldChg>
-    </pc:docChg>
-  </pc:docChgLst>
 </pc:chgInfo>
 </file>
 
@@ -609,7 +616,7 @@
               <a:pPr>
                 <a:defRPr/>
               </a:pPr>
-              <a:t>18.1.2019</a:t>
+              <a:t>20.8.2019</a:t>
             </a:fld>
             <a:endParaRPr lang="fi-FI"/>
           </a:p>
@@ -5629,7 +5636,7 @@
           <a:p>
             <a:r>
               <a:rPr lang="fi-FI" dirty="0"/>
-              <a:t>Mikko Pääkkönen 2018</a:t>
+              <a:t>Mikko Pääkkönen 2019</a:t>
             </a:r>
           </a:p>
         </p:txBody>
@@ -5686,7 +5693,305 @@
             </a:r>
             <a:r>
               <a:rPr lang="fi-FI" dirty="0"/>
-              <a:t>-käsitteitä 2/3</a:t>
+              <a:t>-käsitteitä 2/4</a:t>
+            </a:r>
+          </a:p>
+        </p:txBody>
+      </p:sp>
+      <p:sp>
+        <p:nvSpPr>
+          <p:cNvPr id="3" name="Sisällön paikkamerkki 2">
+            <a:extLst>
+              <a:ext uri="{FF2B5EF4-FFF2-40B4-BE49-F238E27FC236}">
+                <a16:creationId xmlns:a16="http://schemas.microsoft.com/office/drawing/2014/main" id="{80F09F31-0F4A-402B-9DEA-4943ABCD730A}"/>
+              </a:ext>
+            </a:extLst>
+          </p:cNvPr>
+          <p:cNvSpPr>
+            <a:spLocks noGrp="1"/>
+          </p:cNvSpPr>
+          <p:nvPr>
+            <p:ph idx="1"/>
+          </p:nvPr>
+        </p:nvSpPr>
+        <p:spPr/>
+        <p:txBody>
+          <a:bodyPr/>
+          <a:lstStyle/>
+          <a:p>
+            <a:r>
+              <a:rPr lang="fi-FI" dirty="0" err="1"/>
+              <a:t>Clone</a:t>
+            </a:r>
+            <a:endParaRPr lang="fi-FI" dirty="0"/>
+          </a:p>
+          <a:p>
+            <a:pPr lvl="1"/>
+            <a:r>
+              <a:rPr lang="fi-FI" sz="2000" i="1" dirty="0" err="1"/>
+              <a:t>git</a:t>
+            </a:r>
+            <a:r>
+              <a:rPr lang="fi-FI" sz="2000" i="1" dirty="0"/>
+              <a:t> </a:t>
+            </a:r>
+            <a:r>
+              <a:rPr lang="fi-FI" sz="2000" i="1" dirty="0" err="1"/>
+              <a:t>clone</a:t>
+            </a:r>
+            <a:r>
+              <a:rPr lang="fi-FI" sz="2000" dirty="0"/>
+              <a:t>, kloonataan repo</a:t>
+            </a:r>
+          </a:p>
+          <a:p>
+            <a:pPr marL="457200" lvl="1" indent="0">
+              <a:buNone/>
+            </a:pPr>
+            <a:endParaRPr lang="fi-FI" sz="2000" dirty="0"/>
+          </a:p>
+          <a:p>
+            <a:pPr marL="457200" lvl="1" indent="0">
+              <a:buNone/>
+            </a:pPr>
+            <a:r>
+              <a:rPr lang="fi-FI" sz="2000" dirty="0"/>
+              <a:t>Esimerkki: kloonataan </a:t>
+            </a:r>
+            <a:r>
+              <a:rPr lang="fi-FI" sz="2000" dirty="0" err="1"/>
+              <a:t>GitHub:ssa</a:t>
+            </a:r>
+            <a:r>
+              <a:rPr lang="fi-FI" sz="2000" dirty="0"/>
+              <a:t> oleva </a:t>
+            </a:r>
+            <a:r>
+              <a:rPr lang="fi-FI" sz="2000" dirty="0" err="1"/>
+              <a:t>versioncontrol</a:t>
+            </a:r>
+            <a:r>
+              <a:rPr lang="fi-FI" sz="2000" dirty="0"/>
+              <a:t>-repo paikalliseen kansioon komentokehotteessa:</a:t>
+            </a:r>
+          </a:p>
+          <a:p>
+            <a:pPr marL="457200" lvl="1" indent="0">
+              <a:buNone/>
+            </a:pPr>
+            <a:endParaRPr lang="fi-FI" sz="2000" dirty="0"/>
+          </a:p>
+          <a:p>
+            <a:pPr marL="457200" lvl="1" indent="0">
+              <a:buNone/>
+            </a:pPr>
+            <a:r>
+              <a:rPr lang="fi-FI" sz="2000" i="1" dirty="0" err="1"/>
+              <a:t>git</a:t>
+            </a:r>
+            <a:r>
+              <a:rPr lang="fi-FI" sz="2000" i="1" dirty="0"/>
+              <a:t> </a:t>
+            </a:r>
+            <a:r>
+              <a:rPr lang="fi-FI" sz="2000" i="1" dirty="0" err="1"/>
+              <a:t>clone</a:t>
+            </a:r>
+            <a:r>
+              <a:rPr lang="fi-FI" sz="2000" i="1" dirty="0"/>
+              <a:t> https://github.com/SavoniaUAS/versioncontrol.git .</a:t>
+            </a:r>
+            <a:r>
+              <a:rPr lang="fi-FI" sz="2000" dirty="0"/>
+              <a:t> </a:t>
+            </a:r>
+          </a:p>
+          <a:p>
+            <a:pPr marL="0" indent="0">
+              <a:buNone/>
+            </a:pPr>
+            <a:endParaRPr lang="fi-FI" dirty="0"/>
+          </a:p>
+        </p:txBody>
+      </p:sp>
+      <p:sp>
+        <p:nvSpPr>
+          <p:cNvPr id="4" name="Alatunnisteen paikkamerkki 3">
+            <a:extLst>
+              <a:ext uri="{FF2B5EF4-FFF2-40B4-BE49-F238E27FC236}">
+                <a16:creationId xmlns:a16="http://schemas.microsoft.com/office/drawing/2014/main" id="{4AB9EB3A-A16B-4531-8975-06E80423883E}"/>
+              </a:ext>
+            </a:extLst>
+          </p:cNvPr>
+          <p:cNvSpPr>
+            <a:spLocks noGrp="1"/>
+          </p:cNvSpPr>
+          <p:nvPr>
+            <p:ph type="ftr" sz="quarter" idx="10"/>
+          </p:nvPr>
+        </p:nvSpPr>
+        <p:spPr/>
+        <p:txBody>
+          <a:bodyPr/>
+          <a:lstStyle/>
+          <a:p>
+            <a:pPr>
+              <a:defRPr/>
+            </a:pPr>
+            <a:r>
+              <a:rPr lang="fi-FI" dirty="0"/>
+              <a:t>An Intro to </a:t>
+            </a:r>
+            <a:r>
+              <a:rPr lang="fi-FI" dirty="0" err="1"/>
+              <a:t>Git</a:t>
+            </a:r>
+            <a:r>
+              <a:rPr lang="fi-FI" dirty="0"/>
+              <a:t> and GitHub for </a:t>
+            </a:r>
+            <a:r>
+              <a:rPr lang="fi-FI" dirty="0" err="1"/>
+              <a:t>Beginners</a:t>
+            </a:r>
+            <a:r>
+              <a:rPr lang="fi-FI" dirty="0"/>
+              <a:t> </a:t>
+            </a:r>
+            <a:r>
+              <a:rPr lang="fi-FI" dirty="0" err="1"/>
+              <a:t>by</a:t>
+            </a:r>
+            <a:r>
+              <a:rPr lang="fi-FI" dirty="0"/>
+              <a:t> </a:t>
+            </a:r>
+            <a:r>
+              <a:rPr lang="fi-FI" dirty="0" err="1"/>
+              <a:t>Meghan</a:t>
+            </a:r>
+            <a:r>
+              <a:rPr lang="fi-FI" dirty="0"/>
+              <a:t> Nelson, </a:t>
+            </a:r>
+            <a:r>
+              <a:rPr lang="fi-FI" dirty="0">
+                <a:hlinkClick r:id="rId2"/>
+              </a:rPr>
+              <a:t>https://product.hubspot.com/blog/git-and-github-tutorial-for-beginners</a:t>
+            </a:r>
+            <a:r>
+              <a:rPr lang="fi-FI" dirty="0"/>
+              <a:t> </a:t>
+            </a:r>
+          </a:p>
+        </p:txBody>
+      </p:sp>
+      <p:pic>
+        <p:nvPicPr>
+          <p:cNvPr id="5" name="Picture 2" descr="https://git-scm.com/images/logos/2color-lightbg@2x.png">
+            <a:extLst>
+              <a:ext uri="{FF2B5EF4-FFF2-40B4-BE49-F238E27FC236}">
+                <a16:creationId xmlns:a16="http://schemas.microsoft.com/office/drawing/2014/main" id="{72640193-F4E3-4E22-91C0-CFC6EA110C5B}"/>
+              </a:ext>
+            </a:extLst>
+          </p:cNvPr>
+          <p:cNvPicPr>
+            <a:picLocks noChangeAspect="1" noChangeArrowheads="1"/>
+          </p:cNvPicPr>
+          <p:nvPr/>
+        </p:nvPicPr>
+        <p:blipFill>
+          <a:blip r:embed="rId3">
+            <a:extLst>
+              <a:ext uri="{28A0092B-C50C-407E-A947-70E740481C1C}">
+                <a14:useLocalDpi xmlns:a14="http://schemas.microsoft.com/office/drawing/2010/main" val="0"/>
+              </a:ext>
+            </a:extLst>
+          </a:blip>
+          <a:srcRect/>
+          <a:stretch>
+            <a:fillRect/>
+          </a:stretch>
+        </p:blipFill>
+        <p:spPr bwMode="auto">
+          <a:xfrm>
+            <a:off x="5940152" y="188640"/>
+            <a:ext cx="2592288" cy="881731"/>
+          </a:xfrm>
+          <a:prstGeom prst="rect">
+            <a:avLst/>
+          </a:prstGeom>
+          <a:noFill/>
+          <a:extLst>
+            <a:ext uri="{909E8E84-426E-40DD-AFC4-6F175D3DCCD1}">
+              <a14:hiddenFill xmlns:a14="http://schemas.microsoft.com/office/drawing/2010/main">
+                <a:solidFill>
+                  <a:srgbClr val="FFFFFF"/>
+                </a:solidFill>
+              </a14:hiddenFill>
+            </a:ext>
+          </a:extLst>
+        </p:spPr>
+      </p:pic>
+    </p:spTree>
+    <p:extLst>
+      <p:ext uri="{BB962C8B-B14F-4D97-AF65-F5344CB8AC3E}">
+        <p14:creationId xmlns:p14="http://schemas.microsoft.com/office/powerpoint/2010/main" val="2052371432"/>
+      </p:ext>
+    </p:extLst>
+  </p:cSld>
+  <p:clrMapOvr>
+    <a:masterClrMapping/>
+  </p:clrMapOvr>
+</p:sld>
+</file>
+
+<file path=ppt/slides/slide11.xml><?xml version="1.0" encoding="utf-8"?>
+<p:sld xmlns:a="http://schemas.openxmlformats.org/drawingml/2006/main" xmlns:r="http://schemas.openxmlformats.org/officeDocument/2006/relationships" xmlns:p="http://schemas.openxmlformats.org/presentationml/2006/main">
+  <p:cSld>
+    <p:spTree>
+      <p:nvGrpSpPr>
+        <p:cNvPr id="1" name=""/>
+        <p:cNvGrpSpPr/>
+        <p:nvPr/>
+      </p:nvGrpSpPr>
+      <p:grpSpPr>
+        <a:xfrm>
+          <a:off x="0" y="0"/>
+          <a:ext cx="0" cy="0"/>
+          <a:chOff x="0" y="0"/>
+          <a:chExt cx="0" cy="0"/>
+        </a:xfrm>
+      </p:grpSpPr>
+      <p:sp>
+        <p:nvSpPr>
+          <p:cNvPr id="2" name="Otsikko 1">
+            <a:extLst>
+              <a:ext uri="{FF2B5EF4-FFF2-40B4-BE49-F238E27FC236}">
+                <a16:creationId xmlns:a16="http://schemas.microsoft.com/office/drawing/2014/main" id="{094DB930-2672-49D9-A543-781948FEFDBB}"/>
+              </a:ext>
+            </a:extLst>
+          </p:cNvPr>
+          <p:cNvSpPr>
+            <a:spLocks noGrp="1"/>
+          </p:cNvSpPr>
+          <p:nvPr>
+            <p:ph type="title"/>
+          </p:nvPr>
+        </p:nvSpPr>
+        <p:spPr/>
+        <p:txBody>
+          <a:bodyPr/>
+          <a:lstStyle/>
+          <a:p>
+            <a:r>
+              <a:rPr lang="fi-FI" dirty="0" err="1"/>
+              <a:t>Git</a:t>
+            </a:r>
+            <a:r>
+              <a:rPr lang="fi-FI" dirty="0"/>
+              <a:t>-käsitteitä 3/4</a:t>
             </a:r>
           </a:p>
         </p:txBody>
@@ -5911,7 +6216,7 @@
 </p:sld>
 </file>
 
-<file path=ppt/slides/slide11.xml><?xml version="1.0" encoding="utf-8"?>
+<file path=ppt/slides/slide12.xml><?xml version="1.0" encoding="utf-8"?>
 <p:sld xmlns:a="http://schemas.openxmlformats.org/drawingml/2006/main" xmlns:r="http://schemas.openxmlformats.org/officeDocument/2006/relationships" xmlns:p="http://schemas.openxmlformats.org/presentationml/2006/main">
   <p:cSld>
     <p:spTree>
@@ -5955,7 +6260,7 @@
             </a:r>
             <a:r>
               <a:rPr lang="fi-FI" dirty="0"/>
-              <a:t>-käsitteitä 3/3</a:t>
+              <a:t>-käsitteitä 4/4</a:t>
             </a:r>
           </a:p>
         </p:txBody>
@@ -6196,7 +6501,7 @@
 </p:sld>
 </file>
 
-<file path=ppt/slides/slide12.xml><?xml version="1.0" encoding="utf-8"?>
+<file path=ppt/slides/slide13.xml><?xml version="1.0" encoding="utf-8"?>
 <p:sld xmlns:a="http://schemas.openxmlformats.org/drawingml/2006/main" xmlns:r="http://schemas.openxmlformats.org/officeDocument/2006/relationships" xmlns:p="http://schemas.openxmlformats.org/presentationml/2006/main">
   <p:cSld>
     <p:spTree>
@@ -6439,7 +6744,7 @@
 </p:sld>
 </file>
 
-<file path=ppt/slides/slide13.xml><?xml version="1.0" encoding="utf-8"?>
+<file path=ppt/slides/slide14.xml><?xml version="1.0" encoding="utf-8"?>
 <p:sld xmlns:a="http://schemas.openxmlformats.org/drawingml/2006/main" xmlns:r="http://schemas.openxmlformats.org/officeDocument/2006/relationships" xmlns:p="http://schemas.openxmlformats.org/presentationml/2006/main">
   <p:cSld>
     <p:spTree>
@@ -6820,58 +7125,6 @@
 </p:sld>
 </file>
 
-<file path=ppt/slides/slide14.xml><?xml version="1.0" encoding="utf-8"?>
-<p:sld xmlns:a="http://schemas.openxmlformats.org/drawingml/2006/main" xmlns:r="http://schemas.openxmlformats.org/officeDocument/2006/relationships" xmlns:p="http://schemas.openxmlformats.org/presentationml/2006/main">
-  <p:cSld>
-    <p:spTree>
-      <p:nvGrpSpPr>
-        <p:cNvPr id="1" name=""/>
-        <p:cNvGrpSpPr/>
-        <p:nvPr/>
-      </p:nvGrpSpPr>
-      <p:grpSpPr>
-        <a:xfrm>
-          <a:off x="0" y="0"/>
-          <a:ext cx="0" cy="0"/>
-          <a:chOff x="0" y="0"/>
-          <a:chExt cx="0" cy="0"/>
-        </a:xfrm>
-      </p:grpSpPr>
-      <p:sp>
-        <p:nvSpPr>
-          <p:cNvPr id="2" name="Otsikko 1"/>
-          <p:cNvSpPr>
-            <a:spLocks noGrp="1"/>
-          </p:cNvSpPr>
-          <p:nvPr>
-            <p:ph type="title"/>
-          </p:nvPr>
-        </p:nvSpPr>
-        <p:spPr/>
-        <p:txBody>
-          <a:bodyPr/>
-          <a:lstStyle/>
-          <a:p>
-            <a:r>
-              <a:rPr lang="fi-FI" dirty="0"/>
-              <a:t>Työvälineitä</a:t>
-            </a:r>
-          </a:p>
-        </p:txBody>
-      </p:sp>
-    </p:spTree>
-    <p:extLst>
-      <p:ext uri="{BB962C8B-B14F-4D97-AF65-F5344CB8AC3E}">
-        <p14:creationId xmlns:p14="http://schemas.microsoft.com/office/powerpoint/2010/main" val="1145613939"/>
-      </p:ext>
-    </p:extLst>
-  </p:cSld>
-  <p:clrMapOvr>
-    <a:masterClrMapping/>
-  </p:clrMapOvr>
-</p:sld>
-</file>
-
 <file path=ppt/slides/slide15.xml><?xml version="1.0" encoding="utf-8"?>
 <p:sld xmlns:a="http://schemas.openxmlformats.org/drawingml/2006/main" xmlns:r="http://schemas.openxmlformats.org/officeDocument/2006/relationships" xmlns:p="http://schemas.openxmlformats.org/presentationml/2006/main">
   <p:cSld>
@@ -6891,13 +7144,7 @@
       </p:grpSpPr>
       <p:sp>
         <p:nvSpPr>
-          <p:cNvPr id="2" name="Otsikko 1">
-            <a:extLst>
-              <a:ext uri="{FF2B5EF4-FFF2-40B4-BE49-F238E27FC236}">
-                <a16:creationId xmlns:a16="http://schemas.microsoft.com/office/drawing/2014/main" id="{094DB930-2672-49D9-A543-781948FEFDBB}"/>
-              </a:ext>
-            </a:extLst>
-          </p:cNvPr>
+          <p:cNvPr id="2" name="Otsikko 1"/>
           <p:cNvSpPr>
             <a:spLocks noGrp="1"/>
           </p:cNvSpPr>
@@ -6912,153 +7159,15 @@
           <a:p>
             <a:r>
               <a:rPr lang="fi-FI" dirty="0"/>
-              <a:t>Työvälineet (Client)</a:t>
-            </a:r>
-          </a:p>
-        </p:txBody>
-      </p:sp>
-      <p:sp>
-        <p:nvSpPr>
-          <p:cNvPr id="3" name="Sisällön paikkamerkki 2">
-            <a:extLst>
-              <a:ext uri="{FF2B5EF4-FFF2-40B4-BE49-F238E27FC236}">
-                <a16:creationId xmlns:a16="http://schemas.microsoft.com/office/drawing/2014/main" id="{80F09F31-0F4A-402B-9DEA-4943ABCD730A}"/>
-              </a:ext>
-            </a:extLst>
-          </p:cNvPr>
-          <p:cNvSpPr>
-            <a:spLocks noGrp="1"/>
-          </p:cNvSpPr>
-          <p:nvPr>
-            <p:ph idx="1"/>
-          </p:nvPr>
-        </p:nvSpPr>
-        <p:spPr/>
-        <p:txBody>
-          <a:bodyPr/>
-          <a:lstStyle/>
-          <a:p>
-            <a:pPr marL="0" indent="0">
-              <a:buNone/>
-            </a:pPr>
-            <a:r>
-              <a:rPr lang="fi-FI" dirty="0" err="1"/>
-              <a:t>Versionhallintajärjestemään</a:t>
-            </a:r>
-            <a:r>
-              <a:rPr lang="fi-FI" dirty="0"/>
-              <a:t> ollaan yhteydessä jollakin sovelluksella (</a:t>
-            </a:r>
-            <a:r>
-              <a:rPr lang="fi-FI" dirty="0" err="1"/>
-              <a:t>client</a:t>
-            </a:r>
-            <a:r>
-              <a:rPr lang="fi-FI" dirty="0"/>
-              <a:t>)</a:t>
-            </a:r>
-          </a:p>
-          <a:p>
-            <a:r>
-              <a:rPr lang="fi-FI" dirty="0" err="1"/>
-              <a:t>Git</a:t>
-            </a:r>
-            <a:r>
-              <a:rPr lang="fi-FI" dirty="0"/>
-              <a:t>-pohjaisiin järjestelmiin on useita graafisia </a:t>
-            </a:r>
-            <a:r>
-              <a:rPr lang="fi-FI" dirty="0" err="1"/>
-              <a:t>client</a:t>
-            </a:r>
-            <a:r>
-              <a:rPr lang="fi-FI" dirty="0"/>
-              <a:t>-sovelluksia (</a:t>
-            </a:r>
-            <a:r>
-              <a:rPr lang="fi-FI" sz="2000" dirty="0">
-                <a:hlinkClick r:id="rId2"/>
-              </a:rPr>
-              <a:t>https://git-scm.com/downloads/guis</a:t>
-            </a:r>
-            <a:r>
-              <a:rPr lang="fi-FI" dirty="0"/>
-              <a:t>)</a:t>
-            </a:r>
-          </a:p>
-          <a:p>
-            <a:r>
-              <a:rPr lang="fi-FI" dirty="0"/>
-              <a:t>tai </a:t>
-            </a:r>
-            <a:r>
-              <a:rPr lang="fi-FI" dirty="0" err="1"/>
-              <a:t>Command</a:t>
-            </a:r>
-            <a:r>
-              <a:rPr lang="fi-FI" dirty="0"/>
-              <a:t> Line (CMD) –työkalut</a:t>
-            </a:r>
-          </a:p>
-          <a:p>
-            <a:r>
-              <a:rPr lang="fi-FI" dirty="0"/>
-              <a:t>Visual Studiossa on </a:t>
-            </a:r>
-            <a:r>
-              <a:rPr lang="fi-FI" i="1" dirty="0"/>
-              <a:t>Team Explorer</a:t>
-            </a:r>
-            <a:r>
-              <a:rPr lang="fi-FI" dirty="0"/>
-              <a:t>, joka toimii </a:t>
-            </a:r>
-            <a:r>
-              <a:rPr lang="fi-FI" dirty="0" err="1"/>
-              <a:t>clienttina</a:t>
-            </a:r>
-            <a:endParaRPr lang="fi-FI" dirty="0"/>
-          </a:p>
-          <a:p>
-            <a:pPr marL="0" indent="0">
-              <a:buNone/>
-            </a:pPr>
-            <a:endParaRPr lang="fi-FI" dirty="0"/>
-          </a:p>
-        </p:txBody>
-      </p:sp>
-      <p:sp>
-        <p:nvSpPr>
-          <p:cNvPr id="4" name="Alatunnisteen paikkamerkki 3">
-            <a:extLst>
-              <a:ext uri="{FF2B5EF4-FFF2-40B4-BE49-F238E27FC236}">
-                <a16:creationId xmlns:a16="http://schemas.microsoft.com/office/drawing/2014/main" id="{4AB9EB3A-A16B-4531-8975-06E80423883E}"/>
-              </a:ext>
-            </a:extLst>
-          </p:cNvPr>
-          <p:cNvSpPr>
-            <a:spLocks noGrp="1"/>
-          </p:cNvSpPr>
-          <p:nvPr>
-            <p:ph type="ftr" sz="quarter" idx="10"/>
-          </p:nvPr>
-        </p:nvSpPr>
-        <p:spPr/>
-        <p:txBody>
-          <a:bodyPr/>
-          <a:lstStyle/>
-          <a:p>
-            <a:pPr>
-              <a:defRPr/>
-            </a:pPr>
-            <a:endParaRPr lang="fi-FI"/>
+              <a:t>Työvälineitä</a:t>
+            </a:r>
           </a:p>
         </p:txBody>
       </p:sp>
     </p:spTree>
     <p:extLst>
       <p:ext uri="{BB962C8B-B14F-4D97-AF65-F5344CB8AC3E}">
-        <p14:creationId xmlns:p14="http://schemas.microsoft.com/office/powerpoint/2010/main" val="4228207482"/>
+        <p14:creationId xmlns:p14="http://schemas.microsoft.com/office/powerpoint/2010/main" val="1145613939"/>
       </p:ext>
     </p:extLst>
   </p:cSld>
@@ -7108,6 +7217,224 @@
           <a:p>
             <a:r>
               <a:rPr lang="fi-FI" dirty="0"/>
+              <a:t>Työvälineet (Client)</a:t>
+            </a:r>
+          </a:p>
+        </p:txBody>
+      </p:sp>
+      <p:sp>
+        <p:nvSpPr>
+          <p:cNvPr id="3" name="Sisällön paikkamerkki 2">
+            <a:extLst>
+              <a:ext uri="{FF2B5EF4-FFF2-40B4-BE49-F238E27FC236}">
+                <a16:creationId xmlns:a16="http://schemas.microsoft.com/office/drawing/2014/main" id="{80F09F31-0F4A-402B-9DEA-4943ABCD730A}"/>
+              </a:ext>
+            </a:extLst>
+          </p:cNvPr>
+          <p:cNvSpPr>
+            <a:spLocks noGrp="1"/>
+          </p:cNvSpPr>
+          <p:nvPr>
+            <p:ph idx="1"/>
+          </p:nvPr>
+        </p:nvSpPr>
+        <p:spPr/>
+        <p:txBody>
+          <a:bodyPr/>
+          <a:lstStyle/>
+          <a:p>
+            <a:pPr marL="0" indent="0">
+              <a:buNone/>
+            </a:pPr>
+            <a:r>
+              <a:rPr lang="fi-FI" dirty="0" err="1"/>
+              <a:t>Versionhallintajärjestemään</a:t>
+            </a:r>
+            <a:r>
+              <a:rPr lang="fi-FI" dirty="0"/>
+              <a:t> ollaan yhteydessä jollakin sovelluksella (</a:t>
+            </a:r>
+            <a:r>
+              <a:rPr lang="fi-FI" dirty="0" err="1"/>
+              <a:t>client</a:t>
+            </a:r>
+            <a:r>
+              <a:rPr lang="fi-FI" dirty="0"/>
+              <a:t>)</a:t>
+            </a:r>
+          </a:p>
+          <a:p>
+            <a:r>
+              <a:rPr lang="fi-FI" sz="2400" dirty="0" err="1"/>
+              <a:t>Git</a:t>
+            </a:r>
+            <a:r>
+              <a:rPr lang="fi-FI" sz="2400" dirty="0"/>
+              <a:t>-pohjaisiin järjestelmiin on useita graafisia </a:t>
+            </a:r>
+            <a:r>
+              <a:rPr lang="fi-FI" sz="2400" dirty="0" err="1"/>
+              <a:t>client</a:t>
+            </a:r>
+            <a:r>
+              <a:rPr lang="fi-FI" sz="2400" dirty="0"/>
+              <a:t>-sovelluksia (</a:t>
+            </a:r>
+            <a:r>
+              <a:rPr lang="fi-FI" sz="1800" dirty="0">
+                <a:hlinkClick r:id="rId2"/>
+              </a:rPr>
+              <a:t>https://git-scm.com/downloads/guis</a:t>
+            </a:r>
+            <a:r>
+              <a:rPr lang="fi-FI" sz="2400" dirty="0"/>
+              <a:t>)</a:t>
+            </a:r>
+          </a:p>
+          <a:p>
+            <a:r>
+              <a:rPr lang="fi-FI" sz="2400" dirty="0"/>
+              <a:t>tai </a:t>
+            </a:r>
+            <a:r>
+              <a:rPr lang="fi-FI" sz="2400" dirty="0" err="1"/>
+              <a:t>Command</a:t>
+            </a:r>
+            <a:r>
+              <a:rPr lang="fi-FI" sz="2400" dirty="0"/>
+              <a:t> Line (CMD) –työkalut</a:t>
+            </a:r>
+          </a:p>
+          <a:p>
+            <a:r>
+              <a:rPr lang="fi-FI" sz="2400" dirty="0"/>
+              <a:t>Visual Studiossa on </a:t>
+            </a:r>
+            <a:r>
+              <a:rPr lang="fi-FI" sz="2400" i="1" dirty="0"/>
+              <a:t>Team Explorer</a:t>
+            </a:r>
+            <a:r>
+              <a:rPr lang="fi-FI" sz="2400" dirty="0"/>
+              <a:t>, joka toimii </a:t>
+            </a:r>
+            <a:r>
+              <a:rPr lang="fi-FI" sz="2400" dirty="0" err="1"/>
+              <a:t>clienttina</a:t>
+            </a:r>
+            <a:endParaRPr lang="fi-FI" sz="2400" dirty="0"/>
+          </a:p>
+          <a:p>
+            <a:r>
+              <a:rPr lang="fi-FI" sz="2400" dirty="0"/>
+              <a:t>Visual Studio </a:t>
+            </a:r>
+            <a:r>
+              <a:rPr lang="fi-FI" sz="2400" dirty="0" err="1"/>
+              <a:t>Code</a:t>
+            </a:r>
+            <a:r>
+              <a:rPr lang="fi-FI" sz="2400" dirty="0"/>
+              <a:t> sisältää vakiona työkalut </a:t>
+            </a:r>
+            <a:r>
+              <a:rPr lang="fi-FI" sz="2400" dirty="0" err="1"/>
+              <a:t>Git</a:t>
+            </a:r>
+            <a:r>
+              <a:rPr lang="fi-FI" sz="2400" dirty="0"/>
+              <a:t>-pohjaisten järjestelmien kanssa toimimiseen</a:t>
+            </a:r>
+          </a:p>
+          <a:p>
+            <a:pPr marL="0" indent="0">
+              <a:buNone/>
+            </a:pPr>
+            <a:endParaRPr lang="fi-FI" dirty="0"/>
+          </a:p>
+        </p:txBody>
+      </p:sp>
+      <p:sp>
+        <p:nvSpPr>
+          <p:cNvPr id="4" name="Alatunnisteen paikkamerkki 3">
+            <a:extLst>
+              <a:ext uri="{FF2B5EF4-FFF2-40B4-BE49-F238E27FC236}">
+                <a16:creationId xmlns:a16="http://schemas.microsoft.com/office/drawing/2014/main" id="{4AB9EB3A-A16B-4531-8975-06E80423883E}"/>
+              </a:ext>
+            </a:extLst>
+          </p:cNvPr>
+          <p:cNvSpPr>
+            <a:spLocks noGrp="1"/>
+          </p:cNvSpPr>
+          <p:nvPr>
+            <p:ph type="ftr" sz="quarter" idx="10"/>
+          </p:nvPr>
+        </p:nvSpPr>
+        <p:spPr/>
+        <p:txBody>
+          <a:bodyPr/>
+          <a:lstStyle/>
+          <a:p>
+            <a:pPr>
+              <a:defRPr/>
+            </a:pPr>
+            <a:endParaRPr lang="fi-FI"/>
+          </a:p>
+        </p:txBody>
+      </p:sp>
+    </p:spTree>
+    <p:extLst>
+      <p:ext uri="{BB962C8B-B14F-4D97-AF65-F5344CB8AC3E}">
+        <p14:creationId xmlns:p14="http://schemas.microsoft.com/office/powerpoint/2010/main" val="4228207482"/>
+      </p:ext>
+    </p:extLst>
+  </p:cSld>
+  <p:clrMapOvr>
+    <a:masterClrMapping/>
+  </p:clrMapOvr>
+</p:sld>
+</file>
+
+<file path=ppt/slides/slide17.xml><?xml version="1.0" encoding="utf-8"?>
+<p:sld xmlns:a="http://schemas.openxmlformats.org/drawingml/2006/main" xmlns:r="http://schemas.openxmlformats.org/officeDocument/2006/relationships" xmlns:p="http://schemas.openxmlformats.org/presentationml/2006/main">
+  <p:cSld>
+    <p:spTree>
+      <p:nvGrpSpPr>
+        <p:cNvPr id="1" name=""/>
+        <p:cNvGrpSpPr/>
+        <p:nvPr/>
+      </p:nvGrpSpPr>
+      <p:grpSpPr>
+        <a:xfrm>
+          <a:off x="0" y="0"/>
+          <a:ext cx="0" cy="0"/>
+          <a:chOff x="0" y="0"/>
+          <a:chExt cx="0" cy="0"/>
+        </a:xfrm>
+      </p:grpSpPr>
+      <p:sp>
+        <p:nvSpPr>
+          <p:cNvPr id="2" name="Otsikko 1">
+            <a:extLst>
+              <a:ext uri="{FF2B5EF4-FFF2-40B4-BE49-F238E27FC236}">
+                <a16:creationId xmlns:a16="http://schemas.microsoft.com/office/drawing/2014/main" id="{094DB930-2672-49D9-A543-781948FEFDBB}"/>
+              </a:ext>
+            </a:extLst>
+          </p:cNvPr>
+          <p:cNvSpPr>
+            <a:spLocks noGrp="1"/>
+          </p:cNvSpPr>
+          <p:nvPr>
+            <p:ph type="title"/>
+          </p:nvPr>
+        </p:nvSpPr>
+        <p:spPr/>
+        <p:txBody>
+          <a:bodyPr/>
+          <a:lstStyle/>
+          <a:p>
+            <a:r>
+              <a:rPr lang="fi-FI" dirty="0"/>
               <a:t>Savonian sisäisissä projekteissa</a:t>
             </a:r>
           </a:p>
@@ -7248,7 +7575,7 @@
 </p:sld>
 </file>
 
-<file path=ppt/slides/slide17.xml><?xml version="1.0" encoding="utf-8"?>
+<file path=ppt/slides/slide18.xml><?xml version="1.0" encoding="utf-8"?>
 <p:sld xmlns:a="http://schemas.openxmlformats.org/drawingml/2006/main" xmlns:r="http://schemas.openxmlformats.org/officeDocument/2006/relationships" xmlns:p="http://schemas.openxmlformats.org/presentationml/2006/main">
   <p:cSld>
     <p:spTree>
@@ -7366,218 +7693,6 @@
 </p:sld>
 </file>
 
-<file path=ppt/slides/slide18.xml><?xml version="1.0" encoding="utf-8"?>
-<p:sld xmlns:a="http://schemas.openxmlformats.org/drawingml/2006/main" xmlns:r="http://schemas.openxmlformats.org/officeDocument/2006/relationships" xmlns:p="http://schemas.openxmlformats.org/presentationml/2006/main">
-  <p:cSld>
-    <p:spTree>
-      <p:nvGrpSpPr>
-        <p:cNvPr id="1" name=""/>
-        <p:cNvGrpSpPr/>
-        <p:nvPr/>
-      </p:nvGrpSpPr>
-      <p:grpSpPr>
-        <a:xfrm>
-          <a:off x="0" y="0"/>
-          <a:ext cx="0" cy="0"/>
-          <a:chOff x="0" y="0"/>
-          <a:chExt cx="0" cy="0"/>
-        </a:xfrm>
-      </p:grpSpPr>
-      <p:sp>
-        <p:nvSpPr>
-          <p:cNvPr id="2" name="Otsikko 1">
-            <a:extLst>
-              <a:ext uri="{FF2B5EF4-FFF2-40B4-BE49-F238E27FC236}">
-                <a16:creationId xmlns:a16="http://schemas.microsoft.com/office/drawing/2014/main" id="{094DB930-2672-49D9-A543-781948FEFDBB}"/>
-              </a:ext>
-            </a:extLst>
-          </p:cNvPr>
-          <p:cNvSpPr>
-            <a:spLocks noGrp="1"/>
-          </p:cNvSpPr>
-          <p:nvPr>
-            <p:ph type="title"/>
-          </p:nvPr>
-        </p:nvSpPr>
-        <p:spPr/>
-        <p:txBody>
-          <a:bodyPr/>
-          <a:lstStyle/>
-          <a:p>
-            <a:r>
-              <a:rPr lang="fi-FI" dirty="0"/>
-              <a:t>Videotutoriaaleja </a:t>
-            </a:r>
-            <a:r>
-              <a:rPr lang="fi-FI" dirty="0" err="1"/>
-              <a:t>Git:n</a:t>
-            </a:r>
-            <a:r>
-              <a:rPr lang="fi-FI" dirty="0"/>
-              <a:t> käyttöön</a:t>
-            </a:r>
-          </a:p>
-        </p:txBody>
-      </p:sp>
-      <p:sp>
-        <p:nvSpPr>
-          <p:cNvPr id="3" name="Sisällön paikkamerkki 2">
-            <a:extLst>
-              <a:ext uri="{FF2B5EF4-FFF2-40B4-BE49-F238E27FC236}">
-                <a16:creationId xmlns:a16="http://schemas.microsoft.com/office/drawing/2014/main" id="{80F09F31-0F4A-402B-9DEA-4943ABCD730A}"/>
-              </a:ext>
-            </a:extLst>
-          </p:cNvPr>
-          <p:cNvSpPr>
-            <a:spLocks noGrp="1"/>
-          </p:cNvSpPr>
-          <p:nvPr>
-            <p:ph idx="1"/>
-          </p:nvPr>
-        </p:nvSpPr>
-        <p:spPr/>
-        <p:txBody>
-          <a:bodyPr/>
-          <a:lstStyle/>
-          <a:p>
-            <a:r>
-              <a:rPr lang="fi-FI" dirty="0" err="1"/>
-              <a:t>Git</a:t>
-            </a:r>
-            <a:r>
-              <a:rPr lang="fi-FI" dirty="0"/>
-              <a:t> Fundamentals (1:10:24) </a:t>
-            </a:r>
-            <a:r>
-              <a:rPr lang="fi-FI" sz="1800" dirty="0">
-                <a:hlinkClick r:id="rId2"/>
-              </a:rPr>
-              <a:t>https://www.youtube.com/watch?v=c3482qAzZLQ</a:t>
-            </a:r>
-            <a:endParaRPr lang="fi-FI" dirty="0"/>
-          </a:p>
-          <a:p>
-            <a:r>
-              <a:rPr lang="fi-FI" dirty="0"/>
-              <a:t>Using </a:t>
-            </a:r>
-            <a:r>
-              <a:rPr lang="fi-FI" dirty="0" err="1"/>
-              <a:t>Git</a:t>
-            </a:r>
-            <a:r>
-              <a:rPr lang="fi-FI" dirty="0"/>
-              <a:t> </a:t>
-            </a:r>
-            <a:r>
-              <a:rPr lang="fi-FI" dirty="0" err="1"/>
-              <a:t>with</a:t>
-            </a:r>
-            <a:r>
-              <a:rPr lang="fi-FI" dirty="0"/>
-              <a:t> Visual Studio (9:10) </a:t>
-            </a:r>
-            <a:r>
-              <a:rPr lang="fi-FI" sz="1800" dirty="0">
-                <a:hlinkClick r:id="rId3"/>
-              </a:rPr>
-              <a:t>https://www.youtube.com/watch?v=jUiuIAZt6Dw</a:t>
-            </a:r>
-            <a:endParaRPr lang="fi-FI" dirty="0"/>
-          </a:p>
-          <a:p>
-            <a:r>
-              <a:rPr lang="fi-FI" dirty="0" err="1"/>
-              <a:t>Git</a:t>
-            </a:r>
-            <a:r>
-              <a:rPr lang="fi-FI" dirty="0"/>
-              <a:t> </a:t>
-            </a:r>
-            <a:r>
-              <a:rPr lang="fi-FI" dirty="0" err="1"/>
-              <a:t>Tutorial</a:t>
-            </a:r>
-            <a:r>
-              <a:rPr lang="fi-FI" dirty="0"/>
-              <a:t> for </a:t>
-            </a:r>
-            <a:r>
-              <a:rPr lang="fi-FI" dirty="0" err="1"/>
-              <a:t>Beginners</a:t>
-            </a:r>
-            <a:r>
-              <a:rPr lang="fi-FI" dirty="0"/>
-              <a:t>: </a:t>
-            </a:r>
-            <a:r>
-              <a:rPr lang="fi-FI" dirty="0" err="1"/>
-              <a:t>Command</a:t>
-            </a:r>
-            <a:r>
-              <a:rPr lang="fi-FI" dirty="0"/>
-              <a:t>-Line Fundamentals (30:32) </a:t>
-            </a:r>
-            <a:r>
-              <a:rPr lang="fi-FI" sz="1800" dirty="0">
-                <a:hlinkClick r:id="rId4"/>
-              </a:rPr>
-              <a:t>https://www.youtube.com/watch?v=HVsySz-h9r4</a:t>
-            </a:r>
-            <a:r>
-              <a:rPr lang="fi-FI" dirty="0"/>
-              <a:t> </a:t>
-            </a:r>
-          </a:p>
-          <a:p>
-            <a:pPr marL="0" indent="0">
-              <a:buNone/>
-            </a:pPr>
-            <a:endParaRPr lang="fi-FI" dirty="0"/>
-          </a:p>
-        </p:txBody>
-      </p:sp>
-      <p:sp>
-        <p:nvSpPr>
-          <p:cNvPr id="4" name="Alatunnisteen paikkamerkki 3">
-            <a:extLst>
-              <a:ext uri="{FF2B5EF4-FFF2-40B4-BE49-F238E27FC236}">
-                <a16:creationId xmlns:a16="http://schemas.microsoft.com/office/drawing/2014/main" id="{4AB9EB3A-A16B-4531-8975-06E80423883E}"/>
-              </a:ext>
-            </a:extLst>
-          </p:cNvPr>
-          <p:cNvSpPr>
-            <a:spLocks noGrp="1"/>
-          </p:cNvSpPr>
-          <p:nvPr>
-            <p:ph type="ftr" sz="quarter" idx="10"/>
-          </p:nvPr>
-        </p:nvSpPr>
-        <p:spPr/>
-        <p:txBody>
-          <a:bodyPr/>
-          <a:lstStyle/>
-          <a:p>
-            <a:pPr>
-              <a:defRPr/>
-            </a:pPr>
-            <a:endParaRPr lang="fi-FI"/>
-          </a:p>
-        </p:txBody>
-      </p:sp>
-    </p:spTree>
-    <p:extLst>
-      <p:ext uri="{BB962C8B-B14F-4D97-AF65-F5344CB8AC3E}">
-        <p14:creationId xmlns:p14="http://schemas.microsoft.com/office/powerpoint/2010/main" val="468159001"/>
-      </p:ext>
-    </p:extLst>
-  </p:cSld>
-  <p:clrMapOvr>
-    <a:masterClrMapping/>
-  </p:clrMapOvr>
-</p:sld>
-</file>
-
 <file path=ppt/slides/slide19.xml><?xml version="1.0" encoding="utf-8"?>
 <p:sld xmlns:a="http://schemas.openxmlformats.org/drawingml/2006/main" xmlns:r="http://schemas.openxmlformats.org/officeDocument/2006/relationships" xmlns:p="http://schemas.openxmlformats.org/presentationml/2006/main">
   <p:cSld>
@@ -7618,23 +7733,15 @@
           <a:p>
             <a:r>
               <a:rPr lang="fi-FI" dirty="0"/>
-              <a:t>Visual Studio </a:t>
+              <a:t>Videotutoriaaleja </a:t>
             </a:r>
             <a:r>
               <a:rPr lang="fi-FI" dirty="0" err="1"/>
-              <a:t>Code</a:t>
-            </a:r>
-            <a:r>
-              <a:rPr lang="fi-FI" dirty="0"/>
-              <a:t> (VS </a:t>
-            </a:r>
-            <a:r>
-              <a:rPr lang="fi-FI" dirty="0" err="1"/>
-              <a:t>Code</a:t>
-            </a:r>
-            <a:r>
-              <a:rPr lang="fi-FI" dirty="0"/>
-              <a:t>)</a:t>
+              <a:t>Git:n</a:t>
+            </a:r>
+            <a:r>
+              <a:rPr lang="fi-FI" dirty="0"/>
+              <a:t> käyttöön</a:t>
             </a:r>
           </a:p>
         </p:txBody>
@@ -7661,88 +7768,98 @@
           <a:lstStyle/>
           <a:p>
             <a:r>
-              <a:rPr lang="fi-FI" dirty="0"/>
-              <a:t>Using Version Control in VS </a:t>
-            </a:r>
-            <a:r>
               <a:rPr lang="fi-FI" dirty="0" err="1"/>
-              <a:t>Code</a:t>
-            </a:r>
-            <a:r>
-              <a:rPr lang="fi-FI" dirty="0"/>
-              <a:t> </a:t>
-            </a:r>
-          </a:p>
-          <a:p>
-            <a:pPr lvl="1"/>
+              <a:t>Git</a:t>
+            </a:r>
+            <a:r>
+              <a:rPr lang="fi-FI" dirty="0"/>
+              <a:t> Fundamentals (1:10:24) </a:t>
+            </a:r>
             <a:r>
               <a:rPr lang="fi-FI" sz="1800" dirty="0">
                 <a:hlinkClick r:id="rId2"/>
               </a:rPr>
-              <a:t>https://code.visualstudio.com/docs/editor/versioncontrol</a:t>
-            </a:r>
-            <a:endParaRPr lang="fi-FI" sz="1800" dirty="0"/>
-          </a:p>
-          <a:p>
-            <a:r>
-              <a:rPr lang="fi-FI" dirty="0"/>
-              <a:t>VS </a:t>
+              <a:t>https://www.youtube.com/watch?v=c3482qAzZLQ</a:t>
+            </a:r>
+            <a:endParaRPr lang="fi-FI" dirty="0"/>
+          </a:p>
+          <a:p>
+            <a:r>
+              <a:rPr lang="fi-FI" dirty="0"/>
+              <a:t>Using </a:t>
             </a:r>
             <a:r>
               <a:rPr lang="fi-FI" dirty="0" err="1"/>
-              <a:t>Code</a:t>
-            </a:r>
-            <a:r>
-              <a:rPr lang="fi-FI" dirty="0"/>
-              <a:t> tukee vakiona </a:t>
+              <a:t>Git</a:t>
+            </a:r>
+            <a:r>
+              <a:rPr lang="fi-FI" dirty="0"/>
+              <a:t> </a:t>
             </a:r>
             <a:r>
               <a:rPr lang="fi-FI" dirty="0" err="1"/>
-              <a:t>Git:ä</a:t>
-            </a:r>
-            <a:r>
-              <a:rPr lang="fi-FI" dirty="0"/>
-              <a:t> ja siihen on saatavilla tuki moneen muuhun </a:t>
-            </a:r>
-            <a:r>
-              <a:rPr lang="fi-FI" dirty="0" err="1"/>
-              <a:t>VCS:iin</a:t>
-            </a:r>
-            <a:r>
-              <a:rPr lang="fi-FI" dirty="0"/>
-              <a:t>.</a:t>
-            </a:r>
-          </a:p>
-          <a:p>
-            <a:r>
-              <a:rPr lang="fi-FI" dirty="0"/>
-              <a:t>Hyvä dokumentti VS </a:t>
-            </a:r>
-            <a:r>
-              <a:rPr lang="fi-FI" dirty="0" err="1"/>
-              <a:t>Coden</a:t>
-            </a:r>
-            <a:r>
-              <a:rPr lang="fi-FI" dirty="0"/>
-              <a:t> yhdistämisestä Visual Studio Team Serviceen ja </a:t>
-            </a:r>
-            <a:r>
-              <a:rPr lang="fi-FI" dirty="0" err="1"/>
-              <a:t>GitHub:iin</a:t>
-            </a:r>
-            <a:endParaRPr lang="fi-FI" dirty="0"/>
-          </a:p>
-          <a:p>
-            <a:pPr lvl="1"/>
+              <a:t>with</a:t>
+            </a:r>
+            <a:r>
+              <a:rPr lang="fi-FI" dirty="0"/>
+              <a:t> Visual Studio (9:10) </a:t>
+            </a:r>
             <a:r>
               <a:rPr lang="fi-FI" sz="1800" dirty="0">
                 <a:hlinkClick r:id="rId3"/>
               </a:rPr>
-              <a:t>https://www.theregister.co.uk/2015/12/07/visual_studio_code_git_integration/</a:t>
-            </a:r>
-            <a:endParaRPr lang="fi-FI" sz="1800" dirty="0"/>
-          </a:p>
-          <a:p>
+              <a:t>https://www.youtube.com/watch?v=jUiuIAZt6Dw</a:t>
+            </a:r>
+            <a:endParaRPr lang="fi-FI" dirty="0"/>
+          </a:p>
+          <a:p>
+            <a:r>
+              <a:rPr lang="fi-FI" dirty="0" err="1"/>
+              <a:t>Git</a:t>
+            </a:r>
+            <a:r>
+              <a:rPr lang="fi-FI" dirty="0"/>
+              <a:t> </a:t>
+            </a:r>
+            <a:r>
+              <a:rPr lang="fi-FI" dirty="0" err="1"/>
+              <a:t>Tutorial</a:t>
+            </a:r>
+            <a:r>
+              <a:rPr lang="fi-FI" dirty="0"/>
+              <a:t> for </a:t>
+            </a:r>
+            <a:r>
+              <a:rPr lang="fi-FI" dirty="0" err="1"/>
+              <a:t>Beginners</a:t>
+            </a:r>
+            <a:r>
+              <a:rPr lang="fi-FI" dirty="0"/>
+              <a:t>: </a:t>
+            </a:r>
+            <a:r>
+              <a:rPr lang="fi-FI" dirty="0" err="1"/>
+              <a:t>Command</a:t>
+            </a:r>
+            <a:r>
+              <a:rPr lang="fi-FI" dirty="0"/>
+              <a:t>-Line Fundamentals (30:32) </a:t>
+            </a:r>
+            <a:r>
+              <a:rPr lang="fi-FI" sz="1800" dirty="0">
+                <a:hlinkClick r:id="rId4"/>
+              </a:rPr>
+              <a:t>https://www.youtube.com/watch?v=HVsySz-h9r4</a:t>
+            </a:r>
+            <a:r>
+              <a:rPr lang="fi-FI" dirty="0"/>
+              <a:t> </a:t>
+            </a:r>
+          </a:p>
+          <a:p>
+            <a:pPr marL="0" indent="0">
+              <a:buNone/>
+            </a:pPr>
             <a:endParaRPr lang="fi-FI" dirty="0"/>
           </a:p>
         </p:txBody>
@@ -7771,14 +7888,14 @@
             <a:pPr>
               <a:defRPr/>
             </a:pPr>
-            <a:endParaRPr lang="fi-FI" dirty="0"/>
+            <a:endParaRPr lang="fi-FI"/>
           </a:p>
         </p:txBody>
       </p:sp>
     </p:spTree>
     <p:extLst>
       <p:ext uri="{BB962C8B-B14F-4D97-AF65-F5344CB8AC3E}">
-        <p14:creationId xmlns:p14="http://schemas.microsoft.com/office/powerpoint/2010/main" val="2670121243"/>
+        <p14:creationId xmlns:p14="http://schemas.microsoft.com/office/powerpoint/2010/main" val="468159001"/>
       </p:ext>
     </p:extLst>
   </p:cSld>
@@ -7933,6 +8050,216 @@
       </p:grpSpPr>
       <p:sp>
         <p:nvSpPr>
+          <p:cNvPr id="2" name="Otsikko 1">
+            <a:extLst>
+              <a:ext uri="{FF2B5EF4-FFF2-40B4-BE49-F238E27FC236}">
+                <a16:creationId xmlns:a16="http://schemas.microsoft.com/office/drawing/2014/main" id="{094DB930-2672-49D9-A543-781948FEFDBB}"/>
+              </a:ext>
+            </a:extLst>
+          </p:cNvPr>
+          <p:cNvSpPr>
+            <a:spLocks noGrp="1"/>
+          </p:cNvSpPr>
+          <p:nvPr>
+            <p:ph type="title"/>
+          </p:nvPr>
+        </p:nvSpPr>
+        <p:spPr/>
+        <p:txBody>
+          <a:bodyPr/>
+          <a:lstStyle/>
+          <a:p>
+            <a:r>
+              <a:rPr lang="fi-FI" dirty="0"/>
+              <a:t>Visual Studio </a:t>
+            </a:r>
+            <a:r>
+              <a:rPr lang="fi-FI" dirty="0" err="1"/>
+              <a:t>Code</a:t>
+            </a:r>
+            <a:r>
+              <a:rPr lang="fi-FI" dirty="0"/>
+              <a:t> (VS </a:t>
+            </a:r>
+            <a:r>
+              <a:rPr lang="fi-FI" dirty="0" err="1"/>
+              <a:t>Code</a:t>
+            </a:r>
+            <a:r>
+              <a:rPr lang="fi-FI" dirty="0"/>
+              <a:t>)</a:t>
+            </a:r>
+          </a:p>
+        </p:txBody>
+      </p:sp>
+      <p:sp>
+        <p:nvSpPr>
+          <p:cNvPr id="3" name="Sisällön paikkamerkki 2">
+            <a:extLst>
+              <a:ext uri="{FF2B5EF4-FFF2-40B4-BE49-F238E27FC236}">
+                <a16:creationId xmlns:a16="http://schemas.microsoft.com/office/drawing/2014/main" id="{80F09F31-0F4A-402B-9DEA-4943ABCD730A}"/>
+              </a:ext>
+            </a:extLst>
+          </p:cNvPr>
+          <p:cNvSpPr>
+            <a:spLocks noGrp="1"/>
+          </p:cNvSpPr>
+          <p:nvPr>
+            <p:ph idx="1"/>
+          </p:nvPr>
+        </p:nvSpPr>
+        <p:spPr/>
+        <p:txBody>
+          <a:bodyPr/>
+          <a:lstStyle/>
+          <a:p>
+            <a:r>
+              <a:rPr lang="fi-FI" dirty="0"/>
+              <a:t>Using Version Control in VS </a:t>
+            </a:r>
+            <a:r>
+              <a:rPr lang="fi-FI" dirty="0" err="1"/>
+              <a:t>Code</a:t>
+            </a:r>
+            <a:r>
+              <a:rPr lang="fi-FI" dirty="0"/>
+              <a:t> </a:t>
+            </a:r>
+          </a:p>
+          <a:p>
+            <a:pPr lvl="1"/>
+            <a:r>
+              <a:rPr lang="fi-FI" sz="1800" dirty="0">
+                <a:hlinkClick r:id="rId2"/>
+              </a:rPr>
+              <a:t>https://code.visualstudio.com/docs/editor/versioncontrol</a:t>
+            </a:r>
+            <a:endParaRPr lang="fi-FI" sz="1800" dirty="0"/>
+          </a:p>
+          <a:p>
+            <a:r>
+              <a:rPr lang="fi-FI" dirty="0"/>
+              <a:t>VS </a:t>
+            </a:r>
+            <a:r>
+              <a:rPr lang="fi-FI" dirty="0" err="1"/>
+              <a:t>Code</a:t>
+            </a:r>
+            <a:r>
+              <a:rPr lang="fi-FI" dirty="0"/>
+              <a:t> tukee vakiona </a:t>
+            </a:r>
+            <a:r>
+              <a:rPr lang="fi-FI" dirty="0" err="1"/>
+              <a:t>Git:ä</a:t>
+            </a:r>
+            <a:r>
+              <a:rPr lang="fi-FI" dirty="0"/>
+              <a:t> ja siihen on saatavilla tuki moneen muuhun </a:t>
+            </a:r>
+            <a:r>
+              <a:rPr lang="fi-FI" dirty="0" err="1"/>
+              <a:t>VCS:iin</a:t>
+            </a:r>
+            <a:r>
+              <a:rPr lang="fi-FI" dirty="0"/>
+              <a:t>.</a:t>
+            </a:r>
+          </a:p>
+          <a:p>
+            <a:r>
+              <a:rPr lang="fi-FI" dirty="0"/>
+              <a:t>Hyvä dokumentti VS </a:t>
+            </a:r>
+            <a:r>
+              <a:rPr lang="fi-FI" dirty="0" err="1"/>
+              <a:t>Coden</a:t>
+            </a:r>
+            <a:r>
+              <a:rPr lang="fi-FI" dirty="0"/>
+              <a:t> yhdistämisestä Visual Studio Team Serviceen ja </a:t>
+            </a:r>
+            <a:r>
+              <a:rPr lang="fi-FI" dirty="0" err="1"/>
+              <a:t>GitHub:iin</a:t>
+            </a:r>
+            <a:endParaRPr lang="fi-FI" dirty="0"/>
+          </a:p>
+          <a:p>
+            <a:pPr lvl="1"/>
+            <a:r>
+              <a:rPr lang="fi-FI" sz="1800" dirty="0">
+                <a:hlinkClick r:id="rId3"/>
+              </a:rPr>
+              <a:t>https://www.theregister.co.uk/2015/12/07/visual_studio_code_git_integration/</a:t>
+            </a:r>
+            <a:endParaRPr lang="fi-FI" sz="1800" dirty="0"/>
+          </a:p>
+          <a:p>
+            <a:endParaRPr lang="fi-FI" dirty="0"/>
+          </a:p>
+        </p:txBody>
+      </p:sp>
+      <p:sp>
+        <p:nvSpPr>
+          <p:cNvPr id="4" name="Alatunnisteen paikkamerkki 3">
+            <a:extLst>
+              <a:ext uri="{FF2B5EF4-FFF2-40B4-BE49-F238E27FC236}">
+                <a16:creationId xmlns:a16="http://schemas.microsoft.com/office/drawing/2014/main" id="{4AB9EB3A-A16B-4531-8975-06E80423883E}"/>
+              </a:ext>
+            </a:extLst>
+          </p:cNvPr>
+          <p:cNvSpPr>
+            <a:spLocks noGrp="1"/>
+          </p:cNvSpPr>
+          <p:nvPr>
+            <p:ph type="ftr" sz="quarter" idx="10"/>
+          </p:nvPr>
+        </p:nvSpPr>
+        <p:spPr/>
+        <p:txBody>
+          <a:bodyPr/>
+          <a:lstStyle/>
+          <a:p>
+            <a:pPr>
+              <a:defRPr/>
+            </a:pPr>
+            <a:endParaRPr lang="fi-FI" dirty="0"/>
+          </a:p>
+        </p:txBody>
+      </p:sp>
+    </p:spTree>
+    <p:extLst>
+      <p:ext uri="{BB962C8B-B14F-4D97-AF65-F5344CB8AC3E}">
+        <p14:creationId xmlns:p14="http://schemas.microsoft.com/office/powerpoint/2010/main" val="2670121243"/>
+      </p:ext>
+    </p:extLst>
+  </p:cSld>
+  <p:clrMapOvr>
+    <a:masterClrMapping/>
+  </p:clrMapOvr>
+</p:sld>
+</file>
+
+<file path=ppt/slides/slide21.xml><?xml version="1.0" encoding="utf-8"?>
+<p:sld xmlns:a="http://schemas.openxmlformats.org/drawingml/2006/main" xmlns:r="http://schemas.openxmlformats.org/officeDocument/2006/relationships" xmlns:p="http://schemas.openxmlformats.org/presentationml/2006/main">
+  <p:cSld>
+    <p:spTree>
+      <p:nvGrpSpPr>
+        <p:cNvPr id="1" name=""/>
+        <p:cNvGrpSpPr/>
+        <p:nvPr/>
+      </p:nvGrpSpPr>
+      <p:grpSpPr>
+        <a:xfrm>
+          <a:off x="0" y="0"/>
+          <a:ext cx="0" cy="0"/>
+          <a:chOff x="0" y="0"/>
+          <a:chExt cx="0" cy="0"/>
+        </a:xfrm>
+      </p:grpSpPr>
+      <p:sp>
+        <p:nvSpPr>
           <p:cNvPr id="4" name="Alatunnisteen paikkamerkki 3">
             <a:extLst>
               <a:ext uri="{FF2B5EF4-FFF2-40B4-BE49-F238E27FC236}">
@@ -8033,7 +8360,788 @@
 </p:sld>
 </file>
 
-<file path=ppt/slides/slide21.xml><?xml version="1.0" encoding="utf-8"?>
+<file path=ppt/slides/slide22.xml><?xml version="1.0" encoding="utf-8"?>
+<p:sld xmlns:a="http://schemas.openxmlformats.org/drawingml/2006/main" xmlns:r="http://schemas.openxmlformats.org/officeDocument/2006/relationships" xmlns:p="http://schemas.openxmlformats.org/presentationml/2006/main">
+  <p:cSld>
+    <p:spTree>
+      <p:nvGrpSpPr>
+        <p:cNvPr id="1" name=""/>
+        <p:cNvGrpSpPr/>
+        <p:nvPr/>
+      </p:nvGrpSpPr>
+      <p:grpSpPr>
+        <a:xfrm>
+          <a:off x="0" y="0"/>
+          <a:ext cx="0" cy="0"/>
+          <a:chOff x="0" y="0"/>
+          <a:chExt cx="0" cy="0"/>
+        </a:xfrm>
+      </p:grpSpPr>
+      <p:sp>
+        <p:nvSpPr>
+          <p:cNvPr id="2" name="Otsikko 1">
+            <a:extLst>
+              <a:ext uri="{FF2B5EF4-FFF2-40B4-BE49-F238E27FC236}">
+                <a16:creationId xmlns:a16="http://schemas.microsoft.com/office/drawing/2014/main" id="{094DB930-2672-49D9-A543-781948FEFDBB}"/>
+              </a:ext>
+            </a:extLst>
+          </p:cNvPr>
+          <p:cNvSpPr>
+            <a:spLocks noGrp="1"/>
+          </p:cNvSpPr>
+          <p:nvPr>
+            <p:ph type="title"/>
+          </p:nvPr>
+        </p:nvSpPr>
+        <p:spPr/>
+        <p:txBody>
+          <a:bodyPr/>
+          <a:lstStyle/>
+          <a:p>
+            <a:r>
+              <a:rPr lang="fi-FI" dirty="0"/>
+              <a:t>Esimerkki</a:t>
+            </a:r>
+          </a:p>
+        </p:txBody>
+      </p:sp>
+      <p:sp>
+        <p:nvSpPr>
+          <p:cNvPr id="3" name="Sisällön paikkamerkki 2">
+            <a:extLst>
+              <a:ext uri="{FF2B5EF4-FFF2-40B4-BE49-F238E27FC236}">
+                <a16:creationId xmlns:a16="http://schemas.microsoft.com/office/drawing/2014/main" id="{80F09F31-0F4A-402B-9DEA-4943ABCD730A}"/>
+              </a:ext>
+            </a:extLst>
+          </p:cNvPr>
+          <p:cNvSpPr>
+            <a:spLocks noGrp="1"/>
+          </p:cNvSpPr>
+          <p:nvPr>
+            <p:ph idx="1"/>
+          </p:nvPr>
+        </p:nvSpPr>
+        <p:spPr/>
+        <p:txBody>
+          <a:bodyPr/>
+          <a:lstStyle/>
+          <a:p>
+            <a:r>
+              <a:rPr lang="fi-FI" sz="1800" dirty="0"/>
+              <a:t>Kloonataan etärepo paikalliseen kansioon (</a:t>
+            </a:r>
+            <a:r>
+              <a:rPr lang="fi-FI" sz="1800" dirty="0" err="1"/>
+              <a:t>git</a:t>
+            </a:r>
+            <a:r>
+              <a:rPr lang="fi-FI" sz="1800" dirty="0"/>
+              <a:t> </a:t>
+            </a:r>
+            <a:r>
+              <a:rPr lang="fi-FI" sz="1800" dirty="0" err="1"/>
+              <a:t>clone</a:t>
+            </a:r>
+            <a:r>
+              <a:rPr lang="fi-FI" sz="1800" dirty="0"/>
+              <a:t>)</a:t>
+            </a:r>
+          </a:p>
+          <a:p>
+            <a:r>
+              <a:rPr lang="fi-FI" sz="1800" dirty="0"/>
+              <a:t>Muokataan tiedostoja</a:t>
+            </a:r>
+          </a:p>
+          <a:p>
+            <a:pPr lvl="1"/>
+            <a:r>
+              <a:rPr lang="fi-FI" sz="1400" dirty="0"/>
+              <a:t>Huomaa, että tiedostoja voi muokata millä tahansa ohjelmalla (esim. PowerPointilla)</a:t>
+            </a:r>
+          </a:p>
+          <a:p>
+            <a:r>
+              <a:rPr lang="fi-FI" sz="1800" dirty="0"/>
+              <a:t>Viedään muutokset takaisin etärepoon</a:t>
+            </a:r>
+          </a:p>
+          <a:p>
+            <a:pPr lvl="1"/>
+            <a:r>
+              <a:rPr lang="fi-FI" sz="1400" dirty="0" err="1"/>
+              <a:t>git</a:t>
+            </a:r>
+            <a:r>
+              <a:rPr lang="fi-FI" sz="1400" dirty="0"/>
+              <a:t> </a:t>
+            </a:r>
+            <a:r>
+              <a:rPr lang="fi-FI" sz="1400" dirty="0" err="1"/>
+              <a:t>commit</a:t>
+            </a:r>
+            <a:endParaRPr lang="fi-FI" sz="1400" dirty="0"/>
+          </a:p>
+          <a:p>
+            <a:pPr lvl="1"/>
+            <a:r>
+              <a:rPr lang="fi-FI" sz="1400" dirty="0" err="1"/>
+              <a:t>git</a:t>
+            </a:r>
+            <a:r>
+              <a:rPr lang="fi-FI" sz="1400" dirty="0"/>
+              <a:t> </a:t>
+            </a:r>
+            <a:r>
+              <a:rPr lang="fi-FI" sz="1400" dirty="0" err="1"/>
+              <a:t>push</a:t>
+            </a:r>
+            <a:endParaRPr lang="fi-FI" sz="1400" dirty="0"/>
+          </a:p>
+          <a:p>
+            <a:endParaRPr lang="fi-FI" dirty="0"/>
+          </a:p>
+          <a:p>
+            <a:pPr marL="0" indent="0">
+              <a:buNone/>
+            </a:pPr>
+            <a:r>
+              <a:rPr lang="fi-FI" sz="2000" dirty="0">
+                <a:hlinkClick r:id="rId2"/>
+              </a:rPr>
+              <a:t>https://github.com/SavoniaUAS/versioncontrol.git</a:t>
+            </a:r>
+            <a:endParaRPr lang="fi-FI" sz="2000" dirty="0"/>
+          </a:p>
+          <a:p>
+            <a:endParaRPr lang="fi-FI" dirty="0"/>
+          </a:p>
+        </p:txBody>
+      </p:sp>
+      <p:sp>
+        <p:nvSpPr>
+          <p:cNvPr id="4" name="Alatunnisteen paikkamerkki 3">
+            <a:extLst>
+              <a:ext uri="{FF2B5EF4-FFF2-40B4-BE49-F238E27FC236}">
+                <a16:creationId xmlns:a16="http://schemas.microsoft.com/office/drawing/2014/main" id="{4AB9EB3A-A16B-4531-8975-06E80423883E}"/>
+              </a:ext>
+            </a:extLst>
+          </p:cNvPr>
+          <p:cNvSpPr>
+            <a:spLocks noGrp="1"/>
+          </p:cNvSpPr>
+          <p:nvPr>
+            <p:ph type="ftr" sz="quarter" idx="10"/>
+          </p:nvPr>
+        </p:nvSpPr>
+        <p:spPr/>
+        <p:txBody>
+          <a:bodyPr/>
+          <a:lstStyle/>
+          <a:p>
+            <a:pPr>
+              <a:defRPr/>
+            </a:pPr>
+            <a:endParaRPr lang="fi-FI" dirty="0"/>
+          </a:p>
+        </p:txBody>
+      </p:sp>
+    </p:spTree>
+    <p:extLst>
+      <p:ext uri="{BB962C8B-B14F-4D97-AF65-F5344CB8AC3E}">
+        <p14:creationId xmlns:p14="http://schemas.microsoft.com/office/powerpoint/2010/main" val="2155079527"/>
+      </p:ext>
+    </p:extLst>
+  </p:cSld>
+  <p:clrMapOvr>
+    <a:masterClrMapping/>
+  </p:clrMapOvr>
+</p:sld>
+</file>
+
+<file path=ppt/slides/slide23.xml><?xml version="1.0" encoding="utf-8"?>
+<p:sld xmlns:a="http://schemas.openxmlformats.org/drawingml/2006/main" xmlns:r="http://schemas.openxmlformats.org/officeDocument/2006/relationships" xmlns:p="http://schemas.openxmlformats.org/presentationml/2006/main">
+  <p:cSld>
+    <p:spTree>
+      <p:nvGrpSpPr>
+        <p:cNvPr id="1" name=""/>
+        <p:cNvGrpSpPr/>
+        <p:nvPr/>
+      </p:nvGrpSpPr>
+      <p:grpSpPr>
+        <a:xfrm>
+          <a:off x="0" y="0"/>
+          <a:ext cx="0" cy="0"/>
+          <a:chOff x="0" y="0"/>
+          <a:chExt cx="0" cy="0"/>
+        </a:xfrm>
+      </p:grpSpPr>
+      <p:pic>
+        <p:nvPicPr>
+          <p:cNvPr id="7" name="Kuva 6" descr="Step 1: paikallinen tyhjälle näyttävä kansio, jonne kloonataan etärepo">
+            <a:extLst>
+              <a:ext uri="{FF2B5EF4-FFF2-40B4-BE49-F238E27FC236}">
+                <a16:creationId xmlns:a16="http://schemas.microsoft.com/office/drawing/2014/main" id="{03E074D3-9CEF-48C7-A4F8-2EA7763AF051}"/>
+              </a:ext>
+            </a:extLst>
+          </p:cNvPr>
+          <p:cNvPicPr>
+            <a:picLocks noChangeAspect="1"/>
+          </p:cNvPicPr>
+          <p:nvPr/>
+        </p:nvPicPr>
+        <p:blipFill>
+          <a:blip r:embed="rId2" cstate="print">
+            <a:extLst>
+              <a:ext uri="{28A0092B-C50C-407E-A947-70E740481C1C}">
+                <a14:useLocalDpi xmlns:a14="http://schemas.microsoft.com/office/drawing/2010/main" val="0"/>
+              </a:ext>
+            </a:extLst>
+          </a:blip>
+          <a:stretch>
+            <a:fillRect/>
+          </a:stretch>
+        </p:blipFill>
+        <p:spPr>
+          <a:xfrm>
+            <a:off x="0" y="1196752"/>
+            <a:ext cx="9144000" cy="4766474"/>
+          </a:xfrm>
+          <a:prstGeom prst="rect">
+            <a:avLst/>
+          </a:prstGeom>
+        </p:spPr>
+      </p:pic>
+      <p:sp>
+        <p:nvSpPr>
+          <p:cNvPr id="8" name="Tekstiruutu 7">
+            <a:extLst>
+              <a:ext uri="{FF2B5EF4-FFF2-40B4-BE49-F238E27FC236}">
+                <a16:creationId xmlns:a16="http://schemas.microsoft.com/office/drawing/2014/main" id="{CCBE5E6C-1675-4886-8E3C-3E516A85659C}"/>
+              </a:ext>
+            </a:extLst>
+          </p:cNvPr>
+          <p:cNvSpPr txBox="1"/>
+          <p:nvPr/>
+        </p:nvSpPr>
+        <p:spPr>
+          <a:xfrm>
+            <a:off x="179512" y="6165304"/>
+            <a:ext cx="8784976" cy="369332"/>
+          </a:xfrm>
+          <a:prstGeom prst="rect">
+            <a:avLst/>
+          </a:prstGeom>
+          <a:noFill/>
+        </p:spPr>
+        <p:txBody>
+          <a:bodyPr wrap="square" rtlCol="0">
+            <a:spAutoFit/>
+          </a:bodyPr>
+          <a:lstStyle/>
+          <a:p>
+            <a:r>
+              <a:rPr lang="fi-FI" dirty="0" err="1"/>
+              <a:t>Step</a:t>
+            </a:r>
+            <a:r>
+              <a:rPr lang="fi-FI" dirty="0"/>
+              <a:t> 1: paikallinen tyhjälle näyttävä kansio, jonne kloonataan etärepo</a:t>
+            </a:r>
+          </a:p>
+        </p:txBody>
+      </p:sp>
+    </p:spTree>
+    <p:extLst>
+      <p:ext uri="{BB962C8B-B14F-4D97-AF65-F5344CB8AC3E}">
+        <p14:creationId xmlns:p14="http://schemas.microsoft.com/office/powerpoint/2010/main" val="1322460856"/>
+      </p:ext>
+    </p:extLst>
+  </p:cSld>
+  <p:clrMapOvr>
+    <a:masterClrMapping/>
+  </p:clrMapOvr>
+</p:sld>
+</file>
+
+<file path=ppt/slides/slide24.xml><?xml version="1.0" encoding="utf-8"?>
+<p:sld xmlns:a="http://schemas.openxmlformats.org/drawingml/2006/main" xmlns:r="http://schemas.openxmlformats.org/officeDocument/2006/relationships" xmlns:p="http://schemas.openxmlformats.org/presentationml/2006/main">
+  <p:cSld>
+    <p:spTree>
+      <p:nvGrpSpPr>
+        <p:cNvPr id="1" name=""/>
+        <p:cNvGrpSpPr/>
+        <p:nvPr/>
+      </p:nvGrpSpPr>
+      <p:grpSpPr>
+        <a:xfrm>
+          <a:off x="0" y="0"/>
+          <a:ext cx="0" cy="0"/>
+          <a:chOff x="0" y="0"/>
+          <a:chExt cx="0" cy="0"/>
+        </a:xfrm>
+      </p:grpSpPr>
+      <p:sp>
+        <p:nvSpPr>
+          <p:cNvPr id="8" name="Tekstiruutu 7">
+            <a:extLst>
+              <a:ext uri="{FF2B5EF4-FFF2-40B4-BE49-F238E27FC236}">
+                <a16:creationId xmlns:a16="http://schemas.microsoft.com/office/drawing/2014/main" id="{CCBE5E6C-1675-4886-8E3C-3E516A85659C}"/>
+              </a:ext>
+            </a:extLst>
+          </p:cNvPr>
+          <p:cNvSpPr txBox="1"/>
+          <p:nvPr/>
+        </p:nvSpPr>
+        <p:spPr>
+          <a:xfrm>
+            <a:off x="179511" y="6165304"/>
+            <a:ext cx="8784976" cy="646331"/>
+          </a:xfrm>
+          <a:prstGeom prst="rect">
+            <a:avLst/>
+          </a:prstGeom>
+          <a:noFill/>
+        </p:spPr>
+        <p:txBody>
+          <a:bodyPr wrap="square" rtlCol="0">
+            <a:spAutoFit/>
+          </a:bodyPr>
+          <a:lstStyle/>
+          <a:p>
+            <a:r>
+              <a:rPr lang="fi-FI" dirty="0" err="1"/>
+              <a:t>Step</a:t>
+            </a:r>
+            <a:r>
+              <a:rPr lang="fi-FI" dirty="0"/>
+              <a:t> 2: </a:t>
+            </a:r>
+            <a:r>
+              <a:rPr lang="fi-FI" dirty="0" err="1"/>
+              <a:t>git</a:t>
+            </a:r>
+            <a:r>
+              <a:rPr lang="fi-FI" dirty="0"/>
+              <a:t> </a:t>
+            </a:r>
+            <a:r>
+              <a:rPr lang="fi-FI" dirty="0" err="1"/>
+              <a:t>clone</a:t>
+            </a:r>
+            <a:r>
+              <a:rPr lang="fi-FI" dirty="0"/>
+              <a:t> epäonnistui, koska kansio ei ollutkaan tyhjä. Kansiossa oli piilotettu kansio: .</a:t>
+            </a:r>
+            <a:r>
+              <a:rPr lang="fi-FI" dirty="0" err="1"/>
+              <a:t>git</a:t>
+            </a:r>
+            <a:r>
+              <a:rPr lang="fi-FI" dirty="0"/>
+              <a:t>. Poistetaan piilotettu kansio.</a:t>
+            </a:r>
+          </a:p>
+        </p:txBody>
+      </p:sp>
+      <p:pic>
+        <p:nvPicPr>
+          <p:cNvPr id="3" name="Kuva 2" descr="Step 2: git clone epäonnistui, koska kansio ei ollutkaan tyhjä. Kansiossa oli piilotettu kansio: .git. Poistetaan piilotettu kansio.">
+            <a:extLst>
+              <a:ext uri="{FF2B5EF4-FFF2-40B4-BE49-F238E27FC236}">
+                <a16:creationId xmlns:a16="http://schemas.microsoft.com/office/drawing/2014/main" id="{FED06A91-EC16-4E1A-8378-B292ABCFC571}"/>
+              </a:ext>
+            </a:extLst>
+          </p:cNvPr>
+          <p:cNvPicPr>
+            <a:picLocks noChangeAspect="1"/>
+          </p:cNvPicPr>
+          <p:nvPr/>
+        </p:nvPicPr>
+        <p:blipFill>
+          <a:blip r:embed="rId2">
+            <a:extLst>
+              <a:ext uri="{28A0092B-C50C-407E-A947-70E740481C1C}">
+                <a14:useLocalDpi xmlns:a14="http://schemas.microsoft.com/office/drawing/2010/main" val="0"/>
+              </a:ext>
+            </a:extLst>
+          </a:blip>
+          <a:stretch>
+            <a:fillRect/>
+          </a:stretch>
+        </p:blipFill>
+        <p:spPr>
+          <a:xfrm>
+            <a:off x="110895" y="1920797"/>
+            <a:ext cx="8922209" cy="3016405"/>
+          </a:xfrm>
+          <a:prstGeom prst="rect">
+            <a:avLst/>
+          </a:prstGeom>
+        </p:spPr>
+      </p:pic>
+    </p:spTree>
+    <p:extLst>
+      <p:ext uri="{BB962C8B-B14F-4D97-AF65-F5344CB8AC3E}">
+        <p14:creationId xmlns:p14="http://schemas.microsoft.com/office/powerpoint/2010/main" val="4129314754"/>
+      </p:ext>
+    </p:extLst>
+  </p:cSld>
+  <p:clrMapOvr>
+    <a:masterClrMapping/>
+  </p:clrMapOvr>
+</p:sld>
+</file>
+
+<file path=ppt/slides/slide25.xml><?xml version="1.0" encoding="utf-8"?>
+<p:sld xmlns:a="http://schemas.openxmlformats.org/drawingml/2006/main" xmlns:r="http://schemas.openxmlformats.org/officeDocument/2006/relationships" xmlns:p="http://schemas.openxmlformats.org/presentationml/2006/main">
+  <p:cSld>
+    <p:spTree>
+      <p:nvGrpSpPr>
+        <p:cNvPr id="1" name=""/>
+        <p:cNvGrpSpPr/>
+        <p:nvPr/>
+      </p:nvGrpSpPr>
+      <p:grpSpPr>
+        <a:xfrm>
+          <a:off x="0" y="0"/>
+          <a:ext cx="0" cy="0"/>
+          <a:chOff x="0" y="0"/>
+          <a:chExt cx="0" cy="0"/>
+        </a:xfrm>
+      </p:grpSpPr>
+      <p:sp>
+        <p:nvSpPr>
+          <p:cNvPr id="8" name="Tekstiruutu 7">
+            <a:extLst>
+              <a:ext uri="{FF2B5EF4-FFF2-40B4-BE49-F238E27FC236}">
+                <a16:creationId xmlns:a16="http://schemas.microsoft.com/office/drawing/2014/main" id="{CCBE5E6C-1675-4886-8E3C-3E516A85659C}"/>
+              </a:ext>
+            </a:extLst>
+          </p:cNvPr>
+          <p:cNvSpPr txBox="1"/>
+          <p:nvPr/>
+        </p:nvSpPr>
+        <p:spPr>
+          <a:xfrm>
+            <a:off x="179511" y="6165304"/>
+            <a:ext cx="8784976" cy="369332"/>
+          </a:xfrm>
+          <a:prstGeom prst="rect">
+            <a:avLst/>
+          </a:prstGeom>
+          <a:noFill/>
+        </p:spPr>
+        <p:txBody>
+          <a:bodyPr wrap="square" rtlCol="0">
+            <a:spAutoFit/>
+          </a:bodyPr>
+          <a:lstStyle/>
+          <a:p>
+            <a:r>
+              <a:rPr lang="fi-FI" dirty="0" err="1"/>
+              <a:t>Step</a:t>
+            </a:r>
+            <a:r>
+              <a:rPr lang="fi-FI" dirty="0"/>
+              <a:t> 3: kloonaus onnistui. Nyt kansiossa on kopio </a:t>
+            </a:r>
+            <a:r>
+              <a:rPr lang="fi-FI" dirty="0" err="1"/>
+              <a:t>etärepon</a:t>
+            </a:r>
+            <a:r>
+              <a:rPr lang="fi-FI" dirty="0"/>
+              <a:t> tiedostoista.</a:t>
+            </a:r>
+          </a:p>
+        </p:txBody>
+      </p:sp>
+      <p:pic>
+        <p:nvPicPr>
+          <p:cNvPr id="4" name="Kuva 3" descr="Step 3: kloonaus onnistui. Nyt kansiossa on kopio etärepon tiedostoista.">
+            <a:extLst>
+              <a:ext uri="{FF2B5EF4-FFF2-40B4-BE49-F238E27FC236}">
+                <a16:creationId xmlns:a16="http://schemas.microsoft.com/office/drawing/2014/main" id="{35BD8BBA-34DC-4FA2-8779-4A2BBE5BAD85}"/>
+              </a:ext>
+            </a:extLst>
+          </p:cNvPr>
+          <p:cNvPicPr>
+            <a:picLocks noChangeAspect="1"/>
+          </p:cNvPicPr>
+          <p:nvPr/>
+        </p:nvPicPr>
+        <p:blipFill>
+          <a:blip r:embed="rId2" cstate="print">
+            <a:extLst>
+              <a:ext uri="{28A0092B-C50C-407E-A947-70E740481C1C}">
+                <a14:useLocalDpi xmlns:a14="http://schemas.microsoft.com/office/drawing/2010/main" val="0"/>
+              </a:ext>
+            </a:extLst>
+          </a:blip>
+          <a:stretch>
+            <a:fillRect/>
+          </a:stretch>
+        </p:blipFill>
+        <p:spPr>
+          <a:xfrm>
+            <a:off x="0" y="1220167"/>
+            <a:ext cx="9144000" cy="4417666"/>
+          </a:xfrm>
+          <a:prstGeom prst="rect">
+            <a:avLst/>
+          </a:prstGeom>
+        </p:spPr>
+      </p:pic>
+    </p:spTree>
+    <p:extLst>
+      <p:ext uri="{BB962C8B-B14F-4D97-AF65-F5344CB8AC3E}">
+        <p14:creationId xmlns:p14="http://schemas.microsoft.com/office/powerpoint/2010/main" val="1929433325"/>
+      </p:ext>
+    </p:extLst>
+  </p:cSld>
+  <p:clrMapOvr>
+    <a:masterClrMapping/>
+  </p:clrMapOvr>
+</p:sld>
+</file>
+
+<file path=ppt/slides/slide26.xml><?xml version="1.0" encoding="utf-8"?>
+<p:sld xmlns:a="http://schemas.openxmlformats.org/drawingml/2006/main" xmlns:r="http://schemas.openxmlformats.org/officeDocument/2006/relationships" xmlns:p="http://schemas.openxmlformats.org/presentationml/2006/main">
+  <p:cSld>
+    <p:spTree>
+      <p:nvGrpSpPr>
+        <p:cNvPr id="1" name=""/>
+        <p:cNvGrpSpPr/>
+        <p:nvPr/>
+      </p:nvGrpSpPr>
+      <p:grpSpPr>
+        <a:xfrm>
+          <a:off x="0" y="0"/>
+          <a:ext cx="0" cy="0"/>
+          <a:chOff x="0" y="0"/>
+          <a:chExt cx="0" cy="0"/>
+        </a:xfrm>
+      </p:grpSpPr>
+      <p:sp>
+        <p:nvSpPr>
+          <p:cNvPr id="8" name="Tekstiruutu 7">
+            <a:extLst>
+              <a:ext uri="{FF2B5EF4-FFF2-40B4-BE49-F238E27FC236}">
+                <a16:creationId xmlns:a16="http://schemas.microsoft.com/office/drawing/2014/main" id="{CCBE5E6C-1675-4886-8E3C-3E516A85659C}"/>
+              </a:ext>
+            </a:extLst>
+          </p:cNvPr>
+          <p:cNvSpPr txBox="1"/>
+          <p:nvPr/>
+        </p:nvSpPr>
+        <p:spPr>
+          <a:xfrm>
+            <a:off x="179511" y="6165304"/>
+            <a:ext cx="8784976" cy="646331"/>
+          </a:xfrm>
+          <a:prstGeom prst="rect">
+            <a:avLst/>
+          </a:prstGeom>
+          <a:noFill/>
+        </p:spPr>
+        <p:txBody>
+          <a:bodyPr wrap="square" rtlCol="0">
+            <a:spAutoFit/>
+          </a:bodyPr>
+          <a:lstStyle/>
+          <a:p>
+            <a:r>
+              <a:rPr lang="fi-FI" dirty="0" err="1"/>
+              <a:t>Step</a:t>
+            </a:r>
+            <a:r>
+              <a:rPr lang="fi-FI" dirty="0"/>
+              <a:t> 4: Avataan kansio Visual Studio </a:t>
+            </a:r>
+            <a:r>
+              <a:rPr lang="fi-FI" dirty="0" err="1"/>
+              <a:t>Code:en</a:t>
+            </a:r>
+            <a:r>
+              <a:rPr lang="fi-FI" dirty="0"/>
+              <a:t> ja muokataan yhtä tiedostoa. VS </a:t>
+            </a:r>
+            <a:r>
+              <a:rPr lang="fi-FI" dirty="0" err="1"/>
+              <a:t>Code</a:t>
+            </a:r>
+            <a:r>
+              <a:rPr lang="fi-FI" dirty="0"/>
+              <a:t> huomaa muuttuneen tiedoston.</a:t>
+            </a:r>
+          </a:p>
+        </p:txBody>
+      </p:sp>
+      <p:pic>
+        <p:nvPicPr>
+          <p:cNvPr id="3" name="Kuva 2" descr="Step 4: Avataan kansio Visual Studio Code:en ja muokataan yhtä tiedostoa. VS Code huomaa muuttuneen tiedoston.">
+            <a:extLst>
+              <a:ext uri="{FF2B5EF4-FFF2-40B4-BE49-F238E27FC236}">
+                <a16:creationId xmlns:a16="http://schemas.microsoft.com/office/drawing/2014/main" id="{F3A18AD3-0589-4F7B-A7DB-91BAAD894A12}"/>
+              </a:ext>
+            </a:extLst>
+          </p:cNvPr>
+          <p:cNvPicPr>
+            <a:picLocks noChangeAspect="1"/>
+          </p:cNvPicPr>
+          <p:nvPr/>
+        </p:nvPicPr>
+        <p:blipFill>
+          <a:blip r:embed="rId2">
+            <a:extLst>
+              <a:ext uri="{28A0092B-C50C-407E-A947-70E740481C1C}">
+                <a14:useLocalDpi xmlns:a14="http://schemas.microsoft.com/office/drawing/2010/main" val="0"/>
+              </a:ext>
+            </a:extLst>
+          </a:blip>
+          <a:stretch>
+            <a:fillRect/>
+          </a:stretch>
+        </p:blipFill>
+        <p:spPr>
+          <a:xfrm>
+            <a:off x="0" y="2365599"/>
+            <a:ext cx="9144000" cy="2126802"/>
+          </a:xfrm>
+          <a:prstGeom prst="rect">
+            <a:avLst/>
+          </a:prstGeom>
+        </p:spPr>
+      </p:pic>
+    </p:spTree>
+    <p:extLst>
+      <p:ext uri="{BB962C8B-B14F-4D97-AF65-F5344CB8AC3E}">
+        <p14:creationId xmlns:p14="http://schemas.microsoft.com/office/powerpoint/2010/main" val="3563167847"/>
+      </p:ext>
+    </p:extLst>
+  </p:cSld>
+  <p:clrMapOvr>
+    <a:masterClrMapping/>
+  </p:clrMapOvr>
+</p:sld>
+</file>
+
+<file path=ppt/slides/slide27.xml><?xml version="1.0" encoding="utf-8"?>
+<p:sld xmlns:a="http://schemas.openxmlformats.org/drawingml/2006/main" xmlns:r="http://schemas.openxmlformats.org/officeDocument/2006/relationships" xmlns:p="http://schemas.openxmlformats.org/presentationml/2006/main">
+  <p:cSld>
+    <p:spTree>
+      <p:nvGrpSpPr>
+        <p:cNvPr id="1" name=""/>
+        <p:cNvGrpSpPr/>
+        <p:nvPr/>
+      </p:nvGrpSpPr>
+      <p:grpSpPr>
+        <a:xfrm>
+          <a:off x="0" y="0"/>
+          <a:ext cx="0" cy="0"/>
+          <a:chOff x="0" y="0"/>
+          <a:chExt cx="0" cy="0"/>
+        </a:xfrm>
+      </p:grpSpPr>
+      <p:sp>
+        <p:nvSpPr>
+          <p:cNvPr id="8" name="Tekstiruutu 7">
+            <a:extLst>
+              <a:ext uri="{FF2B5EF4-FFF2-40B4-BE49-F238E27FC236}">
+                <a16:creationId xmlns:a16="http://schemas.microsoft.com/office/drawing/2014/main" id="{CCBE5E6C-1675-4886-8E3C-3E516A85659C}"/>
+              </a:ext>
+            </a:extLst>
+          </p:cNvPr>
+          <p:cNvSpPr txBox="1"/>
+          <p:nvPr/>
+        </p:nvSpPr>
+        <p:spPr>
+          <a:xfrm>
+            <a:off x="179511" y="6165304"/>
+            <a:ext cx="8784976" cy="646331"/>
+          </a:xfrm>
+          <a:prstGeom prst="rect">
+            <a:avLst/>
+          </a:prstGeom>
+          <a:noFill/>
+        </p:spPr>
+        <p:txBody>
+          <a:bodyPr wrap="square" rtlCol="0">
+            <a:spAutoFit/>
+          </a:bodyPr>
+          <a:lstStyle/>
+          <a:p>
+            <a:r>
+              <a:rPr lang="fi-FI" dirty="0" err="1"/>
+              <a:t>Step</a:t>
+            </a:r>
+            <a:r>
+              <a:rPr lang="fi-FI" dirty="0"/>
+              <a:t> 5: Muokataan toista tiedostoa (versionhallinta.pptx) Power Point -sovelluksella. VS </a:t>
+            </a:r>
+            <a:r>
+              <a:rPr lang="fi-FI" dirty="0" err="1"/>
+              <a:t>Code</a:t>
+            </a:r>
+            <a:r>
+              <a:rPr lang="fi-FI"/>
+              <a:t> huomaa myös tämän muutoksen.</a:t>
+            </a:r>
+            <a:endParaRPr lang="fi-FI" dirty="0"/>
+          </a:p>
+        </p:txBody>
+      </p:sp>
+      <p:pic>
+        <p:nvPicPr>
+          <p:cNvPr id="4" name="Kuva 3" descr="Step 5: Muokataan toista tiedostoa (versionhallinta.pptx) Power Point -sovelluksella. VS Code huomaa myös tämän muutoksen.">
+            <a:extLst>
+              <a:ext uri="{FF2B5EF4-FFF2-40B4-BE49-F238E27FC236}">
+                <a16:creationId xmlns:a16="http://schemas.microsoft.com/office/drawing/2014/main" id="{2A7986E5-C1AE-4D51-AFAF-B7ADAD36DFCF}"/>
+              </a:ext>
+            </a:extLst>
+          </p:cNvPr>
+          <p:cNvPicPr>
+            <a:picLocks noChangeAspect="1"/>
+          </p:cNvPicPr>
+          <p:nvPr/>
+        </p:nvPicPr>
+        <p:blipFill>
+          <a:blip r:embed="rId2" cstate="print">
+            <a:extLst>
+              <a:ext uri="{28A0092B-C50C-407E-A947-70E740481C1C}">
+                <a14:useLocalDpi xmlns:a14="http://schemas.microsoft.com/office/drawing/2010/main" val="0"/>
+              </a:ext>
+            </a:extLst>
+          </a:blip>
+          <a:stretch>
+            <a:fillRect/>
+          </a:stretch>
+        </p:blipFill>
+        <p:spPr>
+          <a:xfrm>
+            <a:off x="0" y="1421812"/>
+            <a:ext cx="9144000" cy="4014375"/>
+          </a:xfrm>
+          <a:prstGeom prst="rect">
+            <a:avLst/>
+          </a:prstGeom>
+        </p:spPr>
+      </p:pic>
+    </p:spTree>
+    <p:extLst>
+      <p:ext uri="{BB962C8B-B14F-4D97-AF65-F5344CB8AC3E}">
+        <p14:creationId xmlns:p14="http://schemas.microsoft.com/office/powerpoint/2010/main" val="2385363600"/>
+      </p:ext>
+    </p:extLst>
+  </p:cSld>
+  <p:clrMapOvr>
+    <a:masterClrMapping/>
+  </p:clrMapOvr>
+</p:sld>
+</file>
+
+<file path=ppt/slides/slide28.xml><?xml version="1.0" encoding="utf-8"?>
 <p:sld xmlns:a="http://schemas.openxmlformats.org/drawingml/2006/main" xmlns:r="http://schemas.openxmlformats.org/officeDocument/2006/relationships" xmlns:p="http://schemas.openxmlformats.org/presentationml/2006/main">
   <p:cSld>
     <p:spTree>
@@ -8467,12 +9575,12 @@
               <a:t>GitHub, </a:t>
             </a:r>
             <a:r>
-              <a:rPr lang="fi-FI" sz="2400" dirty="0">
+              <a:rPr lang="fi-FI" sz="2000" dirty="0">
                 <a:hlinkClick r:id="rId3"/>
               </a:rPr>
               <a:t>https://github.com/</a:t>
             </a:r>
-            <a:endParaRPr lang="fi-FI" sz="2400" dirty="0"/>
+            <a:endParaRPr lang="fi-FI" sz="2000" dirty="0"/>
           </a:p>
           <a:p>
             <a:r>
@@ -8484,12 +9592,12 @@
               <a:t>, </a:t>
             </a:r>
             <a:r>
-              <a:rPr lang="fi-FI" sz="2400" dirty="0">
+              <a:rPr lang="fi-FI" sz="2000" dirty="0">
                 <a:hlinkClick r:id="rId4"/>
               </a:rPr>
               <a:t>https://about.gitlab.com/</a:t>
             </a:r>
-            <a:endParaRPr lang="fi-FI" sz="2400" dirty="0"/>
+            <a:endParaRPr lang="fi-FI" sz="2000" dirty="0"/>
           </a:p>
           <a:p>
             <a:r>
@@ -8501,26 +9609,14 @@
               <a:t>, </a:t>
             </a:r>
             <a:r>
-              <a:rPr lang="fi-FI" sz="2400" dirty="0">
+              <a:rPr lang="fi-FI" sz="2000" dirty="0">
                 <a:hlinkClick r:id="rId5"/>
               </a:rPr>
               <a:t>https://bitbucket.org/</a:t>
             </a:r>
-            <a:endParaRPr lang="fi-FI" sz="2400" dirty="0"/>
-          </a:p>
-          <a:p>
-            <a:r>
-              <a:rPr lang="fi-FI" dirty="0"/>
-              <a:t>Visual Studio Team Service, VSTS (</a:t>
-            </a:r>
-            <a:r>
-              <a:rPr lang="fi-FI" dirty="0" err="1"/>
-              <a:t>aka</a:t>
-            </a:r>
-            <a:r>
-              <a:rPr lang="fi-FI" dirty="0"/>
-              <a:t>. </a:t>
-            </a:r>
+            <a:endParaRPr lang="fi-FI" sz="2000" dirty="0"/>
+          </a:p>
+          <a:p>
             <a:r>
               <a:rPr lang="fi-FI" dirty="0" err="1"/>
               <a:t>Azure</a:t>
@@ -8535,23 +9631,30 @@
             </a:r>
             <a:r>
               <a:rPr lang="fi-FI" dirty="0"/>
-              <a:t>), </a:t>
-            </a:r>
-            <a:r>
-              <a:rPr lang="fi-FI" sz="2400" dirty="0">
+              <a:t> </a:t>
+            </a:r>
+            <a:r>
+              <a:rPr lang="fi-FI" sz="1800" dirty="0"/>
+              <a:t>(oli aiemmin: Visual Studio Team Service, VSTS)</a:t>
+            </a:r>
+            <a:r>
+              <a:rPr lang="fi-FI" sz="1800" b="1" dirty="0"/>
+              <a:t>,</a:t>
+            </a:r>
+            <a:r>
+              <a:rPr lang="fi-FI" sz="1800" dirty="0"/>
+              <a:t> </a:t>
+            </a:r>
+            <a:r>
+              <a:rPr lang="fi-FI" sz="2000" dirty="0">
                 <a:hlinkClick r:id="rId6"/>
               </a:rPr>
-              <a:t>https://visualstudio.microsoft.com/team-services/</a:t>
-            </a:r>
-            <a:endParaRPr lang="fi-FI" sz="2400" dirty="0"/>
-          </a:p>
-          <a:p>
-            <a:pPr marL="457200" lvl="1" indent="0">
-              <a:buNone/>
-            </a:pPr>
-            <a:endParaRPr lang="fi-FI" dirty="0"/>
-          </a:p>
-          <a:p>
+              <a:t>https://azure.microsoft.com/en-us/services/devops/?nav=min</a:t>
+            </a:r>
+            <a:r>
+              <a:rPr lang="fi-FI" sz="1800" dirty="0"/>
+              <a:t> </a:t>
+            </a:r>
             <a:endParaRPr lang="fi-FI" dirty="0"/>
           </a:p>
         </p:txBody>
@@ -8763,8 +9866,21 @@
             </a:r>
             <a:r>
               <a:rPr lang="fi-FI" sz="2400" i="1" dirty="0"/>
-              <a:t>, VSTS</a:t>
-            </a:r>
+              <a:t>, </a:t>
+            </a:r>
+            <a:r>
+              <a:rPr lang="fi-FI" sz="2400" i="1" dirty="0" err="1"/>
+              <a:t>Azure</a:t>
+            </a:r>
+            <a:r>
+              <a:rPr lang="fi-FI" sz="2400" i="1" dirty="0"/>
+              <a:t> </a:t>
+            </a:r>
+            <a:r>
+              <a:rPr lang="fi-FI" sz="2400" i="1" dirty="0" err="1"/>
+              <a:t>DevOps</a:t>
+            </a:r>
+            <a:endParaRPr lang="fi-FI" sz="2400" i="1" dirty="0"/>
           </a:p>
           <a:p>
             <a:endParaRPr lang="fi-FI" dirty="0"/>
@@ -9314,7 +10430,7 @@
             </a:r>
             <a:r>
               <a:rPr lang="fi-FI" dirty="0"/>
-              <a:t>-käsitteitä 1/3</a:t>
+              <a:t>-käsitteitä 1/4</a:t>
             </a:r>
           </a:p>
         </p:txBody>
@@ -10154,6 +11270,15 @@
 
 <file path=customXml/item1.xml><?xml version="1.0" encoding="utf-8"?>
 <?mso-contentType ?>
+<FormTemplates xmlns="http://schemas.microsoft.com/sharepoint/v3/contenttype/forms">
+  <Display>DocumentLibraryForm</Display>
+  <Edit>DocumentLibraryForm</Edit>
+  <New>DocumentLibraryForm</New>
+</FormTemplates>
+</file>
+
+<file path=customXml/item2.xml><?xml version="1.0" encoding="utf-8"?>
+<?mso-contentType ?>
 <spe:Receivers xmlns:spe="http://schemas.microsoft.com/sharepoint/events">
   <Receiver>
     <Name>Document ID Generator</Name>
@@ -10198,28 +11323,7 @@
 </spe:Receivers>
 </file>
 
-<file path=customXml/item2.xml><?xml version="1.0" encoding="utf-8"?>
-<?mso-contentType ?>
-<FormTemplates xmlns="http://schemas.microsoft.com/sharepoint/v3/contenttype/forms">
-  <Display>DocumentLibraryForm</Display>
-  <Edit>DocumentLibraryForm</Edit>
-  <New>DocumentLibraryForm</New>
-</FormTemplates>
-</file>
-
 <file path=customXml/item3.xml><?xml version="1.0" encoding="utf-8"?>
-<p:properties xmlns:p="http://schemas.microsoft.com/office/2006/metadata/properties" xmlns:xsi="http://www.w3.org/2001/XMLSchema-instance">
-  <documentManagement>
-    <_dlc_DocId xmlns="bcbf1d70-0686-4af9-897b-e669bf036024">SAVONIA-1148-15</_dlc_DocId>
-    <_dlc_DocIdUrl xmlns="bcbf1d70-0686-4af9-897b-e669bf036024">
-      <Url>https://santra.savonia.fi/tukipalvelut/viestinta/visuaalinen-ilme/_layouts/DocIdRedir.aspx?ID=SAVONIA-1148-15</Url>
-      <Description>SAVONIA-1148-15</Description>
-    </_dlc_DocIdUrl>
-  </documentManagement>
-</p:properties>
-</file>
-
-<file path=customXml/item4.xml><?xml version="1.0" encoding="utf-8"?>
 <ct:contentTypeSchema xmlns:ct="http://schemas.microsoft.com/office/2006/metadata/contentType" xmlns:ma="http://schemas.microsoft.com/office/2006/metadata/properties/metaAttributes" ct:_="" ma:_="" ma:contentTypeName="Asiakirja" ma:contentTypeID="0x0101005EF59F2EF8E9544DBE624127AC1EF6F5" ma:contentTypeVersion="4" ma:contentTypeDescription="Luo uusi asiakirja." ma:contentTypeScope="" ma:versionID="6f36e9b651c0d1813e2a776836ff05c9">
   <xsd:schema xmlns:xsd="http://www.w3.org/2001/XMLSchema" xmlns:xs="http://www.w3.org/2001/XMLSchema" xmlns:p="http://schemas.microsoft.com/office/2006/metadata/properties" xmlns:ns2="bcbf1d70-0686-4af9-897b-e669bf036024" targetNamespace="http://schemas.microsoft.com/office/2006/metadata/properties" ma:root="true" ma:fieldsID="e29bd19961912ca0431e39b2278e6297" ns2:_="">
     <xsd:import namespace="bcbf1d70-0686-4af9-897b-e669bf036024"/>
@@ -10364,7 +11468,27 @@
 </ct:contentTypeSchema>
 </file>
 
+<file path=customXml/item4.xml><?xml version="1.0" encoding="utf-8"?>
+<p:properties xmlns:p="http://schemas.microsoft.com/office/2006/metadata/properties" xmlns:xsi="http://www.w3.org/2001/XMLSchema-instance">
+  <documentManagement>
+    <_dlc_DocId xmlns="bcbf1d70-0686-4af9-897b-e669bf036024">SAVONIA-1148-15</_dlc_DocId>
+    <_dlc_DocIdUrl xmlns="bcbf1d70-0686-4af9-897b-e669bf036024">
+      <Url>https://santra.savonia.fi/tukipalvelut/viestinta/visuaalinen-ilme/_layouts/DocIdRedir.aspx?ID=SAVONIA-1148-15</Url>
+      <Description>SAVONIA-1148-15</Description>
+    </_dlc_DocIdUrl>
+  </documentManagement>
+</p:properties>
+</file>
+
 <file path=customXml/itemProps1.xml><?xml version="1.0" encoding="utf-8"?>
+<ds:datastoreItem xmlns:ds="http://schemas.openxmlformats.org/officeDocument/2006/customXml" ds:itemID="{6C3D9C2E-F86A-4B6E-BEBD-901B468DE557}">
+  <ds:schemaRefs>
+    <ds:schemaRef ds:uri="http://schemas.microsoft.com/sharepoint/v3/contenttype/forms"/>
+  </ds:schemaRefs>
+</ds:datastoreItem>
+</file>
+
+<file path=customXml/itemProps2.xml><?xml version="1.0" encoding="utf-8"?>
 <ds:datastoreItem xmlns:ds="http://schemas.openxmlformats.org/officeDocument/2006/customXml" ds:itemID="{D104143F-77D4-42B1-8837-22F1A6D250D0}">
   <ds:schemaRefs>
     <ds:schemaRef ds:uri="http://schemas.microsoft.com/sharepoint/events"/>
@@ -10372,24 +11496,7 @@
 </ds:datastoreItem>
 </file>
 
-<file path=customXml/itemProps2.xml><?xml version="1.0" encoding="utf-8"?>
-<ds:datastoreItem xmlns:ds="http://schemas.openxmlformats.org/officeDocument/2006/customXml" ds:itemID="{6C3D9C2E-F86A-4B6E-BEBD-901B468DE557}">
-  <ds:schemaRefs>
-    <ds:schemaRef ds:uri="http://schemas.microsoft.com/sharepoint/v3/contenttype/forms"/>
-  </ds:schemaRefs>
-</ds:datastoreItem>
-</file>
-
 <file path=customXml/itemProps3.xml><?xml version="1.0" encoding="utf-8"?>
-<ds:datastoreItem xmlns:ds="http://schemas.openxmlformats.org/officeDocument/2006/customXml" ds:itemID="{F82A60BA-D9BF-4B65-8C62-90B75FB47D2A}">
-  <ds:schemaRefs>
-    <ds:schemaRef ds:uri="http://schemas.microsoft.com/office/2006/metadata/properties"/>
-    <ds:schemaRef ds:uri="bcbf1d70-0686-4af9-897b-e669bf036024"/>
-  </ds:schemaRefs>
-</ds:datastoreItem>
-</file>
-
-<file path=customXml/itemProps4.xml><?xml version="1.0" encoding="utf-8"?>
 <ds:datastoreItem xmlns:ds="http://schemas.openxmlformats.org/officeDocument/2006/customXml" ds:itemID="{79F9801D-99E5-4A84-8FBD-7CE4CB8664C1}">
   <ds:schemaRefs>
     <ds:schemaRef ds:uri="http://schemas.microsoft.com/office/2006/metadata/contentType"/>
@@ -10405,4 +11512,13 @@
     <ds:schemaRef ds:uri="http://schemas.microsoft.com/internal/obd"/>
   </ds:schemaRefs>
 </ds:datastoreItem>
+</file>
+
+<file path=customXml/itemProps4.xml><?xml version="1.0" encoding="utf-8"?>
+<ds:datastoreItem xmlns:ds="http://schemas.openxmlformats.org/officeDocument/2006/customXml" ds:itemID="{F82A60BA-D9BF-4B65-8C62-90B75FB47D2A}">
+  <ds:schemaRefs>
+    <ds:schemaRef ds:uri="http://schemas.microsoft.com/office/2006/metadata/properties"/>
+    <ds:schemaRef ds:uri="bcbf1d70-0686-4af9-897b-e669bf036024"/>
+  </ds:schemaRefs>
+</ds:datastoreItem>
 </file>
</xml_diff>

<commit_message>
Lisätty loput esimerkkikuvat git-työnkulkuun. Lisätty dia pull requestista.
</commit_message>
<xml_diff>
--- a/versionhallinta.pptx
+++ b/versionhallinta.pptx
@@ -5,7 +5,7 @@
     <p:sldMasterId id="2147483785" r:id="rId5"/>
   </p:sldMasterIdLst>
   <p:notesMasterIdLst>
-    <p:notesMasterId r:id="rId34"/>
+    <p:notesMasterId r:id="rId41"/>
   </p:notesMasterIdLst>
   <p:sldIdLst>
     <p:sldId id="257" r:id="rId6"/>
@@ -21,21 +21,28 @@
     <p:sldId id="285" r:id="rId16"/>
     <p:sldId id="288" r:id="rId17"/>
     <p:sldId id="287" r:id="rId18"/>
-    <p:sldId id="283" r:id="rId19"/>
-    <p:sldId id="271" r:id="rId20"/>
-    <p:sldId id="280" r:id="rId21"/>
-    <p:sldId id="286" r:id="rId22"/>
-    <p:sldId id="281" r:id="rId23"/>
-    <p:sldId id="284" r:id="rId24"/>
-    <p:sldId id="289" r:id="rId25"/>
-    <p:sldId id="291" r:id="rId26"/>
-    <p:sldId id="293" r:id="rId27"/>
-    <p:sldId id="294" r:id="rId28"/>
-    <p:sldId id="295" r:id="rId29"/>
-    <p:sldId id="296" r:id="rId30"/>
-    <p:sldId id="297" r:id="rId31"/>
-    <p:sldId id="298" r:id="rId32"/>
-    <p:sldId id="260" r:id="rId33"/>
+    <p:sldId id="302" r:id="rId19"/>
+    <p:sldId id="283" r:id="rId20"/>
+    <p:sldId id="301" r:id="rId21"/>
+    <p:sldId id="271" r:id="rId22"/>
+    <p:sldId id="280" r:id="rId23"/>
+    <p:sldId id="286" r:id="rId24"/>
+    <p:sldId id="281" r:id="rId25"/>
+    <p:sldId id="284" r:id="rId26"/>
+    <p:sldId id="289" r:id="rId27"/>
+    <p:sldId id="291" r:id="rId28"/>
+    <p:sldId id="293" r:id="rId29"/>
+    <p:sldId id="294" r:id="rId30"/>
+    <p:sldId id="295" r:id="rId31"/>
+    <p:sldId id="296" r:id="rId32"/>
+    <p:sldId id="297" r:id="rId33"/>
+    <p:sldId id="298" r:id="rId34"/>
+    <p:sldId id="299" r:id="rId35"/>
+    <p:sldId id="300" r:id="rId36"/>
+    <p:sldId id="303" r:id="rId37"/>
+    <p:sldId id="304" r:id="rId38"/>
+    <p:sldId id="305" r:id="rId39"/>
+    <p:sldId id="260" r:id="rId40"/>
   </p:sldIdLst>
   <p:sldSz cx="9144000" cy="6858000" type="screen4x3"/>
   <p:notesSz cx="6858000" cy="9144000"/>
@@ -1039,6 +1046,442 @@
 </p:notes>
 </file>
 
+<file path=ppt/notesSlides/notesSlide10.xml><?xml version="1.0" encoding="utf-8"?>
+<p:notes xmlns:a="http://schemas.openxmlformats.org/drawingml/2006/main" xmlns:r="http://schemas.openxmlformats.org/officeDocument/2006/relationships" xmlns:p="http://schemas.openxmlformats.org/presentationml/2006/main">
+  <p:cSld>
+    <p:spTree>
+      <p:nvGrpSpPr>
+        <p:cNvPr id="1" name=""/>
+        <p:cNvGrpSpPr/>
+        <p:nvPr/>
+      </p:nvGrpSpPr>
+      <p:grpSpPr>
+        <a:xfrm>
+          <a:off x="0" y="0"/>
+          <a:ext cx="0" cy="0"/>
+          <a:chOff x="0" y="0"/>
+          <a:chExt cx="0" cy="0"/>
+        </a:xfrm>
+      </p:grpSpPr>
+      <p:sp>
+        <p:nvSpPr>
+          <p:cNvPr id="2" name="Dian kuvan paikkamerkki 1"/>
+          <p:cNvSpPr>
+            <a:spLocks noGrp="1" noRot="1" noChangeAspect="1"/>
+          </p:cNvSpPr>
+          <p:nvPr>
+            <p:ph type="sldImg"/>
+          </p:nvPr>
+        </p:nvSpPr>
+        <p:spPr/>
+      </p:sp>
+      <p:sp>
+        <p:nvSpPr>
+          <p:cNvPr id="3" name="Huomautusten paikkamerkki 2"/>
+          <p:cNvSpPr>
+            <a:spLocks noGrp="1"/>
+          </p:cNvSpPr>
+          <p:nvPr>
+            <p:ph type="body" idx="1"/>
+          </p:nvPr>
+        </p:nvSpPr>
+        <p:spPr/>
+        <p:txBody>
+          <a:bodyPr/>
+          <a:lstStyle/>
+          <a:p>
+            <a:pPr marL="228600" indent="-228600">
+              <a:buAutoNum type="arabicPeriod"/>
+            </a:pPr>
+            <a:r>
+              <a:rPr lang="fi-FI" dirty="0"/>
+              <a:t>Tehdään </a:t>
+            </a:r>
+            <a:r>
+              <a:rPr lang="fi-FI" dirty="0" err="1"/>
+              <a:t>commit</a:t>
+            </a:r>
+            <a:r>
+              <a:rPr lang="fi-FI" dirty="0"/>
+              <a:t> </a:t>
+            </a:r>
+            <a:r>
+              <a:rPr lang="fi-FI" dirty="0" err="1"/>
+              <a:t>kaille</a:t>
+            </a:r>
+            <a:r>
+              <a:rPr lang="fi-FI" dirty="0"/>
+              <a:t> muutoksille</a:t>
+            </a:r>
+          </a:p>
+          <a:p>
+            <a:pPr marL="228600" indent="-228600">
+              <a:buAutoNum type="arabicPeriod"/>
+            </a:pPr>
+            <a:r>
+              <a:rPr lang="fi-FI" dirty="0" err="1"/>
+              <a:t>Commit</a:t>
+            </a:r>
+            <a:r>
+              <a:rPr lang="fi-FI" dirty="0"/>
+              <a:t> vie muutokset </a:t>
+            </a:r>
+            <a:r>
+              <a:rPr lang="fi-FI" dirty="0" err="1"/>
+              <a:t>workaspace:sta</a:t>
+            </a:r>
+            <a:r>
+              <a:rPr lang="fi-FI" dirty="0"/>
+              <a:t> </a:t>
+            </a:r>
+            <a:r>
+              <a:rPr lang="fi-FI" dirty="0" err="1"/>
+              <a:t>local</a:t>
+            </a:r>
+            <a:r>
+              <a:rPr lang="fi-FI" dirty="0"/>
+              <a:t> </a:t>
+            </a:r>
+            <a:r>
+              <a:rPr lang="fi-FI" dirty="0" err="1"/>
+              <a:t>repository:n</a:t>
+            </a:r>
+            <a:endParaRPr lang="fi-FI" dirty="0"/>
+          </a:p>
+          <a:p>
+            <a:pPr marL="228600" indent="-228600">
+              <a:buAutoNum type="arabicPeriod"/>
+            </a:pPr>
+            <a:endParaRPr lang="fi-FI" dirty="0"/>
+          </a:p>
+        </p:txBody>
+      </p:sp>
+      <p:sp>
+        <p:nvSpPr>
+          <p:cNvPr id="4" name="Dian numeron paikkamerkki 3"/>
+          <p:cNvSpPr>
+            <a:spLocks noGrp="1"/>
+          </p:cNvSpPr>
+          <p:nvPr>
+            <p:ph type="sldNum" sz="quarter" idx="5"/>
+          </p:nvPr>
+        </p:nvSpPr>
+        <p:spPr/>
+        <p:txBody>
+          <a:bodyPr/>
+          <a:lstStyle/>
+          <a:p>
+            <a:pPr>
+              <a:defRPr/>
+            </a:pPr>
+            <a:fld id="{CA1C0503-F7D4-4341-B6A4-2782FA915E0C}" type="slidenum">
+              <a:rPr lang="fi-FI" smtClean="0"/>
+              <a:pPr>
+                <a:defRPr/>
+              </a:pPr>
+              <a:t>31</a:t>
+            </a:fld>
+            <a:endParaRPr lang="fi-FI"/>
+          </a:p>
+        </p:txBody>
+      </p:sp>
+    </p:spTree>
+    <p:extLst>
+      <p:ext uri="{BB962C8B-B14F-4D97-AF65-F5344CB8AC3E}">
+        <p14:creationId xmlns:p14="http://schemas.microsoft.com/office/powerpoint/2010/main" val="1315156674"/>
+      </p:ext>
+    </p:extLst>
+  </p:cSld>
+  <p:clrMapOvr>
+    <a:masterClrMapping/>
+  </p:clrMapOvr>
+</p:notes>
+</file>
+
+<file path=ppt/notesSlides/notesSlide11.xml><?xml version="1.0" encoding="utf-8"?>
+<p:notes xmlns:a="http://schemas.openxmlformats.org/drawingml/2006/main" xmlns:r="http://schemas.openxmlformats.org/officeDocument/2006/relationships" xmlns:p="http://schemas.openxmlformats.org/presentationml/2006/main">
+  <p:cSld>
+    <p:spTree>
+      <p:nvGrpSpPr>
+        <p:cNvPr id="1" name=""/>
+        <p:cNvGrpSpPr/>
+        <p:nvPr/>
+      </p:nvGrpSpPr>
+      <p:grpSpPr>
+        <a:xfrm>
+          <a:off x="0" y="0"/>
+          <a:ext cx="0" cy="0"/>
+          <a:chOff x="0" y="0"/>
+          <a:chExt cx="0" cy="0"/>
+        </a:xfrm>
+      </p:grpSpPr>
+      <p:sp>
+        <p:nvSpPr>
+          <p:cNvPr id="2" name="Dian kuvan paikkamerkki 1"/>
+          <p:cNvSpPr>
+            <a:spLocks noGrp="1" noRot="1" noChangeAspect="1"/>
+          </p:cNvSpPr>
+          <p:nvPr>
+            <p:ph type="sldImg"/>
+          </p:nvPr>
+        </p:nvSpPr>
+        <p:spPr/>
+      </p:sp>
+      <p:sp>
+        <p:nvSpPr>
+          <p:cNvPr id="3" name="Huomautusten paikkamerkki 2"/>
+          <p:cNvSpPr>
+            <a:spLocks noGrp="1"/>
+          </p:cNvSpPr>
+          <p:nvPr>
+            <p:ph type="body" idx="1"/>
+          </p:nvPr>
+        </p:nvSpPr>
+        <p:spPr/>
+        <p:txBody>
+          <a:bodyPr/>
+          <a:lstStyle/>
+          <a:p>
+            <a:pPr marL="228600" indent="-228600">
+              <a:buAutoNum type="arabicPeriod"/>
+            </a:pPr>
+            <a:r>
+              <a:rPr lang="fi-FI" dirty="0"/>
+              <a:t>Huomataan, että </a:t>
+            </a:r>
+            <a:r>
+              <a:rPr lang="fi-FI" dirty="0" err="1"/>
+              <a:t>commit:n</a:t>
+            </a:r>
+            <a:r>
+              <a:rPr lang="fi-FI" dirty="0"/>
+              <a:t> jälkeen muutoksia ei enää ole</a:t>
+            </a:r>
+          </a:p>
+          <a:p>
+            <a:pPr marL="228600" indent="-228600">
+              <a:buAutoNum type="arabicPeriod"/>
+            </a:pPr>
+            <a:r>
+              <a:rPr lang="fi-FI" dirty="0"/>
+              <a:t>Tehdään </a:t>
+            </a:r>
+            <a:r>
+              <a:rPr lang="fi-FI" dirty="0" err="1"/>
+              <a:t>git</a:t>
+            </a:r>
+            <a:r>
+              <a:rPr lang="fi-FI" dirty="0"/>
+              <a:t> </a:t>
+            </a:r>
+            <a:r>
+              <a:rPr lang="fi-FI" dirty="0" err="1"/>
+              <a:t>push</a:t>
+            </a:r>
+            <a:endParaRPr lang="fi-FI" dirty="0"/>
+          </a:p>
+          <a:p>
+            <a:pPr marL="228600" indent="-228600">
+              <a:buAutoNum type="arabicPeriod"/>
+            </a:pPr>
+            <a:r>
+              <a:rPr lang="fi-FI" dirty="0"/>
+              <a:t>Tässä vaiheessa VS </a:t>
+            </a:r>
+            <a:r>
+              <a:rPr lang="fi-FI" dirty="0" err="1"/>
+              <a:t>Code</a:t>
+            </a:r>
+            <a:r>
+              <a:rPr lang="fi-FI" dirty="0"/>
+              <a:t> kysyy mahdollisesti kirjautumista etärepoon, koska </a:t>
+            </a:r>
+            <a:r>
+              <a:rPr lang="fi-FI" dirty="0" err="1"/>
+              <a:t>git</a:t>
+            </a:r>
+            <a:r>
+              <a:rPr lang="fi-FI" dirty="0"/>
+              <a:t> </a:t>
+            </a:r>
+            <a:r>
+              <a:rPr lang="fi-FI" dirty="0" err="1"/>
+              <a:t>push</a:t>
+            </a:r>
+            <a:r>
+              <a:rPr lang="fi-FI" dirty="0"/>
+              <a:t> vaatii kirjoitusoikeudet</a:t>
+            </a:r>
+          </a:p>
+        </p:txBody>
+      </p:sp>
+      <p:sp>
+        <p:nvSpPr>
+          <p:cNvPr id="4" name="Dian numeron paikkamerkki 3"/>
+          <p:cNvSpPr>
+            <a:spLocks noGrp="1"/>
+          </p:cNvSpPr>
+          <p:nvPr>
+            <p:ph type="sldNum" sz="quarter" idx="5"/>
+          </p:nvPr>
+        </p:nvSpPr>
+        <p:spPr/>
+        <p:txBody>
+          <a:bodyPr/>
+          <a:lstStyle/>
+          <a:p>
+            <a:pPr>
+              <a:defRPr/>
+            </a:pPr>
+            <a:fld id="{CA1C0503-F7D4-4341-B6A4-2782FA915E0C}" type="slidenum">
+              <a:rPr lang="fi-FI" smtClean="0"/>
+              <a:pPr>
+                <a:defRPr/>
+              </a:pPr>
+              <a:t>32</a:t>
+            </a:fld>
+            <a:endParaRPr lang="fi-FI"/>
+          </a:p>
+        </p:txBody>
+      </p:sp>
+    </p:spTree>
+    <p:extLst>
+      <p:ext uri="{BB962C8B-B14F-4D97-AF65-F5344CB8AC3E}">
+        <p14:creationId xmlns:p14="http://schemas.microsoft.com/office/powerpoint/2010/main" val="106562406"/>
+      </p:ext>
+    </p:extLst>
+  </p:cSld>
+  <p:clrMapOvr>
+    <a:masterClrMapping/>
+  </p:clrMapOvr>
+</p:notes>
+</file>
+
+<file path=ppt/notesSlides/notesSlide12.xml><?xml version="1.0" encoding="utf-8"?>
+<p:notes xmlns:a="http://schemas.openxmlformats.org/drawingml/2006/main" xmlns:r="http://schemas.openxmlformats.org/officeDocument/2006/relationships" xmlns:p="http://schemas.openxmlformats.org/presentationml/2006/main">
+  <p:cSld>
+    <p:spTree>
+      <p:nvGrpSpPr>
+        <p:cNvPr id="1" name=""/>
+        <p:cNvGrpSpPr/>
+        <p:nvPr/>
+      </p:nvGrpSpPr>
+      <p:grpSpPr>
+        <a:xfrm>
+          <a:off x="0" y="0"/>
+          <a:ext cx="0" cy="0"/>
+          <a:chOff x="0" y="0"/>
+          <a:chExt cx="0" cy="0"/>
+        </a:xfrm>
+      </p:grpSpPr>
+      <p:sp>
+        <p:nvSpPr>
+          <p:cNvPr id="2" name="Dian kuvan paikkamerkki 1"/>
+          <p:cNvSpPr>
+            <a:spLocks noGrp="1" noRot="1" noChangeAspect="1"/>
+          </p:cNvSpPr>
+          <p:nvPr>
+            <p:ph type="sldImg"/>
+          </p:nvPr>
+        </p:nvSpPr>
+        <p:spPr/>
+      </p:sp>
+      <p:sp>
+        <p:nvSpPr>
+          <p:cNvPr id="3" name="Huomautusten paikkamerkki 2"/>
+          <p:cNvSpPr>
+            <a:spLocks noGrp="1"/>
+          </p:cNvSpPr>
+          <p:nvPr>
+            <p:ph type="body" idx="1"/>
+          </p:nvPr>
+        </p:nvSpPr>
+        <p:spPr/>
+        <p:txBody>
+          <a:bodyPr/>
+          <a:lstStyle/>
+          <a:p>
+            <a:r>
+              <a:rPr lang="fi-FI" dirty="0"/>
+              <a:t>1. </a:t>
+            </a:r>
+            <a:r>
+              <a:rPr lang="fi-FI" dirty="0" err="1"/>
+              <a:t>Git</a:t>
+            </a:r>
+            <a:r>
+              <a:rPr lang="fi-FI" dirty="0"/>
+              <a:t> </a:t>
+            </a:r>
+            <a:r>
+              <a:rPr lang="fi-FI" dirty="0" err="1"/>
+              <a:t>push:n</a:t>
+            </a:r>
+            <a:r>
+              <a:rPr lang="fi-FI" dirty="0"/>
+              <a:t> jälkeen voidaan tarkistaa muutokset </a:t>
+            </a:r>
+            <a:r>
+              <a:rPr lang="fi-FI" dirty="0" err="1"/>
+              <a:t>etäreposta</a:t>
+            </a:r>
+            <a:r>
+              <a:rPr lang="fi-FI" dirty="0"/>
+              <a:t> (tässä tapauksessa </a:t>
+            </a:r>
+            <a:r>
+              <a:rPr lang="fi-FI" dirty="0" err="1"/>
+              <a:t>GitHub:sta</a:t>
+            </a:r>
+            <a:r>
+              <a:rPr lang="fi-FI" dirty="0"/>
+              <a:t>)</a:t>
+            </a:r>
+          </a:p>
+        </p:txBody>
+      </p:sp>
+      <p:sp>
+        <p:nvSpPr>
+          <p:cNvPr id="4" name="Dian numeron paikkamerkki 3"/>
+          <p:cNvSpPr>
+            <a:spLocks noGrp="1"/>
+          </p:cNvSpPr>
+          <p:nvPr>
+            <p:ph type="sldNum" sz="quarter" idx="5"/>
+          </p:nvPr>
+        </p:nvSpPr>
+        <p:spPr/>
+        <p:txBody>
+          <a:bodyPr/>
+          <a:lstStyle/>
+          <a:p>
+            <a:pPr>
+              <a:defRPr/>
+            </a:pPr>
+            <a:fld id="{CA1C0503-F7D4-4341-B6A4-2782FA915E0C}" type="slidenum">
+              <a:rPr lang="fi-FI" smtClean="0"/>
+              <a:pPr>
+                <a:defRPr/>
+              </a:pPr>
+              <a:t>33</a:t>
+            </a:fld>
+            <a:endParaRPr lang="fi-FI"/>
+          </a:p>
+        </p:txBody>
+      </p:sp>
+    </p:spTree>
+    <p:extLst>
+      <p:ext uri="{BB962C8B-B14F-4D97-AF65-F5344CB8AC3E}">
+        <p14:creationId xmlns:p14="http://schemas.microsoft.com/office/powerpoint/2010/main" val="3658724392"/>
+      </p:ext>
+    </p:extLst>
+  </p:cSld>
+  <p:clrMapOvr>
+    <a:masterClrMapping/>
+  </p:clrMapOvr>
+</p:notes>
+</file>
+
 <file path=ppt/notesSlides/notesSlide2.xml><?xml version="1.0" encoding="utf-8"?>
 <p:notes xmlns:a="http://schemas.openxmlformats.org/drawingml/2006/main" xmlns:r="http://schemas.openxmlformats.org/officeDocument/2006/relationships" xmlns:p="http://schemas.openxmlformats.org/presentationml/2006/main">
   <p:cSld>
@@ -1222,6 +1665,669 @@
     <p:extLst>
       <p:ext uri="{BB962C8B-B14F-4D97-AF65-F5344CB8AC3E}">
         <p14:creationId xmlns:p14="http://schemas.microsoft.com/office/powerpoint/2010/main" val="478019760"/>
+      </p:ext>
+    </p:extLst>
+  </p:cSld>
+  <p:clrMapOvr>
+    <a:masterClrMapping/>
+  </p:clrMapOvr>
+</p:notes>
+</file>
+
+<file path=ppt/notesSlides/notesSlide4.xml><?xml version="1.0" encoding="utf-8"?>
+<p:notes xmlns:a="http://schemas.openxmlformats.org/drawingml/2006/main" xmlns:r="http://schemas.openxmlformats.org/officeDocument/2006/relationships" xmlns:p="http://schemas.openxmlformats.org/presentationml/2006/main">
+  <p:cSld>
+    <p:spTree>
+      <p:nvGrpSpPr>
+        <p:cNvPr id="1" name=""/>
+        <p:cNvGrpSpPr/>
+        <p:nvPr/>
+      </p:nvGrpSpPr>
+      <p:grpSpPr>
+        <a:xfrm>
+          <a:off x="0" y="0"/>
+          <a:ext cx="0" cy="0"/>
+          <a:chOff x="0" y="0"/>
+          <a:chExt cx="0" cy="0"/>
+        </a:xfrm>
+      </p:grpSpPr>
+      <p:sp>
+        <p:nvSpPr>
+          <p:cNvPr id="2" name="Dian kuvan paikkamerkki 1"/>
+          <p:cNvSpPr>
+            <a:spLocks noGrp="1" noRot="1" noChangeAspect="1"/>
+          </p:cNvSpPr>
+          <p:nvPr>
+            <p:ph type="sldImg"/>
+          </p:nvPr>
+        </p:nvSpPr>
+        <p:spPr/>
+      </p:sp>
+      <p:sp>
+        <p:nvSpPr>
+          <p:cNvPr id="3" name="Huomautusten paikkamerkki 2"/>
+          <p:cNvSpPr>
+            <a:spLocks noGrp="1"/>
+          </p:cNvSpPr>
+          <p:nvPr>
+            <p:ph type="body" idx="1"/>
+          </p:nvPr>
+        </p:nvSpPr>
+        <p:spPr/>
+        <p:txBody>
+          <a:bodyPr/>
+          <a:lstStyle/>
+          <a:p>
+            <a:pPr marL="228600" indent="-228600">
+              <a:buAutoNum type="arabicPeriod"/>
+            </a:pPr>
+            <a:r>
+              <a:rPr lang="fi-FI" dirty="0"/>
+              <a:t>Luodaan kansio omalle koneelle</a:t>
+            </a:r>
+          </a:p>
+          <a:p>
+            <a:pPr marL="228600" indent="-228600">
+              <a:buAutoNum type="arabicPeriod"/>
+            </a:pPr>
+            <a:r>
+              <a:rPr lang="fi-FI" dirty="0"/>
+              <a:t>Yritetään kloonata etärepoa</a:t>
+            </a:r>
+          </a:p>
+        </p:txBody>
+      </p:sp>
+      <p:sp>
+        <p:nvSpPr>
+          <p:cNvPr id="4" name="Dian numeron paikkamerkki 3"/>
+          <p:cNvSpPr>
+            <a:spLocks noGrp="1"/>
+          </p:cNvSpPr>
+          <p:nvPr>
+            <p:ph type="sldNum" sz="quarter" idx="5"/>
+          </p:nvPr>
+        </p:nvSpPr>
+        <p:spPr/>
+        <p:txBody>
+          <a:bodyPr/>
+          <a:lstStyle/>
+          <a:p>
+            <a:pPr>
+              <a:defRPr/>
+            </a:pPr>
+            <a:fld id="{CA1C0503-F7D4-4341-B6A4-2782FA915E0C}" type="slidenum">
+              <a:rPr lang="fi-FI" smtClean="0"/>
+              <a:pPr>
+                <a:defRPr/>
+              </a:pPr>
+              <a:t>25</a:t>
+            </a:fld>
+            <a:endParaRPr lang="fi-FI"/>
+          </a:p>
+        </p:txBody>
+      </p:sp>
+    </p:spTree>
+    <p:extLst>
+      <p:ext uri="{BB962C8B-B14F-4D97-AF65-F5344CB8AC3E}">
+        <p14:creationId xmlns:p14="http://schemas.microsoft.com/office/powerpoint/2010/main" val="3028226451"/>
+      </p:ext>
+    </p:extLst>
+  </p:cSld>
+  <p:clrMapOvr>
+    <a:masterClrMapping/>
+  </p:clrMapOvr>
+</p:notes>
+</file>
+
+<file path=ppt/notesSlides/notesSlide5.xml><?xml version="1.0" encoding="utf-8"?>
+<p:notes xmlns:a="http://schemas.openxmlformats.org/drawingml/2006/main" xmlns:r="http://schemas.openxmlformats.org/officeDocument/2006/relationships" xmlns:p="http://schemas.openxmlformats.org/presentationml/2006/main">
+  <p:cSld>
+    <p:spTree>
+      <p:nvGrpSpPr>
+        <p:cNvPr id="1" name=""/>
+        <p:cNvGrpSpPr/>
+        <p:nvPr/>
+      </p:nvGrpSpPr>
+      <p:grpSpPr>
+        <a:xfrm>
+          <a:off x="0" y="0"/>
+          <a:ext cx="0" cy="0"/>
+          <a:chOff x="0" y="0"/>
+          <a:chExt cx="0" cy="0"/>
+        </a:xfrm>
+      </p:grpSpPr>
+      <p:sp>
+        <p:nvSpPr>
+          <p:cNvPr id="2" name="Dian kuvan paikkamerkki 1"/>
+          <p:cNvSpPr>
+            <a:spLocks noGrp="1" noRot="1" noChangeAspect="1"/>
+          </p:cNvSpPr>
+          <p:nvPr>
+            <p:ph type="sldImg"/>
+          </p:nvPr>
+        </p:nvSpPr>
+        <p:spPr/>
+      </p:sp>
+      <p:sp>
+        <p:nvSpPr>
+          <p:cNvPr id="3" name="Huomautusten paikkamerkki 2"/>
+          <p:cNvSpPr>
+            <a:spLocks noGrp="1"/>
+          </p:cNvSpPr>
+          <p:nvPr>
+            <p:ph type="body" idx="1"/>
+          </p:nvPr>
+        </p:nvSpPr>
+        <p:spPr/>
+        <p:txBody>
+          <a:bodyPr/>
+          <a:lstStyle/>
+          <a:p>
+            <a:pPr marL="228600" indent="-228600">
+              <a:buAutoNum type="arabicPeriod"/>
+            </a:pPr>
+            <a:r>
+              <a:rPr lang="fi-FI" dirty="0"/>
+              <a:t>Kloonaus epäonnistui, koska kansio ei ollutkaan tyhjä</a:t>
+            </a:r>
+          </a:p>
+          <a:p>
+            <a:pPr marL="228600" indent="-228600">
+              <a:buAutoNum type="arabicPeriod"/>
+            </a:pPr>
+            <a:r>
+              <a:rPr lang="fi-FI" dirty="0"/>
+              <a:t>Tarkistetaan piilotetut tiedostot ja kansiot</a:t>
+            </a:r>
+          </a:p>
+          <a:p>
+            <a:pPr marL="228600" indent="-228600">
+              <a:buAutoNum type="arabicPeriod"/>
+            </a:pPr>
+            <a:r>
+              <a:rPr lang="fi-FI" dirty="0"/>
+              <a:t>Poistetaan kaikki tiedostot ja kansiot</a:t>
+            </a:r>
+          </a:p>
+        </p:txBody>
+      </p:sp>
+      <p:sp>
+        <p:nvSpPr>
+          <p:cNvPr id="4" name="Dian numeron paikkamerkki 3"/>
+          <p:cNvSpPr>
+            <a:spLocks noGrp="1"/>
+          </p:cNvSpPr>
+          <p:nvPr>
+            <p:ph type="sldNum" sz="quarter" idx="5"/>
+          </p:nvPr>
+        </p:nvSpPr>
+        <p:spPr/>
+        <p:txBody>
+          <a:bodyPr/>
+          <a:lstStyle/>
+          <a:p>
+            <a:pPr>
+              <a:defRPr/>
+            </a:pPr>
+            <a:fld id="{CA1C0503-F7D4-4341-B6A4-2782FA915E0C}" type="slidenum">
+              <a:rPr lang="fi-FI" smtClean="0"/>
+              <a:pPr>
+                <a:defRPr/>
+              </a:pPr>
+              <a:t>26</a:t>
+            </a:fld>
+            <a:endParaRPr lang="fi-FI"/>
+          </a:p>
+        </p:txBody>
+      </p:sp>
+    </p:spTree>
+    <p:extLst>
+      <p:ext uri="{BB962C8B-B14F-4D97-AF65-F5344CB8AC3E}">
+        <p14:creationId xmlns:p14="http://schemas.microsoft.com/office/powerpoint/2010/main" val="3911932675"/>
+      </p:ext>
+    </p:extLst>
+  </p:cSld>
+  <p:clrMapOvr>
+    <a:masterClrMapping/>
+  </p:clrMapOvr>
+</p:notes>
+</file>
+
+<file path=ppt/notesSlides/notesSlide6.xml><?xml version="1.0" encoding="utf-8"?>
+<p:notes xmlns:a="http://schemas.openxmlformats.org/drawingml/2006/main" xmlns:r="http://schemas.openxmlformats.org/officeDocument/2006/relationships" xmlns:p="http://schemas.openxmlformats.org/presentationml/2006/main">
+  <p:cSld>
+    <p:spTree>
+      <p:nvGrpSpPr>
+        <p:cNvPr id="1" name=""/>
+        <p:cNvGrpSpPr/>
+        <p:nvPr/>
+      </p:nvGrpSpPr>
+      <p:grpSpPr>
+        <a:xfrm>
+          <a:off x="0" y="0"/>
+          <a:ext cx="0" cy="0"/>
+          <a:chOff x="0" y="0"/>
+          <a:chExt cx="0" cy="0"/>
+        </a:xfrm>
+      </p:grpSpPr>
+      <p:sp>
+        <p:nvSpPr>
+          <p:cNvPr id="2" name="Dian kuvan paikkamerkki 1"/>
+          <p:cNvSpPr>
+            <a:spLocks noGrp="1" noRot="1" noChangeAspect="1"/>
+          </p:cNvSpPr>
+          <p:nvPr>
+            <p:ph type="sldImg"/>
+          </p:nvPr>
+        </p:nvSpPr>
+        <p:spPr/>
+      </p:sp>
+      <p:sp>
+        <p:nvSpPr>
+          <p:cNvPr id="3" name="Huomautusten paikkamerkki 2"/>
+          <p:cNvSpPr>
+            <a:spLocks noGrp="1"/>
+          </p:cNvSpPr>
+          <p:nvPr>
+            <p:ph type="body" idx="1"/>
+          </p:nvPr>
+        </p:nvSpPr>
+        <p:spPr/>
+        <p:txBody>
+          <a:bodyPr/>
+          <a:lstStyle/>
+          <a:p>
+            <a:pPr marL="228600" indent="-228600">
+              <a:buAutoNum type="arabicPeriod"/>
+            </a:pPr>
+            <a:r>
+              <a:rPr lang="fi-FI" dirty="0"/>
+              <a:t>Kokeillaan kloonausta uudelleen</a:t>
+            </a:r>
+          </a:p>
+          <a:p>
+            <a:pPr marL="228600" indent="-228600">
+              <a:buAutoNum type="arabicPeriod"/>
+            </a:pPr>
+            <a:r>
+              <a:rPr lang="fi-FI" dirty="0"/>
+              <a:t>Kloonaus onnistuu</a:t>
+            </a:r>
+          </a:p>
+          <a:p>
+            <a:pPr marL="228600" indent="-228600">
+              <a:buAutoNum type="arabicPeriod"/>
+            </a:pPr>
+            <a:r>
+              <a:rPr lang="fi-FI" dirty="0"/>
+              <a:t>Paikallisessa kansiossa on samat tiedostot ja kansiot kuin </a:t>
+            </a:r>
+            <a:r>
+              <a:rPr lang="fi-FI" dirty="0" err="1"/>
+              <a:t>etärepossa</a:t>
+            </a:r>
+            <a:endParaRPr lang="fi-FI" dirty="0"/>
+          </a:p>
+        </p:txBody>
+      </p:sp>
+      <p:sp>
+        <p:nvSpPr>
+          <p:cNvPr id="4" name="Dian numeron paikkamerkki 3"/>
+          <p:cNvSpPr>
+            <a:spLocks noGrp="1"/>
+          </p:cNvSpPr>
+          <p:nvPr>
+            <p:ph type="sldNum" sz="quarter" idx="5"/>
+          </p:nvPr>
+        </p:nvSpPr>
+        <p:spPr/>
+        <p:txBody>
+          <a:bodyPr/>
+          <a:lstStyle/>
+          <a:p>
+            <a:pPr>
+              <a:defRPr/>
+            </a:pPr>
+            <a:fld id="{CA1C0503-F7D4-4341-B6A4-2782FA915E0C}" type="slidenum">
+              <a:rPr lang="fi-FI" smtClean="0"/>
+              <a:pPr>
+                <a:defRPr/>
+              </a:pPr>
+              <a:t>27</a:t>
+            </a:fld>
+            <a:endParaRPr lang="fi-FI"/>
+          </a:p>
+        </p:txBody>
+      </p:sp>
+    </p:spTree>
+    <p:extLst>
+      <p:ext uri="{BB962C8B-B14F-4D97-AF65-F5344CB8AC3E}">
+        <p14:creationId xmlns:p14="http://schemas.microsoft.com/office/powerpoint/2010/main" val="810757080"/>
+      </p:ext>
+    </p:extLst>
+  </p:cSld>
+  <p:clrMapOvr>
+    <a:masterClrMapping/>
+  </p:clrMapOvr>
+</p:notes>
+</file>
+
+<file path=ppt/notesSlides/notesSlide7.xml><?xml version="1.0" encoding="utf-8"?>
+<p:notes xmlns:a="http://schemas.openxmlformats.org/drawingml/2006/main" xmlns:r="http://schemas.openxmlformats.org/officeDocument/2006/relationships" xmlns:p="http://schemas.openxmlformats.org/presentationml/2006/main">
+  <p:cSld>
+    <p:spTree>
+      <p:nvGrpSpPr>
+        <p:cNvPr id="1" name=""/>
+        <p:cNvGrpSpPr/>
+        <p:nvPr/>
+      </p:nvGrpSpPr>
+      <p:grpSpPr>
+        <a:xfrm>
+          <a:off x="0" y="0"/>
+          <a:ext cx="0" cy="0"/>
+          <a:chOff x="0" y="0"/>
+          <a:chExt cx="0" cy="0"/>
+        </a:xfrm>
+      </p:grpSpPr>
+      <p:sp>
+        <p:nvSpPr>
+          <p:cNvPr id="2" name="Dian kuvan paikkamerkki 1"/>
+          <p:cNvSpPr>
+            <a:spLocks noGrp="1" noRot="1" noChangeAspect="1"/>
+          </p:cNvSpPr>
+          <p:nvPr>
+            <p:ph type="sldImg"/>
+          </p:nvPr>
+        </p:nvSpPr>
+        <p:spPr/>
+      </p:sp>
+      <p:sp>
+        <p:nvSpPr>
+          <p:cNvPr id="3" name="Huomautusten paikkamerkki 2"/>
+          <p:cNvSpPr>
+            <a:spLocks noGrp="1"/>
+          </p:cNvSpPr>
+          <p:nvPr>
+            <p:ph type="body" idx="1"/>
+          </p:nvPr>
+        </p:nvSpPr>
+        <p:spPr/>
+        <p:txBody>
+          <a:bodyPr/>
+          <a:lstStyle/>
+          <a:p>
+            <a:pPr marL="228600" indent="-228600">
+              <a:buAutoNum type="arabicPeriod"/>
+            </a:pPr>
+            <a:r>
+              <a:rPr lang="fi-FI" dirty="0"/>
+              <a:t>Avataan kansio VS </a:t>
+            </a:r>
+            <a:r>
+              <a:rPr lang="fi-FI" dirty="0" err="1"/>
+              <a:t>Code:en</a:t>
+            </a:r>
+            <a:endParaRPr lang="fi-FI" dirty="0"/>
+          </a:p>
+          <a:p>
+            <a:pPr marL="228600" indent="-228600">
+              <a:buAutoNum type="arabicPeriod"/>
+            </a:pPr>
+            <a:r>
+              <a:rPr lang="fi-FI" dirty="0"/>
+              <a:t>Muokataan tiedostoa</a:t>
+            </a:r>
+          </a:p>
+          <a:p>
+            <a:pPr marL="228600" indent="-228600">
+              <a:buAutoNum type="arabicPeriod"/>
+            </a:pPr>
+            <a:r>
+              <a:rPr lang="fi-FI" dirty="0"/>
+              <a:t>Katsotaan SOURCE CONTROL –kohdasta muutokset</a:t>
+            </a:r>
+          </a:p>
+        </p:txBody>
+      </p:sp>
+      <p:sp>
+        <p:nvSpPr>
+          <p:cNvPr id="4" name="Dian numeron paikkamerkki 3"/>
+          <p:cNvSpPr>
+            <a:spLocks noGrp="1"/>
+          </p:cNvSpPr>
+          <p:nvPr>
+            <p:ph type="sldNum" sz="quarter" idx="5"/>
+          </p:nvPr>
+        </p:nvSpPr>
+        <p:spPr/>
+        <p:txBody>
+          <a:bodyPr/>
+          <a:lstStyle/>
+          <a:p>
+            <a:pPr>
+              <a:defRPr/>
+            </a:pPr>
+            <a:fld id="{CA1C0503-F7D4-4341-B6A4-2782FA915E0C}" type="slidenum">
+              <a:rPr lang="fi-FI" smtClean="0"/>
+              <a:pPr>
+                <a:defRPr/>
+              </a:pPr>
+              <a:t>28</a:t>
+            </a:fld>
+            <a:endParaRPr lang="fi-FI"/>
+          </a:p>
+        </p:txBody>
+      </p:sp>
+    </p:spTree>
+    <p:extLst>
+      <p:ext uri="{BB962C8B-B14F-4D97-AF65-F5344CB8AC3E}">
+        <p14:creationId xmlns:p14="http://schemas.microsoft.com/office/powerpoint/2010/main" val="420664902"/>
+      </p:ext>
+    </p:extLst>
+  </p:cSld>
+  <p:clrMapOvr>
+    <a:masterClrMapping/>
+  </p:clrMapOvr>
+</p:notes>
+</file>
+
+<file path=ppt/notesSlides/notesSlide8.xml><?xml version="1.0" encoding="utf-8"?>
+<p:notes xmlns:a="http://schemas.openxmlformats.org/drawingml/2006/main" xmlns:r="http://schemas.openxmlformats.org/officeDocument/2006/relationships" xmlns:p="http://schemas.openxmlformats.org/presentationml/2006/main">
+  <p:cSld>
+    <p:spTree>
+      <p:nvGrpSpPr>
+        <p:cNvPr id="1" name=""/>
+        <p:cNvGrpSpPr/>
+        <p:nvPr/>
+      </p:nvGrpSpPr>
+      <p:grpSpPr>
+        <a:xfrm>
+          <a:off x="0" y="0"/>
+          <a:ext cx="0" cy="0"/>
+          <a:chOff x="0" y="0"/>
+          <a:chExt cx="0" cy="0"/>
+        </a:xfrm>
+      </p:grpSpPr>
+      <p:sp>
+        <p:nvSpPr>
+          <p:cNvPr id="2" name="Dian kuvan paikkamerkki 1"/>
+          <p:cNvSpPr>
+            <a:spLocks noGrp="1" noRot="1" noChangeAspect="1"/>
+          </p:cNvSpPr>
+          <p:nvPr>
+            <p:ph type="sldImg"/>
+          </p:nvPr>
+        </p:nvSpPr>
+        <p:spPr/>
+      </p:sp>
+      <p:sp>
+        <p:nvSpPr>
+          <p:cNvPr id="3" name="Huomautusten paikkamerkki 2"/>
+          <p:cNvSpPr>
+            <a:spLocks noGrp="1"/>
+          </p:cNvSpPr>
+          <p:nvPr>
+            <p:ph type="body" idx="1"/>
+          </p:nvPr>
+        </p:nvSpPr>
+        <p:spPr/>
+        <p:txBody>
+          <a:bodyPr/>
+          <a:lstStyle/>
+          <a:p>
+            <a:pPr marL="228600" indent="-228600">
+              <a:buAutoNum type="arabicPeriod"/>
+            </a:pPr>
+            <a:r>
+              <a:rPr lang="fi-FI" dirty="0"/>
+              <a:t>Muokataan toista tiedostoa ulkopuolisella sovelluksella</a:t>
+            </a:r>
+          </a:p>
+          <a:p>
+            <a:pPr marL="228600" indent="-228600">
+              <a:buAutoNum type="arabicPeriod"/>
+            </a:pPr>
+            <a:r>
+              <a:rPr lang="fi-FI" dirty="0"/>
+              <a:t>Katsotaan muutokset VS </a:t>
+            </a:r>
+            <a:r>
+              <a:rPr lang="fi-FI" dirty="0" err="1"/>
+              <a:t>Code:n</a:t>
+            </a:r>
+            <a:r>
+              <a:rPr lang="fi-FI" dirty="0"/>
+              <a:t> SOURCE CONTROL -kohdasta</a:t>
+            </a:r>
+          </a:p>
+        </p:txBody>
+      </p:sp>
+      <p:sp>
+        <p:nvSpPr>
+          <p:cNvPr id="4" name="Dian numeron paikkamerkki 3"/>
+          <p:cNvSpPr>
+            <a:spLocks noGrp="1"/>
+          </p:cNvSpPr>
+          <p:nvPr>
+            <p:ph type="sldNum" sz="quarter" idx="5"/>
+          </p:nvPr>
+        </p:nvSpPr>
+        <p:spPr/>
+        <p:txBody>
+          <a:bodyPr/>
+          <a:lstStyle/>
+          <a:p>
+            <a:pPr>
+              <a:defRPr/>
+            </a:pPr>
+            <a:fld id="{CA1C0503-F7D4-4341-B6A4-2782FA915E0C}" type="slidenum">
+              <a:rPr lang="fi-FI" smtClean="0"/>
+              <a:pPr>
+                <a:defRPr/>
+              </a:pPr>
+              <a:t>29</a:t>
+            </a:fld>
+            <a:endParaRPr lang="fi-FI"/>
+          </a:p>
+        </p:txBody>
+      </p:sp>
+    </p:spTree>
+    <p:extLst>
+      <p:ext uri="{BB962C8B-B14F-4D97-AF65-F5344CB8AC3E}">
+        <p14:creationId xmlns:p14="http://schemas.microsoft.com/office/powerpoint/2010/main" val="1757264773"/>
+      </p:ext>
+    </p:extLst>
+  </p:cSld>
+  <p:clrMapOvr>
+    <a:masterClrMapping/>
+  </p:clrMapOvr>
+</p:notes>
+</file>
+
+<file path=ppt/notesSlides/notesSlide9.xml><?xml version="1.0" encoding="utf-8"?>
+<p:notes xmlns:a="http://schemas.openxmlformats.org/drawingml/2006/main" xmlns:r="http://schemas.openxmlformats.org/officeDocument/2006/relationships" xmlns:p="http://schemas.openxmlformats.org/presentationml/2006/main">
+  <p:cSld>
+    <p:spTree>
+      <p:nvGrpSpPr>
+        <p:cNvPr id="1" name=""/>
+        <p:cNvGrpSpPr/>
+        <p:nvPr/>
+      </p:nvGrpSpPr>
+      <p:grpSpPr>
+        <a:xfrm>
+          <a:off x="0" y="0"/>
+          <a:ext cx="0" cy="0"/>
+          <a:chOff x="0" y="0"/>
+          <a:chExt cx="0" cy="0"/>
+        </a:xfrm>
+      </p:grpSpPr>
+      <p:sp>
+        <p:nvSpPr>
+          <p:cNvPr id="2" name="Dian kuvan paikkamerkki 1"/>
+          <p:cNvSpPr>
+            <a:spLocks noGrp="1" noRot="1" noChangeAspect="1"/>
+          </p:cNvSpPr>
+          <p:nvPr>
+            <p:ph type="sldImg"/>
+          </p:nvPr>
+        </p:nvSpPr>
+        <p:spPr/>
+      </p:sp>
+      <p:sp>
+        <p:nvSpPr>
+          <p:cNvPr id="3" name="Huomautusten paikkamerkki 2"/>
+          <p:cNvSpPr>
+            <a:spLocks noGrp="1"/>
+          </p:cNvSpPr>
+          <p:nvPr>
+            <p:ph type="body" idx="1"/>
+          </p:nvPr>
+        </p:nvSpPr>
+        <p:spPr/>
+        <p:txBody>
+          <a:bodyPr/>
+          <a:lstStyle/>
+          <a:p>
+            <a:r>
+              <a:rPr lang="fi-FI" dirty="0"/>
+              <a:t>1. Lisätään kommentti/viesti muutoksista</a:t>
+            </a:r>
+          </a:p>
+        </p:txBody>
+      </p:sp>
+      <p:sp>
+        <p:nvSpPr>
+          <p:cNvPr id="4" name="Dian numeron paikkamerkki 3"/>
+          <p:cNvSpPr>
+            <a:spLocks noGrp="1"/>
+          </p:cNvSpPr>
+          <p:nvPr>
+            <p:ph type="sldNum" sz="quarter" idx="5"/>
+          </p:nvPr>
+        </p:nvSpPr>
+        <p:spPr/>
+        <p:txBody>
+          <a:bodyPr/>
+          <a:lstStyle/>
+          <a:p>
+            <a:pPr>
+              <a:defRPr/>
+            </a:pPr>
+            <a:fld id="{CA1C0503-F7D4-4341-B6A4-2782FA915E0C}" type="slidenum">
+              <a:rPr lang="fi-FI" smtClean="0"/>
+              <a:pPr>
+                <a:defRPr/>
+              </a:pPr>
+              <a:t>30</a:t>
+            </a:fld>
+            <a:endParaRPr lang="fi-FI"/>
+          </a:p>
+        </p:txBody>
+      </p:sp>
+    </p:spTree>
+    <p:extLst>
+      <p:ext uri="{BB962C8B-B14F-4D97-AF65-F5344CB8AC3E}">
+        <p14:creationId xmlns:p14="http://schemas.microsoft.com/office/powerpoint/2010/main" val="2297972535"/>
       </p:ext>
     </p:extLst>
   </p:cSld>
@@ -6777,6 +7883,284 @@
             <p:ph type="title"/>
           </p:nvPr>
         </p:nvSpPr>
+        <p:spPr/>
+        <p:txBody>
+          <a:bodyPr/>
+          <a:lstStyle/>
+          <a:p>
+            <a:r>
+              <a:rPr lang="fi-FI" dirty="0" err="1"/>
+              <a:t>Pull</a:t>
+            </a:r>
+            <a:r>
+              <a:rPr lang="fi-FI" dirty="0"/>
+              <a:t> </a:t>
+            </a:r>
+            <a:r>
+              <a:rPr lang="fi-FI" dirty="0" err="1"/>
+              <a:t>request</a:t>
+            </a:r>
+            <a:r>
+              <a:rPr lang="fi-FI" dirty="0"/>
+              <a:t>?</a:t>
+            </a:r>
+          </a:p>
+        </p:txBody>
+      </p:sp>
+      <p:sp>
+        <p:nvSpPr>
+          <p:cNvPr id="3" name="Sisällön paikkamerkki 2">
+            <a:extLst>
+              <a:ext uri="{FF2B5EF4-FFF2-40B4-BE49-F238E27FC236}">
+                <a16:creationId xmlns:a16="http://schemas.microsoft.com/office/drawing/2014/main" id="{80F09F31-0F4A-402B-9DEA-4943ABCD730A}"/>
+              </a:ext>
+            </a:extLst>
+          </p:cNvPr>
+          <p:cNvSpPr>
+            <a:spLocks noGrp="1"/>
+          </p:cNvSpPr>
+          <p:nvPr>
+            <p:ph idx="1"/>
+          </p:nvPr>
+        </p:nvSpPr>
+        <p:spPr/>
+        <p:txBody>
+          <a:bodyPr/>
+          <a:lstStyle/>
+          <a:p>
+            <a:r>
+              <a:rPr lang="fi-FI" sz="2400" dirty="0" err="1"/>
+              <a:t>Pull</a:t>
+            </a:r>
+            <a:r>
+              <a:rPr lang="fi-FI" sz="2400" dirty="0"/>
+              <a:t> </a:t>
+            </a:r>
+            <a:r>
+              <a:rPr lang="fi-FI" sz="2400" dirty="0" err="1"/>
+              <a:t>request</a:t>
+            </a:r>
+            <a:r>
+              <a:rPr lang="fi-FI" sz="2400" dirty="0"/>
+              <a:t> on tapa, jolla voit kertoa tekemistäsi muutoksista </a:t>
+            </a:r>
+            <a:r>
+              <a:rPr lang="fi-FI" sz="2400" dirty="0" err="1"/>
+              <a:t>repository:n</a:t>
+            </a:r>
+            <a:r>
+              <a:rPr lang="fi-FI" sz="2400" dirty="0"/>
+              <a:t> omistajalle</a:t>
+            </a:r>
+          </a:p>
+          <a:p>
+            <a:pPr lvl="1"/>
+            <a:r>
+              <a:rPr lang="fi-FI" sz="2000" dirty="0"/>
+              <a:t>Muutokset voidaan katselmoida</a:t>
+            </a:r>
+          </a:p>
+          <a:p>
+            <a:pPr lvl="1"/>
+            <a:r>
+              <a:rPr lang="fi-FI" sz="2000" dirty="0"/>
+              <a:t>Niistä voidaan keskustella</a:t>
+            </a:r>
+          </a:p>
+          <a:p>
+            <a:pPr lvl="1"/>
+            <a:r>
+              <a:rPr lang="fi-FI" sz="2000" dirty="0"/>
+              <a:t>Muutokset voidaan hyväksyä tai hylätä</a:t>
+            </a:r>
+          </a:p>
+          <a:p>
+            <a:r>
+              <a:rPr lang="fi-FI" sz="2400" dirty="0"/>
+              <a:t>Hyväksytyt muutokset voidaan yhdistää </a:t>
+            </a:r>
+            <a:r>
+              <a:rPr lang="fi-FI" sz="2400" dirty="0" err="1"/>
+              <a:t>repository:n</a:t>
+            </a:r>
+            <a:r>
+              <a:rPr lang="fi-FI" sz="2400" dirty="0"/>
+              <a:t> päähaaraan (</a:t>
+            </a:r>
+            <a:r>
+              <a:rPr lang="fi-FI" sz="2400" dirty="0" err="1"/>
+              <a:t>master</a:t>
+            </a:r>
+            <a:r>
+              <a:rPr lang="fi-FI" sz="2400" dirty="0"/>
+              <a:t>) osaksi tuotosta.</a:t>
+            </a:r>
+            <a:endParaRPr lang="fi-FI" i="1" dirty="0"/>
+          </a:p>
+          <a:p>
+            <a:pPr marL="0" indent="0">
+              <a:buNone/>
+            </a:pPr>
+            <a:endParaRPr lang="fi-FI" dirty="0"/>
+          </a:p>
+        </p:txBody>
+      </p:sp>
+      <p:sp>
+        <p:nvSpPr>
+          <p:cNvPr id="4" name="Alatunnisteen paikkamerkki 3">
+            <a:extLst>
+              <a:ext uri="{FF2B5EF4-FFF2-40B4-BE49-F238E27FC236}">
+                <a16:creationId xmlns:a16="http://schemas.microsoft.com/office/drawing/2014/main" id="{4AB9EB3A-A16B-4531-8975-06E80423883E}"/>
+              </a:ext>
+            </a:extLst>
+          </p:cNvPr>
+          <p:cNvSpPr>
+            <a:spLocks noGrp="1"/>
+          </p:cNvSpPr>
+          <p:nvPr>
+            <p:ph type="ftr" sz="quarter" idx="10"/>
+          </p:nvPr>
+        </p:nvSpPr>
+        <p:spPr/>
+        <p:txBody>
+          <a:bodyPr/>
+          <a:lstStyle/>
+          <a:p>
+            <a:pPr>
+              <a:defRPr/>
+            </a:pPr>
+            <a:r>
+              <a:rPr lang="fi-FI" dirty="0" err="1"/>
+              <a:t>About</a:t>
+            </a:r>
+            <a:r>
+              <a:rPr lang="fi-FI" dirty="0"/>
+              <a:t> </a:t>
+            </a:r>
+            <a:r>
+              <a:rPr lang="fi-FI" dirty="0" err="1"/>
+              <a:t>pull</a:t>
+            </a:r>
+            <a:r>
+              <a:rPr lang="fi-FI" dirty="0"/>
+              <a:t> </a:t>
+            </a:r>
+            <a:r>
+              <a:rPr lang="fi-FI" dirty="0" err="1"/>
+              <a:t>requests</a:t>
+            </a:r>
+            <a:r>
+              <a:rPr lang="fi-FI" dirty="0"/>
+              <a:t>:</a:t>
+            </a:r>
+          </a:p>
+          <a:p>
+            <a:pPr>
+              <a:defRPr/>
+            </a:pPr>
+            <a:r>
+              <a:rPr lang="fi-FI" dirty="0">
+                <a:hlinkClick r:id="rId2"/>
+              </a:rPr>
+              <a:t>https://help.github.com/en/articles/about-pull-requests</a:t>
+            </a:r>
+            <a:endParaRPr lang="fi-FI" dirty="0"/>
+          </a:p>
+        </p:txBody>
+      </p:sp>
+      <p:pic>
+        <p:nvPicPr>
+          <p:cNvPr id="5" name="Picture 2" descr="https://git-scm.com/images/logos/2color-lightbg@2x.png">
+            <a:extLst>
+              <a:ext uri="{FF2B5EF4-FFF2-40B4-BE49-F238E27FC236}">
+                <a16:creationId xmlns:a16="http://schemas.microsoft.com/office/drawing/2014/main" id="{04C78133-18E0-463B-8C83-4606FC2527B7}"/>
+              </a:ext>
+            </a:extLst>
+          </p:cNvPr>
+          <p:cNvPicPr>
+            <a:picLocks noChangeAspect="1" noChangeArrowheads="1"/>
+          </p:cNvPicPr>
+          <p:nvPr/>
+        </p:nvPicPr>
+        <p:blipFill>
+          <a:blip r:embed="rId3">
+            <a:extLst>
+              <a:ext uri="{28A0092B-C50C-407E-A947-70E740481C1C}">
+                <a14:useLocalDpi xmlns:a14="http://schemas.microsoft.com/office/drawing/2010/main" val="0"/>
+              </a:ext>
+            </a:extLst>
+          </a:blip>
+          <a:srcRect/>
+          <a:stretch>
+            <a:fillRect/>
+          </a:stretch>
+        </p:blipFill>
+        <p:spPr bwMode="auto">
+          <a:xfrm>
+            <a:off x="5940152" y="188640"/>
+            <a:ext cx="2592288" cy="881731"/>
+          </a:xfrm>
+          <a:prstGeom prst="rect">
+            <a:avLst/>
+          </a:prstGeom>
+          <a:noFill/>
+          <a:extLst>
+            <a:ext uri="{909E8E84-426E-40DD-AFC4-6F175D3DCCD1}">
+              <a14:hiddenFill xmlns:a14="http://schemas.microsoft.com/office/drawing/2010/main">
+                <a:solidFill>
+                  <a:srgbClr val="FFFFFF"/>
+                </a:solidFill>
+              </a14:hiddenFill>
+            </a:ext>
+          </a:extLst>
+        </p:spPr>
+      </p:pic>
+    </p:spTree>
+    <p:extLst>
+      <p:ext uri="{BB962C8B-B14F-4D97-AF65-F5344CB8AC3E}">
+        <p14:creationId xmlns:p14="http://schemas.microsoft.com/office/powerpoint/2010/main" val="8428767"/>
+      </p:ext>
+    </p:extLst>
+  </p:cSld>
+  <p:clrMapOvr>
+    <a:masterClrMapping/>
+  </p:clrMapOvr>
+</p:sld>
+</file>
+
+<file path=ppt/slides/slide15.xml><?xml version="1.0" encoding="utf-8"?>
+<p:sld xmlns:a="http://schemas.openxmlformats.org/drawingml/2006/main" xmlns:r="http://schemas.openxmlformats.org/officeDocument/2006/relationships" xmlns:p="http://schemas.openxmlformats.org/presentationml/2006/main">
+  <p:cSld>
+    <p:spTree>
+      <p:nvGrpSpPr>
+        <p:cNvPr id="1" name=""/>
+        <p:cNvGrpSpPr/>
+        <p:nvPr/>
+      </p:nvGrpSpPr>
+      <p:grpSpPr>
+        <a:xfrm>
+          <a:off x="0" y="0"/>
+          <a:ext cx="0" cy="0"/>
+          <a:chOff x="0" y="0"/>
+          <a:chExt cx="0" cy="0"/>
+        </a:xfrm>
+      </p:grpSpPr>
+      <p:sp>
+        <p:nvSpPr>
+          <p:cNvPr id="2" name="Otsikko 1">
+            <a:extLst>
+              <a:ext uri="{FF2B5EF4-FFF2-40B4-BE49-F238E27FC236}">
+                <a16:creationId xmlns:a16="http://schemas.microsoft.com/office/drawing/2014/main" id="{094DB930-2672-49D9-A543-781948FEFDBB}"/>
+              </a:ext>
+            </a:extLst>
+          </p:cNvPr>
+          <p:cNvSpPr>
+            <a:spLocks noGrp="1"/>
+          </p:cNvSpPr>
+          <p:nvPr>
+            <p:ph type="title"/>
+          </p:nvPr>
+        </p:nvSpPr>
         <p:spPr>
           <a:xfrm>
             <a:off x="468313" y="1412875"/>
@@ -6793,7 +8177,7 @@
             </a:r>
             <a:r>
               <a:rPr lang="fi-FI" dirty="0"/>
-              <a:t>-työnkulku</a:t>
+              <a:t>-työnkulku 1/2</a:t>
             </a:r>
           </a:p>
         </p:txBody>
@@ -7125,58 +8509,6 @@
 </p:sld>
 </file>
 
-<file path=ppt/slides/slide15.xml><?xml version="1.0" encoding="utf-8"?>
-<p:sld xmlns:a="http://schemas.openxmlformats.org/drawingml/2006/main" xmlns:r="http://schemas.openxmlformats.org/officeDocument/2006/relationships" xmlns:p="http://schemas.openxmlformats.org/presentationml/2006/main">
-  <p:cSld>
-    <p:spTree>
-      <p:nvGrpSpPr>
-        <p:cNvPr id="1" name=""/>
-        <p:cNvGrpSpPr/>
-        <p:nvPr/>
-      </p:nvGrpSpPr>
-      <p:grpSpPr>
-        <a:xfrm>
-          <a:off x="0" y="0"/>
-          <a:ext cx="0" cy="0"/>
-          <a:chOff x="0" y="0"/>
-          <a:chExt cx="0" cy="0"/>
-        </a:xfrm>
-      </p:grpSpPr>
-      <p:sp>
-        <p:nvSpPr>
-          <p:cNvPr id="2" name="Otsikko 1"/>
-          <p:cNvSpPr>
-            <a:spLocks noGrp="1"/>
-          </p:cNvSpPr>
-          <p:nvPr>
-            <p:ph type="title"/>
-          </p:nvPr>
-        </p:nvSpPr>
-        <p:spPr/>
-        <p:txBody>
-          <a:bodyPr/>
-          <a:lstStyle/>
-          <a:p>
-            <a:r>
-              <a:rPr lang="fi-FI" dirty="0"/>
-              <a:t>Työvälineitä</a:t>
-            </a:r>
-          </a:p>
-        </p:txBody>
-      </p:sp>
-    </p:spTree>
-    <p:extLst>
-      <p:ext uri="{BB962C8B-B14F-4D97-AF65-F5344CB8AC3E}">
-        <p14:creationId xmlns:p14="http://schemas.microsoft.com/office/powerpoint/2010/main" val="1145613939"/>
-      </p:ext>
-    </p:extLst>
-  </p:cSld>
-  <p:clrMapOvr>
-    <a:masterClrMapping/>
-  </p:clrMapOvr>
-</p:sld>
-</file>
-
 <file path=ppt/slides/slide16.xml><?xml version="1.0" encoding="utf-8"?>
 <p:sld xmlns:a="http://schemas.openxmlformats.org/drawingml/2006/main" xmlns:r="http://schemas.openxmlformats.org/officeDocument/2006/relationships" xmlns:p="http://schemas.openxmlformats.org/presentationml/2006/main">
   <p:cSld>
@@ -7210,147 +8542,24 @@
             <p:ph type="title"/>
           </p:nvPr>
         </p:nvSpPr>
-        <p:spPr/>
+        <p:spPr>
+          <a:xfrm>
+            <a:off x="468313" y="1412875"/>
+            <a:ext cx="8229600" cy="1143000"/>
+          </a:xfrm>
+        </p:spPr>
         <p:txBody>
           <a:bodyPr/>
           <a:lstStyle/>
           <a:p>
             <a:r>
-              <a:rPr lang="fi-FI" dirty="0"/>
-              <a:t>Työvälineet (Client)</a:t>
-            </a:r>
-          </a:p>
-        </p:txBody>
-      </p:sp>
-      <p:sp>
-        <p:nvSpPr>
-          <p:cNvPr id="3" name="Sisällön paikkamerkki 2">
-            <a:extLst>
-              <a:ext uri="{FF2B5EF4-FFF2-40B4-BE49-F238E27FC236}">
-                <a16:creationId xmlns:a16="http://schemas.microsoft.com/office/drawing/2014/main" id="{80F09F31-0F4A-402B-9DEA-4943ABCD730A}"/>
-              </a:ext>
-            </a:extLst>
-          </p:cNvPr>
-          <p:cNvSpPr>
-            <a:spLocks noGrp="1"/>
-          </p:cNvSpPr>
-          <p:nvPr>
-            <p:ph idx="1"/>
-          </p:nvPr>
-        </p:nvSpPr>
-        <p:spPr/>
-        <p:txBody>
-          <a:bodyPr/>
-          <a:lstStyle/>
-          <a:p>
-            <a:pPr marL="0" indent="0">
-              <a:buNone/>
-            </a:pPr>
-            <a:r>
               <a:rPr lang="fi-FI" dirty="0" err="1"/>
-              <a:t>Versionhallintajärjestemään</a:t>
-            </a:r>
-            <a:r>
-              <a:rPr lang="fi-FI" dirty="0"/>
-              <a:t> ollaan yhteydessä jollakin sovelluksella (</a:t>
-            </a:r>
-            <a:r>
-              <a:rPr lang="fi-FI" dirty="0" err="1"/>
-              <a:t>client</a:t>
-            </a:r>
-            <a:r>
-              <a:rPr lang="fi-FI" dirty="0"/>
-              <a:t>)</a:t>
-            </a:r>
-          </a:p>
-          <a:p>
-            <a:r>
-              <a:rPr lang="fi-FI" sz="2400" dirty="0" err="1"/>
               <a:t>Git</a:t>
             </a:r>
             <a:r>
-              <a:rPr lang="fi-FI" sz="2400" dirty="0"/>
-              <a:t>-pohjaisiin järjestelmiin on useita graafisia </a:t>
-            </a:r>
-            <a:r>
-              <a:rPr lang="fi-FI" sz="2400" dirty="0" err="1"/>
-              <a:t>client</a:t>
-            </a:r>
-            <a:r>
-              <a:rPr lang="fi-FI" sz="2400" dirty="0"/>
-              <a:t>-sovelluksia (</a:t>
-            </a:r>
-            <a:r>
-              <a:rPr lang="fi-FI" sz="1800" dirty="0">
-                <a:hlinkClick r:id="rId2"/>
-              </a:rPr>
-              <a:t>https://git-scm.com/downloads/guis</a:t>
-            </a:r>
-            <a:r>
-              <a:rPr lang="fi-FI" sz="2400" dirty="0"/>
-              <a:t>)</a:t>
-            </a:r>
-          </a:p>
-          <a:p>
-            <a:r>
-              <a:rPr lang="fi-FI" sz="2400" dirty="0"/>
-              <a:t>tai </a:t>
-            </a:r>
-            <a:r>
-              <a:rPr lang="fi-FI" sz="2400" dirty="0" err="1"/>
-              <a:t>Command</a:t>
-            </a:r>
-            <a:r>
-              <a:rPr lang="fi-FI" sz="2400" dirty="0"/>
-              <a:t> Line (CMD) –työkalut</a:t>
-            </a:r>
-          </a:p>
-          <a:p>
-            <a:r>
-              <a:rPr lang="fi-FI" sz="2400" dirty="0"/>
-              <a:t>Visual Studiossa on </a:t>
-            </a:r>
-            <a:r>
-              <a:rPr lang="fi-FI" sz="2400" i="1" dirty="0"/>
-              <a:t>Team Explorer</a:t>
-            </a:r>
-            <a:r>
-              <a:rPr lang="fi-FI" sz="2400" dirty="0"/>
-              <a:t>, joka toimii </a:t>
-            </a:r>
-            <a:r>
-              <a:rPr lang="fi-FI" sz="2400" dirty="0" err="1"/>
-              <a:t>clienttina</a:t>
-            </a:r>
-            <a:endParaRPr lang="fi-FI" sz="2400" dirty="0"/>
-          </a:p>
-          <a:p>
-            <a:r>
-              <a:rPr lang="fi-FI" sz="2400" dirty="0"/>
-              <a:t>Visual Studio </a:t>
-            </a:r>
-            <a:r>
-              <a:rPr lang="fi-FI" sz="2400" dirty="0" err="1"/>
-              <a:t>Code</a:t>
-            </a:r>
-            <a:r>
-              <a:rPr lang="fi-FI" sz="2400" dirty="0"/>
-              <a:t> sisältää vakiona työkalut </a:t>
-            </a:r>
-            <a:r>
-              <a:rPr lang="fi-FI" sz="2400" dirty="0" err="1"/>
-              <a:t>Git</a:t>
-            </a:r>
-            <a:r>
-              <a:rPr lang="fi-FI" sz="2400" dirty="0"/>
-              <a:t>-pohjaisten järjestelmien kanssa toimimiseen</a:t>
-            </a:r>
-          </a:p>
-          <a:p>
-            <a:pPr marL="0" indent="0">
-              <a:buNone/>
-            </a:pPr>
-            <a:endParaRPr lang="fi-FI" dirty="0"/>
+              <a:rPr lang="fi-FI" dirty="0"/>
+              <a:t>-työnkulku 2/2</a:t>
+            </a:r>
           </a:p>
         </p:txBody>
       </p:sp>
@@ -7378,14 +8587,228 @@
             <a:pPr>
               <a:defRPr/>
             </a:pPr>
-            <a:endParaRPr lang="fi-FI"/>
+            <a:r>
+              <a:rPr lang="fi-FI" dirty="0"/>
+              <a:t>My </a:t>
+            </a:r>
+            <a:r>
+              <a:rPr lang="fi-FI" dirty="0" err="1"/>
+              <a:t>Git</a:t>
+            </a:r>
+            <a:r>
+              <a:rPr lang="fi-FI" dirty="0"/>
+              <a:t> </a:t>
+            </a:r>
+            <a:r>
+              <a:rPr lang="fi-FI" dirty="0" err="1"/>
+              <a:t>Workflow</a:t>
+            </a:r>
+            <a:r>
+              <a:rPr lang="fi-FI" dirty="0"/>
+              <a:t> </a:t>
+            </a:r>
+            <a:r>
+              <a:rPr lang="fi-FI" dirty="0" err="1"/>
+              <a:t>by</a:t>
+            </a:r>
+            <a:r>
+              <a:rPr lang="fi-FI" dirty="0"/>
+              <a:t> Oliver </a:t>
+            </a:r>
+            <a:r>
+              <a:rPr lang="fi-FI" dirty="0" err="1"/>
+              <a:t>Steele</a:t>
+            </a:r>
+            <a:r>
+              <a:rPr lang="fi-FI" dirty="0"/>
+              <a:t>, </a:t>
+            </a:r>
+            <a:r>
+              <a:rPr lang="fi-FI" dirty="0">
+                <a:hlinkClick r:id="rId2"/>
+              </a:rPr>
+              <a:t>https://blog.osteele.com/2008/05/my-git-workflow/</a:t>
+            </a:r>
+            <a:r>
+              <a:rPr lang="fi-FI" dirty="0"/>
+              <a:t> </a:t>
+            </a:r>
+          </a:p>
+        </p:txBody>
+      </p:sp>
+      <p:pic>
+        <p:nvPicPr>
+          <p:cNvPr id="2050" name="Picture 2" descr="https://images.osteele.com/2008/git-transport.png">
+            <a:extLst>
+              <a:ext uri="{FF2B5EF4-FFF2-40B4-BE49-F238E27FC236}">
+                <a16:creationId xmlns:a16="http://schemas.microsoft.com/office/drawing/2014/main" id="{9F1DDE8C-2885-4563-8C53-3D54F68EFF80}"/>
+              </a:ext>
+            </a:extLst>
+          </p:cNvPr>
+          <p:cNvPicPr>
+            <a:picLocks noGrp="1" noChangeAspect="1" noChangeArrowheads="1"/>
+          </p:cNvPicPr>
+          <p:nvPr>
+            <p:ph idx="1"/>
+          </p:nvPr>
+        </p:nvPicPr>
+        <p:blipFill>
+          <a:blip r:embed="rId3">
+            <a:extLst>
+              <a:ext uri="{28A0092B-C50C-407E-A947-70E740481C1C}">
+                <a14:useLocalDpi xmlns:a14="http://schemas.microsoft.com/office/drawing/2010/main" val="0"/>
+              </a:ext>
+            </a:extLst>
+          </a:blip>
+          <a:srcRect/>
+          <a:stretch>
+            <a:fillRect/>
+          </a:stretch>
+        </p:blipFill>
+        <p:spPr bwMode="auto">
+          <a:xfrm>
+            <a:off x="958805" y="2707059"/>
+            <a:ext cx="3613195" cy="3417888"/>
+          </a:xfrm>
+          <a:prstGeom prst="rect">
+            <a:avLst/>
+          </a:prstGeom>
+          <a:noFill/>
+          <a:extLst>
+            <a:ext uri="{909E8E84-426E-40DD-AFC4-6F175D3DCCD1}">
+              <a14:hiddenFill xmlns:a14="http://schemas.microsoft.com/office/drawing/2010/main">
+                <a:solidFill>
+                  <a:srgbClr val="FFFFFF"/>
+                </a:solidFill>
+              </a14:hiddenFill>
+            </a:ext>
+          </a:extLst>
+        </p:spPr>
+      </p:pic>
+      <p:pic>
+        <p:nvPicPr>
+          <p:cNvPr id="6" name="Picture 2" descr="https://git-scm.com/images/logos/2color-lightbg@2x.png">
+            <a:extLst>
+              <a:ext uri="{FF2B5EF4-FFF2-40B4-BE49-F238E27FC236}">
+                <a16:creationId xmlns:a16="http://schemas.microsoft.com/office/drawing/2014/main" id="{3AB9C826-94D1-47A2-9EB7-634C9567DF35}"/>
+              </a:ext>
+            </a:extLst>
+          </p:cNvPr>
+          <p:cNvPicPr>
+            <a:picLocks noChangeAspect="1" noChangeArrowheads="1"/>
+          </p:cNvPicPr>
+          <p:nvPr/>
+        </p:nvPicPr>
+        <p:blipFill>
+          <a:blip r:embed="rId4">
+            <a:extLst>
+              <a:ext uri="{28A0092B-C50C-407E-A947-70E740481C1C}">
+                <a14:useLocalDpi xmlns:a14="http://schemas.microsoft.com/office/drawing/2010/main" val="0"/>
+              </a:ext>
+            </a:extLst>
+          </a:blip>
+          <a:srcRect/>
+          <a:stretch>
+            <a:fillRect/>
+          </a:stretch>
+        </p:blipFill>
+        <p:spPr bwMode="auto">
+          <a:xfrm>
+            <a:off x="5940152" y="188640"/>
+            <a:ext cx="2592288" cy="881731"/>
+          </a:xfrm>
+          <a:prstGeom prst="rect">
+            <a:avLst/>
+          </a:prstGeom>
+          <a:noFill/>
+          <a:extLst>
+            <a:ext uri="{909E8E84-426E-40DD-AFC4-6F175D3DCCD1}">
+              <a14:hiddenFill xmlns:a14="http://schemas.microsoft.com/office/drawing/2010/main">
+                <a:solidFill>
+                  <a:srgbClr val="FFFFFF"/>
+                </a:solidFill>
+              </a14:hiddenFill>
+            </a:ext>
+          </a:extLst>
+        </p:spPr>
+      </p:pic>
+      <p:sp>
+        <p:nvSpPr>
+          <p:cNvPr id="5" name="Tekstiruutu 4">
+            <a:extLst>
+              <a:ext uri="{FF2B5EF4-FFF2-40B4-BE49-F238E27FC236}">
+                <a16:creationId xmlns:a16="http://schemas.microsoft.com/office/drawing/2014/main" id="{4E4D6918-FDED-414C-B264-73761DA60033}"/>
+              </a:ext>
+            </a:extLst>
+          </p:cNvPr>
+          <p:cNvSpPr txBox="1"/>
+          <p:nvPr/>
+        </p:nvSpPr>
+        <p:spPr>
+          <a:xfrm>
+            <a:off x="5292079" y="2787948"/>
+            <a:ext cx="3613195" cy="2585323"/>
+          </a:xfrm>
+          <a:prstGeom prst="rect">
+            <a:avLst/>
+          </a:prstGeom>
+          <a:noFill/>
+        </p:spPr>
+        <p:txBody>
+          <a:bodyPr wrap="square" rtlCol="0">
+            <a:spAutoFit/>
+          </a:bodyPr>
+          <a:lstStyle/>
+          <a:p>
+            <a:r>
+              <a:rPr lang="fi-FI" dirty="0"/>
+              <a:t>HUOMAA!</a:t>
+            </a:r>
+          </a:p>
+          <a:p>
+            <a:endParaRPr lang="fi-FI" dirty="0"/>
+          </a:p>
+          <a:p>
+            <a:r>
+              <a:rPr lang="fi-FI" b="1" dirty="0">
+                <a:solidFill>
+                  <a:srgbClr val="FF0000"/>
+                </a:solidFill>
+              </a:rPr>
+              <a:t>Kirjoita aina kuvaava viesti tehdyistä muutoksista ennen kuin teet </a:t>
+            </a:r>
+            <a:r>
+              <a:rPr lang="fi-FI" b="1" dirty="0" err="1">
+                <a:solidFill>
+                  <a:srgbClr val="FF0000"/>
+                </a:solidFill>
+              </a:rPr>
+              <a:t>commit:n</a:t>
+            </a:r>
+            <a:r>
+              <a:rPr lang="fi-FI" b="1" dirty="0">
+                <a:solidFill>
+                  <a:srgbClr val="FF0000"/>
+                </a:solidFill>
+              </a:rPr>
+              <a:t>! </a:t>
+            </a:r>
+          </a:p>
+          <a:p>
+            <a:endParaRPr lang="fi-FI" dirty="0"/>
+          </a:p>
+          <a:p>
+            <a:r>
+              <a:rPr lang="fi-FI" dirty="0"/>
+              <a:t>Tämä viesti tallentuu versionhallintaan ja on näkyvissä versioiden yhteydessä.</a:t>
+            </a:r>
           </a:p>
         </p:txBody>
       </p:sp>
     </p:spTree>
     <p:extLst>
       <p:ext uri="{BB962C8B-B14F-4D97-AF65-F5344CB8AC3E}">
-        <p14:creationId xmlns:p14="http://schemas.microsoft.com/office/powerpoint/2010/main" val="4228207482"/>
+        <p14:creationId xmlns:p14="http://schemas.microsoft.com/office/powerpoint/2010/main" val="37214339"/>
       </p:ext>
     </p:extLst>
   </p:cSld>
@@ -7414,6 +8837,276 @@
       </p:grpSpPr>
       <p:sp>
         <p:nvSpPr>
+          <p:cNvPr id="2" name="Otsikko 1"/>
+          <p:cNvSpPr>
+            <a:spLocks noGrp="1"/>
+          </p:cNvSpPr>
+          <p:nvPr>
+            <p:ph type="title"/>
+          </p:nvPr>
+        </p:nvSpPr>
+        <p:spPr/>
+        <p:txBody>
+          <a:bodyPr/>
+          <a:lstStyle/>
+          <a:p>
+            <a:r>
+              <a:rPr lang="fi-FI" dirty="0"/>
+              <a:t>Työvälineitä</a:t>
+            </a:r>
+          </a:p>
+        </p:txBody>
+      </p:sp>
+    </p:spTree>
+    <p:extLst>
+      <p:ext uri="{BB962C8B-B14F-4D97-AF65-F5344CB8AC3E}">
+        <p14:creationId xmlns:p14="http://schemas.microsoft.com/office/powerpoint/2010/main" val="1145613939"/>
+      </p:ext>
+    </p:extLst>
+  </p:cSld>
+  <p:clrMapOvr>
+    <a:masterClrMapping/>
+  </p:clrMapOvr>
+</p:sld>
+</file>
+
+<file path=ppt/slides/slide18.xml><?xml version="1.0" encoding="utf-8"?>
+<p:sld xmlns:a="http://schemas.openxmlformats.org/drawingml/2006/main" xmlns:r="http://schemas.openxmlformats.org/officeDocument/2006/relationships" xmlns:p="http://schemas.openxmlformats.org/presentationml/2006/main">
+  <p:cSld>
+    <p:spTree>
+      <p:nvGrpSpPr>
+        <p:cNvPr id="1" name=""/>
+        <p:cNvGrpSpPr/>
+        <p:nvPr/>
+      </p:nvGrpSpPr>
+      <p:grpSpPr>
+        <a:xfrm>
+          <a:off x="0" y="0"/>
+          <a:ext cx="0" cy="0"/>
+          <a:chOff x="0" y="0"/>
+          <a:chExt cx="0" cy="0"/>
+        </a:xfrm>
+      </p:grpSpPr>
+      <p:sp>
+        <p:nvSpPr>
+          <p:cNvPr id="2" name="Otsikko 1">
+            <a:extLst>
+              <a:ext uri="{FF2B5EF4-FFF2-40B4-BE49-F238E27FC236}">
+                <a16:creationId xmlns:a16="http://schemas.microsoft.com/office/drawing/2014/main" id="{094DB930-2672-49D9-A543-781948FEFDBB}"/>
+              </a:ext>
+            </a:extLst>
+          </p:cNvPr>
+          <p:cNvSpPr>
+            <a:spLocks noGrp="1"/>
+          </p:cNvSpPr>
+          <p:nvPr>
+            <p:ph type="title"/>
+          </p:nvPr>
+        </p:nvSpPr>
+        <p:spPr/>
+        <p:txBody>
+          <a:bodyPr/>
+          <a:lstStyle/>
+          <a:p>
+            <a:r>
+              <a:rPr lang="fi-FI" dirty="0"/>
+              <a:t>Työvälineet (Client)</a:t>
+            </a:r>
+          </a:p>
+        </p:txBody>
+      </p:sp>
+      <p:sp>
+        <p:nvSpPr>
+          <p:cNvPr id="3" name="Sisällön paikkamerkki 2">
+            <a:extLst>
+              <a:ext uri="{FF2B5EF4-FFF2-40B4-BE49-F238E27FC236}">
+                <a16:creationId xmlns:a16="http://schemas.microsoft.com/office/drawing/2014/main" id="{80F09F31-0F4A-402B-9DEA-4943ABCD730A}"/>
+              </a:ext>
+            </a:extLst>
+          </p:cNvPr>
+          <p:cNvSpPr>
+            <a:spLocks noGrp="1"/>
+          </p:cNvSpPr>
+          <p:nvPr>
+            <p:ph idx="1"/>
+          </p:nvPr>
+        </p:nvSpPr>
+        <p:spPr/>
+        <p:txBody>
+          <a:bodyPr/>
+          <a:lstStyle/>
+          <a:p>
+            <a:pPr marL="0" indent="0">
+              <a:buNone/>
+            </a:pPr>
+            <a:r>
+              <a:rPr lang="fi-FI" dirty="0" err="1"/>
+              <a:t>Versionhallintajärjestemään</a:t>
+            </a:r>
+            <a:r>
+              <a:rPr lang="fi-FI" dirty="0"/>
+              <a:t> ollaan yhteydessä jollakin sovelluksella (</a:t>
+            </a:r>
+            <a:r>
+              <a:rPr lang="fi-FI" dirty="0" err="1"/>
+              <a:t>client</a:t>
+            </a:r>
+            <a:r>
+              <a:rPr lang="fi-FI" dirty="0"/>
+              <a:t>)</a:t>
+            </a:r>
+          </a:p>
+          <a:p>
+            <a:r>
+              <a:rPr lang="fi-FI" sz="2400" dirty="0" err="1"/>
+              <a:t>Git</a:t>
+            </a:r>
+            <a:r>
+              <a:rPr lang="fi-FI" sz="2400" dirty="0"/>
+              <a:t>-pohjaisiin järjestelmiin on useita graafisia </a:t>
+            </a:r>
+            <a:r>
+              <a:rPr lang="fi-FI" sz="2400" dirty="0" err="1"/>
+              <a:t>client</a:t>
+            </a:r>
+            <a:r>
+              <a:rPr lang="fi-FI" sz="2400" dirty="0"/>
+              <a:t>-sovelluksia (</a:t>
+            </a:r>
+            <a:r>
+              <a:rPr lang="fi-FI" sz="1800" dirty="0">
+                <a:hlinkClick r:id="rId2"/>
+              </a:rPr>
+              <a:t>https://git-scm.com/downloads/guis</a:t>
+            </a:r>
+            <a:r>
+              <a:rPr lang="fi-FI" sz="2400" dirty="0"/>
+              <a:t>)</a:t>
+            </a:r>
+          </a:p>
+          <a:p>
+            <a:r>
+              <a:rPr lang="fi-FI" sz="2400" dirty="0"/>
+              <a:t>tai </a:t>
+            </a:r>
+            <a:r>
+              <a:rPr lang="fi-FI" sz="2400" dirty="0" err="1"/>
+              <a:t>Command</a:t>
+            </a:r>
+            <a:r>
+              <a:rPr lang="fi-FI" sz="2400" dirty="0"/>
+              <a:t> Line (CMD) –työkalut</a:t>
+            </a:r>
+          </a:p>
+          <a:p>
+            <a:r>
+              <a:rPr lang="fi-FI" sz="2400" dirty="0"/>
+              <a:t>Visual Studiossa on </a:t>
+            </a:r>
+            <a:r>
+              <a:rPr lang="fi-FI" sz="2400" i="1" dirty="0"/>
+              <a:t>Team Explorer</a:t>
+            </a:r>
+            <a:r>
+              <a:rPr lang="fi-FI" sz="2400" dirty="0"/>
+              <a:t>, joka toimii </a:t>
+            </a:r>
+            <a:r>
+              <a:rPr lang="fi-FI" sz="2400" dirty="0" err="1"/>
+              <a:t>clienttina</a:t>
+            </a:r>
+            <a:endParaRPr lang="fi-FI" sz="2400" dirty="0"/>
+          </a:p>
+          <a:p>
+            <a:r>
+              <a:rPr lang="fi-FI" sz="2400" dirty="0"/>
+              <a:t>Visual Studio </a:t>
+            </a:r>
+            <a:r>
+              <a:rPr lang="fi-FI" sz="2400" dirty="0" err="1"/>
+              <a:t>Code</a:t>
+            </a:r>
+            <a:r>
+              <a:rPr lang="fi-FI" sz="2400" dirty="0"/>
+              <a:t> sisältää vakiona työkalut </a:t>
+            </a:r>
+            <a:r>
+              <a:rPr lang="fi-FI" sz="2400" dirty="0" err="1"/>
+              <a:t>Git</a:t>
+            </a:r>
+            <a:r>
+              <a:rPr lang="fi-FI" sz="2400" dirty="0"/>
+              <a:t>-pohjaisten järjestelmien kanssa toimimiseen</a:t>
+            </a:r>
+          </a:p>
+          <a:p>
+            <a:pPr marL="0" indent="0">
+              <a:buNone/>
+            </a:pPr>
+            <a:endParaRPr lang="fi-FI" dirty="0"/>
+          </a:p>
+        </p:txBody>
+      </p:sp>
+      <p:sp>
+        <p:nvSpPr>
+          <p:cNvPr id="4" name="Alatunnisteen paikkamerkki 3">
+            <a:extLst>
+              <a:ext uri="{FF2B5EF4-FFF2-40B4-BE49-F238E27FC236}">
+                <a16:creationId xmlns:a16="http://schemas.microsoft.com/office/drawing/2014/main" id="{4AB9EB3A-A16B-4531-8975-06E80423883E}"/>
+              </a:ext>
+            </a:extLst>
+          </p:cNvPr>
+          <p:cNvSpPr>
+            <a:spLocks noGrp="1"/>
+          </p:cNvSpPr>
+          <p:nvPr>
+            <p:ph type="ftr" sz="quarter" idx="10"/>
+          </p:nvPr>
+        </p:nvSpPr>
+        <p:spPr/>
+        <p:txBody>
+          <a:bodyPr/>
+          <a:lstStyle/>
+          <a:p>
+            <a:pPr>
+              <a:defRPr/>
+            </a:pPr>
+            <a:endParaRPr lang="fi-FI"/>
+          </a:p>
+        </p:txBody>
+      </p:sp>
+    </p:spTree>
+    <p:extLst>
+      <p:ext uri="{BB962C8B-B14F-4D97-AF65-F5344CB8AC3E}">
+        <p14:creationId xmlns:p14="http://schemas.microsoft.com/office/powerpoint/2010/main" val="4228207482"/>
+      </p:ext>
+    </p:extLst>
+  </p:cSld>
+  <p:clrMapOvr>
+    <a:masterClrMapping/>
+  </p:clrMapOvr>
+</p:sld>
+</file>
+
+<file path=ppt/slides/slide19.xml><?xml version="1.0" encoding="utf-8"?>
+<p:sld xmlns:a="http://schemas.openxmlformats.org/drawingml/2006/main" xmlns:r="http://schemas.openxmlformats.org/officeDocument/2006/relationships" xmlns:p="http://schemas.openxmlformats.org/presentationml/2006/main">
+  <p:cSld>
+    <p:spTree>
+      <p:nvGrpSpPr>
+        <p:cNvPr id="1" name=""/>
+        <p:cNvGrpSpPr/>
+        <p:nvPr/>
+      </p:nvGrpSpPr>
+      <p:grpSpPr>
+        <a:xfrm>
+          <a:off x="0" y="0"/>
+          <a:ext cx="0" cy="0"/>
+          <a:chOff x="0" y="0"/>
+          <a:chExt cx="0" cy="0"/>
+        </a:xfrm>
+      </p:grpSpPr>
+      <p:sp>
+        <p:nvSpPr>
           <p:cNvPr id="2" name="Otsikko 1">
             <a:extLst>
               <a:ext uri="{FF2B5EF4-FFF2-40B4-BE49-F238E27FC236}">
@@ -7575,7 +9268,133 @@
 </p:sld>
 </file>
 
-<file path=ppt/slides/slide18.xml><?xml version="1.0" encoding="utf-8"?>
+<file path=ppt/slides/slide2.xml><?xml version="1.0" encoding="utf-8"?>
+<p:sld xmlns:a="http://schemas.openxmlformats.org/drawingml/2006/main" xmlns:r="http://schemas.openxmlformats.org/officeDocument/2006/relationships" xmlns:p="http://schemas.openxmlformats.org/presentationml/2006/main">
+  <p:cSld>
+    <p:spTree>
+      <p:nvGrpSpPr>
+        <p:cNvPr id="1" name=""/>
+        <p:cNvGrpSpPr/>
+        <p:nvPr/>
+      </p:nvGrpSpPr>
+      <p:grpSpPr>
+        <a:xfrm>
+          <a:off x="0" y="0"/>
+          <a:ext cx="0" cy="0"/>
+          <a:chOff x="0" y="0"/>
+          <a:chExt cx="0" cy="0"/>
+        </a:xfrm>
+      </p:grpSpPr>
+      <p:sp>
+        <p:nvSpPr>
+          <p:cNvPr id="2" name="Otsikko 1">
+            <a:extLst>
+              <a:ext uri="{FF2B5EF4-FFF2-40B4-BE49-F238E27FC236}">
+                <a16:creationId xmlns:a16="http://schemas.microsoft.com/office/drawing/2014/main" id="{D7ED3B97-F8D3-4697-8656-419A62126E0E}"/>
+              </a:ext>
+            </a:extLst>
+          </p:cNvPr>
+          <p:cNvSpPr>
+            <a:spLocks noGrp="1"/>
+          </p:cNvSpPr>
+          <p:nvPr>
+            <p:ph type="title"/>
+          </p:nvPr>
+        </p:nvSpPr>
+        <p:spPr/>
+        <p:txBody>
+          <a:bodyPr/>
+          <a:lstStyle/>
+          <a:p>
+            <a:r>
+              <a:rPr lang="fi-FI" dirty="0"/>
+              <a:t>Mikä/mitä on versionhallinta?</a:t>
+            </a:r>
+          </a:p>
+        </p:txBody>
+      </p:sp>
+      <p:sp>
+        <p:nvSpPr>
+          <p:cNvPr id="3" name="Sisällön paikkamerkki 2">
+            <a:extLst>
+              <a:ext uri="{FF2B5EF4-FFF2-40B4-BE49-F238E27FC236}">
+                <a16:creationId xmlns:a16="http://schemas.microsoft.com/office/drawing/2014/main" id="{C6B65E48-DD32-4483-A03D-6E69AC8E7536}"/>
+              </a:ext>
+            </a:extLst>
+          </p:cNvPr>
+          <p:cNvSpPr>
+            <a:spLocks noGrp="1"/>
+          </p:cNvSpPr>
+          <p:nvPr>
+            <p:ph idx="1"/>
+          </p:nvPr>
+        </p:nvSpPr>
+        <p:spPr/>
+        <p:txBody>
+          <a:bodyPr/>
+          <a:lstStyle/>
+          <a:p>
+            <a:pPr marL="0" indent="0">
+              <a:buNone/>
+            </a:pPr>
+            <a:r>
+              <a:rPr lang="fi-FI" dirty="0"/>
+              <a:t>” Versionhallinta on järjestelmä, joka ajan kuluessa tallentaa muutoksia tiedostoon tai joukkoon tiedostoja, jotta sinä voit palata tiettyihin versioihin myöhemmin.”</a:t>
+            </a:r>
+          </a:p>
+        </p:txBody>
+      </p:sp>
+      <p:sp>
+        <p:nvSpPr>
+          <p:cNvPr id="4" name="Alatunnisteen paikkamerkki 3">
+            <a:extLst>
+              <a:ext uri="{FF2B5EF4-FFF2-40B4-BE49-F238E27FC236}">
+                <a16:creationId xmlns:a16="http://schemas.microsoft.com/office/drawing/2014/main" id="{E2FBBCD5-1234-4BA5-B816-9359CB36DD98}"/>
+              </a:ext>
+            </a:extLst>
+          </p:cNvPr>
+          <p:cNvSpPr>
+            <a:spLocks noGrp="1"/>
+          </p:cNvSpPr>
+          <p:nvPr>
+            <p:ph type="ftr" sz="quarter" idx="10"/>
+          </p:nvPr>
+        </p:nvSpPr>
+        <p:spPr/>
+        <p:txBody>
+          <a:bodyPr/>
+          <a:lstStyle/>
+          <a:p>
+            <a:pPr>
+              <a:defRPr/>
+            </a:pPr>
+            <a:r>
+              <a:rPr lang="fi-FI" dirty="0">
+                <a:hlinkClick r:id="rId2"/>
+              </a:rPr>
+              <a:t>https://git-scm.com/book/fi/v1/Alkusanat-Versionhallinnasta</a:t>
+            </a:r>
+            <a:r>
+              <a:rPr lang="fi-FI" dirty="0"/>
+              <a:t> </a:t>
+            </a:r>
+          </a:p>
+        </p:txBody>
+      </p:sp>
+    </p:spTree>
+    <p:extLst>
+      <p:ext uri="{BB962C8B-B14F-4D97-AF65-F5344CB8AC3E}">
+        <p14:creationId xmlns:p14="http://schemas.microsoft.com/office/powerpoint/2010/main" val="102781314"/>
+      </p:ext>
+    </p:extLst>
+  </p:cSld>
+  <p:clrMapOvr>
+    <a:masterClrMapping/>
+  </p:clrMapOvr>
+</p:sld>
+</file>
+
+<file path=ppt/slides/slide20.xml><?xml version="1.0" encoding="utf-8"?>
 <p:sld xmlns:a="http://schemas.openxmlformats.org/drawingml/2006/main" xmlns:r="http://schemas.openxmlformats.org/officeDocument/2006/relationships" xmlns:p="http://schemas.openxmlformats.org/presentationml/2006/main">
   <p:cSld>
     <p:spTree>
@@ -7693,7 +9512,7 @@
 </p:sld>
 </file>
 
-<file path=ppt/slides/slide19.xml><?xml version="1.0" encoding="utf-8"?>
+<file path=ppt/slides/slide21.xml><?xml version="1.0" encoding="utf-8"?>
 <p:sld xmlns:a="http://schemas.openxmlformats.org/drawingml/2006/main" xmlns:r="http://schemas.openxmlformats.org/officeDocument/2006/relationships" xmlns:p="http://schemas.openxmlformats.org/presentationml/2006/main">
   <p:cSld>
     <p:spTree>
@@ -7905,7 +9724,7 @@
 </p:sld>
 </file>
 
-<file path=ppt/slides/slide2.xml><?xml version="1.0" encoding="utf-8"?>
+<file path=ppt/slides/slide22.xml><?xml version="1.0" encoding="utf-8"?>
 <p:sld xmlns:a="http://schemas.openxmlformats.org/drawingml/2006/main" xmlns:r="http://schemas.openxmlformats.org/officeDocument/2006/relationships" xmlns:p="http://schemas.openxmlformats.org/presentationml/2006/main">
   <p:cSld>
     <p:spTree>
@@ -7927,132 +9746,6 @@
           <p:cNvPr id="2" name="Otsikko 1">
             <a:extLst>
               <a:ext uri="{FF2B5EF4-FFF2-40B4-BE49-F238E27FC236}">
-                <a16:creationId xmlns:a16="http://schemas.microsoft.com/office/drawing/2014/main" id="{D7ED3B97-F8D3-4697-8656-419A62126E0E}"/>
-              </a:ext>
-            </a:extLst>
-          </p:cNvPr>
-          <p:cNvSpPr>
-            <a:spLocks noGrp="1"/>
-          </p:cNvSpPr>
-          <p:nvPr>
-            <p:ph type="title"/>
-          </p:nvPr>
-        </p:nvSpPr>
-        <p:spPr/>
-        <p:txBody>
-          <a:bodyPr/>
-          <a:lstStyle/>
-          <a:p>
-            <a:r>
-              <a:rPr lang="fi-FI" dirty="0"/>
-              <a:t>Mikä/mitä on versionhallinta?</a:t>
-            </a:r>
-          </a:p>
-        </p:txBody>
-      </p:sp>
-      <p:sp>
-        <p:nvSpPr>
-          <p:cNvPr id="3" name="Sisällön paikkamerkki 2">
-            <a:extLst>
-              <a:ext uri="{FF2B5EF4-FFF2-40B4-BE49-F238E27FC236}">
-                <a16:creationId xmlns:a16="http://schemas.microsoft.com/office/drawing/2014/main" id="{C6B65E48-DD32-4483-A03D-6E69AC8E7536}"/>
-              </a:ext>
-            </a:extLst>
-          </p:cNvPr>
-          <p:cNvSpPr>
-            <a:spLocks noGrp="1"/>
-          </p:cNvSpPr>
-          <p:nvPr>
-            <p:ph idx="1"/>
-          </p:nvPr>
-        </p:nvSpPr>
-        <p:spPr/>
-        <p:txBody>
-          <a:bodyPr/>
-          <a:lstStyle/>
-          <a:p>
-            <a:pPr marL="0" indent="0">
-              <a:buNone/>
-            </a:pPr>
-            <a:r>
-              <a:rPr lang="fi-FI" dirty="0"/>
-              <a:t>” Versionhallinta on järjestelmä, joka ajan kuluessa tallentaa muutoksia tiedostoon tai joukkoon tiedostoja, jotta sinä voit palata tiettyihin versioihin myöhemmin.”</a:t>
-            </a:r>
-          </a:p>
-        </p:txBody>
-      </p:sp>
-      <p:sp>
-        <p:nvSpPr>
-          <p:cNvPr id="4" name="Alatunnisteen paikkamerkki 3">
-            <a:extLst>
-              <a:ext uri="{FF2B5EF4-FFF2-40B4-BE49-F238E27FC236}">
-                <a16:creationId xmlns:a16="http://schemas.microsoft.com/office/drawing/2014/main" id="{E2FBBCD5-1234-4BA5-B816-9359CB36DD98}"/>
-              </a:ext>
-            </a:extLst>
-          </p:cNvPr>
-          <p:cNvSpPr>
-            <a:spLocks noGrp="1"/>
-          </p:cNvSpPr>
-          <p:nvPr>
-            <p:ph type="ftr" sz="quarter" idx="10"/>
-          </p:nvPr>
-        </p:nvSpPr>
-        <p:spPr/>
-        <p:txBody>
-          <a:bodyPr/>
-          <a:lstStyle/>
-          <a:p>
-            <a:pPr>
-              <a:defRPr/>
-            </a:pPr>
-            <a:r>
-              <a:rPr lang="fi-FI" dirty="0">
-                <a:hlinkClick r:id="rId2"/>
-              </a:rPr>
-              <a:t>https://git-scm.com/book/fi/v1/Alkusanat-Versionhallinnasta</a:t>
-            </a:r>
-            <a:r>
-              <a:rPr lang="fi-FI" dirty="0"/>
-              <a:t> </a:t>
-            </a:r>
-          </a:p>
-        </p:txBody>
-      </p:sp>
-    </p:spTree>
-    <p:extLst>
-      <p:ext uri="{BB962C8B-B14F-4D97-AF65-F5344CB8AC3E}">
-        <p14:creationId xmlns:p14="http://schemas.microsoft.com/office/powerpoint/2010/main" val="102781314"/>
-      </p:ext>
-    </p:extLst>
-  </p:cSld>
-  <p:clrMapOvr>
-    <a:masterClrMapping/>
-  </p:clrMapOvr>
-</p:sld>
-</file>
-
-<file path=ppt/slides/slide20.xml><?xml version="1.0" encoding="utf-8"?>
-<p:sld xmlns:a="http://schemas.openxmlformats.org/drawingml/2006/main" xmlns:r="http://schemas.openxmlformats.org/officeDocument/2006/relationships" xmlns:p="http://schemas.openxmlformats.org/presentationml/2006/main">
-  <p:cSld>
-    <p:spTree>
-      <p:nvGrpSpPr>
-        <p:cNvPr id="1" name=""/>
-        <p:cNvGrpSpPr/>
-        <p:nvPr/>
-      </p:nvGrpSpPr>
-      <p:grpSpPr>
-        <a:xfrm>
-          <a:off x="0" y="0"/>
-          <a:ext cx="0" cy="0"/>
-          <a:chOff x="0" y="0"/>
-          <a:chExt cx="0" cy="0"/>
-        </a:xfrm>
-      </p:grpSpPr>
-      <p:sp>
-        <p:nvSpPr>
-          <p:cNvPr id="2" name="Otsikko 1">
-            <a:extLst>
-              <a:ext uri="{FF2B5EF4-FFF2-40B4-BE49-F238E27FC236}">
                 <a16:creationId xmlns:a16="http://schemas.microsoft.com/office/drawing/2014/main" id="{094DB930-2672-49D9-A543-781948FEFDBB}"/>
               </a:ext>
             </a:extLst>
@@ -8241,7 +9934,7 @@
 </p:sld>
 </file>
 
-<file path=ppt/slides/slide21.xml><?xml version="1.0" encoding="utf-8"?>
+<file path=ppt/slides/slide23.xml><?xml version="1.0" encoding="utf-8"?>
 <p:sld xmlns:a="http://schemas.openxmlformats.org/drawingml/2006/main" xmlns:r="http://schemas.openxmlformats.org/officeDocument/2006/relationships" xmlns:p="http://schemas.openxmlformats.org/presentationml/2006/main">
   <p:cSld>
     <p:spTree>
@@ -8360,7 +10053,7 @@
 </p:sld>
 </file>
 
-<file path=ppt/slides/slide22.xml><?xml version="1.0" encoding="utf-8"?>
+<file path=ppt/slides/slide24.xml><?xml version="1.0" encoding="utf-8"?>
 <p:sld xmlns:a="http://schemas.openxmlformats.org/drawingml/2006/main" xmlns:r="http://schemas.openxmlformats.org/officeDocument/2006/relationships" xmlns:p="http://schemas.openxmlformats.org/presentationml/2006/main">
   <p:cSld>
     <p:spTree>
@@ -8559,7 +10252,7 @@
 </p:sld>
 </file>
 
-<file path=ppt/slides/slide23.xml><?xml version="1.0" encoding="utf-8"?>
+<file path=ppt/slides/slide25.xml><?xml version="1.0" encoding="utf-8"?>
 <p:sld xmlns:a="http://schemas.openxmlformats.org/drawingml/2006/main" xmlns:r="http://schemas.openxmlformats.org/officeDocument/2006/relationships" xmlns:p="http://schemas.openxmlformats.org/presentationml/2006/main">
   <p:cSld>
     <p:spTree>
@@ -8591,7 +10284,7 @@
           <p:nvPr/>
         </p:nvPicPr>
         <p:blipFill>
-          <a:blip r:embed="rId2" cstate="print">
+          <a:blip r:embed="rId3" cstate="print">
             <a:extLst>
               <a:ext uri="{28A0092B-C50C-407E-A947-70E740481C1C}">
                 <a14:useLocalDpi xmlns:a14="http://schemas.microsoft.com/office/drawing/2010/main" val="0"/>
@@ -8664,7 +10357,7 @@
 </p:sld>
 </file>
 
-<file path=ppt/slides/slide24.xml><?xml version="1.0" encoding="utf-8"?>
+<file path=ppt/slides/slide26.xml><?xml version="1.0" encoding="utf-8"?>
 <p:sld xmlns:a="http://schemas.openxmlformats.org/drawingml/2006/main" xmlns:r="http://schemas.openxmlformats.org/officeDocument/2006/relationships" xmlns:p="http://schemas.openxmlformats.org/presentationml/2006/main">
   <p:cSld>
     <p:spTree>
@@ -8759,7 +10452,7 @@
           <p:nvPr/>
         </p:nvPicPr>
         <p:blipFill>
-          <a:blip r:embed="rId2">
+          <a:blip r:embed="rId3">
             <a:extLst>
               <a:ext uri="{28A0092B-C50C-407E-A947-70E740481C1C}">
                 <a14:useLocalDpi xmlns:a14="http://schemas.microsoft.com/office/drawing/2010/main" val="0"/>
@@ -8793,7 +10486,7 @@
 </p:sld>
 </file>
 
-<file path=ppt/slides/slide25.xml><?xml version="1.0" encoding="utf-8"?>
+<file path=ppt/slides/slide27.xml><?xml version="1.0" encoding="utf-8"?>
 <p:sld xmlns:a="http://schemas.openxmlformats.org/drawingml/2006/main" xmlns:r="http://schemas.openxmlformats.org/officeDocument/2006/relationships" xmlns:p="http://schemas.openxmlformats.org/presentationml/2006/main">
   <p:cSld>
     <p:spTree>
@@ -8872,7 +10565,7 @@
           <p:nvPr/>
         </p:nvPicPr>
         <p:blipFill>
-          <a:blip r:embed="rId2" cstate="print">
+          <a:blip r:embed="rId3" cstate="print">
             <a:extLst>
               <a:ext uri="{28A0092B-C50C-407E-A947-70E740481C1C}">
                 <a14:useLocalDpi xmlns:a14="http://schemas.microsoft.com/office/drawing/2010/main" val="0"/>
@@ -8906,7 +10599,7 @@
 </p:sld>
 </file>
 
-<file path=ppt/slides/slide26.xml><?xml version="1.0" encoding="utf-8"?>
+<file path=ppt/slides/slide28.xml><?xml version="1.0" encoding="utf-8"?>
 <p:sld xmlns:a="http://schemas.openxmlformats.org/drawingml/2006/main" xmlns:r="http://schemas.openxmlformats.org/officeDocument/2006/relationships" xmlns:p="http://schemas.openxmlformats.org/presentationml/2006/main">
   <p:cSld>
     <p:spTree>
@@ -8993,7 +10686,7 @@
           <p:nvPr/>
         </p:nvPicPr>
         <p:blipFill>
-          <a:blip r:embed="rId2">
+          <a:blip r:embed="rId3">
             <a:extLst>
               <a:ext uri="{28A0092B-C50C-407E-A947-70E740481C1C}">
                 <a14:useLocalDpi xmlns:a14="http://schemas.microsoft.com/office/drawing/2010/main" val="0"/>
@@ -9027,7 +10720,7 @@
 </p:sld>
 </file>
 
-<file path=ppt/slides/slide27.xml><?xml version="1.0" encoding="utf-8"?>
+<file path=ppt/slides/slide29.xml><?xml version="1.0" encoding="utf-8"?>
 <p:sld xmlns:a="http://schemas.openxmlformats.org/drawingml/2006/main" xmlns:r="http://schemas.openxmlformats.org/officeDocument/2006/relationships" xmlns:p="http://schemas.openxmlformats.org/presentationml/2006/main">
   <p:cSld>
     <p:spTree>
@@ -9078,17 +10771,16 @@
             </a:r>
             <a:r>
               <a:rPr lang="fi-FI" dirty="0"/>
-              <a:t> 5: Muokataan toista tiedostoa (versionhallinta.pptx) Power Point -sovelluksella. VS </a:t>
+              <a:t> 5: Muokataan toista tiedostoa (versionhallinta.pptx) PowerPoint -sovelluksella. VS </a:t>
             </a:r>
             <a:r>
               <a:rPr lang="fi-FI" dirty="0" err="1"/>
               <a:t>Code</a:t>
             </a:r>
             <a:r>
-              <a:rPr lang="fi-FI"/>
+              <a:rPr lang="fi-FI" dirty="0"/>
               <a:t> huomaa myös tämän muutoksen.</a:t>
             </a:r>
-            <a:endParaRPr lang="fi-FI" dirty="0"/>
           </a:p>
         </p:txBody>
       </p:sp>
@@ -9107,7 +10799,7 @@
           <p:nvPr/>
         </p:nvPicPr>
         <p:blipFill>
-          <a:blip r:embed="rId2" cstate="print">
+          <a:blip r:embed="rId3" cstate="print">
             <a:extLst>
               <a:ext uri="{28A0092B-C50C-407E-A947-70E740481C1C}">
                 <a14:useLocalDpi xmlns:a14="http://schemas.microsoft.com/office/drawing/2010/main" val="0"/>
@@ -9141,31 +10833,6 @@
 </p:sld>
 </file>
 
-<file path=ppt/slides/slide28.xml><?xml version="1.0" encoding="utf-8"?>
-<p:sld xmlns:a="http://schemas.openxmlformats.org/drawingml/2006/main" xmlns:r="http://schemas.openxmlformats.org/officeDocument/2006/relationships" xmlns:p="http://schemas.openxmlformats.org/presentationml/2006/main">
-  <p:cSld>
-    <p:spTree>
-      <p:nvGrpSpPr>
-        <p:cNvPr id="1" name=""/>
-        <p:cNvGrpSpPr/>
-        <p:nvPr/>
-      </p:nvGrpSpPr>
-      <p:grpSpPr>
-        <a:xfrm>
-          <a:off x="0" y="0"/>
-          <a:ext cx="0" cy="0"/>
-          <a:chOff x="0" y="0"/>
-          <a:chExt cx="0" cy="0"/>
-        </a:xfrm>
-      </p:grpSpPr>
-    </p:spTree>
-  </p:cSld>
-  <p:clrMapOvr>
-    <a:masterClrMapping/>
-  </p:clrMapOvr>
-</p:sld>
-</file>
-
 <file path=ppt/slides/slide3.xml><?xml version="1.0" encoding="utf-8"?>
 <p:sld xmlns:a="http://schemas.openxmlformats.org/drawingml/2006/main" xmlns:r="http://schemas.openxmlformats.org/officeDocument/2006/relationships" xmlns:p="http://schemas.openxmlformats.org/presentationml/2006/main">
   <p:cSld>
@@ -9316,6 +10983,707 @@
           </a:p>
         </p:txBody>
       </p:sp>
+    </p:spTree>
+  </p:cSld>
+  <p:clrMapOvr>
+    <a:masterClrMapping/>
+  </p:clrMapOvr>
+</p:sld>
+</file>
+
+<file path=ppt/slides/slide30.xml><?xml version="1.0" encoding="utf-8"?>
+<p:sld xmlns:a="http://schemas.openxmlformats.org/drawingml/2006/main" xmlns:r="http://schemas.openxmlformats.org/officeDocument/2006/relationships" xmlns:p="http://schemas.openxmlformats.org/presentationml/2006/main">
+  <p:cSld>
+    <p:spTree>
+      <p:nvGrpSpPr>
+        <p:cNvPr id="1" name=""/>
+        <p:cNvGrpSpPr/>
+        <p:nvPr/>
+      </p:nvGrpSpPr>
+      <p:grpSpPr>
+        <a:xfrm>
+          <a:off x="0" y="0"/>
+          <a:ext cx="0" cy="0"/>
+          <a:chOff x="0" y="0"/>
+          <a:chExt cx="0" cy="0"/>
+        </a:xfrm>
+      </p:grpSpPr>
+      <p:sp>
+        <p:nvSpPr>
+          <p:cNvPr id="8" name="Tekstiruutu 7">
+            <a:extLst>
+              <a:ext uri="{FF2B5EF4-FFF2-40B4-BE49-F238E27FC236}">
+                <a16:creationId xmlns:a16="http://schemas.microsoft.com/office/drawing/2014/main" id="{CCBE5E6C-1675-4886-8E3C-3E516A85659C}"/>
+              </a:ext>
+            </a:extLst>
+          </p:cNvPr>
+          <p:cNvSpPr txBox="1"/>
+          <p:nvPr/>
+        </p:nvSpPr>
+        <p:spPr>
+          <a:xfrm>
+            <a:off x="179511" y="6165304"/>
+            <a:ext cx="8784976" cy="646331"/>
+          </a:xfrm>
+          <a:prstGeom prst="rect">
+            <a:avLst/>
+          </a:prstGeom>
+          <a:noFill/>
+        </p:spPr>
+        <p:txBody>
+          <a:bodyPr wrap="square" rtlCol="0">
+            <a:spAutoFit/>
+          </a:bodyPr>
+          <a:lstStyle/>
+          <a:p>
+            <a:r>
+              <a:rPr lang="fi-FI" dirty="0" err="1"/>
+              <a:t>Step</a:t>
+            </a:r>
+            <a:r>
+              <a:rPr lang="fi-FI" dirty="0"/>
+              <a:t> 6: Kirjoitetaan viesti tehdyistä muutoksista </a:t>
+            </a:r>
+            <a:r>
+              <a:rPr lang="fi-FI" dirty="0" err="1"/>
+              <a:t>commit:ia</a:t>
+            </a:r>
+            <a:r>
+              <a:rPr lang="fi-FI" dirty="0"/>
+              <a:t> varten. </a:t>
+            </a:r>
+            <a:r>
+              <a:rPr lang="fi-FI" b="1" dirty="0"/>
+              <a:t>Viesti täytyy kirjoittaa aina!</a:t>
+            </a:r>
+          </a:p>
+        </p:txBody>
+      </p:sp>
+      <p:pic>
+        <p:nvPicPr>
+          <p:cNvPr id="3" name="Kuva 2" descr="Step 6: Kirjoitetaan viesti tehdyistä muutoksista commit:ia varten. Viesti täytyy kirjoittaa aina!">
+            <a:extLst>
+              <a:ext uri="{FF2B5EF4-FFF2-40B4-BE49-F238E27FC236}">
+                <a16:creationId xmlns:a16="http://schemas.microsoft.com/office/drawing/2014/main" id="{48116FDA-C0CF-4C26-8CAE-6BF65E32E050}"/>
+              </a:ext>
+            </a:extLst>
+          </p:cNvPr>
+          <p:cNvPicPr>
+            <a:picLocks noChangeAspect="1"/>
+          </p:cNvPicPr>
+          <p:nvPr/>
+        </p:nvPicPr>
+        <p:blipFill>
+          <a:blip r:embed="rId3">
+            <a:extLst>
+              <a:ext uri="{28A0092B-C50C-407E-A947-70E740481C1C}">
+                <a14:useLocalDpi xmlns:a14="http://schemas.microsoft.com/office/drawing/2010/main" val="0"/>
+              </a:ext>
+            </a:extLst>
+          </a:blip>
+          <a:stretch>
+            <a:fillRect/>
+          </a:stretch>
+        </p:blipFill>
+        <p:spPr>
+          <a:xfrm>
+            <a:off x="777680" y="1796966"/>
+            <a:ext cx="7588640" cy="3264068"/>
+          </a:xfrm>
+          <a:prstGeom prst="rect">
+            <a:avLst/>
+          </a:prstGeom>
+        </p:spPr>
+      </p:pic>
+    </p:spTree>
+    <p:extLst>
+      <p:ext uri="{BB962C8B-B14F-4D97-AF65-F5344CB8AC3E}">
+        <p14:creationId xmlns:p14="http://schemas.microsoft.com/office/powerpoint/2010/main" val="3925898759"/>
+      </p:ext>
+    </p:extLst>
+  </p:cSld>
+  <p:clrMapOvr>
+    <a:masterClrMapping/>
+  </p:clrMapOvr>
+</p:sld>
+</file>
+
+<file path=ppt/slides/slide31.xml><?xml version="1.0" encoding="utf-8"?>
+<p:sld xmlns:a="http://schemas.openxmlformats.org/drawingml/2006/main" xmlns:r="http://schemas.openxmlformats.org/officeDocument/2006/relationships" xmlns:p="http://schemas.openxmlformats.org/presentationml/2006/main">
+  <p:cSld>
+    <p:spTree>
+      <p:nvGrpSpPr>
+        <p:cNvPr id="1" name=""/>
+        <p:cNvGrpSpPr/>
+        <p:nvPr/>
+      </p:nvGrpSpPr>
+      <p:grpSpPr>
+        <a:xfrm>
+          <a:off x="0" y="0"/>
+          <a:ext cx="0" cy="0"/>
+          <a:chOff x="0" y="0"/>
+          <a:chExt cx="0" cy="0"/>
+        </a:xfrm>
+      </p:grpSpPr>
+      <p:sp>
+        <p:nvSpPr>
+          <p:cNvPr id="8" name="Tekstiruutu 7">
+            <a:extLst>
+              <a:ext uri="{FF2B5EF4-FFF2-40B4-BE49-F238E27FC236}">
+                <a16:creationId xmlns:a16="http://schemas.microsoft.com/office/drawing/2014/main" id="{CCBE5E6C-1675-4886-8E3C-3E516A85659C}"/>
+              </a:ext>
+            </a:extLst>
+          </p:cNvPr>
+          <p:cNvSpPr txBox="1"/>
+          <p:nvPr/>
+        </p:nvSpPr>
+        <p:spPr>
+          <a:xfrm>
+            <a:off x="179511" y="6165304"/>
+            <a:ext cx="8784976" cy="369332"/>
+          </a:xfrm>
+          <a:prstGeom prst="rect">
+            <a:avLst/>
+          </a:prstGeom>
+          <a:noFill/>
+        </p:spPr>
+        <p:txBody>
+          <a:bodyPr wrap="square" rtlCol="0">
+            <a:spAutoFit/>
+          </a:bodyPr>
+          <a:lstStyle/>
+          <a:p>
+            <a:r>
+              <a:rPr lang="fi-FI" dirty="0" err="1"/>
+              <a:t>Step</a:t>
+            </a:r>
+            <a:r>
+              <a:rPr lang="fi-FI" dirty="0"/>
+              <a:t> 7: Tehdään </a:t>
+            </a:r>
+            <a:r>
+              <a:rPr lang="fi-FI" dirty="0" err="1"/>
+              <a:t>commit</a:t>
+            </a:r>
+            <a:endParaRPr lang="fi-FI" dirty="0"/>
+          </a:p>
+        </p:txBody>
+      </p:sp>
+      <p:pic>
+        <p:nvPicPr>
+          <p:cNvPr id="4" name="Kuva 3" descr="Step 7: Tehdään commit.">
+            <a:extLst>
+              <a:ext uri="{FF2B5EF4-FFF2-40B4-BE49-F238E27FC236}">
+                <a16:creationId xmlns:a16="http://schemas.microsoft.com/office/drawing/2014/main" id="{D4865E0A-65AC-42BC-88DA-4720D9C2A27A}"/>
+              </a:ext>
+            </a:extLst>
+          </p:cNvPr>
+          <p:cNvPicPr>
+            <a:picLocks noChangeAspect="1"/>
+          </p:cNvPicPr>
+          <p:nvPr/>
+        </p:nvPicPr>
+        <p:blipFill>
+          <a:blip r:embed="rId3">
+            <a:extLst>
+              <a:ext uri="{28A0092B-C50C-407E-A947-70E740481C1C}">
+                <a14:useLocalDpi xmlns:a14="http://schemas.microsoft.com/office/drawing/2010/main" val="0"/>
+              </a:ext>
+            </a:extLst>
+          </a:blip>
+          <a:stretch>
+            <a:fillRect/>
+          </a:stretch>
+        </p:blipFill>
+        <p:spPr>
+          <a:xfrm>
+            <a:off x="1756348" y="692696"/>
+            <a:ext cx="5631304" cy="5472608"/>
+          </a:xfrm>
+          <a:prstGeom prst="rect">
+            <a:avLst/>
+          </a:prstGeom>
+        </p:spPr>
+      </p:pic>
+    </p:spTree>
+    <p:extLst>
+      <p:ext uri="{BB962C8B-B14F-4D97-AF65-F5344CB8AC3E}">
+        <p14:creationId xmlns:p14="http://schemas.microsoft.com/office/powerpoint/2010/main" val="186229220"/>
+      </p:ext>
+    </p:extLst>
+  </p:cSld>
+  <p:clrMapOvr>
+    <a:masterClrMapping/>
+  </p:clrMapOvr>
+</p:sld>
+</file>
+
+<file path=ppt/slides/slide32.xml><?xml version="1.0" encoding="utf-8"?>
+<p:sld xmlns:a="http://schemas.openxmlformats.org/drawingml/2006/main" xmlns:r="http://schemas.openxmlformats.org/officeDocument/2006/relationships" xmlns:p="http://schemas.openxmlformats.org/presentationml/2006/main">
+  <p:cSld>
+    <p:spTree>
+      <p:nvGrpSpPr>
+        <p:cNvPr id="1" name=""/>
+        <p:cNvGrpSpPr/>
+        <p:nvPr/>
+      </p:nvGrpSpPr>
+      <p:grpSpPr>
+        <a:xfrm>
+          <a:off x="0" y="0"/>
+          <a:ext cx="0" cy="0"/>
+          <a:chOff x="0" y="0"/>
+          <a:chExt cx="0" cy="0"/>
+        </a:xfrm>
+      </p:grpSpPr>
+      <p:sp>
+        <p:nvSpPr>
+          <p:cNvPr id="8" name="Tekstiruutu 7">
+            <a:extLst>
+              <a:ext uri="{FF2B5EF4-FFF2-40B4-BE49-F238E27FC236}">
+                <a16:creationId xmlns:a16="http://schemas.microsoft.com/office/drawing/2014/main" id="{CCBE5E6C-1675-4886-8E3C-3E516A85659C}"/>
+              </a:ext>
+            </a:extLst>
+          </p:cNvPr>
+          <p:cNvSpPr txBox="1"/>
+          <p:nvPr/>
+        </p:nvSpPr>
+        <p:spPr>
+          <a:xfrm>
+            <a:off x="179511" y="6165304"/>
+            <a:ext cx="8784976" cy="646331"/>
+          </a:xfrm>
+          <a:prstGeom prst="rect">
+            <a:avLst/>
+          </a:prstGeom>
+          <a:noFill/>
+        </p:spPr>
+        <p:txBody>
+          <a:bodyPr wrap="square" rtlCol="0">
+            <a:spAutoFit/>
+          </a:bodyPr>
+          <a:lstStyle/>
+          <a:p>
+            <a:r>
+              <a:rPr lang="fi-FI" dirty="0" err="1"/>
+              <a:t>Step</a:t>
+            </a:r>
+            <a:r>
+              <a:rPr lang="fi-FI" dirty="0"/>
+              <a:t> 8: </a:t>
+            </a:r>
+            <a:r>
+              <a:rPr lang="fi-FI" dirty="0" err="1"/>
+              <a:t>Commit:n</a:t>
+            </a:r>
+            <a:r>
+              <a:rPr lang="fi-FI" dirty="0"/>
+              <a:t> jälkeen työtilassa ei ole muuttuneita tietoja (</a:t>
+            </a:r>
+            <a:r>
+              <a:rPr lang="fi-FI" dirty="0" err="1"/>
+              <a:t>Changes</a:t>
+            </a:r>
+            <a:r>
+              <a:rPr lang="fi-FI" dirty="0"/>
+              <a:t> on tyhjä). Muutokset voidaan </a:t>
+            </a:r>
+            <a:r>
+              <a:rPr lang="fi-FI" i="1" dirty="0" err="1"/>
+              <a:t>git</a:t>
+            </a:r>
+            <a:r>
+              <a:rPr lang="fi-FI" i="1" dirty="0"/>
+              <a:t> </a:t>
+            </a:r>
+            <a:r>
+              <a:rPr lang="fi-FI" i="1" dirty="0" err="1"/>
+              <a:t>Push</a:t>
+            </a:r>
+            <a:r>
+              <a:rPr lang="fi-FI" dirty="0"/>
+              <a:t> etärepoon.</a:t>
+            </a:r>
+          </a:p>
+        </p:txBody>
+      </p:sp>
+      <p:pic>
+        <p:nvPicPr>
+          <p:cNvPr id="3" name="Kuva 2" descr="Step 8: Commit:n jälkeen työtilassa ei ole muuttuneita tietoja (Changes on tyhjä). Muutokset voidaan git Push etärepoon.">
+            <a:extLst>
+              <a:ext uri="{FF2B5EF4-FFF2-40B4-BE49-F238E27FC236}">
+                <a16:creationId xmlns:a16="http://schemas.microsoft.com/office/drawing/2014/main" id="{E77C6260-839F-4046-923C-295172131DE2}"/>
+              </a:ext>
+            </a:extLst>
+          </p:cNvPr>
+          <p:cNvPicPr>
+            <a:picLocks noChangeAspect="1"/>
+          </p:cNvPicPr>
+          <p:nvPr/>
+        </p:nvPicPr>
+        <p:blipFill>
+          <a:blip r:embed="rId3">
+            <a:extLst>
+              <a:ext uri="{28A0092B-C50C-407E-A947-70E740481C1C}">
+                <a14:useLocalDpi xmlns:a14="http://schemas.microsoft.com/office/drawing/2010/main" val="0"/>
+              </a:ext>
+            </a:extLst>
+          </a:blip>
+          <a:stretch>
+            <a:fillRect/>
+          </a:stretch>
+        </p:blipFill>
+        <p:spPr>
+          <a:xfrm>
+            <a:off x="825307" y="1854119"/>
+            <a:ext cx="7493385" cy="3149762"/>
+          </a:xfrm>
+          <a:prstGeom prst="rect">
+            <a:avLst/>
+          </a:prstGeom>
+        </p:spPr>
+      </p:pic>
+    </p:spTree>
+    <p:extLst>
+      <p:ext uri="{BB962C8B-B14F-4D97-AF65-F5344CB8AC3E}">
+        <p14:creationId xmlns:p14="http://schemas.microsoft.com/office/powerpoint/2010/main" val="1042977388"/>
+      </p:ext>
+    </p:extLst>
+  </p:cSld>
+  <p:clrMapOvr>
+    <a:masterClrMapping/>
+  </p:clrMapOvr>
+</p:sld>
+</file>
+
+<file path=ppt/slides/slide33.xml><?xml version="1.0" encoding="utf-8"?>
+<p:sld xmlns:a="http://schemas.openxmlformats.org/drawingml/2006/main" xmlns:r="http://schemas.openxmlformats.org/officeDocument/2006/relationships" xmlns:p="http://schemas.openxmlformats.org/presentationml/2006/main">
+  <p:cSld>
+    <p:spTree>
+      <p:nvGrpSpPr>
+        <p:cNvPr id="1" name=""/>
+        <p:cNvGrpSpPr/>
+        <p:nvPr/>
+      </p:nvGrpSpPr>
+      <p:grpSpPr>
+        <a:xfrm>
+          <a:off x="0" y="0"/>
+          <a:ext cx="0" cy="0"/>
+          <a:chOff x="0" y="0"/>
+          <a:chExt cx="0" cy="0"/>
+        </a:xfrm>
+      </p:grpSpPr>
+      <p:sp>
+        <p:nvSpPr>
+          <p:cNvPr id="8" name="Tekstiruutu 7">
+            <a:extLst>
+              <a:ext uri="{FF2B5EF4-FFF2-40B4-BE49-F238E27FC236}">
+                <a16:creationId xmlns:a16="http://schemas.microsoft.com/office/drawing/2014/main" id="{CCBE5E6C-1675-4886-8E3C-3E516A85659C}"/>
+              </a:ext>
+            </a:extLst>
+          </p:cNvPr>
+          <p:cNvSpPr txBox="1"/>
+          <p:nvPr/>
+        </p:nvSpPr>
+        <p:spPr>
+          <a:xfrm>
+            <a:off x="179511" y="6165304"/>
+            <a:ext cx="8784976" cy="646331"/>
+          </a:xfrm>
+          <a:prstGeom prst="rect">
+            <a:avLst/>
+          </a:prstGeom>
+          <a:noFill/>
+        </p:spPr>
+        <p:txBody>
+          <a:bodyPr wrap="square" rtlCol="0">
+            <a:spAutoFit/>
+          </a:bodyPr>
+          <a:lstStyle/>
+          <a:p>
+            <a:r>
+              <a:rPr lang="fi-FI" dirty="0" err="1"/>
+              <a:t>Step</a:t>
+            </a:r>
+            <a:r>
+              <a:rPr lang="fi-FI" dirty="0"/>
+              <a:t> 9: Tehdään </a:t>
+            </a:r>
+            <a:r>
+              <a:rPr lang="fi-FI" i="1" dirty="0" err="1"/>
+              <a:t>git</a:t>
+            </a:r>
+            <a:r>
+              <a:rPr lang="fi-FI" i="1" dirty="0"/>
+              <a:t> </a:t>
+            </a:r>
+            <a:r>
+              <a:rPr lang="fi-FI" i="1" dirty="0" err="1"/>
+              <a:t>Push</a:t>
+            </a:r>
+            <a:r>
+              <a:rPr lang="fi-FI" dirty="0"/>
+              <a:t>, jolla </a:t>
+            </a:r>
+            <a:r>
+              <a:rPr lang="fi-FI" dirty="0" err="1"/>
+              <a:t>commitoidut</a:t>
+            </a:r>
+            <a:r>
+              <a:rPr lang="fi-FI" dirty="0"/>
+              <a:t> muutokset viedään etärepoon. Etärepoon täytyy olla kirjoitusoikeudet.</a:t>
+            </a:r>
+          </a:p>
+        </p:txBody>
+      </p:sp>
+      <p:pic>
+        <p:nvPicPr>
+          <p:cNvPr id="4" name="Kuva 3" descr="Step 9: Tehdään git Push, jolla commitoidut muutokset viedään etärepoon. Etärepoon täytyy olla kirjoitusoikeudet.">
+            <a:extLst>
+              <a:ext uri="{FF2B5EF4-FFF2-40B4-BE49-F238E27FC236}">
+                <a16:creationId xmlns:a16="http://schemas.microsoft.com/office/drawing/2014/main" id="{1E26F40E-6FFB-4D54-B850-AE23225310EB}"/>
+              </a:ext>
+            </a:extLst>
+          </p:cNvPr>
+          <p:cNvPicPr>
+            <a:picLocks noChangeAspect="1"/>
+          </p:cNvPicPr>
+          <p:nvPr/>
+        </p:nvPicPr>
+        <p:blipFill>
+          <a:blip r:embed="rId3" cstate="print">
+            <a:extLst>
+              <a:ext uri="{28A0092B-C50C-407E-A947-70E740481C1C}">
+                <a14:useLocalDpi xmlns:a14="http://schemas.microsoft.com/office/drawing/2010/main" val="0"/>
+              </a:ext>
+            </a:extLst>
+          </a:blip>
+          <a:stretch>
+            <a:fillRect/>
+          </a:stretch>
+        </p:blipFill>
+        <p:spPr>
+          <a:xfrm>
+            <a:off x="2123728" y="844080"/>
+            <a:ext cx="4896544" cy="5169840"/>
+          </a:xfrm>
+          <a:prstGeom prst="rect">
+            <a:avLst/>
+          </a:prstGeom>
+        </p:spPr>
+      </p:pic>
+    </p:spTree>
+    <p:extLst>
+      <p:ext uri="{BB962C8B-B14F-4D97-AF65-F5344CB8AC3E}">
+        <p14:creationId xmlns:p14="http://schemas.microsoft.com/office/powerpoint/2010/main" val="1105081230"/>
+      </p:ext>
+    </p:extLst>
+  </p:cSld>
+  <p:clrMapOvr>
+    <a:masterClrMapping/>
+  </p:clrMapOvr>
+</p:sld>
+</file>
+
+<file path=ppt/slides/slide34.xml><?xml version="1.0" encoding="utf-8"?>
+<p:sld xmlns:a="http://schemas.openxmlformats.org/drawingml/2006/main" xmlns:r="http://schemas.openxmlformats.org/officeDocument/2006/relationships" xmlns:p="http://schemas.openxmlformats.org/presentationml/2006/main">
+  <p:cSld>
+    <p:spTree>
+      <p:nvGrpSpPr>
+        <p:cNvPr id="1" name=""/>
+        <p:cNvGrpSpPr/>
+        <p:nvPr/>
+      </p:nvGrpSpPr>
+      <p:grpSpPr>
+        <a:xfrm>
+          <a:off x="0" y="0"/>
+          <a:ext cx="0" cy="0"/>
+          <a:chOff x="0" y="0"/>
+          <a:chExt cx="0" cy="0"/>
+        </a:xfrm>
+      </p:grpSpPr>
+      <p:sp>
+        <p:nvSpPr>
+          <p:cNvPr id="2" name="Otsikko 1">
+            <a:extLst>
+              <a:ext uri="{FF2B5EF4-FFF2-40B4-BE49-F238E27FC236}">
+                <a16:creationId xmlns:a16="http://schemas.microsoft.com/office/drawing/2014/main" id="{094DB930-2672-49D9-A543-781948FEFDBB}"/>
+              </a:ext>
+            </a:extLst>
+          </p:cNvPr>
+          <p:cNvSpPr>
+            <a:spLocks noGrp="1"/>
+          </p:cNvSpPr>
+          <p:nvPr>
+            <p:ph type="title"/>
+          </p:nvPr>
+        </p:nvSpPr>
+        <p:spPr/>
+        <p:txBody>
+          <a:bodyPr/>
+          <a:lstStyle/>
+          <a:p>
+            <a:r>
+              <a:rPr lang="fi-FI" dirty="0"/>
+              <a:t>Esimerkin huomioita</a:t>
+            </a:r>
+          </a:p>
+        </p:txBody>
+      </p:sp>
+      <p:sp>
+        <p:nvSpPr>
+          <p:cNvPr id="3" name="Sisällön paikkamerkki 2">
+            <a:extLst>
+              <a:ext uri="{FF2B5EF4-FFF2-40B4-BE49-F238E27FC236}">
+                <a16:creationId xmlns:a16="http://schemas.microsoft.com/office/drawing/2014/main" id="{80F09F31-0F4A-402B-9DEA-4943ABCD730A}"/>
+              </a:ext>
+            </a:extLst>
+          </p:cNvPr>
+          <p:cNvSpPr>
+            <a:spLocks noGrp="1"/>
+          </p:cNvSpPr>
+          <p:nvPr>
+            <p:ph idx="1"/>
+          </p:nvPr>
+        </p:nvSpPr>
+        <p:spPr/>
+        <p:txBody>
+          <a:bodyPr/>
+          <a:lstStyle/>
+          <a:p>
+            <a:r>
+              <a:rPr lang="fi-FI" dirty="0"/>
+              <a:t>Huomaa, että työnkulku on sama riippumatta käytetystä välineestä / editorista / </a:t>
+            </a:r>
+            <a:r>
+              <a:rPr lang="fi-FI" dirty="0" err="1"/>
+              <a:t>IDE:stä</a:t>
+            </a:r>
+            <a:endParaRPr lang="fi-FI" dirty="0"/>
+          </a:p>
+          <a:p>
+            <a:r>
+              <a:rPr lang="fi-FI" dirty="0"/>
+              <a:t>Tässä esimerkissä on käytetty Visual Studio </a:t>
+            </a:r>
+            <a:r>
+              <a:rPr lang="fi-FI" dirty="0" err="1"/>
+              <a:t>Code:a</a:t>
+            </a:r>
+            <a:r>
+              <a:rPr lang="fi-FI" dirty="0"/>
+              <a:t> paikallisen </a:t>
+            </a:r>
+            <a:r>
+              <a:rPr lang="fi-FI" dirty="0" err="1"/>
+              <a:t>git</a:t>
+            </a:r>
+            <a:r>
+              <a:rPr lang="fi-FI" dirty="0"/>
+              <a:t> </a:t>
+            </a:r>
+            <a:r>
+              <a:rPr lang="fi-FI" dirty="0" err="1"/>
+              <a:t>repon</a:t>
+            </a:r>
+            <a:r>
+              <a:rPr lang="fi-FI" dirty="0"/>
+              <a:t> ja </a:t>
+            </a:r>
+            <a:r>
+              <a:rPr lang="fi-FI" dirty="0" err="1"/>
+              <a:t>GitHub:ssa</a:t>
+            </a:r>
+            <a:r>
+              <a:rPr lang="fi-FI" dirty="0"/>
+              <a:t> olevan </a:t>
+            </a:r>
+            <a:r>
+              <a:rPr lang="fi-FI" dirty="0" err="1"/>
+              <a:t>etärepon</a:t>
+            </a:r>
+            <a:r>
+              <a:rPr lang="fi-FI" dirty="0"/>
+              <a:t> kanssa kommunikointiin</a:t>
+            </a:r>
+          </a:p>
+          <a:p>
+            <a:r>
+              <a:rPr lang="fi-FI" i="1" dirty="0" err="1"/>
+              <a:t>Git</a:t>
+            </a:r>
+            <a:r>
+              <a:rPr lang="fi-FI" i="1" dirty="0"/>
+              <a:t> </a:t>
+            </a:r>
+            <a:r>
+              <a:rPr lang="fi-FI" i="1" dirty="0" err="1"/>
+              <a:t>push</a:t>
+            </a:r>
+            <a:r>
+              <a:rPr lang="fi-FI" dirty="0"/>
+              <a:t> vaatii, että etärepoon on kirjoitusoikeudet!</a:t>
+            </a:r>
+          </a:p>
+        </p:txBody>
+      </p:sp>
+      <p:sp>
+        <p:nvSpPr>
+          <p:cNvPr id="4" name="Alatunnisteen paikkamerkki 3">
+            <a:extLst>
+              <a:ext uri="{FF2B5EF4-FFF2-40B4-BE49-F238E27FC236}">
+                <a16:creationId xmlns:a16="http://schemas.microsoft.com/office/drawing/2014/main" id="{4AB9EB3A-A16B-4531-8975-06E80423883E}"/>
+              </a:ext>
+            </a:extLst>
+          </p:cNvPr>
+          <p:cNvSpPr>
+            <a:spLocks noGrp="1"/>
+          </p:cNvSpPr>
+          <p:nvPr>
+            <p:ph type="ftr" sz="quarter" idx="10"/>
+          </p:nvPr>
+        </p:nvSpPr>
+        <p:spPr/>
+        <p:txBody>
+          <a:bodyPr/>
+          <a:lstStyle/>
+          <a:p>
+            <a:pPr>
+              <a:defRPr/>
+            </a:pPr>
+            <a:endParaRPr lang="fi-FI" dirty="0"/>
+          </a:p>
+        </p:txBody>
+      </p:sp>
+    </p:spTree>
+    <p:extLst>
+      <p:ext uri="{BB962C8B-B14F-4D97-AF65-F5344CB8AC3E}">
+        <p14:creationId xmlns:p14="http://schemas.microsoft.com/office/powerpoint/2010/main" val="2331064802"/>
+      </p:ext>
+    </p:extLst>
+  </p:cSld>
+  <p:clrMapOvr>
+    <a:masterClrMapping/>
+  </p:clrMapOvr>
+</p:sld>
+</file>
+
+<file path=ppt/slides/slide35.xml><?xml version="1.0" encoding="utf-8"?>
+<p:sld xmlns:a="http://schemas.openxmlformats.org/drawingml/2006/main" xmlns:r="http://schemas.openxmlformats.org/officeDocument/2006/relationships" xmlns:p="http://schemas.openxmlformats.org/presentationml/2006/main">
+  <p:cSld>
+    <p:spTree>
+      <p:nvGrpSpPr>
+        <p:cNvPr id="1" name=""/>
+        <p:cNvGrpSpPr/>
+        <p:nvPr/>
+      </p:nvGrpSpPr>
+      <p:grpSpPr>
+        <a:xfrm>
+          <a:off x="0" y="0"/>
+          <a:ext cx="0" cy="0"/>
+          <a:chOff x="0" y="0"/>
+          <a:chExt cx="0" cy="0"/>
+        </a:xfrm>
+      </p:grpSpPr>
     </p:spTree>
   </p:cSld>
   <p:clrMapOvr>
@@ -11270,15 +13638,6 @@
 
 <file path=customXml/item1.xml><?xml version="1.0" encoding="utf-8"?>
 <?mso-contentType ?>
-<FormTemplates xmlns="http://schemas.microsoft.com/sharepoint/v3/contenttype/forms">
-  <Display>DocumentLibraryForm</Display>
-  <Edit>DocumentLibraryForm</Edit>
-  <New>DocumentLibraryForm</New>
-</FormTemplates>
-</file>
-
-<file path=customXml/item2.xml><?xml version="1.0" encoding="utf-8"?>
-<?mso-contentType ?>
 <spe:Receivers xmlns:spe="http://schemas.microsoft.com/sharepoint/events">
   <Receiver>
     <Name>Document ID Generator</Name>
@@ -11323,7 +13682,28 @@
 </spe:Receivers>
 </file>
 
+<file path=customXml/item2.xml><?xml version="1.0" encoding="utf-8"?>
+<?mso-contentType ?>
+<FormTemplates xmlns="http://schemas.microsoft.com/sharepoint/v3/contenttype/forms">
+  <Display>DocumentLibraryForm</Display>
+  <Edit>DocumentLibraryForm</Edit>
+  <New>DocumentLibraryForm</New>
+</FormTemplates>
+</file>
+
 <file path=customXml/item3.xml><?xml version="1.0" encoding="utf-8"?>
+<p:properties xmlns:p="http://schemas.microsoft.com/office/2006/metadata/properties" xmlns:xsi="http://www.w3.org/2001/XMLSchema-instance">
+  <documentManagement>
+    <_dlc_DocId xmlns="bcbf1d70-0686-4af9-897b-e669bf036024">SAVONIA-1148-15</_dlc_DocId>
+    <_dlc_DocIdUrl xmlns="bcbf1d70-0686-4af9-897b-e669bf036024">
+      <Url>https://santra.savonia.fi/tukipalvelut/viestinta/visuaalinen-ilme/_layouts/DocIdRedir.aspx?ID=SAVONIA-1148-15</Url>
+      <Description>SAVONIA-1148-15</Description>
+    </_dlc_DocIdUrl>
+  </documentManagement>
+</p:properties>
+</file>
+
+<file path=customXml/item4.xml><?xml version="1.0" encoding="utf-8"?>
 <ct:contentTypeSchema xmlns:ct="http://schemas.microsoft.com/office/2006/metadata/contentType" xmlns:ma="http://schemas.microsoft.com/office/2006/metadata/properties/metaAttributes" ct:_="" ma:_="" ma:contentTypeName="Asiakirja" ma:contentTypeID="0x0101005EF59F2EF8E9544DBE624127AC1EF6F5" ma:contentTypeVersion="4" ma:contentTypeDescription="Luo uusi asiakirja." ma:contentTypeScope="" ma:versionID="6f36e9b651c0d1813e2a776836ff05c9">
   <xsd:schema xmlns:xsd="http://www.w3.org/2001/XMLSchema" xmlns:xs="http://www.w3.org/2001/XMLSchema" xmlns:p="http://schemas.microsoft.com/office/2006/metadata/properties" xmlns:ns2="bcbf1d70-0686-4af9-897b-e669bf036024" targetNamespace="http://schemas.microsoft.com/office/2006/metadata/properties" ma:root="true" ma:fieldsID="e29bd19961912ca0431e39b2278e6297" ns2:_="">
     <xsd:import namespace="bcbf1d70-0686-4af9-897b-e669bf036024"/>
@@ -11468,19 +13848,15 @@
 </ct:contentTypeSchema>
 </file>
 
-<file path=customXml/item4.xml><?xml version="1.0" encoding="utf-8"?>
-<p:properties xmlns:p="http://schemas.microsoft.com/office/2006/metadata/properties" xmlns:xsi="http://www.w3.org/2001/XMLSchema-instance">
-  <documentManagement>
-    <_dlc_DocId xmlns="bcbf1d70-0686-4af9-897b-e669bf036024">SAVONIA-1148-15</_dlc_DocId>
-    <_dlc_DocIdUrl xmlns="bcbf1d70-0686-4af9-897b-e669bf036024">
-      <Url>https://santra.savonia.fi/tukipalvelut/viestinta/visuaalinen-ilme/_layouts/DocIdRedir.aspx?ID=SAVONIA-1148-15</Url>
-      <Description>SAVONIA-1148-15</Description>
-    </_dlc_DocIdUrl>
-  </documentManagement>
-</p:properties>
+<file path=customXml/itemProps1.xml><?xml version="1.0" encoding="utf-8"?>
+<ds:datastoreItem xmlns:ds="http://schemas.openxmlformats.org/officeDocument/2006/customXml" ds:itemID="{D104143F-77D4-42B1-8837-22F1A6D250D0}">
+  <ds:schemaRefs>
+    <ds:schemaRef ds:uri="http://schemas.microsoft.com/sharepoint/events"/>
+  </ds:schemaRefs>
+</ds:datastoreItem>
 </file>
 
-<file path=customXml/itemProps1.xml><?xml version="1.0" encoding="utf-8"?>
+<file path=customXml/itemProps2.xml><?xml version="1.0" encoding="utf-8"?>
 <ds:datastoreItem xmlns:ds="http://schemas.openxmlformats.org/officeDocument/2006/customXml" ds:itemID="{6C3D9C2E-F86A-4B6E-BEBD-901B468DE557}">
   <ds:schemaRefs>
     <ds:schemaRef ds:uri="http://schemas.microsoft.com/sharepoint/v3/contenttype/forms"/>
@@ -11488,15 +13864,23 @@
 </ds:datastoreItem>
 </file>
 
-<file path=customXml/itemProps2.xml><?xml version="1.0" encoding="utf-8"?>
-<ds:datastoreItem xmlns:ds="http://schemas.openxmlformats.org/officeDocument/2006/customXml" ds:itemID="{D104143F-77D4-42B1-8837-22F1A6D250D0}">
+<file path=customXml/itemProps3.xml><?xml version="1.0" encoding="utf-8"?>
+<ds:datastoreItem xmlns:ds="http://schemas.openxmlformats.org/officeDocument/2006/customXml" ds:itemID="{F82A60BA-D9BF-4B65-8C62-90B75FB47D2A}">
   <ds:schemaRefs>
-    <ds:schemaRef ds:uri="http://schemas.microsoft.com/sharepoint/events"/>
+    <ds:schemaRef ds:uri="bcbf1d70-0686-4af9-897b-e669bf036024"/>
+    <ds:schemaRef ds:uri="http://schemas.microsoft.com/office/2006/metadata/properties"/>
+    <ds:schemaRef ds:uri="http://www.w3.org/XML/1998/namespace"/>
+    <ds:schemaRef ds:uri="http://schemas.microsoft.com/office/2006/documentManagement/types"/>
+    <ds:schemaRef ds:uri="http://purl.org/dc/dcmitype/"/>
+    <ds:schemaRef ds:uri="http://schemas.microsoft.com/office/infopath/2007/PartnerControls"/>
+    <ds:schemaRef ds:uri="http://schemas.openxmlformats.org/package/2006/metadata/core-properties"/>
+    <ds:schemaRef ds:uri="http://purl.org/dc/terms/"/>
+    <ds:schemaRef ds:uri="http://purl.org/dc/elements/1.1/"/>
   </ds:schemaRefs>
 </ds:datastoreItem>
 </file>
 
-<file path=customXml/itemProps3.xml><?xml version="1.0" encoding="utf-8"?>
+<file path=customXml/itemProps4.xml><?xml version="1.0" encoding="utf-8"?>
 <ds:datastoreItem xmlns:ds="http://schemas.openxmlformats.org/officeDocument/2006/customXml" ds:itemID="{79F9801D-99E5-4A84-8FBD-7CE4CB8664C1}">
   <ds:schemaRefs>
     <ds:schemaRef ds:uri="http://schemas.microsoft.com/office/2006/metadata/contentType"/>
@@ -11512,13 +13896,4 @@
     <ds:schemaRef ds:uri="http://schemas.microsoft.com/internal/obd"/>
   </ds:schemaRefs>
 </ds:datastoreItem>
-</file>
-
-<file path=customXml/itemProps4.xml><?xml version="1.0" encoding="utf-8"?>
-<ds:datastoreItem xmlns:ds="http://schemas.openxmlformats.org/officeDocument/2006/customXml" ds:itemID="{F82A60BA-D9BF-4B65-8C62-90B75FB47D2A}">
-  <ds:schemaRefs>
-    <ds:schemaRef ds:uri="http://schemas.microsoft.com/office/2006/metadata/properties"/>
-    <ds:schemaRef ds:uri="bcbf1d70-0686-4af9-897b-e669bf036024"/>
-  </ds:schemaRefs>
-</ds:datastoreItem>
 </file>
</xml_diff>

<commit_message>
Added info about gitignore.
</commit_message>
<xml_diff>
--- a/versionhallinta.pptx
+++ b/versionhallinta.pptx
@@ -5,7 +5,7 @@
     <p:sldMasterId id="2147483785" r:id="rId5"/>
   </p:sldMasterIdLst>
   <p:notesMasterIdLst>
-    <p:notesMasterId r:id="rId41"/>
+    <p:notesMasterId r:id="rId42"/>
   </p:notesMasterIdLst>
   <p:sldIdLst>
     <p:sldId id="257" r:id="rId6"/>
@@ -42,7 +42,8 @@
     <p:sldId id="303" r:id="rId37"/>
     <p:sldId id="304" r:id="rId38"/>
     <p:sldId id="305" r:id="rId39"/>
-    <p:sldId id="260" r:id="rId40"/>
+    <p:sldId id="306" r:id="rId40"/>
+    <p:sldId id="260" r:id="rId41"/>
   </p:sldIdLst>
   <p:sldSz cx="9144000" cy="6858000" type="screen4x3"/>
   <p:notesSz cx="6858000" cy="9144000"/>
@@ -623,7 +624,7 @@
               <a:pPr>
                 <a:defRPr/>
               </a:pPr>
-              <a:t>20.8.2019</a:t>
+              <a:t>9.1.2020</a:t>
             </a:fld>
             <a:endParaRPr lang="fi-FI"/>
           </a:p>
@@ -7417,13 +7418,16 @@
             <a:pPr lvl="1"/>
             <a:r>
               <a:rPr lang="fi-FI" sz="2000" dirty="0"/>
-              <a:t>Huolehditaan ensin, että muutokset on </a:t>
+              <a:t>Huolehditaan ensin, että muutokset on tehty (</a:t>
             </a:r>
             <a:r>
               <a:rPr lang="fi-FI" sz="2000" dirty="0" err="1"/>
-              <a:t>kommitoitu</a:t>
-            </a:r>
-            <a:endParaRPr lang="fi-FI" sz="2000" dirty="0"/>
+              <a:t>committed</a:t>
+            </a:r>
+            <a:r>
+              <a:rPr lang="fi-FI" sz="2000" dirty="0"/>
+              <a:t>)</a:t>
+            </a:r>
           </a:p>
           <a:p>
             <a:pPr lvl="1"/>
@@ -7453,11 +7457,11 @@
             </a:r>
             <a:r>
               <a:rPr lang="fi-FI" sz="2000" i="1" dirty="0"/>
-              <a:t>, s</a:t>
+              <a:t>, </a:t>
             </a:r>
             <a:r>
               <a:rPr lang="fi-FI" sz="2000" dirty="0"/>
-              <a:t>iirrytään takaisin päähaaraan</a:t>
+              <a:t>siirrytään takaisin päähaaraan</a:t>
             </a:r>
             <a:endParaRPr lang="fi-FI" sz="2000" i="1" dirty="0"/>
           </a:p>
@@ -11249,8 +11253,8 @@
         </p:nvSpPr>
         <p:spPr>
           <a:xfrm>
-            <a:off x="179511" y="6165304"/>
-            <a:ext cx="8784976" cy="646331"/>
+            <a:off x="179512" y="5805264"/>
+            <a:ext cx="8784976" cy="923330"/>
           </a:xfrm>
           <a:prstGeom prst="rect">
             <a:avLst/>
@@ -11285,7 +11289,7 @@
             </a:r>
             <a:r>
               <a:rPr lang="fi-FI" dirty="0"/>
-              <a:t> on tyhjä). Muutokset voidaan </a:t>
+              <a:t> on tyhjä). Muutokset viedään etärepoon </a:t>
             </a:r>
             <a:r>
               <a:rPr lang="fi-FI" i="1" dirty="0" err="1"/>
@@ -11301,7 +11305,23 @@
             </a:r>
             <a:r>
               <a:rPr lang="fi-FI" dirty="0"/>
-              <a:t> etärepoon.</a:t>
+              <a:t> –komennolla (muutokset voi viedä ja hakea myös </a:t>
+            </a:r>
+            <a:r>
+              <a:rPr lang="fi-FI" dirty="0" err="1"/>
+              <a:t>Sync-kommennolla</a:t>
+            </a:r>
+            <a:r>
+              <a:rPr lang="fi-FI" dirty="0"/>
+              <a:t> VS </a:t>
+            </a:r>
+            <a:r>
+              <a:rPr lang="fi-FI" dirty="0" err="1"/>
+              <a:t>Codessa</a:t>
+            </a:r>
+            <a:r>
+              <a:rPr lang="fi-FI" dirty="0"/>
+              <a:t>)</a:t>
             </a:r>
           </a:p>
         </p:txBody>
@@ -11422,15 +11442,7 @@
             </a:r>
             <a:r>
               <a:rPr lang="fi-FI" dirty="0"/>
-              <a:t>, jolla </a:t>
-            </a:r>
-            <a:r>
-              <a:rPr lang="fi-FI" dirty="0" err="1"/>
-              <a:t>commitoidut</a:t>
-            </a:r>
-            <a:r>
-              <a:rPr lang="fi-FI" dirty="0"/>
-              <a:t> muutokset viedään etärepoon. Etärepoon täytyy olla kirjoitusoikeudet.</a:t>
+              <a:t>, jolla tehdyt muutokset viedään etärepoon. Etärepoon täytyy olla kirjoitusoikeudet.</a:t>
             </a:r>
           </a:p>
         </p:txBody>
@@ -11668,6 +11680,191 @@
 </file>
 
 <file path=ppt/slides/slide35.xml><?xml version="1.0" encoding="utf-8"?>
+<p:sld xmlns:a="http://schemas.openxmlformats.org/drawingml/2006/main" xmlns:r="http://schemas.openxmlformats.org/officeDocument/2006/relationships" xmlns:p="http://schemas.openxmlformats.org/presentationml/2006/main">
+  <p:cSld>
+    <p:spTree>
+      <p:nvGrpSpPr>
+        <p:cNvPr id="1" name=""/>
+        <p:cNvGrpSpPr/>
+        <p:nvPr/>
+      </p:nvGrpSpPr>
+      <p:grpSpPr>
+        <a:xfrm>
+          <a:off x="0" y="0"/>
+          <a:ext cx="0" cy="0"/>
+          <a:chOff x="0" y="0"/>
+          <a:chExt cx="0" cy="0"/>
+        </a:xfrm>
+      </p:grpSpPr>
+      <p:sp>
+        <p:nvSpPr>
+          <p:cNvPr id="2" name="Otsikko 1">
+            <a:extLst>
+              <a:ext uri="{FF2B5EF4-FFF2-40B4-BE49-F238E27FC236}">
+                <a16:creationId xmlns:a16="http://schemas.microsoft.com/office/drawing/2014/main" id="{094DB930-2672-49D9-A543-781948FEFDBB}"/>
+              </a:ext>
+            </a:extLst>
+          </p:cNvPr>
+          <p:cNvSpPr>
+            <a:spLocks noGrp="1"/>
+          </p:cNvSpPr>
+          <p:nvPr>
+            <p:ph type="title"/>
+          </p:nvPr>
+        </p:nvSpPr>
+        <p:spPr/>
+        <p:txBody>
+          <a:bodyPr/>
+          <a:lstStyle/>
+          <a:p>
+            <a:r>
+              <a:rPr lang="fi-FI" dirty="0"/>
+              <a:t>.</a:t>
+            </a:r>
+            <a:r>
+              <a:rPr lang="fi-FI" dirty="0" err="1"/>
+              <a:t>gitignore</a:t>
+            </a:r>
+            <a:r>
+              <a:rPr lang="fi-FI" dirty="0"/>
+              <a:t> -tiedosto</a:t>
+            </a:r>
+          </a:p>
+        </p:txBody>
+      </p:sp>
+      <p:sp>
+        <p:nvSpPr>
+          <p:cNvPr id="3" name="Sisällön paikkamerkki 2">
+            <a:extLst>
+              <a:ext uri="{FF2B5EF4-FFF2-40B4-BE49-F238E27FC236}">
+                <a16:creationId xmlns:a16="http://schemas.microsoft.com/office/drawing/2014/main" id="{80F09F31-0F4A-402B-9DEA-4943ABCD730A}"/>
+              </a:ext>
+            </a:extLst>
+          </p:cNvPr>
+          <p:cNvSpPr>
+            <a:spLocks noGrp="1"/>
+          </p:cNvSpPr>
+          <p:nvPr>
+            <p:ph idx="1"/>
+          </p:nvPr>
+        </p:nvSpPr>
+        <p:spPr/>
+        <p:txBody>
+          <a:bodyPr/>
+          <a:lstStyle/>
+          <a:p>
+            <a:r>
+              <a:rPr lang="fi-FI" dirty="0"/>
+              <a:t>Versiohallitussa kansiossa voi olla </a:t>
+            </a:r>
+            <a:r>
+              <a:rPr lang="fi-FI" b="1" dirty="0">
+                <a:solidFill>
+                  <a:srgbClr val="FF0000"/>
+                </a:solidFill>
+              </a:rPr>
+              <a:t>.</a:t>
+            </a:r>
+            <a:r>
+              <a:rPr lang="fi-FI" b="1" dirty="0" err="1">
+                <a:solidFill>
+                  <a:srgbClr val="FF0000"/>
+                </a:solidFill>
+              </a:rPr>
+              <a:t>gitignore</a:t>
+            </a:r>
+            <a:r>
+              <a:rPr lang="fi-FI" dirty="0"/>
+              <a:t>-tiedosto, jolla voi ohjata versionhallintaan päätyviä tiedostoja.</a:t>
+            </a:r>
+          </a:p>
+          <a:p>
+            <a:r>
+              <a:rPr lang="fi-FI" dirty="0"/>
+              <a:t>Tiedoston puuttuessa kaikki kansion tiedostot viedään versionhallintaan.</a:t>
+            </a:r>
+          </a:p>
+          <a:p>
+            <a:endParaRPr lang="fi-FI" sz="2000" dirty="0"/>
+          </a:p>
+          <a:p>
+            <a:r>
+              <a:rPr lang="fi-FI" sz="2000" dirty="0"/>
+              <a:t>Lisätietoja: </a:t>
+            </a:r>
+            <a:r>
+              <a:rPr lang="fi-FI" sz="2000" dirty="0">
+                <a:hlinkClick r:id="rId2"/>
+              </a:rPr>
+              <a:t>https://git-scm.com/docs/gitignore</a:t>
+            </a:r>
+            <a:endParaRPr lang="fi-FI" sz="2000" dirty="0"/>
+          </a:p>
+          <a:p>
+            <a:r>
+              <a:rPr lang="fi-FI" sz="2000" dirty="0"/>
+              <a:t>Kokoelma .</a:t>
+            </a:r>
+            <a:r>
+              <a:rPr lang="fi-FI" sz="2000" dirty="0" err="1"/>
+              <a:t>gitignore</a:t>
+            </a:r>
+            <a:r>
+              <a:rPr lang="fi-FI" sz="2000" dirty="0"/>
+              <a:t>-malleja: </a:t>
+            </a:r>
+            <a:r>
+              <a:rPr lang="fi-FI" sz="2000" dirty="0">
+                <a:hlinkClick r:id="rId3"/>
+              </a:rPr>
+              <a:t>https://github.com/github/gitignore</a:t>
+            </a:r>
+            <a:endParaRPr lang="fi-FI" sz="2000" dirty="0"/>
+          </a:p>
+        </p:txBody>
+      </p:sp>
+      <p:sp>
+        <p:nvSpPr>
+          <p:cNvPr id="4" name="Alatunnisteen paikkamerkki 3">
+            <a:extLst>
+              <a:ext uri="{FF2B5EF4-FFF2-40B4-BE49-F238E27FC236}">
+                <a16:creationId xmlns:a16="http://schemas.microsoft.com/office/drawing/2014/main" id="{4AB9EB3A-A16B-4531-8975-06E80423883E}"/>
+              </a:ext>
+            </a:extLst>
+          </p:cNvPr>
+          <p:cNvSpPr>
+            <a:spLocks noGrp="1"/>
+          </p:cNvSpPr>
+          <p:nvPr>
+            <p:ph type="ftr" sz="quarter" idx="10"/>
+          </p:nvPr>
+        </p:nvSpPr>
+        <p:spPr/>
+        <p:txBody>
+          <a:bodyPr/>
+          <a:lstStyle/>
+          <a:p>
+            <a:pPr>
+              <a:defRPr/>
+            </a:pPr>
+            <a:endParaRPr lang="fi-FI" dirty="0"/>
+          </a:p>
+        </p:txBody>
+      </p:sp>
+    </p:spTree>
+    <p:extLst>
+      <p:ext uri="{BB962C8B-B14F-4D97-AF65-F5344CB8AC3E}">
+        <p14:creationId xmlns:p14="http://schemas.microsoft.com/office/powerpoint/2010/main" val="177298977"/>
+      </p:ext>
+    </p:extLst>
+  </p:cSld>
+  <p:clrMapOvr>
+    <a:masterClrMapping/>
+  </p:clrMapOvr>
+</p:sld>
+</file>
+
+<file path=ppt/slides/slide36.xml><?xml version="1.0" encoding="utf-8"?>
 <p:sld xmlns:a="http://schemas.openxmlformats.org/drawingml/2006/main" xmlns:r="http://schemas.openxmlformats.org/officeDocument/2006/relationships" xmlns:p="http://schemas.openxmlformats.org/presentationml/2006/main">
   <p:cSld>
     <p:spTree>
@@ -13638,6 +13835,15 @@
 
 <file path=customXml/item1.xml><?xml version="1.0" encoding="utf-8"?>
 <?mso-contentType ?>
+<FormTemplates xmlns="http://schemas.microsoft.com/sharepoint/v3/contenttype/forms">
+  <Display>DocumentLibraryForm</Display>
+  <Edit>DocumentLibraryForm</Edit>
+  <New>DocumentLibraryForm</New>
+</FormTemplates>
+</file>
+
+<file path=customXml/item2.xml><?xml version="1.0" encoding="utf-8"?>
+<?mso-contentType ?>
 <spe:Receivers xmlns:spe="http://schemas.microsoft.com/sharepoint/events">
   <Receiver>
     <Name>Document ID Generator</Name>
@@ -13682,28 +13888,7 @@
 </spe:Receivers>
 </file>
 
-<file path=customXml/item2.xml><?xml version="1.0" encoding="utf-8"?>
-<?mso-contentType ?>
-<FormTemplates xmlns="http://schemas.microsoft.com/sharepoint/v3/contenttype/forms">
-  <Display>DocumentLibraryForm</Display>
-  <Edit>DocumentLibraryForm</Edit>
-  <New>DocumentLibraryForm</New>
-</FormTemplates>
-</file>
-
 <file path=customXml/item3.xml><?xml version="1.0" encoding="utf-8"?>
-<p:properties xmlns:p="http://schemas.microsoft.com/office/2006/metadata/properties" xmlns:xsi="http://www.w3.org/2001/XMLSchema-instance">
-  <documentManagement>
-    <_dlc_DocId xmlns="bcbf1d70-0686-4af9-897b-e669bf036024">SAVONIA-1148-15</_dlc_DocId>
-    <_dlc_DocIdUrl xmlns="bcbf1d70-0686-4af9-897b-e669bf036024">
-      <Url>https://santra.savonia.fi/tukipalvelut/viestinta/visuaalinen-ilme/_layouts/DocIdRedir.aspx?ID=SAVONIA-1148-15</Url>
-      <Description>SAVONIA-1148-15</Description>
-    </_dlc_DocIdUrl>
-  </documentManagement>
-</p:properties>
-</file>
-
-<file path=customXml/item4.xml><?xml version="1.0" encoding="utf-8"?>
 <ct:contentTypeSchema xmlns:ct="http://schemas.microsoft.com/office/2006/metadata/contentType" xmlns:ma="http://schemas.microsoft.com/office/2006/metadata/properties/metaAttributes" ct:_="" ma:_="" ma:contentTypeName="Asiakirja" ma:contentTypeID="0x0101005EF59F2EF8E9544DBE624127AC1EF6F5" ma:contentTypeVersion="4" ma:contentTypeDescription="Luo uusi asiakirja." ma:contentTypeScope="" ma:versionID="6f36e9b651c0d1813e2a776836ff05c9">
   <xsd:schema xmlns:xsd="http://www.w3.org/2001/XMLSchema" xmlns:xs="http://www.w3.org/2001/XMLSchema" xmlns:p="http://schemas.microsoft.com/office/2006/metadata/properties" xmlns:ns2="bcbf1d70-0686-4af9-897b-e669bf036024" targetNamespace="http://schemas.microsoft.com/office/2006/metadata/properties" ma:root="true" ma:fieldsID="e29bd19961912ca0431e39b2278e6297" ns2:_="">
     <xsd:import namespace="bcbf1d70-0686-4af9-897b-e669bf036024"/>
@@ -13848,7 +14033,27 @@
 </ct:contentTypeSchema>
 </file>
 
+<file path=customXml/item4.xml><?xml version="1.0" encoding="utf-8"?>
+<p:properties xmlns:p="http://schemas.microsoft.com/office/2006/metadata/properties" xmlns:xsi="http://www.w3.org/2001/XMLSchema-instance">
+  <documentManagement>
+    <_dlc_DocId xmlns="bcbf1d70-0686-4af9-897b-e669bf036024">SAVONIA-1148-15</_dlc_DocId>
+    <_dlc_DocIdUrl xmlns="bcbf1d70-0686-4af9-897b-e669bf036024">
+      <Url>https://santra.savonia.fi/tukipalvelut/viestinta/visuaalinen-ilme/_layouts/DocIdRedir.aspx?ID=SAVONIA-1148-15</Url>
+      <Description>SAVONIA-1148-15</Description>
+    </_dlc_DocIdUrl>
+  </documentManagement>
+</p:properties>
+</file>
+
 <file path=customXml/itemProps1.xml><?xml version="1.0" encoding="utf-8"?>
+<ds:datastoreItem xmlns:ds="http://schemas.openxmlformats.org/officeDocument/2006/customXml" ds:itemID="{6C3D9C2E-F86A-4B6E-BEBD-901B468DE557}">
+  <ds:schemaRefs>
+    <ds:schemaRef ds:uri="http://schemas.microsoft.com/sharepoint/v3/contenttype/forms"/>
+  </ds:schemaRefs>
+</ds:datastoreItem>
+</file>
+
+<file path=customXml/itemProps2.xml><?xml version="1.0" encoding="utf-8"?>
 <ds:datastoreItem xmlns:ds="http://schemas.openxmlformats.org/officeDocument/2006/customXml" ds:itemID="{D104143F-77D4-42B1-8837-22F1A6D250D0}">
   <ds:schemaRefs>
     <ds:schemaRef ds:uri="http://schemas.microsoft.com/sharepoint/events"/>
@@ -13856,31 +14061,7 @@
 </ds:datastoreItem>
 </file>
 
-<file path=customXml/itemProps2.xml><?xml version="1.0" encoding="utf-8"?>
-<ds:datastoreItem xmlns:ds="http://schemas.openxmlformats.org/officeDocument/2006/customXml" ds:itemID="{6C3D9C2E-F86A-4B6E-BEBD-901B468DE557}">
-  <ds:schemaRefs>
-    <ds:schemaRef ds:uri="http://schemas.microsoft.com/sharepoint/v3/contenttype/forms"/>
-  </ds:schemaRefs>
-</ds:datastoreItem>
-</file>
-
 <file path=customXml/itemProps3.xml><?xml version="1.0" encoding="utf-8"?>
-<ds:datastoreItem xmlns:ds="http://schemas.openxmlformats.org/officeDocument/2006/customXml" ds:itemID="{F82A60BA-D9BF-4B65-8C62-90B75FB47D2A}">
-  <ds:schemaRefs>
-    <ds:schemaRef ds:uri="bcbf1d70-0686-4af9-897b-e669bf036024"/>
-    <ds:schemaRef ds:uri="http://schemas.microsoft.com/office/2006/metadata/properties"/>
-    <ds:schemaRef ds:uri="http://www.w3.org/XML/1998/namespace"/>
-    <ds:schemaRef ds:uri="http://schemas.microsoft.com/office/2006/documentManagement/types"/>
-    <ds:schemaRef ds:uri="http://purl.org/dc/dcmitype/"/>
-    <ds:schemaRef ds:uri="http://schemas.microsoft.com/office/infopath/2007/PartnerControls"/>
-    <ds:schemaRef ds:uri="http://schemas.openxmlformats.org/package/2006/metadata/core-properties"/>
-    <ds:schemaRef ds:uri="http://purl.org/dc/terms/"/>
-    <ds:schemaRef ds:uri="http://purl.org/dc/elements/1.1/"/>
-  </ds:schemaRefs>
-</ds:datastoreItem>
-</file>
-
-<file path=customXml/itemProps4.xml><?xml version="1.0" encoding="utf-8"?>
 <ds:datastoreItem xmlns:ds="http://schemas.openxmlformats.org/officeDocument/2006/customXml" ds:itemID="{79F9801D-99E5-4A84-8FBD-7CE4CB8664C1}">
   <ds:schemaRefs>
     <ds:schemaRef ds:uri="http://schemas.microsoft.com/office/2006/metadata/contentType"/>
@@ -13896,4 +14077,20 @@
     <ds:schemaRef ds:uri="http://schemas.microsoft.com/internal/obd"/>
   </ds:schemaRefs>
 </ds:datastoreItem>
+</file>
+
+<file path=customXml/itemProps4.xml><?xml version="1.0" encoding="utf-8"?>
+<ds:datastoreItem xmlns:ds="http://schemas.openxmlformats.org/officeDocument/2006/customXml" ds:itemID="{F82A60BA-D9BF-4B65-8C62-90B75FB47D2A}">
+  <ds:schemaRefs>
+    <ds:schemaRef ds:uri="bcbf1d70-0686-4af9-897b-e669bf036024"/>
+    <ds:schemaRef ds:uri="http://schemas.microsoft.com/office/2006/metadata/properties"/>
+    <ds:schemaRef ds:uri="http://www.w3.org/XML/1998/namespace"/>
+    <ds:schemaRef ds:uri="http://schemas.microsoft.com/office/2006/documentManagement/types"/>
+    <ds:schemaRef ds:uri="http://purl.org/dc/dcmitype/"/>
+    <ds:schemaRef ds:uri="http://schemas.microsoft.com/office/infopath/2007/PartnerControls"/>
+    <ds:schemaRef ds:uri="http://schemas.openxmlformats.org/package/2006/metadata/core-properties"/>
+    <ds:schemaRef ds:uri="http://purl.org/dc/terms/"/>
+    <ds:schemaRef ds:uri="http://purl.org/dc/elements/1.1/"/>
+  </ds:schemaRefs>
+</ds:datastoreItem>
 </file>
</xml_diff>

<commit_message>
Added info about branches. Added recommendation for workflow.
</commit_message>
<xml_diff>
--- a/versionhallinta.pptx
+++ b/versionhallinta.pptx
@@ -5,7 +5,7 @@
     <p:sldMasterId id="2147483785" r:id="rId5"/>
   </p:sldMasterIdLst>
   <p:notesMasterIdLst>
-    <p:notesMasterId r:id="rId42"/>
+    <p:notesMasterId r:id="rId44"/>
   </p:notesMasterIdLst>
   <p:sldIdLst>
     <p:sldId id="257" r:id="rId6"/>
@@ -20,30 +20,32 @@
     <p:sldId id="292" r:id="rId15"/>
     <p:sldId id="285" r:id="rId16"/>
     <p:sldId id="288" r:id="rId17"/>
-    <p:sldId id="287" r:id="rId18"/>
-    <p:sldId id="302" r:id="rId19"/>
-    <p:sldId id="283" r:id="rId20"/>
-    <p:sldId id="301" r:id="rId21"/>
-    <p:sldId id="271" r:id="rId22"/>
-    <p:sldId id="280" r:id="rId23"/>
-    <p:sldId id="286" r:id="rId24"/>
-    <p:sldId id="281" r:id="rId25"/>
-    <p:sldId id="284" r:id="rId26"/>
-    <p:sldId id="289" r:id="rId27"/>
-    <p:sldId id="291" r:id="rId28"/>
-    <p:sldId id="293" r:id="rId29"/>
-    <p:sldId id="294" r:id="rId30"/>
-    <p:sldId id="295" r:id="rId31"/>
-    <p:sldId id="296" r:id="rId32"/>
-    <p:sldId id="297" r:id="rId33"/>
-    <p:sldId id="298" r:id="rId34"/>
-    <p:sldId id="299" r:id="rId35"/>
-    <p:sldId id="300" r:id="rId36"/>
-    <p:sldId id="303" r:id="rId37"/>
-    <p:sldId id="304" r:id="rId38"/>
-    <p:sldId id="305" r:id="rId39"/>
-    <p:sldId id="306" r:id="rId40"/>
-    <p:sldId id="260" r:id="rId41"/>
+    <p:sldId id="307" r:id="rId18"/>
+    <p:sldId id="287" r:id="rId19"/>
+    <p:sldId id="302" r:id="rId20"/>
+    <p:sldId id="283" r:id="rId21"/>
+    <p:sldId id="301" r:id="rId22"/>
+    <p:sldId id="308" r:id="rId23"/>
+    <p:sldId id="271" r:id="rId24"/>
+    <p:sldId id="280" r:id="rId25"/>
+    <p:sldId id="286" r:id="rId26"/>
+    <p:sldId id="281" r:id="rId27"/>
+    <p:sldId id="284" r:id="rId28"/>
+    <p:sldId id="289" r:id="rId29"/>
+    <p:sldId id="291" r:id="rId30"/>
+    <p:sldId id="293" r:id="rId31"/>
+    <p:sldId id="294" r:id="rId32"/>
+    <p:sldId id="295" r:id="rId33"/>
+    <p:sldId id="296" r:id="rId34"/>
+    <p:sldId id="297" r:id="rId35"/>
+    <p:sldId id="298" r:id="rId36"/>
+    <p:sldId id="299" r:id="rId37"/>
+    <p:sldId id="300" r:id="rId38"/>
+    <p:sldId id="303" r:id="rId39"/>
+    <p:sldId id="304" r:id="rId40"/>
+    <p:sldId id="305" r:id="rId41"/>
+    <p:sldId id="306" r:id="rId42"/>
+    <p:sldId id="260" r:id="rId43"/>
   </p:sldIdLst>
   <p:sldSz cx="9144000" cy="6858000" type="screen4x3"/>
   <p:notesSz cx="6858000" cy="9144000"/>
@@ -509,9 +511,6 @@
       </pc:sldChg>
     </pc:docChg>
   </pc:docChgLst>
-  <pc:docChgLst>
-    <pc:chgData name="Mikko Pääkkönen" userId="738bf089a40c7f08" providerId="LiveId" clId="{7371DB93-0DF9-4B60-9C3A-91FFF4D00BD4}"/>
-  </pc:docChgLst>
 </pc:chgInfo>
 </file>
 
@@ -624,7 +623,7 @@
               <a:pPr>
                 <a:defRPr/>
               </a:pPr>
-              <a:t>9.1.2020</a:t>
+              <a:t>24.8.2020</a:t>
             </a:fld>
             <a:endParaRPr lang="fi-FI"/>
           </a:p>
@@ -1091,69 +1090,10 @@
           <a:bodyPr/>
           <a:lstStyle/>
           <a:p>
-            <a:pPr marL="228600" indent="-228600">
-              <a:buAutoNum type="arabicPeriod"/>
-            </a:pPr>
-            <a:r>
-              <a:rPr lang="fi-FI" dirty="0"/>
-              <a:t>Tehdään </a:t>
-            </a:r>
-            <a:r>
-              <a:rPr lang="fi-FI" dirty="0" err="1"/>
-              <a:t>commit</a:t>
-            </a:r>
-            <a:r>
-              <a:rPr lang="fi-FI" dirty="0"/>
-              <a:t> </a:t>
-            </a:r>
-            <a:r>
-              <a:rPr lang="fi-FI" dirty="0" err="1"/>
-              <a:t>kaille</a:t>
-            </a:r>
-            <a:r>
-              <a:rPr lang="fi-FI" dirty="0"/>
-              <a:t> muutoksille</a:t>
-            </a:r>
-          </a:p>
-          <a:p>
-            <a:pPr marL="228600" indent="-228600">
-              <a:buAutoNum type="arabicPeriod"/>
-            </a:pPr>
-            <a:r>
-              <a:rPr lang="fi-FI" dirty="0" err="1"/>
-              <a:t>Commit</a:t>
-            </a:r>
-            <a:r>
-              <a:rPr lang="fi-FI" dirty="0"/>
-              <a:t> vie muutokset </a:t>
-            </a:r>
-            <a:r>
-              <a:rPr lang="fi-FI" dirty="0" err="1"/>
-              <a:t>workaspace:sta</a:t>
-            </a:r>
-            <a:r>
-              <a:rPr lang="fi-FI" dirty="0"/>
-              <a:t> </a:t>
-            </a:r>
-            <a:r>
-              <a:rPr lang="fi-FI" dirty="0" err="1"/>
-              <a:t>local</a:t>
-            </a:r>
-            <a:r>
-              <a:rPr lang="fi-FI" dirty="0"/>
-              <a:t> </a:t>
-            </a:r>
-            <a:r>
-              <a:rPr lang="fi-FI" dirty="0" err="1"/>
-              <a:t>repository:n</a:t>
-            </a:r>
-            <a:endParaRPr lang="fi-FI" dirty="0"/>
-          </a:p>
-          <a:p>
-            <a:pPr marL="228600" indent="-228600">
-              <a:buAutoNum type="arabicPeriod"/>
-            </a:pPr>
-            <a:endParaRPr lang="fi-FI" dirty="0"/>
+            <a:r>
+              <a:rPr lang="fi-FI" dirty="0"/>
+              <a:t>1. Lisätään kommentti/viesti muutoksista</a:t>
+            </a:r>
           </a:p>
         </p:txBody>
       </p:sp>
@@ -1180,7 +1120,7 @@
               <a:pPr>
                 <a:defRPr/>
               </a:pPr>
-              <a:t>31</a:t>
+              <a:t>32</a:t>
             </a:fld>
             <a:endParaRPr lang="fi-FI"/>
           </a:p>
@@ -1189,7 +1129,7 @@
     </p:spTree>
     <p:extLst>
       <p:ext uri="{BB962C8B-B14F-4D97-AF65-F5344CB8AC3E}">
-        <p14:creationId xmlns:p14="http://schemas.microsoft.com/office/powerpoint/2010/main" val="1315156674"/>
+        <p14:creationId xmlns:p14="http://schemas.microsoft.com/office/powerpoint/2010/main" val="2297972535"/>
       </p:ext>
     </p:extLst>
   </p:cSld>
@@ -1248,15 +1188,23 @@
             </a:pPr>
             <a:r>
               <a:rPr lang="fi-FI" dirty="0"/>
-              <a:t>Huomataan, että </a:t>
+              <a:t>Tehdään </a:t>
             </a:r>
             <a:r>
               <a:rPr lang="fi-FI" dirty="0" err="1"/>
-              <a:t>commit:n</a:t>
-            </a:r>
-            <a:r>
-              <a:rPr lang="fi-FI" dirty="0"/>
-              <a:t> jälkeen muutoksia ei enää ole</a:t>
+              <a:t>commit</a:t>
+            </a:r>
+            <a:r>
+              <a:rPr lang="fi-FI" dirty="0"/>
+              <a:t> </a:t>
+            </a:r>
+            <a:r>
+              <a:rPr lang="fi-FI" dirty="0" err="1"/>
+              <a:t>kaille</a:t>
+            </a:r>
+            <a:r>
+              <a:rPr lang="fi-FI" dirty="0"/>
+              <a:t> muutoksille</a:t>
             </a:r>
           </a:p>
           <a:p>
@@ -1264,12 +1212,16 @@
               <a:buAutoNum type="arabicPeriod"/>
             </a:pPr>
             <a:r>
-              <a:rPr lang="fi-FI" dirty="0"/>
-              <a:t>Tehdään </a:t>
-            </a:r>
-            <a:r>
               <a:rPr lang="fi-FI" dirty="0" err="1"/>
-              <a:t>git</a:t>
+              <a:t>Commit</a:t>
+            </a:r>
+            <a:r>
+              <a:rPr lang="fi-FI" dirty="0"/>
+              <a:t> vie muutokset </a:t>
+            </a:r>
+            <a:r>
+              <a:rPr lang="fi-FI" dirty="0" err="1"/>
+              <a:t>workaspace:sta</a:t>
             </a:r>
             <a:r>
               <a:rPr lang="fi-FI" dirty="0"/>
@@ -1277,7 +1229,15 @@
             </a:r>
             <a:r>
               <a:rPr lang="fi-FI" dirty="0" err="1"/>
-              <a:t>push</a:t>
+              <a:t>local</a:t>
+            </a:r>
+            <a:r>
+              <a:rPr lang="fi-FI" dirty="0"/>
+              <a:t> </a:t>
+            </a:r>
+            <a:r>
+              <a:rPr lang="fi-FI" dirty="0" err="1"/>
+              <a:t>repository:n</a:t>
             </a:r>
             <a:endParaRPr lang="fi-FI" dirty="0"/>
           </a:p>
@@ -1285,34 +1245,7 @@
             <a:pPr marL="228600" indent="-228600">
               <a:buAutoNum type="arabicPeriod"/>
             </a:pPr>
-            <a:r>
-              <a:rPr lang="fi-FI" dirty="0"/>
-              <a:t>Tässä vaiheessa VS </a:t>
-            </a:r>
-            <a:r>
-              <a:rPr lang="fi-FI" dirty="0" err="1"/>
-              <a:t>Code</a:t>
-            </a:r>
-            <a:r>
-              <a:rPr lang="fi-FI" dirty="0"/>
-              <a:t> kysyy mahdollisesti kirjautumista etärepoon, koska </a:t>
-            </a:r>
-            <a:r>
-              <a:rPr lang="fi-FI" dirty="0" err="1"/>
-              <a:t>git</a:t>
-            </a:r>
-            <a:r>
-              <a:rPr lang="fi-FI" dirty="0"/>
-              <a:t> </a:t>
-            </a:r>
-            <a:r>
-              <a:rPr lang="fi-FI" dirty="0" err="1"/>
-              <a:t>push</a:t>
-            </a:r>
-            <a:r>
-              <a:rPr lang="fi-FI" dirty="0"/>
-              <a:t> vaatii kirjoitusoikeudet</a:t>
-            </a:r>
+            <a:endParaRPr lang="fi-FI" dirty="0"/>
           </a:p>
         </p:txBody>
       </p:sp>
@@ -1339,7 +1272,7 @@
               <a:pPr>
                 <a:defRPr/>
               </a:pPr>
-              <a:t>32</a:t>
+              <a:t>33</a:t>
             </a:fld>
             <a:endParaRPr lang="fi-FI"/>
           </a:p>
@@ -1348,7 +1281,7 @@
     </p:spTree>
     <p:extLst>
       <p:ext uri="{BB962C8B-B14F-4D97-AF65-F5344CB8AC3E}">
-        <p14:creationId xmlns:p14="http://schemas.microsoft.com/office/powerpoint/2010/main" val="106562406"/>
+        <p14:creationId xmlns:p14="http://schemas.microsoft.com/office/powerpoint/2010/main" val="1315156674"/>
       </p:ext>
     </p:extLst>
   </p:cSld>
@@ -1402,13 +1335,33 @@
           <a:bodyPr/>
           <a:lstStyle/>
           <a:p>
-            <a:r>
-              <a:rPr lang="fi-FI" dirty="0"/>
-              <a:t>1. </a:t>
+            <a:pPr marL="228600" indent="-228600">
+              <a:buAutoNum type="arabicPeriod"/>
+            </a:pPr>
+            <a:r>
+              <a:rPr lang="fi-FI" dirty="0"/>
+              <a:t>Huomataan, että </a:t>
             </a:r>
             <a:r>
               <a:rPr lang="fi-FI" dirty="0" err="1"/>
-              <a:t>Git</a:t>
+              <a:t>commit:n</a:t>
+            </a:r>
+            <a:r>
+              <a:rPr lang="fi-FI" dirty="0"/>
+              <a:t> jälkeen muutoksia ei enää ole</a:t>
+            </a:r>
+          </a:p>
+          <a:p>
+            <a:pPr marL="228600" indent="-228600">
+              <a:buAutoNum type="arabicPeriod"/>
+            </a:pPr>
+            <a:r>
+              <a:rPr lang="fi-FI" dirty="0"/>
+              <a:t>Tehdään </a:t>
+            </a:r>
+            <a:r>
+              <a:rPr lang="fi-FI" dirty="0" err="1"/>
+              <a:t>git</a:t>
             </a:r>
             <a:r>
               <a:rPr lang="fi-FI" dirty="0"/>
@@ -1416,27 +1369,41 @@
             </a:r>
             <a:r>
               <a:rPr lang="fi-FI" dirty="0" err="1"/>
-              <a:t>push:n</a:t>
-            </a:r>
-            <a:r>
-              <a:rPr lang="fi-FI" dirty="0"/>
-              <a:t> jälkeen voidaan tarkistaa muutokset </a:t>
+              <a:t>push</a:t>
+            </a:r>
+            <a:endParaRPr lang="fi-FI" dirty="0"/>
+          </a:p>
+          <a:p>
+            <a:pPr marL="228600" indent="-228600">
+              <a:buAutoNum type="arabicPeriod"/>
+            </a:pPr>
+            <a:r>
+              <a:rPr lang="fi-FI" dirty="0"/>
+              <a:t>Tässä vaiheessa VS </a:t>
             </a:r>
             <a:r>
               <a:rPr lang="fi-FI" dirty="0" err="1"/>
-              <a:t>etäreposta</a:t>
-            </a:r>
-            <a:r>
-              <a:rPr lang="fi-FI" dirty="0"/>
-              <a:t> (tässä tapauksessa </a:t>
+              <a:t>Code</a:t>
+            </a:r>
+            <a:r>
+              <a:rPr lang="fi-FI" dirty="0"/>
+              <a:t> kysyy mahdollisesti kirjautumista etärepoon, koska </a:t>
             </a:r>
             <a:r>
               <a:rPr lang="fi-FI" dirty="0" err="1"/>
-              <a:t>GitHub:sta</a:t>
-            </a:r>
-            <a:r>
-              <a:rPr lang="fi-FI" dirty="0"/>
-              <a:t>)</a:t>
+              <a:t>git</a:t>
+            </a:r>
+            <a:r>
+              <a:rPr lang="fi-FI" dirty="0"/>
+              <a:t> </a:t>
+            </a:r>
+            <a:r>
+              <a:rPr lang="fi-FI" dirty="0" err="1"/>
+              <a:t>push</a:t>
+            </a:r>
+            <a:r>
+              <a:rPr lang="fi-FI" dirty="0"/>
+              <a:t> vaatii kirjoitusoikeudet</a:t>
             </a:r>
           </a:p>
         </p:txBody>
@@ -1464,7 +1431,132 @@
               <a:pPr>
                 <a:defRPr/>
               </a:pPr>
-              <a:t>33</a:t>
+              <a:t>34</a:t>
+            </a:fld>
+            <a:endParaRPr lang="fi-FI"/>
+          </a:p>
+        </p:txBody>
+      </p:sp>
+    </p:spTree>
+    <p:extLst>
+      <p:ext uri="{BB962C8B-B14F-4D97-AF65-F5344CB8AC3E}">
+        <p14:creationId xmlns:p14="http://schemas.microsoft.com/office/powerpoint/2010/main" val="106562406"/>
+      </p:ext>
+    </p:extLst>
+  </p:cSld>
+  <p:clrMapOvr>
+    <a:masterClrMapping/>
+  </p:clrMapOvr>
+</p:notes>
+</file>
+
+<file path=ppt/notesSlides/notesSlide13.xml><?xml version="1.0" encoding="utf-8"?>
+<p:notes xmlns:a="http://schemas.openxmlformats.org/drawingml/2006/main" xmlns:r="http://schemas.openxmlformats.org/officeDocument/2006/relationships" xmlns:p="http://schemas.openxmlformats.org/presentationml/2006/main">
+  <p:cSld>
+    <p:spTree>
+      <p:nvGrpSpPr>
+        <p:cNvPr id="1" name=""/>
+        <p:cNvGrpSpPr/>
+        <p:nvPr/>
+      </p:nvGrpSpPr>
+      <p:grpSpPr>
+        <a:xfrm>
+          <a:off x="0" y="0"/>
+          <a:ext cx="0" cy="0"/>
+          <a:chOff x="0" y="0"/>
+          <a:chExt cx="0" cy="0"/>
+        </a:xfrm>
+      </p:grpSpPr>
+      <p:sp>
+        <p:nvSpPr>
+          <p:cNvPr id="2" name="Dian kuvan paikkamerkki 1"/>
+          <p:cNvSpPr>
+            <a:spLocks noGrp="1" noRot="1" noChangeAspect="1"/>
+          </p:cNvSpPr>
+          <p:nvPr>
+            <p:ph type="sldImg"/>
+          </p:nvPr>
+        </p:nvSpPr>
+        <p:spPr/>
+      </p:sp>
+      <p:sp>
+        <p:nvSpPr>
+          <p:cNvPr id="3" name="Huomautusten paikkamerkki 2"/>
+          <p:cNvSpPr>
+            <a:spLocks noGrp="1"/>
+          </p:cNvSpPr>
+          <p:nvPr>
+            <p:ph type="body" idx="1"/>
+          </p:nvPr>
+        </p:nvSpPr>
+        <p:spPr/>
+        <p:txBody>
+          <a:bodyPr/>
+          <a:lstStyle/>
+          <a:p>
+            <a:r>
+              <a:rPr lang="fi-FI" dirty="0"/>
+              <a:t>1. </a:t>
+            </a:r>
+            <a:r>
+              <a:rPr lang="fi-FI" dirty="0" err="1"/>
+              <a:t>Git</a:t>
+            </a:r>
+            <a:r>
+              <a:rPr lang="fi-FI" dirty="0"/>
+              <a:t> </a:t>
+            </a:r>
+            <a:r>
+              <a:rPr lang="fi-FI" dirty="0" err="1"/>
+              <a:t>push:n</a:t>
+            </a:r>
+            <a:r>
+              <a:rPr lang="fi-FI" dirty="0"/>
+              <a:t> jälkeen voidaan tarkistaa muutokset </a:t>
+            </a:r>
+            <a:r>
+              <a:rPr lang="fi-FI" dirty="0" err="1"/>
+              <a:t>etäreposta</a:t>
+            </a:r>
+            <a:r>
+              <a:rPr lang="fi-FI" dirty="0"/>
+              <a:t> (tässä tapauksessa </a:t>
+            </a:r>
+            <a:r>
+              <a:rPr lang="fi-FI" dirty="0" err="1"/>
+              <a:t>GitHub:sta</a:t>
+            </a:r>
+            <a:r>
+              <a:rPr lang="fi-FI" dirty="0"/>
+              <a:t>)</a:t>
+            </a:r>
+          </a:p>
+        </p:txBody>
+      </p:sp>
+      <p:sp>
+        <p:nvSpPr>
+          <p:cNvPr id="4" name="Dian numeron paikkamerkki 3"/>
+          <p:cNvSpPr>
+            <a:spLocks noGrp="1"/>
+          </p:cNvSpPr>
+          <p:nvPr>
+            <p:ph type="sldNum" sz="quarter" idx="5"/>
+          </p:nvPr>
+        </p:nvSpPr>
+        <p:spPr/>
+        <p:txBody>
+          <a:bodyPr/>
+          <a:lstStyle/>
+          <a:p>
+            <a:pPr>
+              <a:defRPr/>
+            </a:pPr>
+            <a:fld id="{CA1C0503-F7D4-4341-B6A4-2782FA915E0C}" type="slidenum">
+              <a:rPr lang="fi-FI" smtClean="0"/>
+              <a:pPr>
+                <a:defRPr/>
+              </a:pPr>
+              <a:t>35</a:t>
             </a:fld>
             <a:endParaRPr lang="fi-FI"/>
           </a:p>
@@ -1719,22 +1811,7 @@
           <a:bodyPr/>
           <a:lstStyle/>
           <a:p>
-            <a:pPr marL="228600" indent="-228600">
-              <a:buAutoNum type="arabicPeriod"/>
-            </a:pPr>
-            <a:r>
-              <a:rPr lang="fi-FI" dirty="0"/>
-              <a:t>Luodaan kansio omalle koneelle</a:t>
-            </a:r>
-          </a:p>
-          <a:p>
-            <a:pPr marL="228600" indent="-228600">
-              <a:buAutoNum type="arabicPeriod"/>
-            </a:pPr>
-            <a:r>
-              <a:rPr lang="fi-FI" dirty="0"/>
-              <a:t>Yritetään kloonata etärepoa</a:t>
-            </a:r>
+            <a:endParaRPr lang="fi-FI" dirty="0"/>
           </a:p>
         </p:txBody>
       </p:sp>
@@ -1761,7 +1838,7 @@
               <a:pPr>
                 <a:defRPr/>
               </a:pPr>
-              <a:t>25</a:t>
+              <a:t>18</a:t>
             </a:fld>
             <a:endParaRPr lang="fi-FI"/>
           </a:p>
@@ -1770,7 +1847,7 @@
     </p:spTree>
     <p:extLst>
       <p:ext uri="{BB962C8B-B14F-4D97-AF65-F5344CB8AC3E}">
-        <p14:creationId xmlns:p14="http://schemas.microsoft.com/office/powerpoint/2010/main" val="3028226451"/>
+        <p14:creationId xmlns:p14="http://schemas.microsoft.com/office/powerpoint/2010/main" val="496224726"/>
       </p:ext>
     </p:extLst>
   </p:cSld>
@@ -1829,7 +1906,7 @@
             </a:pPr>
             <a:r>
               <a:rPr lang="fi-FI" dirty="0"/>
-              <a:t>Kloonaus epäonnistui, koska kansio ei ollutkaan tyhjä</a:t>
+              <a:t>Luodaan kansio omalle koneelle</a:t>
             </a:r>
           </a:p>
           <a:p>
@@ -1838,16 +1915,7 @@
             </a:pPr>
             <a:r>
               <a:rPr lang="fi-FI" dirty="0"/>
-              <a:t>Tarkistetaan piilotetut tiedostot ja kansiot</a:t>
-            </a:r>
-          </a:p>
-          <a:p>
-            <a:pPr marL="228600" indent="-228600">
-              <a:buAutoNum type="arabicPeriod"/>
-            </a:pPr>
-            <a:r>
-              <a:rPr lang="fi-FI" dirty="0"/>
-              <a:t>Poistetaan kaikki tiedostot ja kansiot</a:t>
+              <a:t>Yritetään kloonata etärepoa</a:t>
             </a:r>
           </a:p>
         </p:txBody>
@@ -1875,7 +1943,7 @@
               <a:pPr>
                 <a:defRPr/>
               </a:pPr>
-              <a:t>26</a:t>
+              <a:t>27</a:t>
             </a:fld>
             <a:endParaRPr lang="fi-FI"/>
           </a:p>
@@ -1884,7 +1952,7 @@
     </p:spTree>
     <p:extLst>
       <p:ext uri="{BB962C8B-B14F-4D97-AF65-F5344CB8AC3E}">
-        <p14:creationId xmlns:p14="http://schemas.microsoft.com/office/powerpoint/2010/main" val="3911932675"/>
+        <p14:creationId xmlns:p14="http://schemas.microsoft.com/office/powerpoint/2010/main" val="3028226451"/>
       </p:ext>
     </p:extLst>
   </p:cSld>
@@ -1943,7 +2011,7 @@
             </a:pPr>
             <a:r>
               <a:rPr lang="fi-FI" dirty="0"/>
-              <a:t>Kokeillaan kloonausta uudelleen</a:t>
+              <a:t>Kloonaus epäonnistui, koska kansio ei ollutkaan tyhjä</a:t>
             </a:r>
           </a:p>
           <a:p>
@@ -1952,7 +2020,7 @@
             </a:pPr>
             <a:r>
               <a:rPr lang="fi-FI" dirty="0"/>
-              <a:t>Kloonaus onnistuu</a:t>
+              <a:t>Tarkistetaan piilotetut tiedostot ja kansiot</a:t>
             </a:r>
           </a:p>
           <a:p>
@@ -1961,13 +2029,8 @@
             </a:pPr>
             <a:r>
               <a:rPr lang="fi-FI" dirty="0"/>
-              <a:t>Paikallisessa kansiossa on samat tiedostot ja kansiot kuin </a:t>
-            </a:r>
-            <a:r>
-              <a:rPr lang="fi-FI" dirty="0" err="1"/>
-              <a:t>etärepossa</a:t>
-            </a:r>
-            <a:endParaRPr lang="fi-FI" dirty="0"/>
+              <a:t>Poistetaan kaikki tiedostot ja kansiot</a:t>
+            </a:r>
           </a:p>
         </p:txBody>
       </p:sp>
@@ -1994,7 +2057,7 @@
               <a:pPr>
                 <a:defRPr/>
               </a:pPr>
-              <a:t>27</a:t>
+              <a:t>28</a:t>
             </a:fld>
             <a:endParaRPr lang="fi-FI"/>
           </a:p>
@@ -2003,7 +2066,7 @@
     </p:spTree>
     <p:extLst>
       <p:ext uri="{BB962C8B-B14F-4D97-AF65-F5344CB8AC3E}">
-        <p14:creationId xmlns:p14="http://schemas.microsoft.com/office/powerpoint/2010/main" val="810757080"/>
+        <p14:creationId xmlns:p14="http://schemas.microsoft.com/office/powerpoint/2010/main" val="3911932675"/>
       </p:ext>
     </p:extLst>
   </p:cSld>
@@ -2062,13 +2125,8 @@
             </a:pPr>
             <a:r>
               <a:rPr lang="fi-FI" dirty="0"/>
-              <a:t>Avataan kansio VS </a:t>
-            </a:r>
-            <a:r>
-              <a:rPr lang="fi-FI" dirty="0" err="1"/>
-              <a:t>Code:en</a:t>
-            </a:r>
-            <a:endParaRPr lang="fi-FI" dirty="0"/>
+              <a:t>Kokeillaan kloonausta uudelleen</a:t>
+            </a:r>
           </a:p>
           <a:p>
             <a:pPr marL="228600" indent="-228600">
@@ -2076,7 +2134,7 @@
             </a:pPr>
             <a:r>
               <a:rPr lang="fi-FI" dirty="0"/>
-              <a:t>Muokataan tiedostoa</a:t>
+              <a:t>Kloonaus onnistuu</a:t>
             </a:r>
           </a:p>
           <a:p>
@@ -2085,8 +2143,13 @@
             </a:pPr>
             <a:r>
               <a:rPr lang="fi-FI" dirty="0"/>
-              <a:t>Katsotaan SOURCE CONTROL –kohdasta muutokset</a:t>
-            </a:r>
+              <a:t>Paikallisessa kansiossa on samat tiedostot ja kansiot kuin </a:t>
+            </a:r>
+            <a:r>
+              <a:rPr lang="fi-FI" dirty="0" err="1"/>
+              <a:t>etärepossa</a:t>
+            </a:r>
+            <a:endParaRPr lang="fi-FI" dirty="0"/>
           </a:p>
         </p:txBody>
       </p:sp>
@@ -2113,7 +2176,7 @@
               <a:pPr>
                 <a:defRPr/>
               </a:pPr>
-              <a:t>28</a:t>
+              <a:t>29</a:t>
             </a:fld>
             <a:endParaRPr lang="fi-FI"/>
           </a:p>
@@ -2122,7 +2185,7 @@
     </p:spTree>
     <p:extLst>
       <p:ext uri="{BB962C8B-B14F-4D97-AF65-F5344CB8AC3E}">
-        <p14:creationId xmlns:p14="http://schemas.microsoft.com/office/powerpoint/2010/main" val="420664902"/>
+        <p14:creationId xmlns:p14="http://schemas.microsoft.com/office/powerpoint/2010/main" val="810757080"/>
       </p:ext>
     </p:extLst>
   </p:cSld>
@@ -2181,8 +2244,13 @@
             </a:pPr>
             <a:r>
               <a:rPr lang="fi-FI" dirty="0"/>
-              <a:t>Muokataan toista tiedostoa ulkopuolisella sovelluksella</a:t>
-            </a:r>
+              <a:t>Avataan kansio VS </a:t>
+            </a:r>
+            <a:r>
+              <a:rPr lang="fi-FI" dirty="0" err="1"/>
+              <a:t>Code:en</a:t>
+            </a:r>
+            <a:endParaRPr lang="fi-FI" dirty="0"/>
           </a:p>
           <a:p>
             <a:pPr marL="228600" indent="-228600">
@@ -2190,15 +2258,16 @@
             </a:pPr>
             <a:r>
               <a:rPr lang="fi-FI" dirty="0"/>
-              <a:t>Katsotaan muutokset VS </a:t>
-            </a:r>
-            <a:r>
-              <a:rPr lang="fi-FI" dirty="0" err="1"/>
-              <a:t>Code:n</a:t>
-            </a:r>
-            <a:r>
-              <a:rPr lang="fi-FI" dirty="0"/>
-              <a:t> SOURCE CONTROL -kohdasta</a:t>
+              <a:t>Muokataan tiedostoa</a:t>
+            </a:r>
+          </a:p>
+          <a:p>
+            <a:pPr marL="228600" indent="-228600">
+              <a:buAutoNum type="arabicPeriod"/>
+            </a:pPr>
+            <a:r>
+              <a:rPr lang="fi-FI" dirty="0"/>
+              <a:t>Katsotaan SOURCE CONTROL –kohdasta muutokset</a:t>
             </a:r>
           </a:p>
         </p:txBody>
@@ -2226,7 +2295,7 @@
               <a:pPr>
                 <a:defRPr/>
               </a:pPr>
-              <a:t>29</a:t>
+              <a:t>30</a:t>
             </a:fld>
             <a:endParaRPr lang="fi-FI"/>
           </a:p>
@@ -2235,7 +2304,7 @@
     </p:spTree>
     <p:extLst>
       <p:ext uri="{BB962C8B-B14F-4D97-AF65-F5344CB8AC3E}">
-        <p14:creationId xmlns:p14="http://schemas.microsoft.com/office/powerpoint/2010/main" val="1757264773"/>
+        <p14:creationId xmlns:p14="http://schemas.microsoft.com/office/powerpoint/2010/main" val="420664902"/>
       </p:ext>
     </p:extLst>
   </p:cSld>
@@ -2289,9 +2358,29 @@
           <a:bodyPr/>
           <a:lstStyle/>
           <a:p>
-            <a:r>
-              <a:rPr lang="fi-FI" dirty="0"/>
-              <a:t>1. Lisätään kommentti/viesti muutoksista</a:t>
+            <a:pPr marL="228600" indent="-228600">
+              <a:buAutoNum type="arabicPeriod"/>
+            </a:pPr>
+            <a:r>
+              <a:rPr lang="fi-FI" dirty="0"/>
+              <a:t>Muokataan toista tiedostoa ulkopuolisella sovelluksella</a:t>
+            </a:r>
+          </a:p>
+          <a:p>
+            <a:pPr marL="228600" indent="-228600">
+              <a:buAutoNum type="arabicPeriod"/>
+            </a:pPr>
+            <a:r>
+              <a:rPr lang="fi-FI" dirty="0"/>
+              <a:t>Katsotaan muutokset VS </a:t>
+            </a:r>
+            <a:r>
+              <a:rPr lang="fi-FI" dirty="0" err="1"/>
+              <a:t>Code:n</a:t>
+            </a:r>
+            <a:r>
+              <a:rPr lang="fi-FI" dirty="0"/>
+              <a:t> SOURCE CONTROL -kohdasta</a:t>
             </a:r>
           </a:p>
         </p:txBody>
@@ -2319,7 +2408,7 @@
               <a:pPr>
                 <a:defRPr/>
               </a:pPr>
-              <a:t>30</a:t>
+              <a:t>31</a:t>
             </a:fld>
             <a:endParaRPr lang="fi-FI"/>
           </a:p>
@@ -2328,7 +2417,7 @@
     </p:spTree>
     <p:extLst>
       <p:ext uri="{BB962C8B-B14F-4D97-AF65-F5344CB8AC3E}">
-        <p14:creationId xmlns:p14="http://schemas.microsoft.com/office/powerpoint/2010/main" val="2297972535"/>
+        <p14:creationId xmlns:p14="http://schemas.microsoft.com/office/powerpoint/2010/main" val="1757264773"/>
       </p:ext>
     </p:extLst>
   </p:cSld>
@@ -6743,7 +6832,7 @@
           <a:p>
             <a:r>
               <a:rPr lang="fi-FI" dirty="0"/>
-              <a:t>Mikko Pääkkönen 2019</a:t>
+              <a:t>Mikko Pääkkönen 2020</a:t>
             </a:r>
           </a:p>
         </p:txBody>
@@ -7134,10 +7223,18 @@
             <a:pPr lvl="1"/>
             <a:r>
               <a:rPr lang="fi-FI" sz="2000" dirty="0"/>
-              <a:t>Projektissa on päähaara (oletusnimellä: </a:t>
-            </a:r>
-            <a:r>
-              <a:rPr lang="fi-FI" sz="2000" dirty="0" err="1"/>
+              <a:t>Projektissa on päähaara (useasti oletusnimellä: </a:t>
+            </a:r>
+            <a:r>
+              <a:rPr lang="fi-FI" sz="2000" i="1" dirty="0"/>
+              <a:t>main</a:t>
+            </a:r>
+            <a:r>
+              <a:rPr lang="fi-FI" sz="2000" dirty="0"/>
+              <a:t> tai </a:t>
+            </a:r>
+            <a:r>
+              <a:rPr lang="fi-FI" sz="2000" i="1" dirty="0" err="1"/>
               <a:t>master</a:t>
             </a:r>
             <a:r>
@@ -7449,15 +7546,7 @@
             </a:r>
             <a:r>
               <a:rPr lang="fi-FI" sz="2000" i="1" dirty="0"/>
-              <a:t> </a:t>
-            </a:r>
-            <a:r>
-              <a:rPr lang="fi-FI" sz="2000" i="1" dirty="0" err="1"/>
-              <a:t>master</a:t>
-            </a:r>
-            <a:r>
-              <a:rPr lang="fi-FI" sz="2000" i="1" dirty="0"/>
-              <a:t>, </a:t>
+              <a:t> main, </a:t>
             </a:r>
             <a:r>
               <a:rPr lang="fi-FI" sz="2000" dirty="0"/>
@@ -7651,6 +7740,214 @@
           <a:p>
             <a:r>
               <a:rPr lang="fi-FI" dirty="0" err="1"/>
+              <a:t>About</a:t>
+            </a:r>
+            <a:r>
+              <a:rPr lang="fi-FI" dirty="0"/>
+              <a:t> </a:t>
+            </a:r>
+            <a:r>
+              <a:rPr lang="fi-FI" dirty="0" err="1"/>
+              <a:t>Branch</a:t>
+            </a:r>
+            <a:endParaRPr lang="fi-FI" dirty="0"/>
+          </a:p>
+        </p:txBody>
+      </p:sp>
+      <p:sp>
+        <p:nvSpPr>
+          <p:cNvPr id="3" name="Sisällön paikkamerkki 2">
+            <a:extLst>
+              <a:ext uri="{FF2B5EF4-FFF2-40B4-BE49-F238E27FC236}">
+                <a16:creationId xmlns:a16="http://schemas.microsoft.com/office/drawing/2014/main" id="{80F09F31-0F4A-402B-9DEA-4943ABCD730A}"/>
+              </a:ext>
+            </a:extLst>
+          </p:cNvPr>
+          <p:cNvSpPr>
+            <a:spLocks noGrp="1"/>
+          </p:cNvSpPr>
+          <p:nvPr>
+            <p:ph idx="1"/>
+          </p:nvPr>
+        </p:nvSpPr>
+        <p:spPr/>
+        <p:txBody>
+          <a:bodyPr/>
+          <a:lstStyle/>
+          <a:p>
+            <a:r>
+              <a:rPr lang="fi-FI" sz="2400" dirty="0"/>
+              <a:t>Haara (</a:t>
+            </a:r>
+            <a:r>
+              <a:rPr lang="fi-FI" sz="2400" dirty="0" err="1"/>
+              <a:t>branch</a:t>
+            </a:r>
+            <a:r>
+              <a:rPr lang="fi-FI" sz="2400" dirty="0"/>
+              <a:t>) on kopio toisesta haarasta (tiedostoista)</a:t>
+            </a:r>
+          </a:p>
+          <a:p>
+            <a:r>
+              <a:rPr lang="fi-FI" sz="2400" dirty="0"/>
+              <a:t>On itsenäinen ja ei vaikuta muiden haarojen toimintaan</a:t>
+            </a:r>
+          </a:p>
+          <a:p>
+            <a:r>
+              <a:rPr lang="fi-FI" sz="2400" dirty="0"/>
+              <a:t>Haarojen vaihtaminen kehitysympäristössä aiheuttaa:</a:t>
+            </a:r>
+          </a:p>
+          <a:p>
+            <a:pPr lvl="1"/>
+            <a:r>
+              <a:rPr lang="fi-FI" sz="2000" dirty="0"/>
+              <a:t>tiedostojen muuttumisen!</a:t>
+            </a:r>
+          </a:p>
+          <a:p>
+            <a:pPr lvl="1"/>
+            <a:r>
+              <a:rPr lang="fi-FI" sz="2000" dirty="0"/>
+              <a:t>kansiossa olevat tiedostot korvataan uuden haaran tilanteella (tiedostoilla)</a:t>
+            </a:r>
+          </a:p>
+          <a:p>
+            <a:pPr lvl="1"/>
+            <a:endParaRPr lang="fi-FI" dirty="0"/>
+          </a:p>
+        </p:txBody>
+      </p:sp>
+      <p:sp>
+        <p:nvSpPr>
+          <p:cNvPr id="4" name="Alatunnisteen paikkamerkki 3">
+            <a:extLst>
+              <a:ext uri="{FF2B5EF4-FFF2-40B4-BE49-F238E27FC236}">
+                <a16:creationId xmlns:a16="http://schemas.microsoft.com/office/drawing/2014/main" id="{4AB9EB3A-A16B-4531-8975-06E80423883E}"/>
+              </a:ext>
+            </a:extLst>
+          </p:cNvPr>
+          <p:cNvSpPr>
+            <a:spLocks noGrp="1"/>
+          </p:cNvSpPr>
+          <p:nvPr>
+            <p:ph type="ftr" sz="quarter" idx="10"/>
+          </p:nvPr>
+        </p:nvSpPr>
+        <p:spPr/>
+        <p:txBody>
+          <a:bodyPr/>
+          <a:lstStyle/>
+          <a:p>
+            <a:pPr>
+              <a:defRPr/>
+            </a:pPr>
+            <a:endParaRPr lang="fi-FI" dirty="0"/>
+          </a:p>
+        </p:txBody>
+      </p:sp>
+      <p:pic>
+        <p:nvPicPr>
+          <p:cNvPr id="5" name="Picture 2" descr="https://git-scm.com/images/logos/2color-lightbg@2x.png">
+            <a:extLst>
+              <a:ext uri="{FF2B5EF4-FFF2-40B4-BE49-F238E27FC236}">
+                <a16:creationId xmlns:a16="http://schemas.microsoft.com/office/drawing/2014/main" id="{04C78133-18E0-463B-8C83-4606FC2527B7}"/>
+              </a:ext>
+            </a:extLst>
+          </p:cNvPr>
+          <p:cNvPicPr>
+            <a:picLocks noChangeAspect="1" noChangeArrowheads="1"/>
+          </p:cNvPicPr>
+          <p:nvPr/>
+        </p:nvPicPr>
+        <p:blipFill>
+          <a:blip r:embed="rId2">
+            <a:extLst>
+              <a:ext uri="{28A0092B-C50C-407E-A947-70E740481C1C}">
+                <a14:useLocalDpi xmlns:a14="http://schemas.microsoft.com/office/drawing/2010/main" val="0"/>
+              </a:ext>
+            </a:extLst>
+          </a:blip>
+          <a:srcRect/>
+          <a:stretch>
+            <a:fillRect/>
+          </a:stretch>
+        </p:blipFill>
+        <p:spPr bwMode="auto">
+          <a:xfrm>
+            <a:off x="5940152" y="188640"/>
+            <a:ext cx="2592288" cy="881731"/>
+          </a:xfrm>
+          <a:prstGeom prst="rect">
+            <a:avLst/>
+          </a:prstGeom>
+          <a:noFill/>
+          <a:extLst>
+            <a:ext uri="{909E8E84-426E-40DD-AFC4-6F175D3DCCD1}">
+              <a14:hiddenFill xmlns:a14="http://schemas.microsoft.com/office/drawing/2010/main">
+                <a:solidFill>
+                  <a:srgbClr val="FFFFFF"/>
+                </a:solidFill>
+              </a14:hiddenFill>
+            </a:ext>
+          </a:extLst>
+        </p:spPr>
+      </p:pic>
+    </p:spTree>
+    <p:extLst>
+      <p:ext uri="{BB962C8B-B14F-4D97-AF65-F5344CB8AC3E}">
+        <p14:creationId xmlns:p14="http://schemas.microsoft.com/office/powerpoint/2010/main" val="1388597705"/>
+      </p:ext>
+    </p:extLst>
+  </p:cSld>
+  <p:clrMapOvr>
+    <a:masterClrMapping/>
+  </p:clrMapOvr>
+</p:sld>
+</file>
+
+<file path=ppt/slides/slide14.xml><?xml version="1.0" encoding="utf-8"?>
+<p:sld xmlns:a="http://schemas.openxmlformats.org/drawingml/2006/main" xmlns:r="http://schemas.openxmlformats.org/officeDocument/2006/relationships" xmlns:p="http://schemas.openxmlformats.org/presentationml/2006/main">
+  <p:cSld>
+    <p:spTree>
+      <p:nvGrpSpPr>
+        <p:cNvPr id="1" name=""/>
+        <p:cNvGrpSpPr/>
+        <p:nvPr/>
+      </p:nvGrpSpPr>
+      <p:grpSpPr>
+        <a:xfrm>
+          <a:off x="0" y="0"/>
+          <a:ext cx="0" cy="0"/>
+          <a:chOff x="0" y="0"/>
+          <a:chExt cx="0" cy="0"/>
+        </a:xfrm>
+      </p:grpSpPr>
+      <p:sp>
+        <p:nvSpPr>
+          <p:cNvPr id="2" name="Otsikko 1">
+            <a:extLst>
+              <a:ext uri="{FF2B5EF4-FFF2-40B4-BE49-F238E27FC236}">
+                <a16:creationId xmlns:a16="http://schemas.microsoft.com/office/drawing/2014/main" id="{094DB930-2672-49D9-A543-781948FEFDBB}"/>
+              </a:ext>
+            </a:extLst>
+          </p:cNvPr>
+          <p:cNvSpPr>
+            <a:spLocks noGrp="1"/>
+          </p:cNvSpPr>
+          <p:nvPr>
+            <p:ph type="title"/>
+          </p:nvPr>
+        </p:nvSpPr>
+        <p:spPr/>
+        <p:txBody>
+          <a:bodyPr/>
+          <a:lstStyle/>
+          <a:p>
+            <a:r>
+              <a:rPr lang="fi-FI" dirty="0" err="1"/>
               <a:t>Git</a:t>
             </a:r>
             <a:r>
@@ -7854,7 +8151,7 @@
 </p:sld>
 </file>
 
-<file path=ppt/slides/slide14.xml><?xml version="1.0" encoding="utf-8"?>
+<file path=ppt/slides/slide15.xml><?xml version="1.0" encoding="utf-8"?>
 <p:sld xmlns:a="http://schemas.openxmlformats.org/drawingml/2006/main" xmlns:r="http://schemas.openxmlformats.org/officeDocument/2006/relationships" xmlns:p="http://schemas.openxmlformats.org/presentationml/2006/main">
   <p:cSld>
     <p:spTree>
@@ -7989,15 +8286,7 @@
             </a:r>
             <a:r>
               <a:rPr lang="fi-FI" sz="2400" dirty="0"/>
-              <a:t> päähaaraan (</a:t>
-            </a:r>
-            <a:r>
-              <a:rPr lang="fi-FI" sz="2400" dirty="0" err="1"/>
-              <a:t>master</a:t>
-            </a:r>
-            <a:r>
-              <a:rPr lang="fi-FI" sz="2400" dirty="0"/>
-              <a:t>) osaksi tuotosta.</a:t>
+              <a:t> päähaaraan osaksi tuotosta.</a:t>
             </a:r>
             <a:endParaRPr lang="fi-FI" i="1" dirty="0"/>
           </a:p>
@@ -8132,7 +8421,7 @@
 </p:sld>
 </file>
 
-<file path=ppt/slides/slide15.xml><?xml version="1.0" encoding="utf-8"?>
+<file path=ppt/slides/slide16.xml><?xml version="1.0" encoding="utf-8"?>
 <p:sld xmlns:a="http://schemas.openxmlformats.org/drawingml/2006/main" xmlns:r="http://schemas.openxmlformats.org/officeDocument/2006/relationships" xmlns:p="http://schemas.openxmlformats.org/presentationml/2006/main">
   <p:cSld>
     <p:spTree>
@@ -8181,7 +8470,7 @@
             </a:r>
             <a:r>
               <a:rPr lang="fi-FI" dirty="0"/>
-              <a:t>-työnkulku 1/2</a:t>
+              <a:t>-työnkulku 1/3</a:t>
             </a:r>
           </a:p>
         </p:txBody>
@@ -8513,7 +8802,7 @@
 </p:sld>
 </file>
 
-<file path=ppt/slides/slide16.xml><?xml version="1.0" encoding="utf-8"?>
+<file path=ppt/slides/slide17.xml><?xml version="1.0" encoding="utf-8"?>
 <p:sld xmlns:a="http://schemas.openxmlformats.org/drawingml/2006/main" xmlns:r="http://schemas.openxmlformats.org/officeDocument/2006/relationships" xmlns:p="http://schemas.openxmlformats.org/presentationml/2006/main">
   <p:cSld>
     <p:spTree>
@@ -8562,7 +8851,7 @@
             </a:r>
             <a:r>
               <a:rPr lang="fi-FI" dirty="0"/>
-              <a:t>-työnkulku 2/2</a:t>
+              <a:t>-työnkulku 2/3</a:t>
             </a:r>
           </a:p>
         </p:txBody>
@@ -8822,58 +9111,6 @@
 </p:sld>
 </file>
 
-<file path=ppt/slides/slide17.xml><?xml version="1.0" encoding="utf-8"?>
-<p:sld xmlns:a="http://schemas.openxmlformats.org/drawingml/2006/main" xmlns:r="http://schemas.openxmlformats.org/officeDocument/2006/relationships" xmlns:p="http://schemas.openxmlformats.org/presentationml/2006/main">
-  <p:cSld>
-    <p:spTree>
-      <p:nvGrpSpPr>
-        <p:cNvPr id="1" name=""/>
-        <p:cNvGrpSpPr/>
-        <p:nvPr/>
-      </p:nvGrpSpPr>
-      <p:grpSpPr>
-        <a:xfrm>
-          <a:off x="0" y="0"/>
-          <a:ext cx="0" cy="0"/>
-          <a:chOff x="0" y="0"/>
-          <a:chExt cx="0" cy="0"/>
-        </a:xfrm>
-      </p:grpSpPr>
-      <p:sp>
-        <p:nvSpPr>
-          <p:cNvPr id="2" name="Otsikko 1"/>
-          <p:cNvSpPr>
-            <a:spLocks noGrp="1"/>
-          </p:cNvSpPr>
-          <p:nvPr>
-            <p:ph type="title"/>
-          </p:nvPr>
-        </p:nvSpPr>
-        <p:spPr/>
-        <p:txBody>
-          <a:bodyPr/>
-          <a:lstStyle/>
-          <a:p>
-            <a:r>
-              <a:rPr lang="fi-FI" dirty="0"/>
-              <a:t>Työvälineitä</a:t>
-            </a:r>
-          </a:p>
-        </p:txBody>
-      </p:sp>
-    </p:spTree>
-    <p:extLst>
-      <p:ext uri="{BB962C8B-B14F-4D97-AF65-F5344CB8AC3E}">
-        <p14:creationId xmlns:p14="http://schemas.microsoft.com/office/powerpoint/2010/main" val="1145613939"/>
-      </p:ext>
-    </p:extLst>
-  </p:cSld>
-  <p:clrMapOvr>
-    <a:masterClrMapping/>
-  </p:clrMapOvr>
-</p:sld>
-</file>
-
 <file path=ppt/slides/slide18.xml><?xml version="1.0" encoding="utf-8"?>
 <p:sld xmlns:a="http://schemas.openxmlformats.org/drawingml/2006/main" xmlns:r="http://schemas.openxmlformats.org/officeDocument/2006/relationships" xmlns:p="http://schemas.openxmlformats.org/presentationml/2006/main">
   <p:cSld>
@@ -8913,8 +9150,12 @@
           <a:lstStyle/>
           <a:p>
             <a:r>
-              <a:rPr lang="fi-FI" dirty="0"/>
-              <a:t>Työvälineet (Client)</a:t>
+              <a:rPr lang="fi-FI" dirty="0" err="1"/>
+              <a:t>Git</a:t>
+            </a:r>
+            <a:r>
+              <a:rPr lang="fi-FI" dirty="0"/>
+              <a:t>-työnkulku 3/3</a:t>
             </a:r>
           </a:p>
         </p:txBody>
@@ -8924,7 +9165,7 @@
           <p:cNvPr id="3" name="Sisällön paikkamerkki 2">
             <a:extLst>
               <a:ext uri="{FF2B5EF4-FFF2-40B4-BE49-F238E27FC236}">
-                <a16:creationId xmlns:a16="http://schemas.microsoft.com/office/drawing/2014/main" id="{80F09F31-0F4A-402B-9DEA-4943ABCD730A}"/>
+                <a16:creationId xmlns:a16="http://schemas.microsoft.com/office/drawing/2014/main" id="{265ED1D5-C300-4639-98B8-3C007ED2AD13}"/>
               </a:ext>
             </a:extLst>
           </p:cNvPr>
@@ -8932,7 +9173,7 @@
             <a:spLocks noGrp="1"/>
           </p:cNvSpPr>
           <p:nvPr>
-            <p:ph idx="1"/>
+            <p:ph sz="half" idx="1"/>
           </p:nvPr>
         </p:nvSpPr>
         <p:spPr/>
@@ -8940,114 +9181,181 @@
           <a:bodyPr/>
           <a:lstStyle/>
           <a:p>
-            <a:pPr marL="0" indent="0">
-              <a:buNone/>
-            </a:pPr>
             <a:r>
               <a:rPr lang="fi-FI" dirty="0" err="1"/>
-              <a:t>Versionhallintajärjestemään</a:t>
-            </a:r>
-            <a:r>
-              <a:rPr lang="fi-FI" dirty="0"/>
-              <a:t> ollaan yhteydessä jollakin sovelluksella (</a:t>
+              <a:t>Commit</a:t>
+            </a:r>
+            <a:r>
+              <a:rPr lang="fi-FI" dirty="0"/>
+              <a:t> </a:t>
             </a:r>
             <a:r>
               <a:rPr lang="fi-FI" dirty="0" err="1"/>
-              <a:t>client</a:t>
-            </a:r>
-            <a:r>
-              <a:rPr lang="fi-FI" dirty="0"/>
-              <a:t>)</a:t>
-            </a:r>
-          </a:p>
-          <a:p>
-            <a:r>
-              <a:rPr lang="fi-FI" sz="2400" dirty="0" err="1"/>
-              <a:t>Git</a:t>
-            </a:r>
-            <a:r>
-              <a:rPr lang="fi-FI" sz="2400" dirty="0"/>
-              <a:t>-pohjaisiin järjestelmiin on useita graafisia </a:t>
-            </a:r>
-            <a:r>
-              <a:rPr lang="fi-FI" sz="2400" dirty="0" err="1"/>
-              <a:t>client</a:t>
-            </a:r>
-            <a:r>
-              <a:rPr lang="fi-FI" sz="2400" dirty="0"/>
-              <a:t>-sovelluksia (</a:t>
-            </a:r>
-            <a:r>
-              <a:rPr lang="fi-FI" sz="1800" dirty="0">
-                <a:hlinkClick r:id="rId2"/>
-              </a:rPr>
-              <a:t>https://git-scm.com/downloads/guis</a:t>
-            </a:r>
-            <a:r>
-              <a:rPr lang="fi-FI" sz="2400" dirty="0"/>
-              <a:t>)</a:t>
-            </a:r>
-          </a:p>
-          <a:p>
-            <a:r>
-              <a:rPr lang="fi-FI" sz="2400" dirty="0"/>
-              <a:t>tai </a:t>
-            </a:r>
-            <a:r>
-              <a:rPr lang="fi-FI" sz="2400" dirty="0" err="1"/>
-              <a:t>Command</a:t>
-            </a:r>
-            <a:r>
-              <a:rPr lang="fi-FI" sz="2400" dirty="0"/>
-              <a:t> Line (CMD) –työkalut</a:t>
-            </a:r>
-          </a:p>
-          <a:p>
-            <a:r>
-              <a:rPr lang="fi-FI" sz="2400" dirty="0"/>
-              <a:t>Visual Studiossa on </a:t>
-            </a:r>
-            <a:r>
-              <a:rPr lang="fi-FI" sz="2400" i="1" dirty="0"/>
-              <a:t>Team Explorer</a:t>
-            </a:r>
-            <a:r>
-              <a:rPr lang="fi-FI" sz="2400" dirty="0"/>
-              <a:t>, joka toimii </a:t>
-            </a:r>
-            <a:r>
-              <a:rPr lang="fi-FI" sz="2400" dirty="0" err="1"/>
-              <a:t>clienttina</a:t>
-            </a:r>
-            <a:endParaRPr lang="fi-FI" sz="2400" dirty="0"/>
-          </a:p>
-          <a:p>
-            <a:r>
-              <a:rPr lang="fi-FI" sz="2400" dirty="0"/>
-              <a:t>Visual Studio </a:t>
-            </a:r>
-            <a:r>
-              <a:rPr lang="fi-FI" sz="2400" dirty="0" err="1"/>
-              <a:t>Code</a:t>
-            </a:r>
-            <a:r>
-              <a:rPr lang="fi-FI" sz="2400" dirty="0"/>
-              <a:t> sisältää vakiona työkalut </a:t>
-            </a:r>
-            <a:r>
-              <a:rPr lang="fi-FI" sz="2400" dirty="0" err="1"/>
-              <a:t>Git</a:t>
-            </a:r>
-            <a:r>
-              <a:rPr lang="fi-FI" sz="2400" dirty="0"/>
-              <a:t>-pohjaisten järjestelmien kanssa toimimiseen</a:t>
-            </a:r>
-          </a:p>
+              <a:t>small</a:t>
+            </a:r>
+            <a:r>
+              <a:rPr lang="fi-FI" dirty="0"/>
+              <a:t>, </a:t>
+            </a:r>
+            <a:r>
+              <a:rPr lang="fi-FI" dirty="0" err="1"/>
+              <a:t>commit</a:t>
+            </a:r>
+            <a:r>
+              <a:rPr lang="fi-FI" dirty="0"/>
+              <a:t> </a:t>
+            </a:r>
+            <a:r>
+              <a:rPr lang="fi-FI" dirty="0" err="1"/>
+              <a:t>often</a:t>
+            </a:r>
+            <a:r>
+              <a:rPr lang="fi-FI" dirty="0"/>
+              <a:t>!</a:t>
+            </a:r>
+          </a:p>
+          <a:p>
+            <a:r>
+              <a:rPr lang="fi-FI" dirty="0"/>
+              <a:t>Eli -&gt; </a:t>
+            </a:r>
+            <a:r>
+              <a:rPr lang="fi-FI" b="1" dirty="0" err="1"/>
+              <a:t>kommitoi</a:t>
+            </a:r>
+            <a:r>
+              <a:rPr lang="fi-FI" b="1" dirty="0"/>
+              <a:t> pieniä valmiita kokonaisuuksia ja tee se usein!</a:t>
+            </a:r>
+          </a:p>
+          <a:p>
+            <a:endParaRPr lang="fi-FI" dirty="0"/>
+          </a:p>
+          <a:p>
+            <a:r>
+              <a:rPr lang="fi-FI" dirty="0"/>
+              <a:t>Ja muista </a:t>
+            </a:r>
+            <a:r>
+              <a:rPr lang="fi-FI" dirty="0" err="1"/>
+              <a:t>git</a:t>
+            </a:r>
+            <a:r>
+              <a:rPr lang="fi-FI" dirty="0"/>
+              <a:t> </a:t>
+            </a:r>
+            <a:r>
+              <a:rPr lang="fi-FI" dirty="0" err="1"/>
+              <a:t>push</a:t>
+            </a:r>
+            <a:r>
+              <a:rPr lang="fi-FI" dirty="0"/>
+              <a:t>!</a:t>
+            </a:r>
+          </a:p>
+        </p:txBody>
+      </p:sp>
+      <p:sp>
+        <p:nvSpPr>
+          <p:cNvPr id="7" name="Sisällön paikkamerkki 6">
+            <a:extLst>
+              <a:ext uri="{FF2B5EF4-FFF2-40B4-BE49-F238E27FC236}">
+                <a16:creationId xmlns:a16="http://schemas.microsoft.com/office/drawing/2014/main" id="{7934E515-E32D-4736-93A5-FAD2E19CA546}"/>
+              </a:ext>
+            </a:extLst>
+          </p:cNvPr>
+          <p:cNvSpPr>
+            <a:spLocks noGrp="1"/>
+          </p:cNvSpPr>
+          <p:nvPr>
+            <p:ph sz="half" idx="2"/>
+          </p:nvPr>
+        </p:nvSpPr>
+        <p:spPr/>
+        <p:txBody>
+          <a:bodyPr/>
+          <a:lstStyle/>
           <a:p>
             <a:pPr marL="0" indent="0">
               <a:buNone/>
             </a:pPr>
             <a:endParaRPr lang="fi-FI" dirty="0"/>
+          </a:p>
+          <a:p>
+            <a:pPr marL="0" indent="0">
+              <a:buNone/>
+            </a:pPr>
+            <a:endParaRPr lang="fi-FI" dirty="0"/>
+          </a:p>
+          <a:p>
+            <a:pPr marL="0" indent="0">
+              <a:buNone/>
+            </a:pPr>
+            <a:endParaRPr lang="fi-FI" dirty="0"/>
+          </a:p>
+          <a:p>
+            <a:pPr marL="0" indent="0">
+              <a:buNone/>
+            </a:pPr>
+            <a:endParaRPr lang="fi-FI" dirty="0"/>
+          </a:p>
+          <a:p>
+            <a:pPr marL="0" indent="0">
+              <a:buNone/>
+            </a:pPr>
+            <a:endParaRPr lang="fi-FI" dirty="0"/>
+          </a:p>
+          <a:p>
+            <a:pPr marL="0" indent="0">
+              <a:buNone/>
+            </a:pPr>
+            <a:r>
+              <a:rPr lang="fi-FI" sz="1200" dirty="0"/>
+              <a:t>Kuvan lähde: </a:t>
+            </a:r>
+            <a:r>
+              <a:rPr lang="fi-FI" sz="1200" dirty="0">
+                <a:hlinkClick r:id="rId3"/>
+              </a:rPr>
+              <a:t>https://netavanza.com/post/177510576474/git-commit</a:t>
+            </a:r>
+            <a:endParaRPr lang="fi-FI" sz="1200" dirty="0"/>
+          </a:p>
+          <a:p>
+            <a:pPr marL="0" indent="0">
+              <a:buNone/>
+            </a:pPr>
+            <a:r>
+              <a:rPr lang="fi-FI" sz="1200" dirty="0"/>
+              <a:t>In case of </a:t>
+            </a:r>
+            <a:r>
+              <a:rPr lang="fi-FI" sz="1200" dirty="0" err="1"/>
+              <a:t>fire</a:t>
+            </a:r>
+            <a:r>
+              <a:rPr lang="fi-FI" sz="1200" dirty="0"/>
+              <a:t> -kyltti: Marco </a:t>
+            </a:r>
+            <a:r>
+              <a:rPr lang="fi-FI" sz="1200" dirty="0" err="1"/>
+              <a:t>Leong</a:t>
+            </a:r>
+            <a:r>
+              <a:rPr lang="fi-FI" sz="1200" dirty="0"/>
+              <a:t> (</a:t>
+            </a:r>
+            <a:r>
+              <a:rPr lang="fi-FI" sz="1200" dirty="0">
+                <a:hlinkClick r:id="rId4"/>
+              </a:rPr>
+              <a:t>CC BY-NC 4.0</a:t>
+            </a:r>
+            <a:r>
+              <a:rPr lang="fi-FI" sz="1200" dirty="0"/>
+              <a:t>)</a:t>
+            </a:r>
+            <a:endParaRPr lang="fi-FI" sz="1400" dirty="0"/>
           </a:p>
         </p:txBody>
       </p:sp>
@@ -9075,14 +9383,100 @@
             <a:pPr>
               <a:defRPr/>
             </a:pPr>
-            <a:endParaRPr lang="fi-FI"/>
-          </a:p>
-        </p:txBody>
-      </p:sp>
+            <a:r>
+              <a:rPr lang="fi-FI" dirty="0"/>
+              <a:t> </a:t>
+            </a:r>
+          </a:p>
+        </p:txBody>
+      </p:sp>
+      <p:pic>
+        <p:nvPicPr>
+          <p:cNvPr id="6" name="Picture 2" descr="https://git-scm.com/images/logos/2color-lightbg@2x.png">
+            <a:extLst>
+              <a:ext uri="{FF2B5EF4-FFF2-40B4-BE49-F238E27FC236}">
+                <a16:creationId xmlns:a16="http://schemas.microsoft.com/office/drawing/2014/main" id="{3AB9C826-94D1-47A2-9EB7-634C9567DF35}"/>
+              </a:ext>
+            </a:extLst>
+          </p:cNvPr>
+          <p:cNvPicPr>
+            <a:picLocks noChangeAspect="1" noChangeArrowheads="1"/>
+          </p:cNvPicPr>
+          <p:nvPr/>
+        </p:nvPicPr>
+        <p:blipFill>
+          <a:blip r:embed="rId5">
+            <a:extLst>
+              <a:ext uri="{28A0092B-C50C-407E-A947-70E740481C1C}">
+                <a14:useLocalDpi xmlns:a14="http://schemas.microsoft.com/office/drawing/2010/main" val="0"/>
+              </a:ext>
+            </a:extLst>
+          </a:blip>
+          <a:srcRect/>
+          <a:stretch>
+            <a:fillRect/>
+          </a:stretch>
+        </p:blipFill>
+        <p:spPr bwMode="auto">
+          <a:xfrm>
+            <a:off x="5940152" y="188640"/>
+            <a:ext cx="2592288" cy="881731"/>
+          </a:xfrm>
+          <a:prstGeom prst="rect">
+            <a:avLst/>
+          </a:prstGeom>
+          <a:noFill/>
+          <a:extLst>
+            <a:ext uri="{909E8E84-426E-40DD-AFC4-6F175D3DCCD1}">
+              <a14:hiddenFill xmlns:a14="http://schemas.microsoft.com/office/drawing/2010/main">
+                <a:solidFill>
+                  <a:srgbClr val="FFFFFF"/>
+                </a:solidFill>
+              </a14:hiddenFill>
+            </a:ext>
+          </a:extLst>
+        </p:spPr>
+      </p:pic>
+      <p:pic>
+        <p:nvPicPr>
+          <p:cNvPr id="8" name="Kuva 7">
+            <a:extLst>
+              <a:ext uri="{FF2B5EF4-FFF2-40B4-BE49-F238E27FC236}">
+                <a16:creationId xmlns:a16="http://schemas.microsoft.com/office/drawing/2014/main" id="{70A1A92C-E78E-42D0-ABAE-03A9FEF7161C}"/>
+              </a:ext>
+            </a:extLst>
+          </p:cNvPr>
+          <p:cNvPicPr>
+            <a:picLocks noChangeAspect="1"/>
+          </p:cNvPicPr>
+          <p:nvPr/>
+        </p:nvPicPr>
+        <p:blipFill>
+          <a:blip r:embed="rId6" cstate="screen">
+            <a:extLst>
+              <a:ext uri="{28A0092B-C50C-407E-A947-70E740481C1C}">
+                <a14:useLocalDpi xmlns:a14="http://schemas.microsoft.com/office/drawing/2010/main"/>
+              </a:ext>
+            </a:extLst>
+          </a:blip>
+          <a:stretch>
+            <a:fillRect/>
+          </a:stretch>
+        </p:blipFill>
+        <p:spPr>
+          <a:xfrm>
+            <a:off x="4716016" y="2549179"/>
+            <a:ext cx="3513780" cy="2635336"/>
+          </a:xfrm>
+          <a:prstGeom prst="rect">
+            <a:avLst/>
+          </a:prstGeom>
+        </p:spPr>
+      </p:pic>
     </p:spTree>
     <p:extLst>
       <p:ext uri="{BB962C8B-B14F-4D97-AF65-F5344CB8AC3E}">
-        <p14:creationId xmlns:p14="http://schemas.microsoft.com/office/powerpoint/2010/main" val="4228207482"/>
+        <p14:creationId xmlns:p14="http://schemas.microsoft.com/office/powerpoint/2010/main" val="3794125083"/>
       </p:ext>
     </p:extLst>
   </p:cSld>
@@ -9111,13 +9505,7 @@
       </p:grpSpPr>
       <p:sp>
         <p:nvSpPr>
-          <p:cNvPr id="2" name="Otsikko 1">
-            <a:extLst>
-              <a:ext uri="{FF2B5EF4-FFF2-40B4-BE49-F238E27FC236}">
-                <a16:creationId xmlns:a16="http://schemas.microsoft.com/office/drawing/2014/main" id="{094DB930-2672-49D9-A543-781948FEFDBB}"/>
-              </a:ext>
-            </a:extLst>
-          </p:cNvPr>
+          <p:cNvPr id="2" name="Otsikko 1"/>
           <p:cNvSpPr>
             <a:spLocks noGrp="1"/>
           </p:cNvSpPr>
@@ -9132,137 +9520,15 @@
           <a:p>
             <a:r>
               <a:rPr lang="fi-FI" dirty="0"/>
-              <a:t>Savonian sisäisissä projekteissa</a:t>
-            </a:r>
-          </a:p>
-        </p:txBody>
-      </p:sp>
-      <p:sp>
-        <p:nvSpPr>
-          <p:cNvPr id="3" name="Sisällön paikkamerkki 2">
-            <a:extLst>
-              <a:ext uri="{FF2B5EF4-FFF2-40B4-BE49-F238E27FC236}">
-                <a16:creationId xmlns:a16="http://schemas.microsoft.com/office/drawing/2014/main" id="{80F09F31-0F4A-402B-9DEA-4943ABCD730A}"/>
-              </a:ext>
-            </a:extLst>
-          </p:cNvPr>
-          <p:cNvSpPr>
-            <a:spLocks noGrp="1"/>
-          </p:cNvSpPr>
-          <p:nvPr>
-            <p:ph idx="1"/>
-          </p:nvPr>
-        </p:nvSpPr>
-        <p:spPr/>
-        <p:txBody>
-          <a:bodyPr/>
-          <a:lstStyle/>
-          <a:p>
-            <a:r>
-              <a:rPr lang="fi-FI" dirty="0"/>
-              <a:t>On käytössä Microsoft Team Foundation Server </a:t>
-            </a:r>
-            <a:r>
-              <a:rPr lang="fi-FI" sz="1800" dirty="0"/>
-              <a:t>(</a:t>
-            </a:r>
-            <a:r>
-              <a:rPr lang="fi-FI" sz="1800" dirty="0">
-                <a:hlinkClick r:id="rId2"/>
-              </a:rPr>
-              <a:t>https://visualstudio.microsoft.com/tfs/</a:t>
-            </a:r>
-            <a:r>
-              <a:rPr lang="fi-FI" sz="1800" dirty="0"/>
-              <a:t>)</a:t>
-            </a:r>
-          </a:p>
-          <a:p>
-            <a:pPr lvl="1"/>
-            <a:r>
-              <a:rPr lang="fi-FI" sz="2000" dirty="0"/>
-              <a:t>asennettu omalle palvelimelle ja on omassa ylläpidossa</a:t>
-            </a:r>
-          </a:p>
-          <a:p>
-            <a:pPr lvl="1"/>
-            <a:r>
-              <a:rPr lang="fi-FI" sz="2000" dirty="0"/>
-              <a:t>näkyy vain sisäverkossa</a:t>
-            </a:r>
-          </a:p>
-          <a:p>
-            <a:pPr lvl="1"/>
-            <a:r>
-              <a:rPr lang="fi-FI" sz="2000" dirty="0"/>
-              <a:t>käytetään keskitettyä version hallintaa </a:t>
-            </a:r>
-            <a:r>
-              <a:rPr lang="fi-FI" sz="1800" dirty="0"/>
-              <a:t>(Team Foundation Version Control, TFVC)</a:t>
-            </a:r>
-          </a:p>
-          <a:p>
-            <a:pPr lvl="1"/>
-            <a:r>
-              <a:rPr lang="fi-FI" sz="1800" dirty="0"/>
-              <a:t>Projekteihin pääsyä hallitaan Savonian käyttäjätunnusten avulla</a:t>
-            </a:r>
-          </a:p>
-          <a:p>
-            <a:r>
-              <a:rPr lang="fi-FI" dirty="0"/>
-              <a:t>Pääasiallinen </a:t>
-            </a:r>
-            <a:r>
-              <a:rPr lang="fi-FI" dirty="0" err="1"/>
-              <a:t>client</a:t>
-            </a:r>
-            <a:r>
-              <a:rPr lang="fi-FI" dirty="0"/>
-              <a:t> on Visual Studio ja Team Explorer</a:t>
-            </a:r>
-          </a:p>
-          <a:p>
-            <a:pPr marL="0" indent="0">
-              <a:buNone/>
-            </a:pPr>
-            <a:endParaRPr lang="fi-FI" dirty="0"/>
-          </a:p>
-        </p:txBody>
-      </p:sp>
-      <p:sp>
-        <p:nvSpPr>
-          <p:cNvPr id="4" name="Alatunnisteen paikkamerkki 3">
-            <a:extLst>
-              <a:ext uri="{FF2B5EF4-FFF2-40B4-BE49-F238E27FC236}">
-                <a16:creationId xmlns:a16="http://schemas.microsoft.com/office/drawing/2014/main" id="{4AB9EB3A-A16B-4531-8975-06E80423883E}"/>
-              </a:ext>
-            </a:extLst>
-          </p:cNvPr>
-          <p:cNvSpPr>
-            <a:spLocks noGrp="1"/>
-          </p:cNvSpPr>
-          <p:nvPr>
-            <p:ph type="ftr" sz="quarter" idx="10"/>
-          </p:nvPr>
-        </p:nvSpPr>
-        <p:spPr/>
-        <p:txBody>
-          <a:bodyPr/>
-          <a:lstStyle/>
-          <a:p>
-            <a:pPr>
-              <a:defRPr/>
-            </a:pPr>
-            <a:endParaRPr lang="fi-FI"/>
+              <a:t>Työvälineitä</a:t>
+            </a:r>
           </a:p>
         </p:txBody>
       </p:sp>
     </p:spTree>
     <p:extLst>
       <p:ext uri="{BB962C8B-B14F-4D97-AF65-F5344CB8AC3E}">
-        <p14:creationId xmlns:p14="http://schemas.microsoft.com/office/powerpoint/2010/main" val="3660611479"/>
+        <p14:creationId xmlns:p14="http://schemas.microsoft.com/office/powerpoint/2010/main" val="1145613939"/>
       </p:ext>
     </p:extLst>
   </p:cSld>
@@ -9417,6 +9683,434 @@
       </p:grpSpPr>
       <p:sp>
         <p:nvSpPr>
+          <p:cNvPr id="2" name="Otsikko 1">
+            <a:extLst>
+              <a:ext uri="{FF2B5EF4-FFF2-40B4-BE49-F238E27FC236}">
+                <a16:creationId xmlns:a16="http://schemas.microsoft.com/office/drawing/2014/main" id="{094DB930-2672-49D9-A543-781948FEFDBB}"/>
+              </a:ext>
+            </a:extLst>
+          </p:cNvPr>
+          <p:cNvSpPr>
+            <a:spLocks noGrp="1"/>
+          </p:cNvSpPr>
+          <p:nvPr>
+            <p:ph type="title"/>
+          </p:nvPr>
+        </p:nvSpPr>
+        <p:spPr/>
+        <p:txBody>
+          <a:bodyPr/>
+          <a:lstStyle/>
+          <a:p>
+            <a:r>
+              <a:rPr lang="fi-FI" dirty="0"/>
+              <a:t>Työvälineet (Client)</a:t>
+            </a:r>
+          </a:p>
+        </p:txBody>
+      </p:sp>
+      <p:sp>
+        <p:nvSpPr>
+          <p:cNvPr id="3" name="Sisällön paikkamerkki 2">
+            <a:extLst>
+              <a:ext uri="{FF2B5EF4-FFF2-40B4-BE49-F238E27FC236}">
+                <a16:creationId xmlns:a16="http://schemas.microsoft.com/office/drawing/2014/main" id="{80F09F31-0F4A-402B-9DEA-4943ABCD730A}"/>
+              </a:ext>
+            </a:extLst>
+          </p:cNvPr>
+          <p:cNvSpPr>
+            <a:spLocks noGrp="1"/>
+          </p:cNvSpPr>
+          <p:nvPr>
+            <p:ph idx="1"/>
+          </p:nvPr>
+        </p:nvSpPr>
+        <p:spPr/>
+        <p:txBody>
+          <a:bodyPr/>
+          <a:lstStyle/>
+          <a:p>
+            <a:pPr marL="0" indent="0">
+              <a:buNone/>
+            </a:pPr>
+            <a:r>
+              <a:rPr lang="fi-FI" sz="2400" dirty="0" err="1"/>
+              <a:t>Versionhallintajärjestemään</a:t>
+            </a:r>
+            <a:r>
+              <a:rPr lang="fi-FI" sz="2400" dirty="0"/>
+              <a:t> ollaan yhteydessä jollakin sovelluksella (</a:t>
+            </a:r>
+            <a:r>
+              <a:rPr lang="fi-FI" sz="2400" dirty="0" err="1"/>
+              <a:t>client</a:t>
+            </a:r>
+            <a:r>
+              <a:rPr lang="fi-FI" sz="2400" dirty="0"/>
+              <a:t>)</a:t>
+            </a:r>
+          </a:p>
+          <a:p>
+            <a:r>
+              <a:rPr lang="fi-FI" sz="2000" dirty="0" err="1"/>
+              <a:t>Git</a:t>
+            </a:r>
+            <a:r>
+              <a:rPr lang="fi-FI" sz="2000" dirty="0"/>
+              <a:t>-pohjaisiin järjestelmiin on useita graafisia </a:t>
+            </a:r>
+            <a:r>
+              <a:rPr lang="fi-FI" sz="2000" dirty="0" err="1"/>
+              <a:t>client</a:t>
+            </a:r>
+            <a:r>
+              <a:rPr lang="fi-FI" sz="2000" dirty="0"/>
+              <a:t>-sovelluksia (</a:t>
+            </a:r>
+            <a:r>
+              <a:rPr lang="fi-FI" sz="1600" dirty="0">
+                <a:hlinkClick r:id="rId2"/>
+              </a:rPr>
+              <a:t>https://git-scm.com/downloads/guis</a:t>
+            </a:r>
+            <a:r>
+              <a:rPr lang="fi-FI" sz="2000" dirty="0"/>
+              <a:t>)</a:t>
+            </a:r>
+          </a:p>
+          <a:p>
+            <a:r>
+              <a:rPr lang="fi-FI" sz="2000" dirty="0"/>
+              <a:t>On myös </a:t>
+            </a:r>
+            <a:r>
+              <a:rPr lang="fi-FI" sz="2000" dirty="0" err="1"/>
+              <a:t>Command</a:t>
+            </a:r>
+            <a:r>
+              <a:rPr lang="fi-FI" sz="2000" dirty="0"/>
+              <a:t> Line -työkalut (CLI)</a:t>
+            </a:r>
+          </a:p>
+          <a:p>
+            <a:r>
+              <a:rPr lang="fi-FI" sz="2000" dirty="0"/>
+              <a:t>Visual Studiossa on </a:t>
+            </a:r>
+            <a:r>
+              <a:rPr lang="fi-FI" sz="2000" i="1" dirty="0"/>
+              <a:t>Team Explorer</a:t>
+            </a:r>
+            <a:r>
+              <a:rPr lang="fi-FI" sz="2000" dirty="0"/>
+              <a:t>, joka toimii </a:t>
+            </a:r>
+            <a:r>
+              <a:rPr lang="fi-FI" sz="2000" dirty="0" err="1"/>
+              <a:t>clienttina</a:t>
+            </a:r>
+            <a:endParaRPr lang="fi-FI" sz="2000" dirty="0"/>
+          </a:p>
+          <a:p>
+            <a:r>
+              <a:rPr lang="fi-FI" sz="2000" dirty="0"/>
+              <a:t>Visual Studio </a:t>
+            </a:r>
+            <a:r>
+              <a:rPr lang="fi-FI" sz="2000" dirty="0" err="1"/>
+              <a:t>Code</a:t>
+            </a:r>
+            <a:r>
+              <a:rPr lang="fi-FI" sz="2000" dirty="0"/>
+              <a:t> sisältää vakiona työkalut </a:t>
+            </a:r>
+            <a:r>
+              <a:rPr lang="fi-FI" sz="2000" dirty="0" err="1"/>
+              <a:t>Git</a:t>
+            </a:r>
+            <a:r>
+              <a:rPr lang="fi-FI" sz="2000" dirty="0"/>
+              <a:t>-pohjaisten järjestelmien kanssa toimimiseen</a:t>
+            </a:r>
+          </a:p>
+          <a:p>
+            <a:pPr lvl="1"/>
+            <a:r>
+              <a:rPr lang="fi-FI" sz="2000" dirty="0"/>
+              <a:t>VS </a:t>
+            </a:r>
+            <a:r>
+              <a:rPr lang="fi-FI" sz="2000" dirty="0" err="1"/>
+              <a:t>Code</a:t>
+            </a:r>
+            <a:r>
+              <a:rPr lang="fi-FI" sz="2000" dirty="0"/>
+              <a:t> vaatii, että </a:t>
+            </a:r>
+            <a:r>
+              <a:rPr lang="fi-FI" sz="2000" dirty="0" err="1"/>
+              <a:t>Git</a:t>
+            </a:r>
+            <a:r>
+              <a:rPr lang="fi-FI" sz="2000" dirty="0"/>
+              <a:t> CLI on asennettu koneelle, </a:t>
+            </a:r>
+            <a:r>
+              <a:rPr lang="fi-FI" sz="1600" dirty="0">
+                <a:hlinkClick r:id="rId3"/>
+              </a:rPr>
+              <a:t>https://git-scm.com/book/en/v2/Getting-Started-Installing-Git</a:t>
+            </a:r>
+            <a:endParaRPr lang="fi-FI" sz="2000" dirty="0"/>
+          </a:p>
+          <a:p>
+            <a:pPr marL="0" indent="0">
+              <a:buNone/>
+            </a:pPr>
+            <a:endParaRPr lang="fi-FI" dirty="0"/>
+          </a:p>
+        </p:txBody>
+      </p:sp>
+      <p:sp>
+        <p:nvSpPr>
+          <p:cNvPr id="4" name="Alatunnisteen paikkamerkki 3">
+            <a:extLst>
+              <a:ext uri="{FF2B5EF4-FFF2-40B4-BE49-F238E27FC236}">
+                <a16:creationId xmlns:a16="http://schemas.microsoft.com/office/drawing/2014/main" id="{4AB9EB3A-A16B-4531-8975-06E80423883E}"/>
+              </a:ext>
+            </a:extLst>
+          </p:cNvPr>
+          <p:cNvSpPr>
+            <a:spLocks noGrp="1"/>
+          </p:cNvSpPr>
+          <p:nvPr>
+            <p:ph type="ftr" sz="quarter" idx="10"/>
+          </p:nvPr>
+        </p:nvSpPr>
+        <p:spPr/>
+        <p:txBody>
+          <a:bodyPr/>
+          <a:lstStyle/>
+          <a:p>
+            <a:pPr>
+              <a:defRPr/>
+            </a:pPr>
+            <a:endParaRPr lang="fi-FI"/>
+          </a:p>
+        </p:txBody>
+      </p:sp>
+    </p:spTree>
+    <p:extLst>
+      <p:ext uri="{BB962C8B-B14F-4D97-AF65-F5344CB8AC3E}">
+        <p14:creationId xmlns:p14="http://schemas.microsoft.com/office/powerpoint/2010/main" val="4228207482"/>
+      </p:ext>
+    </p:extLst>
+  </p:cSld>
+  <p:clrMapOvr>
+    <a:masterClrMapping/>
+  </p:clrMapOvr>
+</p:sld>
+</file>
+
+<file path=ppt/slides/slide21.xml><?xml version="1.0" encoding="utf-8"?>
+<p:sld xmlns:a="http://schemas.openxmlformats.org/drawingml/2006/main" xmlns:r="http://schemas.openxmlformats.org/officeDocument/2006/relationships" xmlns:p="http://schemas.openxmlformats.org/presentationml/2006/main">
+  <p:cSld>
+    <p:spTree>
+      <p:nvGrpSpPr>
+        <p:cNvPr id="1" name=""/>
+        <p:cNvGrpSpPr/>
+        <p:nvPr/>
+      </p:nvGrpSpPr>
+      <p:grpSpPr>
+        <a:xfrm>
+          <a:off x="0" y="0"/>
+          <a:ext cx="0" cy="0"/>
+          <a:chOff x="0" y="0"/>
+          <a:chExt cx="0" cy="0"/>
+        </a:xfrm>
+      </p:grpSpPr>
+      <p:sp>
+        <p:nvSpPr>
+          <p:cNvPr id="2" name="Otsikko 1">
+            <a:extLst>
+              <a:ext uri="{FF2B5EF4-FFF2-40B4-BE49-F238E27FC236}">
+                <a16:creationId xmlns:a16="http://schemas.microsoft.com/office/drawing/2014/main" id="{094DB930-2672-49D9-A543-781948FEFDBB}"/>
+              </a:ext>
+            </a:extLst>
+          </p:cNvPr>
+          <p:cNvSpPr>
+            <a:spLocks noGrp="1"/>
+          </p:cNvSpPr>
+          <p:nvPr>
+            <p:ph type="title"/>
+          </p:nvPr>
+        </p:nvSpPr>
+        <p:spPr/>
+        <p:txBody>
+          <a:bodyPr/>
+          <a:lstStyle/>
+          <a:p>
+            <a:r>
+              <a:rPr lang="fi-FI" dirty="0"/>
+              <a:t>Savonian sisäisissä projekteissa</a:t>
+            </a:r>
+          </a:p>
+        </p:txBody>
+      </p:sp>
+      <p:sp>
+        <p:nvSpPr>
+          <p:cNvPr id="3" name="Sisällön paikkamerkki 2">
+            <a:extLst>
+              <a:ext uri="{FF2B5EF4-FFF2-40B4-BE49-F238E27FC236}">
+                <a16:creationId xmlns:a16="http://schemas.microsoft.com/office/drawing/2014/main" id="{80F09F31-0F4A-402B-9DEA-4943ABCD730A}"/>
+              </a:ext>
+            </a:extLst>
+          </p:cNvPr>
+          <p:cNvSpPr>
+            <a:spLocks noGrp="1"/>
+          </p:cNvSpPr>
+          <p:nvPr>
+            <p:ph idx="1"/>
+          </p:nvPr>
+        </p:nvSpPr>
+        <p:spPr/>
+        <p:txBody>
+          <a:bodyPr/>
+          <a:lstStyle/>
+          <a:p>
+            <a:r>
+              <a:rPr lang="fi-FI" dirty="0"/>
+              <a:t>On käytössä Microsoft Team Foundation Server </a:t>
+            </a:r>
+            <a:r>
+              <a:rPr lang="fi-FI" sz="1800" dirty="0"/>
+              <a:t>(</a:t>
+            </a:r>
+            <a:r>
+              <a:rPr lang="fi-FI" sz="1800" dirty="0">
+                <a:hlinkClick r:id="rId2"/>
+              </a:rPr>
+              <a:t>https://visualstudio.microsoft.com/tfs/</a:t>
+            </a:r>
+            <a:r>
+              <a:rPr lang="fi-FI" sz="1800" dirty="0"/>
+              <a:t>)</a:t>
+            </a:r>
+          </a:p>
+          <a:p>
+            <a:pPr lvl="1"/>
+            <a:r>
+              <a:rPr lang="fi-FI" sz="2000" dirty="0"/>
+              <a:t>asennettu omalle palvelimelle ja on omassa ylläpidossa</a:t>
+            </a:r>
+          </a:p>
+          <a:p>
+            <a:pPr lvl="1"/>
+            <a:r>
+              <a:rPr lang="fi-FI" sz="2000" dirty="0"/>
+              <a:t>näkyy vain sisäverkossa</a:t>
+            </a:r>
+          </a:p>
+          <a:p>
+            <a:pPr lvl="1"/>
+            <a:r>
+              <a:rPr lang="fi-FI" sz="2000" dirty="0"/>
+              <a:t>käytetään keskitettyä version hallintaa </a:t>
+            </a:r>
+            <a:r>
+              <a:rPr lang="fi-FI" sz="1800" dirty="0"/>
+              <a:t>(Team Foundation Version Control, TFVC)</a:t>
+            </a:r>
+          </a:p>
+          <a:p>
+            <a:pPr lvl="1"/>
+            <a:r>
+              <a:rPr lang="fi-FI" sz="1800" dirty="0"/>
+              <a:t>Projekteihin pääsyä hallitaan Savonian käyttäjätunnusten avulla</a:t>
+            </a:r>
+          </a:p>
+          <a:p>
+            <a:r>
+              <a:rPr lang="fi-FI" dirty="0"/>
+              <a:t>Pääasiallinen </a:t>
+            </a:r>
+            <a:r>
+              <a:rPr lang="fi-FI" dirty="0" err="1"/>
+              <a:t>client</a:t>
+            </a:r>
+            <a:r>
+              <a:rPr lang="fi-FI" dirty="0"/>
+              <a:t> on Visual Studio ja Team Explorer</a:t>
+            </a:r>
+          </a:p>
+          <a:p>
+            <a:pPr marL="0" indent="0">
+              <a:buNone/>
+            </a:pPr>
+            <a:endParaRPr lang="fi-FI" dirty="0"/>
+          </a:p>
+        </p:txBody>
+      </p:sp>
+      <p:sp>
+        <p:nvSpPr>
+          <p:cNvPr id="4" name="Alatunnisteen paikkamerkki 3">
+            <a:extLst>
+              <a:ext uri="{FF2B5EF4-FFF2-40B4-BE49-F238E27FC236}">
+                <a16:creationId xmlns:a16="http://schemas.microsoft.com/office/drawing/2014/main" id="{4AB9EB3A-A16B-4531-8975-06E80423883E}"/>
+              </a:ext>
+            </a:extLst>
+          </p:cNvPr>
+          <p:cNvSpPr>
+            <a:spLocks noGrp="1"/>
+          </p:cNvSpPr>
+          <p:nvPr>
+            <p:ph type="ftr" sz="quarter" idx="10"/>
+          </p:nvPr>
+        </p:nvSpPr>
+        <p:spPr/>
+        <p:txBody>
+          <a:bodyPr/>
+          <a:lstStyle/>
+          <a:p>
+            <a:pPr>
+              <a:defRPr/>
+            </a:pPr>
+            <a:endParaRPr lang="fi-FI"/>
+          </a:p>
+        </p:txBody>
+      </p:sp>
+    </p:spTree>
+    <p:extLst>
+      <p:ext uri="{BB962C8B-B14F-4D97-AF65-F5344CB8AC3E}">
+        <p14:creationId xmlns:p14="http://schemas.microsoft.com/office/powerpoint/2010/main" val="3660611479"/>
+      </p:ext>
+    </p:extLst>
+  </p:cSld>
+  <p:clrMapOvr>
+    <a:masterClrMapping/>
+  </p:clrMapOvr>
+</p:sld>
+</file>
+
+<file path=ppt/slides/slide22.xml><?xml version="1.0" encoding="utf-8"?>
+<p:sld xmlns:a="http://schemas.openxmlformats.org/drawingml/2006/main" xmlns:r="http://schemas.openxmlformats.org/officeDocument/2006/relationships" xmlns:p="http://schemas.openxmlformats.org/presentationml/2006/main">
+  <p:cSld>
+    <p:spTree>
+      <p:nvGrpSpPr>
+        <p:cNvPr id="1" name=""/>
+        <p:cNvGrpSpPr/>
+        <p:nvPr/>
+      </p:nvGrpSpPr>
+      <p:grpSpPr>
+        <a:xfrm>
+          <a:off x="0" y="0"/>
+          <a:ext cx="0" cy="0"/>
+          <a:chOff x="0" y="0"/>
+          <a:chExt cx="0" cy="0"/>
+        </a:xfrm>
+      </p:grpSpPr>
+      <p:sp>
+        <p:nvSpPr>
           <p:cNvPr id="4" name="Alatunnisteen paikkamerkki 3">
             <a:extLst>
               <a:ext uri="{FF2B5EF4-FFF2-40B4-BE49-F238E27FC236}">
@@ -9516,7 +10210,7 @@
 </p:sld>
 </file>
 
-<file path=ppt/slides/slide21.xml><?xml version="1.0" encoding="utf-8"?>
+<file path=ppt/slides/slide23.xml><?xml version="1.0" encoding="utf-8"?>
 <p:sld xmlns:a="http://schemas.openxmlformats.org/drawingml/2006/main" xmlns:r="http://schemas.openxmlformats.org/officeDocument/2006/relationships" xmlns:p="http://schemas.openxmlformats.org/presentationml/2006/main">
   <p:cSld>
     <p:spTree>
@@ -9728,7 +10422,7 @@
 </p:sld>
 </file>
 
-<file path=ppt/slides/slide22.xml><?xml version="1.0" encoding="utf-8"?>
+<file path=ppt/slides/slide24.xml><?xml version="1.0" encoding="utf-8"?>
 <p:sld xmlns:a="http://schemas.openxmlformats.org/drawingml/2006/main" xmlns:r="http://schemas.openxmlformats.org/officeDocument/2006/relationships" xmlns:p="http://schemas.openxmlformats.org/presentationml/2006/main">
   <p:cSld>
     <p:spTree>
@@ -9938,7 +10632,7 @@
 </p:sld>
 </file>
 
-<file path=ppt/slides/slide23.xml><?xml version="1.0" encoding="utf-8"?>
+<file path=ppt/slides/slide25.xml><?xml version="1.0" encoding="utf-8"?>
 <p:sld xmlns:a="http://schemas.openxmlformats.org/drawingml/2006/main" xmlns:r="http://schemas.openxmlformats.org/officeDocument/2006/relationships" xmlns:p="http://schemas.openxmlformats.org/presentationml/2006/main">
   <p:cSld>
     <p:spTree>
@@ -10057,7 +10751,7 @@
 </p:sld>
 </file>
 
-<file path=ppt/slides/slide24.xml><?xml version="1.0" encoding="utf-8"?>
+<file path=ppt/slides/slide26.xml><?xml version="1.0" encoding="utf-8"?>
 <p:sld xmlns:a="http://schemas.openxmlformats.org/drawingml/2006/main" xmlns:r="http://schemas.openxmlformats.org/officeDocument/2006/relationships" xmlns:p="http://schemas.openxmlformats.org/presentationml/2006/main">
   <p:cSld>
     <p:spTree>
@@ -10256,7 +10950,7 @@
 </p:sld>
 </file>
 
-<file path=ppt/slides/slide25.xml><?xml version="1.0" encoding="utf-8"?>
+<file path=ppt/slides/slide27.xml><?xml version="1.0" encoding="utf-8"?>
 <p:sld xmlns:a="http://schemas.openxmlformats.org/drawingml/2006/main" xmlns:r="http://schemas.openxmlformats.org/officeDocument/2006/relationships" xmlns:p="http://schemas.openxmlformats.org/presentationml/2006/main">
   <p:cSld>
     <p:spTree>
@@ -10361,7 +11055,7 @@
 </p:sld>
 </file>
 
-<file path=ppt/slides/slide26.xml><?xml version="1.0" encoding="utf-8"?>
+<file path=ppt/slides/slide28.xml><?xml version="1.0" encoding="utf-8"?>
 <p:sld xmlns:a="http://schemas.openxmlformats.org/drawingml/2006/main" xmlns:r="http://schemas.openxmlformats.org/officeDocument/2006/relationships" xmlns:p="http://schemas.openxmlformats.org/presentationml/2006/main">
   <p:cSld>
     <p:spTree>
@@ -10490,7 +11184,7 @@
 </p:sld>
 </file>
 
-<file path=ppt/slides/slide27.xml><?xml version="1.0" encoding="utf-8"?>
+<file path=ppt/slides/slide29.xml><?xml version="1.0" encoding="utf-8"?>
 <p:sld xmlns:a="http://schemas.openxmlformats.org/drawingml/2006/main" xmlns:r="http://schemas.openxmlformats.org/officeDocument/2006/relationships" xmlns:p="http://schemas.openxmlformats.org/presentationml/2006/main">
   <p:cSld>
     <p:spTree>
@@ -10603,7 +11297,165 @@
 </p:sld>
 </file>
 
-<file path=ppt/slides/slide28.xml><?xml version="1.0" encoding="utf-8"?>
+<file path=ppt/slides/slide3.xml><?xml version="1.0" encoding="utf-8"?>
+<p:sld xmlns:a="http://schemas.openxmlformats.org/drawingml/2006/main" xmlns:r="http://schemas.openxmlformats.org/officeDocument/2006/relationships" xmlns:p="http://schemas.openxmlformats.org/presentationml/2006/main">
+  <p:cSld>
+    <p:spTree>
+      <p:nvGrpSpPr>
+        <p:cNvPr id="1" name=""/>
+        <p:cNvGrpSpPr/>
+        <p:nvPr/>
+      </p:nvGrpSpPr>
+      <p:grpSpPr>
+        <a:xfrm>
+          <a:off x="0" y="0"/>
+          <a:ext cx="0" cy="0"/>
+          <a:chOff x="0" y="0"/>
+          <a:chExt cx="0" cy="0"/>
+        </a:xfrm>
+      </p:grpSpPr>
+      <p:sp>
+        <p:nvSpPr>
+          <p:cNvPr id="5" name="Otsikko 4"/>
+          <p:cNvSpPr>
+            <a:spLocks noGrp="1"/>
+          </p:cNvSpPr>
+          <p:nvPr>
+            <p:ph type="title"/>
+          </p:nvPr>
+        </p:nvSpPr>
+        <p:spPr/>
+        <p:txBody>
+          <a:bodyPr/>
+          <a:lstStyle/>
+          <a:p>
+            <a:r>
+              <a:rPr lang="fi-FI" dirty="0"/>
+              <a:t>Erilaisia versionhallinnan tyyppejä</a:t>
+            </a:r>
+          </a:p>
+        </p:txBody>
+      </p:sp>
+      <p:sp>
+        <p:nvSpPr>
+          <p:cNvPr id="6" name="Sisällön paikkamerkki 5"/>
+          <p:cNvSpPr>
+            <a:spLocks noGrp="1"/>
+          </p:cNvSpPr>
+          <p:nvPr>
+            <p:ph idx="1"/>
+          </p:nvPr>
+        </p:nvSpPr>
+        <p:spPr/>
+        <p:txBody>
+          <a:bodyPr/>
+          <a:lstStyle/>
+          <a:p>
+            <a:pPr marL="0" indent="0">
+              <a:buNone/>
+            </a:pPr>
+            <a:r>
+              <a:rPr lang="fi-FI" dirty="0"/>
+              <a:t>Versionhallintajärjestelmien (VCS) tyyppejä:</a:t>
+            </a:r>
+          </a:p>
+          <a:p>
+            <a:r>
+              <a:rPr lang="fi-FI" dirty="0"/>
+              <a:t>Paikalliset</a:t>
+            </a:r>
+          </a:p>
+          <a:p>
+            <a:pPr lvl="1"/>
+            <a:r>
+              <a:rPr lang="fi-FI" dirty="0"/>
+              <a:t>Omalla koneella</a:t>
+            </a:r>
+          </a:p>
+          <a:p>
+            <a:r>
+              <a:rPr lang="fi-FI" dirty="0"/>
+              <a:t>Keskitetyt (CVCS)</a:t>
+            </a:r>
+          </a:p>
+          <a:p>
+            <a:pPr lvl="1"/>
+            <a:r>
+              <a:rPr lang="fi-FI" dirty="0"/>
+              <a:t>Keskitetty palvelin </a:t>
+            </a:r>
+            <a:r>
+              <a:rPr lang="fi-FI" sz="1600" dirty="0"/>
+              <a:t>(</a:t>
+            </a:r>
+            <a:r>
+              <a:rPr lang="fi-FI" sz="1600" dirty="0" err="1"/>
+              <a:t>Centralized</a:t>
+            </a:r>
+            <a:r>
+              <a:rPr lang="fi-FI" sz="1600" dirty="0"/>
+              <a:t> Version Control System)</a:t>
+            </a:r>
+            <a:endParaRPr lang="fi-FI" sz="2000" dirty="0"/>
+          </a:p>
+          <a:p>
+            <a:r>
+              <a:rPr lang="fi-FI" dirty="0"/>
+              <a:t>Hajautetut (DVCS)</a:t>
+            </a:r>
+          </a:p>
+          <a:p>
+            <a:pPr lvl="1"/>
+            <a:r>
+              <a:rPr lang="fi-FI" dirty="0"/>
+              <a:t>Tiedostot hajautetusti kaikilla koneilla </a:t>
+            </a:r>
+            <a:r>
+              <a:rPr lang="fi-FI" sz="1600" dirty="0"/>
+              <a:t>(Distributed Version Control System)</a:t>
+            </a:r>
+            <a:endParaRPr lang="fi-FI" dirty="0"/>
+          </a:p>
+          <a:p>
+            <a:pPr lvl="1"/>
+            <a:endParaRPr lang="fi-FI" dirty="0"/>
+          </a:p>
+          <a:p>
+            <a:endParaRPr lang="fi-FI" dirty="0"/>
+          </a:p>
+        </p:txBody>
+      </p:sp>
+      <p:sp>
+        <p:nvSpPr>
+          <p:cNvPr id="3" name="Alatunnisteen paikkamerkki 2"/>
+          <p:cNvSpPr>
+            <a:spLocks noGrp="1"/>
+          </p:cNvSpPr>
+          <p:nvPr>
+            <p:ph type="ftr" sz="quarter" idx="10"/>
+          </p:nvPr>
+        </p:nvSpPr>
+        <p:spPr/>
+        <p:txBody>
+          <a:bodyPr/>
+          <a:lstStyle/>
+          <a:p>
+            <a:pPr>
+              <a:defRPr/>
+            </a:pPr>
+            <a:endParaRPr lang="fi-FI"/>
+          </a:p>
+        </p:txBody>
+      </p:sp>
+    </p:spTree>
+  </p:cSld>
+  <p:clrMapOvr>
+    <a:masterClrMapping/>
+  </p:clrMapOvr>
+</p:sld>
+</file>
+
+<file path=ppt/slides/slide30.xml><?xml version="1.0" encoding="utf-8"?>
 <p:sld xmlns:a="http://schemas.openxmlformats.org/drawingml/2006/main" xmlns:r="http://schemas.openxmlformats.org/officeDocument/2006/relationships" xmlns:p="http://schemas.openxmlformats.org/presentationml/2006/main">
   <p:cSld>
     <p:spTree>
@@ -10724,7 +11576,7 @@
 </p:sld>
 </file>
 
-<file path=ppt/slides/slide29.xml><?xml version="1.0" encoding="utf-8"?>
+<file path=ppt/slides/slide31.xml><?xml version="1.0" encoding="utf-8"?>
 <p:sld xmlns:a="http://schemas.openxmlformats.org/drawingml/2006/main" xmlns:r="http://schemas.openxmlformats.org/officeDocument/2006/relationships" xmlns:p="http://schemas.openxmlformats.org/presentationml/2006/main">
   <p:cSld>
     <p:spTree>
@@ -10837,165 +11689,7 @@
 </p:sld>
 </file>
 
-<file path=ppt/slides/slide3.xml><?xml version="1.0" encoding="utf-8"?>
-<p:sld xmlns:a="http://schemas.openxmlformats.org/drawingml/2006/main" xmlns:r="http://schemas.openxmlformats.org/officeDocument/2006/relationships" xmlns:p="http://schemas.openxmlformats.org/presentationml/2006/main">
-  <p:cSld>
-    <p:spTree>
-      <p:nvGrpSpPr>
-        <p:cNvPr id="1" name=""/>
-        <p:cNvGrpSpPr/>
-        <p:nvPr/>
-      </p:nvGrpSpPr>
-      <p:grpSpPr>
-        <a:xfrm>
-          <a:off x="0" y="0"/>
-          <a:ext cx="0" cy="0"/>
-          <a:chOff x="0" y="0"/>
-          <a:chExt cx="0" cy="0"/>
-        </a:xfrm>
-      </p:grpSpPr>
-      <p:sp>
-        <p:nvSpPr>
-          <p:cNvPr id="5" name="Otsikko 4"/>
-          <p:cNvSpPr>
-            <a:spLocks noGrp="1"/>
-          </p:cNvSpPr>
-          <p:nvPr>
-            <p:ph type="title"/>
-          </p:nvPr>
-        </p:nvSpPr>
-        <p:spPr/>
-        <p:txBody>
-          <a:bodyPr/>
-          <a:lstStyle/>
-          <a:p>
-            <a:r>
-              <a:rPr lang="fi-FI" dirty="0"/>
-              <a:t>Erilaisia versionhallinnan tyyppejä</a:t>
-            </a:r>
-          </a:p>
-        </p:txBody>
-      </p:sp>
-      <p:sp>
-        <p:nvSpPr>
-          <p:cNvPr id="6" name="Sisällön paikkamerkki 5"/>
-          <p:cNvSpPr>
-            <a:spLocks noGrp="1"/>
-          </p:cNvSpPr>
-          <p:nvPr>
-            <p:ph idx="1"/>
-          </p:nvPr>
-        </p:nvSpPr>
-        <p:spPr/>
-        <p:txBody>
-          <a:bodyPr/>
-          <a:lstStyle/>
-          <a:p>
-            <a:pPr marL="0" indent="0">
-              <a:buNone/>
-            </a:pPr>
-            <a:r>
-              <a:rPr lang="fi-FI" dirty="0"/>
-              <a:t>Versionhallintajärjestelmien (VCS) tyyppejä:</a:t>
-            </a:r>
-          </a:p>
-          <a:p>
-            <a:r>
-              <a:rPr lang="fi-FI" dirty="0"/>
-              <a:t>Paikalliset</a:t>
-            </a:r>
-          </a:p>
-          <a:p>
-            <a:pPr lvl="1"/>
-            <a:r>
-              <a:rPr lang="fi-FI" dirty="0"/>
-              <a:t>Omalla koneella</a:t>
-            </a:r>
-          </a:p>
-          <a:p>
-            <a:r>
-              <a:rPr lang="fi-FI" dirty="0"/>
-              <a:t>Keskitetyt (CVCS)</a:t>
-            </a:r>
-          </a:p>
-          <a:p>
-            <a:pPr lvl="1"/>
-            <a:r>
-              <a:rPr lang="fi-FI" dirty="0"/>
-              <a:t>Keskitetty palvelin </a:t>
-            </a:r>
-            <a:r>
-              <a:rPr lang="fi-FI" sz="1600" dirty="0"/>
-              <a:t>(</a:t>
-            </a:r>
-            <a:r>
-              <a:rPr lang="fi-FI" sz="1600" dirty="0" err="1"/>
-              <a:t>Centralized</a:t>
-            </a:r>
-            <a:r>
-              <a:rPr lang="fi-FI" sz="1600" dirty="0"/>
-              <a:t> Version Control System)</a:t>
-            </a:r>
-            <a:endParaRPr lang="fi-FI" sz="2000" dirty="0"/>
-          </a:p>
-          <a:p>
-            <a:r>
-              <a:rPr lang="fi-FI" dirty="0"/>
-              <a:t>Hajautetut (DVCS)</a:t>
-            </a:r>
-          </a:p>
-          <a:p>
-            <a:pPr lvl="1"/>
-            <a:r>
-              <a:rPr lang="fi-FI" dirty="0"/>
-              <a:t>Tiedostot hajautetusti kaikilla koneilla </a:t>
-            </a:r>
-            <a:r>
-              <a:rPr lang="fi-FI" sz="1600" dirty="0"/>
-              <a:t>(Distributed Version Control System)</a:t>
-            </a:r>
-            <a:endParaRPr lang="fi-FI" dirty="0"/>
-          </a:p>
-          <a:p>
-            <a:pPr lvl="1"/>
-            <a:endParaRPr lang="fi-FI" dirty="0"/>
-          </a:p>
-          <a:p>
-            <a:endParaRPr lang="fi-FI" dirty="0"/>
-          </a:p>
-        </p:txBody>
-      </p:sp>
-      <p:sp>
-        <p:nvSpPr>
-          <p:cNvPr id="3" name="Alatunnisteen paikkamerkki 2"/>
-          <p:cNvSpPr>
-            <a:spLocks noGrp="1"/>
-          </p:cNvSpPr>
-          <p:nvPr>
-            <p:ph type="ftr" sz="quarter" idx="10"/>
-          </p:nvPr>
-        </p:nvSpPr>
-        <p:spPr/>
-        <p:txBody>
-          <a:bodyPr/>
-          <a:lstStyle/>
-          <a:p>
-            <a:pPr>
-              <a:defRPr/>
-            </a:pPr>
-            <a:endParaRPr lang="fi-FI"/>
-          </a:p>
-        </p:txBody>
-      </p:sp>
-    </p:spTree>
-  </p:cSld>
-  <p:clrMapOvr>
-    <a:masterClrMapping/>
-  </p:clrMapOvr>
-</p:sld>
-</file>
-
-<file path=ppt/slides/slide30.xml><?xml version="1.0" encoding="utf-8"?>
+<file path=ppt/slides/slide32.xml><?xml version="1.0" encoding="utf-8"?>
 <p:sld xmlns:a="http://schemas.openxmlformats.org/drawingml/2006/main" xmlns:r="http://schemas.openxmlformats.org/officeDocument/2006/relationships" xmlns:p="http://schemas.openxmlformats.org/presentationml/2006/main">
   <p:cSld>
     <p:spTree>
@@ -11112,7 +11806,7 @@
 </p:sld>
 </file>
 
-<file path=ppt/slides/slide31.xml><?xml version="1.0" encoding="utf-8"?>
+<file path=ppt/slides/slide33.xml><?xml version="1.0" encoding="utf-8"?>
 <p:sld xmlns:a="http://schemas.openxmlformats.org/drawingml/2006/main" xmlns:r="http://schemas.openxmlformats.org/officeDocument/2006/relationships" xmlns:p="http://schemas.openxmlformats.org/presentationml/2006/main">
   <p:cSld>
     <p:spTree>
@@ -11222,7 +11916,7 @@
 </p:sld>
 </file>
 
-<file path=ppt/slides/slide32.xml><?xml version="1.0" encoding="utf-8"?>
+<file path=ppt/slides/slide34.xml><?xml version="1.0" encoding="utf-8"?>
 <p:sld xmlns:a="http://schemas.openxmlformats.org/drawingml/2006/main" xmlns:r="http://schemas.openxmlformats.org/officeDocument/2006/relationships" xmlns:p="http://schemas.openxmlformats.org/presentationml/2006/main">
   <p:cSld>
     <p:spTree>
@@ -11375,7 +12069,7 @@
 </p:sld>
 </file>
 
-<file path=ppt/slides/slide33.xml><?xml version="1.0" encoding="utf-8"?>
+<file path=ppt/slides/slide35.xml><?xml version="1.0" encoding="utf-8"?>
 <p:sld xmlns:a="http://schemas.openxmlformats.org/drawingml/2006/main" xmlns:r="http://schemas.openxmlformats.org/officeDocument/2006/relationships" xmlns:p="http://schemas.openxmlformats.org/presentationml/2006/main">
   <p:cSld>
     <p:spTree>
@@ -11496,7 +12190,7 @@
 </p:sld>
 </file>
 
-<file path=ppt/slides/slide34.xml><?xml version="1.0" encoding="utf-8"?>
+<file path=ppt/slides/slide36.xml><?xml version="1.0" encoding="utf-8"?>
 <p:sld xmlns:a="http://schemas.openxmlformats.org/drawingml/2006/main" xmlns:r="http://schemas.openxmlformats.org/officeDocument/2006/relationships" xmlns:p="http://schemas.openxmlformats.org/presentationml/2006/main">
   <p:cSld>
     <p:spTree>
@@ -11679,7 +12373,7 @@
 </p:sld>
 </file>
 
-<file path=ppt/slides/slide35.xml><?xml version="1.0" encoding="utf-8"?>
+<file path=ppt/slides/slide37.xml><?xml version="1.0" encoding="utf-8"?>
 <p:sld xmlns:a="http://schemas.openxmlformats.org/drawingml/2006/main" xmlns:r="http://schemas.openxmlformats.org/officeDocument/2006/relationships" xmlns:p="http://schemas.openxmlformats.org/presentationml/2006/main">
   <p:cSld>
     <p:spTree>
@@ -11864,7 +12558,7 @@
 </p:sld>
 </file>
 
-<file path=ppt/slides/slide36.xml><?xml version="1.0" encoding="utf-8"?>
+<file path=ppt/slides/slide38.xml><?xml version="1.0" encoding="utf-8"?>
 <p:sld xmlns:a="http://schemas.openxmlformats.org/drawingml/2006/main" xmlns:r="http://schemas.openxmlformats.org/officeDocument/2006/relationships" xmlns:p="http://schemas.openxmlformats.org/presentationml/2006/main">
   <p:cSld>
     <p:spTree>
@@ -12359,7 +13053,7 @@
             <a:pPr lvl="1"/>
             <a:r>
               <a:rPr lang="fi-FI" sz="1800" i="1" dirty="0"/>
-              <a:t>GitHub julkaisi alkuvuodesta 2019 rajattomat ilmaiset privaatit </a:t>
+              <a:t>GitHub julkaisi huhtikuussa 2020 rajattomat ilmaiset privaatit </a:t>
             </a:r>
             <a:r>
               <a:rPr lang="fi-FI" sz="1800" i="1" dirty="0" err="1"/>
@@ -12367,7 +13061,7 @@
             </a:r>
             <a:r>
               <a:rPr lang="fi-FI" sz="1800" i="1" dirty="0"/>
-              <a:t>, joissa on mahdollista olla 3 tekijää (</a:t>
+              <a:t>, joissa on mahdollista olla rajattomasti tekijöitä (</a:t>
             </a:r>
             <a:r>
               <a:rPr lang="fi-FI" sz="1800" i="1" dirty="0" err="1"/>
@@ -13843,49 +14537,15 @@
 </file>
 
 <file path=customXml/item2.xml><?xml version="1.0" encoding="utf-8"?>
-<?mso-contentType ?>
-<spe:Receivers xmlns:spe="http://schemas.microsoft.com/sharepoint/events">
-  <Receiver>
-    <Name>Document ID Generator</Name>
-    <Synchronization>Synchronous</Synchronization>
-    <Type>10001</Type>
-    <SequenceNumber>1000</SequenceNumber>
-    <Assembly>Microsoft.Office.DocumentManagement, Version=14.0.0.0, Culture=neutral, PublicKeyToken=71e9bce111e9429c</Assembly>
-    <Class>Microsoft.Office.DocumentManagement.Internal.DocIdHandler</Class>
-    <Data/>
-    <Filter/>
-  </Receiver>
-  <Receiver>
-    <Name>Document ID Generator</Name>
-    <Synchronization>Synchronous</Synchronization>
-    <Type>10002</Type>
-    <SequenceNumber>1001</SequenceNumber>
-    <Assembly>Microsoft.Office.DocumentManagement, Version=14.0.0.0, Culture=neutral, PublicKeyToken=71e9bce111e9429c</Assembly>
-    <Class>Microsoft.Office.DocumentManagement.Internal.DocIdHandler</Class>
-    <Data/>
-    <Filter/>
-  </Receiver>
-  <Receiver>
-    <Name>Document ID Generator</Name>
-    <Synchronization>Synchronous</Synchronization>
-    <Type>10004</Type>
-    <SequenceNumber>1002</SequenceNumber>
-    <Assembly>Microsoft.Office.DocumentManagement, Version=14.0.0.0, Culture=neutral, PublicKeyToken=71e9bce111e9429c</Assembly>
-    <Class>Microsoft.Office.DocumentManagement.Internal.DocIdHandler</Class>
-    <Data/>
-    <Filter/>
-  </Receiver>
-  <Receiver>
-    <Name>Document ID Generator</Name>
-    <Synchronization>Synchronous</Synchronization>
-    <Type>10006</Type>
-    <SequenceNumber>1003</SequenceNumber>
-    <Assembly>Microsoft.Office.DocumentManagement, Version=14.0.0.0, Culture=neutral, PublicKeyToken=71e9bce111e9429c</Assembly>
-    <Class>Microsoft.Office.DocumentManagement.Internal.DocIdHandler</Class>
-    <Data/>
-    <Filter/>
-  </Receiver>
-</spe:Receivers>
+<p:properties xmlns:p="http://schemas.microsoft.com/office/2006/metadata/properties" xmlns:xsi="http://www.w3.org/2001/XMLSchema-instance">
+  <documentManagement>
+    <_dlc_DocId xmlns="bcbf1d70-0686-4af9-897b-e669bf036024">SAVONIA-1148-15</_dlc_DocId>
+    <_dlc_DocIdUrl xmlns="bcbf1d70-0686-4af9-897b-e669bf036024">
+      <Url>https://santra.savonia.fi/tukipalvelut/viestinta/visuaalinen-ilme/_layouts/DocIdRedir.aspx?ID=SAVONIA-1148-15</Url>
+      <Description>SAVONIA-1148-15</Description>
+    </_dlc_DocIdUrl>
+  </documentManagement>
+</p:properties>
 </file>
 
 <file path=customXml/item3.xml><?xml version="1.0" encoding="utf-8"?>
@@ -14034,15 +14694,49 @@
 </file>
 
 <file path=customXml/item4.xml><?xml version="1.0" encoding="utf-8"?>
-<p:properties xmlns:p="http://schemas.microsoft.com/office/2006/metadata/properties" xmlns:xsi="http://www.w3.org/2001/XMLSchema-instance">
-  <documentManagement>
-    <_dlc_DocId xmlns="bcbf1d70-0686-4af9-897b-e669bf036024">SAVONIA-1148-15</_dlc_DocId>
-    <_dlc_DocIdUrl xmlns="bcbf1d70-0686-4af9-897b-e669bf036024">
-      <Url>https://santra.savonia.fi/tukipalvelut/viestinta/visuaalinen-ilme/_layouts/DocIdRedir.aspx?ID=SAVONIA-1148-15</Url>
-      <Description>SAVONIA-1148-15</Description>
-    </_dlc_DocIdUrl>
-  </documentManagement>
-</p:properties>
+<?mso-contentType ?>
+<spe:Receivers xmlns:spe="http://schemas.microsoft.com/sharepoint/events">
+  <Receiver>
+    <Name>Document ID Generator</Name>
+    <Synchronization>Synchronous</Synchronization>
+    <Type>10001</Type>
+    <SequenceNumber>1000</SequenceNumber>
+    <Assembly>Microsoft.Office.DocumentManagement, Version=14.0.0.0, Culture=neutral, PublicKeyToken=71e9bce111e9429c</Assembly>
+    <Class>Microsoft.Office.DocumentManagement.Internal.DocIdHandler</Class>
+    <Data/>
+    <Filter/>
+  </Receiver>
+  <Receiver>
+    <Name>Document ID Generator</Name>
+    <Synchronization>Synchronous</Synchronization>
+    <Type>10002</Type>
+    <SequenceNumber>1001</SequenceNumber>
+    <Assembly>Microsoft.Office.DocumentManagement, Version=14.0.0.0, Culture=neutral, PublicKeyToken=71e9bce111e9429c</Assembly>
+    <Class>Microsoft.Office.DocumentManagement.Internal.DocIdHandler</Class>
+    <Data/>
+    <Filter/>
+  </Receiver>
+  <Receiver>
+    <Name>Document ID Generator</Name>
+    <Synchronization>Synchronous</Synchronization>
+    <Type>10004</Type>
+    <SequenceNumber>1002</SequenceNumber>
+    <Assembly>Microsoft.Office.DocumentManagement, Version=14.0.0.0, Culture=neutral, PublicKeyToken=71e9bce111e9429c</Assembly>
+    <Class>Microsoft.Office.DocumentManagement.Internal.DocIdHandler</Class>
+    <Data/>
+    <Filter/>
+  </Receiver>
+  <Receiver>
+    <Name>Document ID Generator</Name>
+    <Synchronization>Synchronous</Synchronization>
+    <Type>10006</Type>
+    <SequenceNumber>1003</SequenceNumber>
+    <Assembly>Microsoft.Office.DocumentManagement, Version=14.0.0.0, Culture=neutral, PublicKeyToken=71e9bce111e9429c</Assembly>
+    <Class>Microsoft.Office.DocumentManagement.Internal.DocIdHandler</Class>
+    <Data/>
+    <Filter/>
+  </Receiver>
+</spe:Receivers>
 </file>
 
 <file path=customXml/itemProps1.xml><?xml version="1.0" encoding="utf-8"?>
@@ -14054,9 +14748,17 @@
 </file>
 
 <file path=customXml/itemProps2.xml><?xml version="1.0" encoding="utf-8"?>
-<ds:datastoreItem xmlns:ds="http://schemas.openxmlformats.org/officeDocument/2006/customXml" ds:itemID="{D104143F-77D4-42B1-8837-22F1A6D250D0}">
+<ds:datastoreItem xmlns:ds="http://schemas.openxmlformats.org/officeDocument/2006/customXml" ds:itemID="{F82A60BA-D9BF-4B65-8C62-90B75FB47D2A}">
   <ds:schemaRefs>
-    <ds:schemaRef ds:uri="http://schemas.microsoft.com/sharepoint/events"/>
+    <ds:schemaRef ds:uri="bcbf1d70-0686-4af9-897b-e669bf036024"/>
+    <ds:schemaRef ds:uri="http://schemas.microsoft.com/office/2006/metadata/properties"/>
+    <ds:schemaRef ds:uri="http://www.w3.org/XML/1998/namespace"/>
+    <ds:schemaRef ds:uri="http://schemas.microsoft.com/office/2006/documentManagement/types"/>
+    <ds:schemaRef ds:uri="http://purl.org/dc/dcmitype/"/>
+    <ds:schemaRef ds:uri="http://schemas.microsoft.com/office/infopath/2007/PartnerControls"/>
+    <ds:schemaRef ds:uri="http://schemas.openxmlformats.org/package/2006/metadata/core-properties"/>
+    <ds:schemaRef ds:uri="http://purl.org/dc/terms/"/>
+    <ds:schemaRef ds:uri="http://purl.org/dc/elements/1.1/"/>
   </ds:schemaRefs>
 </ds:datastoreItem>
 </file>
@@ -14080,17 +14782,9 @@
 </file>
 
 <file path=customXml/itemProps4.xml><?xml version="1.0" encoding="utf-8"?>
-<ds:datastoreItem xmlns:ds="http://schemas.openxmlformats.org/officeDocument/2006/customXml" ds:itemID="{F82A60BA-D9BF-4B65-8C62-90B75FB47D2A}">
+<ds:datastoreItem xmlns:ds="http://schemas.openxmlformats.org/officeDocument/2006/customXml" ds:itemID="{D104143F-77D4-42B1-8837-22F1A6D250D0}">
   <ds:schemaRefs>
-    <ds:schemaRef ds:uri="bcbf1d70-0686-4af9-897b-e669bf036024"/>
-    <ds:schemaRef ds:uri="http://schemas.microsoft.com/office/2006/metadata/properties"/>
-    <ds:schemaRef ds:uri="http://www.w3.org/XML/1998/namespace"/>
-    <ds:schemaRef ds:uri="http://schemas.microsoft.com/office/2006/documentManagement/types"/>
-    <ds:schemaRef ds:uri="http://purl.org/dc/dcmitype/"/>
-    <ds:schemaRef ds:uri="http://schemas.microsoft.com/office/infopath/2007/PartnerControls"/>
-    <ds:schemaRef ds:uri="http://schemas.openxmlformats.org/package/2006/metadata/core-properties"/>
-    <ds:schemaRef ds:uri="http://purl.org/dc/terms/"/>
-    <ds:schemaRef ds:uri="http://purl.org/dc/elements/1.1/"/>
+    <ds:schemaRef ds:uri="http://schemas.microsoft.com/sharepoint/events"/>
   </ds:schemaRefs>
 </ds:datastoreItem>
 </file>
</xml_diff>